<commit_message>
modified powerpoint final version
</commit_message>
<xml_diff>
--- a/2018_11_19_GA Presentation_Pavitra Kumar_Lending Club.pptx
+++ b/2018_11_19_GA Presentation_Pavitra Kumar_Lending Club.pptx
@@ -6,10 +6,10 @@
     <p:sldMasterId id="2147483676" r:id="rId2"/>
   </p:sldMasterIdLst>
   <p:notesMasterIdLst>
-    <p:notesMasterId r:id="rId30"/>
+    <p:notesMasterId r:id="rId25"/>
   </p:notesMasterIdLst>
   <p:handoutMasterIdLst>
-    <p:handoutMasterId r:id="rId31"/>
+    <p:handoutMasterId r:id="rId26"/>
   </p:handoutMasterIdLst>
   <p:sldIdLst>
     <p:sldId id="270" r:id="rId3"/>
@@ -23,22 +23,17 @@
     <p:sldId id="586" r:id="rId11"/>
     <p:sldId id="591" r:id="rId12"/>
     <p:sldId id="592" r:id="rId13"/>
-    <p:sldId id="590" r:id="rId14"/>
-    <p:sldId id="594" r:id="rId15"/>
-    <p:sldId id="598" r:id="rId16"/>
-    <p:sldId id="595" r:id="rId17"/>
-    <p:sldId id="601" r:id="rId18"/>
-    <p:sldId id="599" r:id="rId19"/>
-    <p:sldId id="600" r:id="rId20"/>
-    <p:sldId id="603" r:id="rId21"/>
-    <p:sldId id="589" r:id="rId22"/>
-    <p:sldId id="588" r:id="rId23"/>
-    <p:sldId id="606" r:id="rId24"/>
-    <p:sldId id="607" r:id="rId25"/>
-    <p:sldId id="608" r:id="rId26"/>
-    <p:sldId id="609" r:id="rId27"/>
-    <p:sldId id="610" r:id="rId28"/>
-    <p:sldId id="611" r:id="rId29"/>
+    <p:sldId id="594" r:id="rId14"/>
+    <p:sldId id="599" r:id="rId15"/>
+    <p:sldId id="600" r:id="rId16"/>
+    <p:sldId id="614" r:id="rId17"/>
+    <p:sldId id="589" r:id="rId18"/>
+    <p:sldId id="588" r:id="rId19"/>
+    <p:sldId id="606" r:id="rId20"/>
+    <p:sldId id="608" r:id="rId21"/>
+    <p:sldId id="609" r:id="rId22"/>
+    <p:sldId id="610" r:id="rId23"/>
+    <p:sldId id="611" r:id="rId24"/>
   </p:sldIdLst>
   <p:sldSz cx="9144000" cy="6858000" type="screen4x3"/>
   <p:notesSz cx="7010400" cy="9296400"/>
@@ -153,18 +148,13 @@
             <p14:sldId id="586"/>
             <p14:sldId id="591"/>
             <p14:sldId id="592"/>
-            <p14:sldId id="590"/>
             <p14:sldId id="594"/>
-            <p14:sldId id="598"/>
-            <p14:sldId id="595"/>
-            <p14:sldId id="601"/>
             <p14:sldId id="599"/>
             <p14:sldId id="600"/>
-            <p14:sldId id="603"/>
+            <p14:sldId id="614"/>
             <p14:sldId id="589"/>
             <p14:sldId id="588"/>
             <p14:sldId id="606"/>
-            <p14:sldId id="607"/>
             <p14:sldId id="608"/>
             <p14:sldId id="609"/>
             <p14:sldId id="610"/>
@@ -1071,7 +1061,7 @@
     </p:spTree>
     <p:extLst>
       <p:ext uri="{BB962C8B-B14F-4D97-AF65-F5344CB8AC3E}">
-        <p14:creationId xmlns:p14="http://schemas.microsoft.com/office/powerpoint/2010/main" val="3064403952"/>
+        <p14:creationId xmlns:p14="http://schemas.microsoft.com/office/powerpoint/2010/main" val="169032562"/>
       </p:ext>
     </p:extLst>
   </p:cSld>
@@ -1155,7 +1145,7 @@
     </p:spTree>
     <p:extLst>
       <p:ext uri="{BB962C8B-B14F-4D97-AF65-F5344CB8AC3E}">
-        <p14:creationId xmlns:p14="http://schemas.microsoft.com/office/powerpoint/2010/main" val="169032562"/>
+        <p14:creationId xmlns:p14="http://schemas.microsoft.com/office/powerpoint/2010/main" val="1657297594"/>
       </p:ext>
     </p:extLst>
   </p:cSld>
@@ -1239,7 +1229,7 @@
     </p:spTree>
     <p:extLst>
       <p:ext uri="{BB962C8B-B14F-4D97-AF65-F5344CB8AC3E}">
-        <p14:creationId xmlns:p14="http://schemas.microsoft.com/office/powerpoint/2010/main" val="3730505361"/>
+        <p14:creationId xmlns:p14="http://schemas.microsoft.com/office/powerpoint/2010/main" val="569059965"/>
       </p:ext>
     </p:extLst>
   </p:cSld>
@@ -1323,7 +1313,7 @@
     </p:spTree>
     <p:extLst>
       <p:ext uri="{BB962C8B-B14F-4D97-AF65-F5344CB8AC3E}">
-        <p14:creationId xmlns:p14="http://schemas.microsoft.com/office/powerpoint/2010/main" val="2414381127"/>
+        <p14:creationId xmlns:p14="http://schemas.microsoft.com/office/powerpoint/2010/main" val="1287364363"/>
       </p:ext>
     </p:extLst>
   </p:cSld>
@@ -1407,7 +1397,7 @@
     </p:spTree>
     <p:extLst>
       <p:ext uri="{BB962C8B-B14F-4D97-AF65-F5344CB8AC3E}">
-        <p14:creationId xmlns:p14="http://schemas.microsoft.com/office/powerpoint/2010/main" val="1344724522"/>
+        <p14:creationId xmlns:p14="http://schemas.microsoft.com/office/powerpoint/2010/main" val="3895598060"/>
       </p:ext>
     </p:extLst>
   </p:cSld>
@@ -1491,7 +1481,7 @@
     </p:spTree>
     <p:extLst>
       <p:ext uri="{BB962C8B-B14F-4D97-AF65-F5344CB8AC3E}">
-        <p14:creationId xmlns:p14="http://schemas.microsoft.com/office/powerpoint/2010/main" val="1657297594"/>
+        <p14:creationId xmlns:p14="http://schemas.microsoft.com/office/powerpoint/2010/main" val="1126732749"/>
       </p:ext>
     </p:extLst>
   </p:cSld>
@@ -1575,7 +1565,7 @@
     </p:spTree>
     <p:extLst>
       <p:ext uri="{BB962C8B-B14F-4D97-AF65-F5344CB8AC3E}">
-        <p14:creationId xmlns:p14="http://schemas.microsoft.com/office/powerpoint/2010/main" val="569059965"/>
+        <p14:creationId xmlns:p14="http://schemas.microsoft.com/office/powerpoint/2010/main" val="3575352186"/>
       </p:ext>
     </p:extLst>
   </p:cSld>
@@ -1659,7 +1649,7 @@
     </p:spTree>
     <p:extLst>
       <p:ext uri="{BB962C8B-B14F-4D97-AF65-F5344CB8AC3E}">
-        <p14:creationId xmlns:p14="http://schemas.microsoft.com/office/powerpoint/2010/main" val="3734371905"/>
+        <p14:creationId xmlns:p14="http://schemas.microsoft.com/office/powerpoint/2010/main" val="1790927742"/>
       </p:ext>
     </p:extLst>
   </p:cSld>
@@ -1827,7 +1817,7 @@
     </p:spTree>
     <p:extLst>
       <p:ext uri="{BB962C8B-B14F-4D97-AF65-F5344CB8AC3E}">
-        <p14:creationId xmlns:p14="http://schemas.microsoft.com/office/powerpoint/2010/main" val="3895598060"/>
+        <p14:creationId xmlns:p14="http://schemas.microsoft.com/office/powerpoint/2010/main" val="3159488659"/>
       </p:ext>
     </p:extLst>
   </p:cSld>
@@ -1881,7 +1871,10 @@
           <a:bodyPr/>
           <a:lstStyle/>
           <a:p>
-            <a:endParaRPr lang="en-US" dirty="0"/>
+            <a:pPr marL="339725" lvl="1" indent="-106363">
+              <a:buNone/>
+            </a:pPr>
+            <a:endParaRPr lang="en-US" b="1" dirty="0" smtClean="0"/>
           </a:p>
         </p:txBody>
       </p:sp>
@@ -1901,17 +1894,26 @@
           <a:lstStyle/>
           <a:p>
             <a:fld id="{C39337EC-B44D-4CB5-9C94-A9D6BC5C7729}" type="slidenum">
-              <a:rPr lang="en-US" smtClean="0"/>
+              <a:rPr lang="en-US" smtClean="0">
+                <a:solidFill>
+                  <a:prstClr val="black"/>
+                </a:solidFill>
+              </a:rPr>
+              <a:pPr/>
               <a:t>20</a:t>
             </a:fld>
-            <a:endParaRPr lang="en-US" dirty="0"/>
+            <a:endParaRPr lang="en-US" dirty="0">
+              <a:solidFill>
+                <a:prstClr val="black"/>
+              </a:solidFill>
+            </a:endParaRPr>
           </a:p>
         </p:txBody>
       </p:sp>
     </p:spTree>
     <p:extLst>
       <p:ext uri="{BB962C8B-B14F-4D97-AF65-F5344CB8AC3E}">
-        <p14:creationId xmlns:p14="http://schemas.microsoft.com/office/powerpoint/2010/main" val="1126732749"/>
+        <p14:creationId xmlns:p14="http://schemas.microsoft.com/office/powerpoint/2010/main" val="1511980378"/>
       </p:ext>
     </p:extLst>
   </p:cSld>
@@ -1965,342 +1967,6 @@
           <a:bodyPr/>
           <a:lstStyle/>
           <a:p>
-            <a:endParaRPr lang="en-US" dirty="0"/>
-          </a:p>
-        </p:txBody>
-      </p:sp>
-      <p:sp>
-        <p:nvSpPr>
-          <p:cNvPr id="4" name="Slide Number Placeholder 3"/>
-          <p:cNvSpPr>
-            <a:spLocks noGrp="1"/>
-          </p:cNvSpPr>
-          <p:nvPr>
-            <p:ph type="sldNum" sz="quarter" idx="10"/>
-          </p:nvPr>
-        </p:nvSpPr>
-        <p:spPr/>
-        <p:txBody>
-          <a:bodyPr/>
-          <a:lstStyle/>
-          <a:p>
-            <a:fld id="{C39337EC-B44D-4CB5-9C94-A9D6BC5C7729}" type="slidenum">
-              <a:rPr lang="en-US" smtClean="0"/>
-              <a:t>21</a:t>
-            </a:fld>
-            <a:endParaRPr lang="en-US" dirty="0"/>
-          </a:p>
-        </p:txBody>
-      </p:sp>
-    </p:spTree>
-    <p:extLst>
-      <p:ext uri="{BB962C8B-B14F-4D97-AF65-F5344CB8AC3E}">
-        <p14:creationId xmlns:p14="http://schemas.microsoft.com/office/powerpoint/2010/main" val="3575352186"/>
-      </p:ext>
-    </p:extLst>
-  </p:cSld>
-  <p:clrMapOvr>
-    <a:masterClrMapping/>
-  </p:clrMapOvr>
-</p:notes>
-</file>
-
-<file path=ppt/notesSlides/notesSlide23.xml><?xml version="1.0" encoding="utf-8"?>
-<p:notes xmlns:a="http://schemas.openxmlformats.org/drawingml/2006/main" xmlns:r="http://schemas.openxmlformats.org/officeDocument/2006/relationships" xmlns:p="http://schemas.openxmlformats.org/presentationml/2006/main">
-  <p:cSld>
-    <p:spTree>
-      <p:nvGrpSpPr>
-        <p:cNvPr id="1" name=""/>
-        <p:cNvGrpSpPr/>
-        <p:nvPr/>
-      </p:nvGrpSpPr>
-      <p:grpSpPr>
-        <a:xfrm>
-          <a:off x="0" y="0"/>
-          <a:ext cx="0" cy="0"/>
-          <a:chOff x="0" y="0"/>
-          <a:chExt cx="0" cy="0"/>
-        </a:xfrm>
-      </p:grpSpPr>
-      <p:sp>
-        <p:nvSpPr>
-          <p:cNvPr id="2" name="Slide Image Placeholder 1"/>
-          <p:cNvSpPr>
-            <a:spLocks noGrp="1" noRot="1" noChangeAspect="1"/>
-          </p:cNvSpPr>
-          <p:nvPr>
-            <p:ph type="sldImg"/>
-          </p:nvPr>
-        </p:nvSpPr>
-        <p:spPr/>
-      </p:sp>
-      <p:sp>
-        <p:nvSpPr>
-          <p:cNvPr id="3" name="Notes Placeholder 2"/>
-          <p:cNvSpPr>
-            <a:spLocks noGrp="1"/>
-          </p:cNvSpPr>
-          <p:nvPr>
-            <p:ph type="body" idx="1"/>
-          </p:nvPr>
-        </p:nvSpPr>
-        <p:spPr/>
-        <p:txBody>
-          <a:bodyPr/>
-          <a:lstStyle/>
-          <a:p>
-            <a:endParaRPr lang="en-US" dirty="0"/>
-          </a:p>
-        </p:txBody>
-      </p:sp>
-      <p:sp>
-        <p:nvSpPr>
-          <p:cNvPr id="4" name="Slide Number Placeholder 3"/>
-          <p:cNvSpPr>
-            <a:spLocks noGrp="1"/>
-          </p:cNvSpPr>
-          <p:nvPr>
-            <p:ph type="sldNum" sz="quarter" idx="10"/>
-          </p:nvPr>
-        </p:nvSpPr>
-        <p:spPr/>
-        <p:txBody>
-          <a:bodyPr/>
-          <a:lstStyle/>
-          <a:p>
-            <a:fld id="{C39337EC-B44D-4CB5-9C94-A9D6BC5C7729}" type="slidenum">
-              <a:rPr lang="en-US" smtClean="0"/>
-              <a:t>22</a:t>
-            </a:fld>
-            <a:endParaRPr lang="en-US" dirty="0"/>
-          </a:p>
-        </p:txBody>
-      </p:sp>
-    </p:spTree>
-    <p:extLst>
-      <p:ext uri="{BB962C8B-B14F-4D97-AF65-F5344CB8AC3E}">
-        <p14:creationId xmlns:p14="http://schemas.microsoft.com/office/powerpoint/2010/main" val="3383477558"/>
-      </p:ext>
-    </p:extLst>
-  </p:cSld>
-  <p:clrMapOvr>
-    <a:masterClrMapping/>
-  </p:clrMapOvr>
-</p:notes>
-</file>
-
-<file path=ppt/notesSlides/notesSlide24.xml><?xml version="1.0" encoding="utf-8"?>
-<p:notes xmlns:a="http://schemas.openxmlformats.org/drawingml/2006/main" xmlns:r="http://schemas.openxmlformats.org/officeDocument/2006/relationships" xmlns:p="http://schemas.openxmlformats.org/presentationml/2006/main">
-  <p:cSld>
-    <p:spTree>
-      <p:nvGrpSpPr>
-        <p:cNvPr id="1" name=""/>
-        <p:cNvGrpSpPr/>
-        <p:nvPr/>
-      </p:nvGrpSpPr>
-      <p:grpSpPr>
-        <a:xfrm>
-          <a:off x="0" y="0"/>
-          <a:ext cx="0" cy="0"/>
-          <a:chOff x="0" y="0"/>
-          <a:chExt cx="0" cy="0"/>
-        </a:xfrm>
-      </p:grpSpPr>
-      <p:sp>
-        <p:nvSpPr>
-          <p:cNvPr id="2" name="Slide Image Placeholder 1"/>
-          <p:cNvSpPr>
-            <a:spLocks noGrp="1" noRot="1" noChangeAspect="1"/>
-          </p:cNvSpPr>
-          <p:nvPr>
-            <p:ph type="sldImg"/>
-          </p:nvPr>
-        </p:nvSpPr>
-        <p:spPr/>
-      </p:sp>
-      <p:sp>
-        <p:nvSpPr>
-          <p:cNvPr id="3" name="Notes Placeholder 2"/>
-          <p:cNvSpPr>
-            <a:spLocks noGrp="1"/>
-          </p:cNvSpPr>
-          <p:nvPr>
-            <p:ph type="body" idx="1"/>
-          </p:nvPr>
-        </p:nvSpPr>
-        <p:spPr/>
-        <p:txBody>
-          <a:bodyPr/>
-          <a:lstStyle/>
-          <a:p>
-            <a:endParaRPr lang="en-US" dirty="0"/>
-          </a:p>
-        </p:txBody>
-      </p:sp>
-      <p:sp>
-        <p:nvSpPr>
-          <p:cNvPr id="4" name="Slide Number Placeholder 3"/>
-          <p:cNvSpPr>
-            <a:spLocks noGrp="1"/>
-          </p:cNvSpPr>
-          <p:nvPr>
-            <p:ph type="sldNum" sz="quarter" idx="10"/>
-          </p:nvPr>
-        </p:nvSpPr>
-        <p:spPr/>
-        <p:txBody>
-          <a:bodyPr/>
-          <a:lstStyle/>
-          <a:p>
-            <a:fld id="{C39337EC-B44D-4CB5-9C94-A9D6BC5C7729}" type="slidenum">
-              <a:rPr lang="en-US" smtClean="0"/>
-              <a:t>23</a:t>
-            </a:fld>
-            <a:endParaRPr lang="en-US" dirty="0"/>
-          </a:p>
-        </p:txBody>
-      </p:sp>
-    </p:spTree>
-    <p:extLst>
-      <p:ext uri="{BB962C8B-B14F-4D97-AF65-F5344CB8AC3E}">
-        <p14:creationId xmlns:p14="http://schemas.microsoft.com/office/powerpoint/2010/main" val="1790927742"/>
-      </p:ext>
-    </p:extLst>
-  </p:cSld>
-  <p:clrMapOvr>
-    <a:masterClrMapping/>
-  </p:clrMapOvr>
-</p:notes>
-</file>
-
-<file path=ppt/notesSlides/notesSlide25.xml><?xml version="1.0" encoding="utf-8"?>
-<p:notes xmlns:a="http://schemas.openxmlformats.org/drawingml/2006/main" xmlns:r="http://schemas.openxmlformats.org/officeDocument/2006/relationships" xmlns:p="http://schemas.openxmlformats.org/presentationml/2006/main">
-  <p:cSld>
-    <p:spTree>
-      <p:nvGrpSpPr>
-        <p:cNvPr id="1" name=""/>
-        <p:cNvGrpSpPr/>
-        <p:nvPr/>
-      </p:nvGrpSpPr>
-      <p:grpSpPr>
-        <a:xfrm>
-          <a:off x="0" y="0"/>
-          <a:ext cx="0" cy="0"/>
-          <a:chOff x="0" y="0"/>
-          <a:chExt cx="0" cy="0"/>
-        </a:xfrm>
-      </p:grpSpPr>
-      <p:sp>
-        <p:nvSpPr>
-          <p:cNvPr id="2" name="Slide Image Placeholder 1"/>
-          <p:cNvSpPr>
-            <a:spLocks noGrp="1" noRot="1" noChangeAspect="1"/>
-          </p:cNvSpPr>
-          <p:nvPr>
-            <p:ph type="sldImg"/>
-          </p:nvPr>
-        </p:nvSpPr>
-        <p:spPr/>
-      </p:sp>
-      <p:sp>
-        <p:nvSpPr>
-          <p:cNvPr id="3" name="Notes Placeholder 2"/>
-          <p:cNvSpPr>
-            <a:spLocks noGrp="1"/>
-          </p:cNvSpPr>
-          <p:nvPr>
-            <p:ph type="body" idx="1"/>
-          </p:nvPr>
-        </p:nvSpPr>
-        <p:spPr/>
-        <p:txBody>
-          <a:bodyPr/>
-          <a:lstStyle/>
-          <a:p>
-            <a:endParaRPr lang="en-US" dirty="0"/>
-          </a:p>
-        </p:txBody>
-      </p:sp>
-      <p:sp>
-        <p:nvSpPr>
-          <p:cNvPr id="4" name="Slide Number Placeholder 3"/>
-          <p:cNvSpPr>
-            <a:spLocks noGrp="1"/>
-          </p:cNvSpPr>
-          <p:nvPr>
-            <p:ph type="sldNum" sz="quarter" idx="10"/>
-          </p:nvPr>
-        </p:nvSpPr>
-        <p:spPr/>
-        <p:txBody>
-          <a:bodyPr/>
-          <a:lstStyle/>
-          <a:p>
-            <a:fld id="{C39337EC-B44D-4CB5-9C94-A9D6BC5C7729}" type="slidenum">
-              <a:rPr lang="en-US" smtClean="0"/>
-              <a:t>24</a:t>
-            </a:fld>
-            <a:endParaRPr lang="en-US" dirty="0"/>
-          </a:p>
-        </p:txBody>
-      </p:sp>
-    </p:spTree>
-    <p:extLst>
-      <p:ext uri="{BB962C8B-B14F-4D97-AF65-F5344CB8AC3E}">
-        <p14:creationId xmlns:p14="http://schemas.microsoft.com/office/powerpoint/2010/main" val="3159488659"/>
-      </p:ext>
-    </p:extLst>
-  </p:cSld>
-  <p:clrMapOvr>
-    <a:masterClrMapping/>
-  </p:clrMapOvr>
-</p:notes>
-</file>
-
-<file path=ppt/notesSlides/notesSlide26.xml><?xml version="1.0" encoding="utf-8"?>
-<p:notes xmlns:a="http://schemas.openxmlformats.org/drawingml/2006/main" xmlns:r="http://schemas.openxmlformats.org/officeDocument/2006/relationships" xmlns:p="http://schemas.openxmlformats.org/presentationml/2006/main">
-  <p:cSld>
-    <p:spTree>
-      <p:nvGrpSpPr>
-        <p:cNvPr id="1" name=""/>
-        <p:cNvGrpSpPr/>
-        <p:nvPr/>
-      </p:nvGrpSpPr>
-      <p:grpSpPr>
-        <a:xfrm>
-          <a:off x="0" y="0"/>
-          <a:ext cx="0" cy="0"/>
-          <a:chOff x="0" y="0"/>
-          <a:chExt cx="0" cy="0"/>
-        </a:xfrm>
-      </p:grpSpPr>
-      <p:sp>
-        <p:nvSpPr>
-          <p:cNvPr id="2" name="Slide Image Placeholder 1"/>
-          <p:cNvSpPr>
-            <a:spLocks noGrp="1" noRot="1" noChangeAspect="1"/>
-          </p:cNvSpPr>
-          <p:nvPr>
-            <p:ph type="sldImg"/>
-          </p:nvPr>
-        </p:nvSpPr>
-        <p:spPr/>
-      </p:sp>
-      <p:sp>
-        <p:nvSpPr>
-          <p:cNvPr id="3" name="Notes Placeholder 2"/>
-          <p:cNvSpPr>
-            <a:spLocks noGrp="1"/>
-          </p:cNvSpPr>
-          <p:nvPr>
-            <p:ph type="body" idx="1"/>
-          </p:nvPr>
-        </p:nvSpPr>
-        <p:spPr/>
-        <p:txBody>
-          <a:bodyPr/>
-          <a:lstStyle/>
-          <a:p>
             <a:pPr marL="339725" lvl="1" indent="-106363">
               <a:buNone/>
             </a:pPr>
@@ -2330,103 +1996,7 @@
                 </a:solidFill>
               </a:rPr>
               <a:pPr/>
-              <a:t>25</a:t>
-            </a:fld>
-            <a:endParaRPr lang="en-US" dirty="0">
-              <a:solidFill>
-                <a:prstClr val="black"/>
-              </a:solidFill>
-            </a:endParaRPr>
-          </a:p>
-        </p:txBody>
-      </p:sp>
-    </p:spTree>
-    <p:extLst>
-      <p:ext uri="{BB962C8B-B14F-4D97-AF65-F5344CB8AC3E}">
-        <p14:creationId xmlns:p14="http://schemas.microsoft.com/office/powerpoint/2010/main" val="1511980378"/>
-      </p:ext>
-    </p:extLst>
-  </p:cSld>
-  <p:clrMapOvr>
-    <a:masterClrMapping/>
-  </p:clrMapOvr>
-</p:notes>
-</file>
-
-<file path=ppt/notesSlides/notesSlide27.xml><?xml version="1.0" encoding="utf-8"?>
-<p:notes xmlns:a="http://schemas.openxmlformats.org/drawingml/2006/main" xmlns:r="http://schemas.openxmlformats.org/officeDocument/2006/relationships" xmlns:p="http://schemas.openxmlformats.org/presentationml/2006/main">
-  <p:cSld>
-    <p:spTree>
-      <p:nvGrpSpPr>
-        <p:cNvPr id="1" name=""/>
-        <p:cNvGrpSpPr/>
-        <p:nvPr/>
-      </p:nvGrpSpPr>
-      <p:grpSpPr>
-        <a:xfrm>
-          <a:off x="0" y="0"/>
-          <a:ext cx="0" cy="0"/>
-          <a:chOff x="0" y="0"/>
-          <a:chExt cx="0" cy="0"/>
-        </a:xfrm>
-      </p:grpSpPr>
-      <p:sp>
-        <p:nvSpPr>
-          <p:cNvPr id="2" name="Slide Image Placeholder 1"/>
-          <p:cNvSpPr>
-            <a:spLocks noGrp="1" noRot="1" noChangeAspect="1"/>
-          </p:cNvSpPr>
-          <p:nvPr>
-            <p:ph type="sldImg"/>
-          </p:nvPr>
-        </p:nvSpPr>
-        <p:spPr/>
-      </p:sp>
-      <p:sp>
-        <p:nvSpPr>
-          <p:cNvPr id="3" name="Notes Placeholder 2"/>
-          <p:cNvSpPr>
-            <a:spLocks noGrp="1"/>
-          </p:cNvSpPr>
-          <p:nvPr>
-            <p:ph type="body" idx="1"/>
-          </p:nvPr>
-        </p:nvSpPr>
-        <p:spPr/>
-        <p:txBody>
-          <a:bodyPr/>
-          <a:lstStyle/>
-          <a:p>
-            <a:pPr marL="339725" lvl="1" indent="-106363">
-              <a:buNone/>
-            </a:pPr>
-            <a:endParaRPr lang="en-US" b="1" dirty="0" smtClean="0"/>
-          </a:p>
-        </p:txBody>
-      </p:sp>
-      <p:sp>
-        <p:nvSpPr>
-          <p:cNvPr id="4" name="Slide Number Placeholder 3"/>
-          <p:cNvSpPr>
-            <a:spLocks noGrp="1"/>
-          </p:cNvSpPr>
-          <p:nvPr>
-            <p:ph type="sldNum" sz="quarter" idx="10"/>
-          </p:nvPr>
-        </p:nvSpPr>
-        <p:spPr/>
-        <p:txBody>
-          <a:bodyPr/>
-          <a:lstStyle/>
-          <a:p>
-            <a:fld id="{C39337EC-B44D-4CB5-9C94-A9D6BC5C7729}" type="slidenum">
-              <a:rPr lang="en-US" smtClean="0">
-                <a:solidFill>
-                  <a:prstClr val="black"/>
-                </a:solidFill>
-              </a:rPr>
-              <a:pPr/>
-              <a:t>26</a:t>
+              <a:t>21</a:t>
             </a:fld>
             <a:endParaRPr lang="en-US" dirty="0">
               <a:solidFill>
@@ -7007,94 +6577,104 @@
           <a:p>
             <a:r>
               <a:rPr lang="en-US" sz="2400" dirty="0" smtClean="0"/>
-              <a:t>Target Variable: Loan Status Categories [GRAPHIC]</a:t>
-            </a:r>
-            <a:endParaRPr lang="en-US" sz="2400" dirty="0"/>
-          </a:p>
-        </p:txBody>
-      </p:sp>
-      <p:sp>
-        <p:nvSpPr>
-          <p:cNvPr id="10" name="AutoShape 6" descr="data:image/png;base64,iVBORw0KGgoAAAANSUhEUgAAAbIAAAIICAYAAAALymuSAAAABHNCSVQICAgIfAhkiAAAAAlwSFlzAAALEgAACxIB0t1+/AAAADl0RVh0U29mdHdhcmUAbWF0cGxvdGxpYiB2ZXJzaW9uIDIuMi4yLCBodHRwOi8vbWF0cGxvdGxpYi5vcmcvhp/UCwAAIABJREFUeJzs3XfYHFXd//H3J6EKoYciAUOJIoK0CAg2QOkK+hMFfSQiRRAr6CP66IOK2EXBAiIgoEgR4QGRFmmCSgm9m4ARQg0QIIqUhO/vj3M292Qze5ck98wO+3ld133du2dm9pzdnZ3vzJlTFBGYmZk11Yi6C2BmZrYgHMjMzKzRHMjMzKzRHMjMzKzRHMjMzKzRHMjMzKzR5iuQSYoB/m5Z2AW17iPptZLOl/SkpJfzd79B3eUaKknfzGX/r258PTPr3yILuP3vgX+VpD+wgK9rXU7SSOAc4A3AX4H7gJeBGXWWy+ojaV1gMnBZRLxzIb3mIsBLwH0Rse7CeM0mkfRN4H+Aj0TEb+ouT7da0ED2+YiYujAKYo2zLimIXRER29ZdGDPrXb5HZvNr9fz//lpLYWYWEUP+AyL/jR3Euuvmdf8ELAv8CJhKqi74Qdu6OwMXAk8AL5AOkj8EVujw2isCPwceBv4D3Al8Clg05zmlbf1v5vT/6vB61+TlY0qWrZnzuh94HngS+AOwZcm678yvcwKwAnBsLuMLwD3AZ/v5vFYCvgXcAfwbeAa4DfgOsEpe57j8+gf08zq35XU2GOR3uijwaeDGnO+/gOuBg4CRJd9n2d8JQ8jrYOBa4FngOeDmnP/IkvU3Bb4HTAKm58/xn8CJwNoL8lm27xfAG4Hzgadyuf4G7DDE30fH/Szvsz8gVcE9n/O5GNi+w2u9A/hpLvdTeZvJwI+BlQf4vS2Z3+vU/Jn9AzgCWHSI7+fNwLn5M38BeBy4CTgKGN32nvvdL4byfoD9+nnNP+V1FqHkt172W2xLX4y0b19POt78J7+/S+jnd7WA+9kKpOPTxfk7aX3/lwHvLXndaf28/7eUfEdnA48CL+Ztj6fkWJbXX5r0m/pn4Tv4n/x5TgNmddhuF2Ai6RbC88C9+X0u19/vANgS+CPpuBnAhvT9xubZtvC7D2DSgN/BUL6wQgbzE8j+mr/cJ0n3Vs4BvlJY7/t5veeBq/OXMjmn/Z38g2k7INyTlz8MnJk/4JeAn5Tt3MxnIAO2Bp7Oy+7OZbs65/US8P4OP55zctkfAX6Xy/dCXvaVkvw3AB7Kyx/J259LCtAB7JrX2yg/v6GfA08Afxvk97kI6ccVpB/hucB5wMzC+xiR110ZOJn0g299Nyfnv30GkddSwFV52yfz65xPOji28lLbNv+XP+cb8+PW5xqkH9Tr5/ezbNsvjiH9sO4AziAd5AKYBbxjCL+P0v0MWIMUTIJ0ADkDuByYndM+V/Jat5AOsteT7kmfR7oH3XqN9oN/6/d2NfAX0sHiXNJBpPV9DuqEI7/eboXyXQecnl+r9dvbMq/3vly+1u/xZEr2i6G8H+BtwCl52bNtr/mFwr47P4GsVdaZpJPn04ErSfvkPUP4fIayn+2e06aSjgWnA3/O+1cAh7W99lHArXnZn9ve/7jCep8i3Z+eTTo5/B19J7KPAq9te90l6du3nyQdzy4g7ftn0yGQAV/N27xEOlE6g75gey+FoN32Ozgxb3M78Nv8XtYnnbwEcHCHz/YXefnHB/weBvuFtWUwP4Gs9eNatmSdvfLy24B1C+kjCh/Gb9q2+WVOvwBYspC+JelqYqEEMmC5vDPMAj7Utv4WpAD3DLBiyY8n8k61RGHZVnmHexZ4VSF9UfoOzj8CFmvLa0NgrcLza/O6G5e8j5PysgEDS17/i3n9W5n7QLJ6oUyfHMwBYhB5tXbOM4BlCunL0BdM9yvJq/1HIuDjef2L25YN9bMsXk0c2rbuYRSuAAb5HjsFsoty+qkUroqAt5MOIrPav0/SGfCybWmLFPI4brC/N2Bc3u9eBtYc5Htp/SbKrhg2aNtf5lwN9vN6Q30/AwWqIQeyQjnvp622J+87bx3kZzPU/WxdYIuS1xkHPEg62LefRA90zNqadDyZBmzatqz1+7imLf1r9J2YLFdIX5u+wDSrbZs35/3mWeBNhfQl6DspOLtD2QM4pKTs6+Vlt5QsWyrnNRMYNeB3MdgfZ1smMcDf2A4/rHkOunmdO/LyN5QsG0GK5C8By+e0UaSzulnFHaWwzQ/Kdu5B7BRlgezzOe17Hbb5Ql7+qZIfz1wBrrC8dcDeupD2odZOR9sVSYd8J+T1f9aWvgwpkD9NIVAO8FqtnXfbkmW75WWT29KHHMiAVfP3+E8KJx+F5a/Oy28cwmteR/ohL70An2Vrv7imZNli+Xt8npJqzwFe778KaeMK+0RZNcyP8vJfDuG9Pwo81pbW+r3NAl5Xsk2rWvrDg8zj3rz+0oNYd8BANh/vZzgCWavG4nfzU8753c8GeK2D8msdNNC+1Lb8grx85w7L/5iXb5ifi3TlONfxp7D+ga39py39tJz+jZJtViUdj18G1igp+839vO8r8jpvaktvVSsP6vcwXM3vy9IejIh5+pdJejWp9ds9EXFn+/KIeFnSX0hnf5uS6pPfRDoT+GtE/KMkr9OBQwf9Lvq3ff7/+w7Lr87/Ny9Zdn1EPFmSfi+wA+nA3dJqrnxq5G9yAGeSDn4flvSFiHgup3+YdDbz80JaR5LWJl15PRoRl5escj7p4LuupFUj4tFBlK2TbUkHngsj4j/tCyPiYUn3ARtJWiwiXiyUc0VgV9JZ7nL0tbgdTTrZWZt0RQ9D/yxbLiop04uSppLuna1Aukc3P96a/18YEU+XLD8V+GxhvTkkrU567+uRTlRG5kUjgNGSlomIZ9s2+0dE3FuSTyvt1SXLytwIvBY4VdKRwE1D/EznMZ/vZ2G6m3QFvJukzwGnz+d+PeT9LHdb2YZ0JbUasDgpuLS+j3GDzTx3TdiGdLy9tMNqV5PaHmxOuiBYmxR4HoqIv5Ssfybpnn671n55WvuCiHhU0qXAe0jv64y2Vf7Qz9s4jnTfdH/ghkL6/vn/8f1sO0eVze879S0bm/+vJ2mgnWGl/L/1pf+zw3qDLdNgjM3/r5XU33orlaQ92GHdmfn/4oW0NfL/vw+mUBHxvKRTSAe/PUj3EmCIOwB9n+XUDvlEPpBvRA54g3zdMmPz/wMlHTjAussDjwFI2ov0fpbuZ/1RhcdD+iwLhvJ9DVW/nzPp3hn0tQYFQNKhpIYEi/Xz2qNI1TBFC+u9fBF4PfDe/DdD0t9IVwKnRsS/B/k6wAK9n4UmIp6WtB9pnzoKOErSFNI9stM7nNCVGdJ+JmkN0onhxv2sNqqfZe1WBl6VH780yOPTavl/6fE4ImZImll43ZbV6LuPWaZ0/+0vr+wc0u98L0mHRMS/JL2RFHhviYgb+tl2jgUNZEPxfIf0VheAR+h8VtHS+kD6/cYWQFl3hFba70hncZ3MczVJutQeqqGc7R5HCmT7A6dIGg9sQroSvHUY8l2gM3H6Psub6bt66uRFAElrkW5uQ3qvFwLTWld0ks4iBfKyfWKo5Z2f72uoOpUp2pdL2ppUTf4M6X7HlcAjEfFCXn49qXai7L0vlPcSEQ/m/Wpb0pn924Gd8uMvS9o6IgY1AMICvp/5VdrFKCJOlzSRdBXxLtL72g/YT9KpETFhCHkMdj87iRTEfk9q3HYvMDMiZkvamVQNOJT33npvM0kBoT935f/DdexsKfssOh37iYiXJJ0EfAnYk9TS+4C8eLAn45UGsk6m5f+PRcRHB7nNw/n/azos75TeqqrqdGa/RknaNGAd4Mj5CA5D0TqDfi2pVd+AIuJeSVcA20han/nYAej7LNcqW6h0mtf6PB8ZwuuWaX3XV0XE5wa5za6ks/fvRsTRJcvLRnsY8mdZgX4/50L6w4W09+X/h0XEySXbrLMQyjWgiJhNamU3EebcDvgZqRXeEaT7tYOx0N9PRMyS9DJD+023tn2CFFxOApD0NtIJ696STo6IKwbIftD7maRlgO1I3+8HIqL9RGN+Ri15nHRMmzUfx841O5RzOdJV4ey2RY+QPsvX0Fc9XTS27fWH4njSlf/+kk4j3R75NyXVmJ3U3iE6V01OATaUNNgd+QZSM/bNJZUFrT07bNc6EL+ufYGkN1B+WTwx/3/vIMs2v/6U/+89xO2Oy/8/S3rfzzJvHXVHEXE/qfnwqpLKRujYlXRPakpELGggu5x0pfDuXL8/GMvn//NUleXvbMOSbeb3sxxOrXupu+SDRbuPtK0H/b/3HUj37CoXEQ+TAhike9ctrRPFTt/tkN9PRMwi7TP97S+PAitLWr5k2fYlaaUi4s+ke0Qw9/vqZCj72XKkq6GHS4IYwAc7bNfxM833kP8MLC/pHYMoA6SWmo8Cq0t6c8nyD3TYrrVffrh9gaSVSZ9zkLp8DEmOAZeQqhOPJH1WZw7lPmntgSw7gnTD9xxJG7UvlDRG0sGt5/kNnkb6cn8iaYnCupuTWgCVuTL/n5CrrFrbrErq61B22X0sqcPklyTtJ2muz0zS4pL2yAfVBXE2abzCt0j6vqRF2/LZsFjmgnNJdcz7k86kfjvU+xakDqoAP5I0upDnaqQqEICyq6EhyVVQp5DOvE/LP4C5SNpEUvHH1Dr7myBpqcJ6o0ln0mUHuPn9LIdNREwm/VhHAUcXyyTpLaR9djbpSqel9d73b1t/bVLn/GEn6dD8+2i3c/5fDEqPk97DurlRQ7v5fT+PAKtJ6nT/6ErSb/d/28q+D6nambb0zSS9V9JibelLk/quQed7jEVD2c8eIVUBbpSrWFvrSNJXSd1yyrSucOY5+c6OJAWQUyS9vX2hpJUkfVLS4pDueZO6wEC6N7hsYd2xpL5iZX6a8/lMrmpubbM4aZ9dEjgnIgbzuZVpnZC3amqGUqu0wM3vxw5i3UE1ySX1Dg/SD+FG0iX+haSm+bOBJ9rWX4m+DtPTSFchl5Kab7c+9Hma5JJah7WaQf8hb/MM6cdwHW3N7/M2W9PXI/2BXK7f5fWfyenFjo/9Nk2ncz+jN5LOloK0A59Nqvu+oz2Ptu1aO3MAm8zH91nsEP00fZ06n81p55I7RA/2PfaT11KklqdBam11DX0dg6fS1h+F1Cih1bn0UdL9hfNz2e7Kj4N5RzoY9GfZ6fsoLO844ssQv981Cu9xKql17Z/o6xB7SNv6K9HXVHoqcFb+np7P++u17eVigN8bfc2a5+mQ32H9f5F+fzfn/M8sfIb/Asa3rX9hXnY76aTlBGDC/L6fvN3Pc/p9wG/yax5SWP4G0v3rIPWF/F0u40ukkYHam9+/n75jwGWkk+LWaC5BuvpYZJCfz1D2s6/Q1zXiT/n7n5zL+YP2chb2mefzNheSTrhPYO7+tgcX9qHb6fuN3EK6ogvm7p5S7BD9RP68/kCqzjuHVEPzXMl7LXaIvpT0u30wp/2dzh2iS39XbeuOpK9j/K1DPoYNdYOc6UIPZHndd+QP9aH8BUzPX8YxlHRSJDW9Po7043iedGD7LB2GqMrbLEY68E/NeUwFvk1qzt/fEFWrkYZ0uZO+IZwmkw7ye7ftKPMVyPKyVfJOfW9+TzNIP85vt+8ohW22y69XOtLHIL/TRYHPkIYe+nf+uwH4BOXDRs1XICvstB8lBa8n8/fwEGn0l69SGLUgr7886eSkNTzYVNIV4nKkA9s8gWwon+VAP7j+9ov5+H5XIh1c7yNVj88gXal1GqJqdeDXpAPG86QDxjdIAb6s3+PCDmQTSAf6e0gH/n+Rmq//lJLhwUhNu39DOri3RgQ5YX7fT95mFOmsv9VpeJ73Rxqc4LJcvmfz47eU7aek3/L/kILJA7kcj5EC6ScoDGAwyM9o0L9ZUhXyjbmcT5KC01Zl5SxssxOpyq41MkvZidsmpBOH1jBiM0jB9IS8fftoOaNItS0P5PXvAw4nBbkXSd2lyt7rrvlzezpvNxn4LrmP72B/Bx1e+9d5/dKRPvr7U36BVxT12NQPkn5Bauixf0ScUHd5zKyZcjX31cAFEfHuCvN9FelkdjHg1RHxzFC275Z7ZDafcmOXj5CqRX5bc3HMrAHyvej2+/3r0tcZ+jcVF+lgUg3Lr4caxKA7mt/bfJD0RVLLqneRqgO+EoMYycPMjHR/bllJt5NOgtcAxpOuiM4l3b8cVrnB1rdJ1dE7kW5nfGt+XsuBrLneTapbfxj4Omm4KjOzwfgJqcn/RqR70P8hNeg5FfhFVHPPaVlgX9K9tptJI0UNqnN9u1fkPTIzM+sdvkdmZmaN9oqrWlxppZVi7NixdRfDzKxRbrzxxiciYvTAa3afV1wgGzt2LJMmTaq7GGZmjSKp08j2Xc9Vi2Zm1mgOZGZm1mgOZGZm1mgOZGZm1mgOZGZm1miDCmSSlpN0tqR7JN0t6c2SVpA0UdLk/H/5vK4kHSNpiqTbJG1aeJ0Jef3JkiYU0jeTdHve5pg8KzGd8jAzM2sZ7BXZ0cDFEbEeaUiTu4HDgMsiYhxpyoTD8ro7AePy3wHkQSglrUCaJmAL0kyghxcC07F53dZ2O+b0TnmYmZkBgwhkkpYhzZp6IqTptSPiaWA30vw35P+758e7AadGci2wXJ5peAdgYkQ8FREzgInAjnnZMhHxtzy+16ltr1WWh5mZGTC4DtFrkya4/JWkjUiTwn2GNGHcIwAR8Uhh2vrVmXua8Gk5rb/0aSXp9JPHfBt72B8X9CWY+p1dFvg1zMxs4RhM1eIiwKbAsRGxCWmo/f6q+FSSFvORPmiSDpA0SdKk6dOnD2VTMzNruMEEsmnAtIi4Lj8/mxTYHsvVguT/jxfWX6Ow/RjSVCP9pY8pSaefPOYSEcdHxPiIGD96dCOHCjMzs/k0YCCLiEeBByW9LidtB9wFnA+0Wh5OAM7Lj88H9s6tF7cEnsnVg5cA20taPjfy2B64JC+bKWnL3Fpx77bXKsvDzMwMGPygwZ8CTpO0GHA/sA8pCJ4laV/gAWCPvO6FwM7AFOC5vC4R8ZSkI4Ab8nrfiIin8uODgJNJMx1flP8AvtMhDzMzM2CQgSwibiFNg91uu5J1Azi4w+ucBJxUkj4J2KAk/cmyPMzMzFo8soeZmTWaA5mZmTWaA5mZmTWaA5mZmTWaA5mZmTWaA5mZmTWaA5mZmTWaA5mZmTWaA5mZmTWaA5mZmTWaA5mZmTWaA5mZmTWaA5mZmTWaA5mZmTWaA5mZmTWaA5mZmTWaA5mZmTWaA5mZmTWaA5mZmTWaA5mZmTWaA5mZmTWaA5mZmTWaA5mZmTWaA5mZmTWaA5mZmTWaA5mZmTXaoAKZpKmSbpd0i6RJOW0FSRMlTc7/l8/pknSMpCmSbpO0aeF1JuT1J0uaUEjfLL/+lLyt+svDzMysZShXZNtExMYRMT4/Pwy4LCLGAZfl5wA7AePy3wHAsZCCEnA4sAWwOXB4ITAdm9dtbbfjAHmYmZkBC1a1uBtwSn58CrB7If3USK4FlpO0GrADMDEinoqIGcBEYMe8bJmI+FtEBHBq22uV5WFmZgYMPpAFcKmkGyUdkNNWiYhHAPL/lXP66sCDhW2n5bT+0qeVpPeXh5mZGQCLDHK9rSPiYUkrAxMl3dPPuipJi/lIH7QcXA8AWHPNNYeyqZmZNdygrsgi4uH8/3HgXNI9rsdytSD5/+N59WnAGoXNxwAPD5A+piSdfvJoL9/xETE+IsaPHj16MG/JzMxeIQYMZJKWkjSq9RjYHrgDOB9otTycAJyXH58P7J1bL24JPJOrBS8Btpe0fG7ksT1wSV42U9KWubXi3m2vVZaHmZkZMLiqxVWAc3OL+EWA30bExZJuAM6StC/wALBHXv9CYGdgCvAcsA9ARDwl6QjghrzeNyLiqfz4IOBkYEngovwH8J0OeZiZmQGDCGQRcT+wUUn6k8B2JekBHNzhtU4CTipJnwRsMNg8zMzMWjyyh5mZNZoDmZmZNZoDmZmZNZoDmZmZNZoDmZmZNZoDmZmZNZoDmZmZNZoDmZmZNZoDmZmZNZoDmZmZNZoDmZmZNZoDmZmZNZoDmZmZNZoDmZmZNZoDmZmZNZoDmZmZNZoDmZmZNZoDmZmZNZoDmZmZNZoDmZmZNZoDmZmZNZoDmZmZNZoDmZmZNZoDmZmZNZoDmZmZNdqgA5mkkZJulnRBfr6WpOskTZZ0pqTFcvri+fmUvHxs4TW+lNPvlbRDIX3HnDZF0mGF9NI8zMzMWoZyRfYZ4O7C8+8CP4qIccAMYN+cvi8wIyLWBX6U10PS+sCewBuAHYGf5+A4EvgZsBOwPrBXXre/PMzMzIBBBjJJY4BdgBPycwHbAmfnVU4Bds+Pd8vPycu3y+vvBpwRES9ExD+AKcDm+W9KRNwfES8CZwC7DZCHmZkZMPgrsh8D/w28nJ+vCDwdEbPy82nA6vnx6sCDAHn5M3n9Oelt23RK7y8PMzMzYBCBTNKuwOMRcWMxuWTVGGDZwkovK+MBkiZJmjR9+vSyVczM7BVqMFdkWwPvkTSVVO23LekKbTlJi+R1xgAP58fTgDUA8vJlgaeK6W3bdEp/op885hIRx0fE+IgYP3r06EG8JTMze6UYMJBFxJciYkxEjCU11rg8Ij4MXAG8P682ATgvPz4/PycvvzwiIqfvmVs1rgWMA64HbgDG5RaKi+U8zs/bdMrDzMwMWLB+ZF8EDpE0hXQ/68ScfiKwYk4/BDgMICLuBM4C7gIuBg6OiNn5HtgngUtIrSLPyuv2l4eZmRkAiwy8Sp+IuBK4Mj++n9TisH2d54E9Omx/JHBkSfqFwIUl6aV5mJmZtXhkDzMzazQHMjMzazQHMjMzazQHMjMzazQHMjMzazQHMjMzazQHMjMzazQHMjMzazQHMjMzazQHMjMzazQHMjMzazQHMjMzazQHMjMzazQHMjMzazQHMjMzazQHMjMzazQHMjMzazQHMjMzazQHMjMzazQHMjMzazQHMjMzazQHMjMzazQHMjMzazQHMjMzazQHMjMza7QBA5mkJSRdL+lWSXdK+npOX0vSdZImSzpT0mI5ffH8fEpePrbwWl/K6fdK2qGQvmNOmyLpsEJ6aR5mZmYtg7kiewHYNiI2AjYGdpS0JfBd4EcRMQ6YAeyb198XmBER6wI/yushaX1gT+ANwI7AzyWNlDQS+BmwE7A+sFdel37yMDMzAwYRyCL5V366aP4LYFvg7Jx+CrB7frxbfk5evp0k5fQzIuKFiPgHMAXYPP9NiYj7I+JF4Axgt7xNpzzMzMyAQd4jy1dOtwCPAxOB+4CnI2JWXmUasHp+vDrwIEBe/gywYjG9bZtO6Sv2k4eZmRkwyEAWEbMjYmNgDOkK6vVlq+X/6rBsYaXPQ9IBkiZJmjR9+vSyVczM7BVqSK0WI+Jp4EpgS2A5SYvkRWOAh/PjacAaAHn5ssBTxfS2bTqlP9FPHu3lOj4ixkfE+NGjRw/lLZmZWcMNptXiaEnL5cdLAu8E7gauAN6fV5sAnJcfn5+fk5dfHhGR0/fMrRrXAsYB1wM3AONyC8XFSA1Czs/bdMrDzMwMgEUGXoXVgFNy68IRwFkRcYGku4AzJH0TuBk4Ma9/IvBrSVNIV2J7AkTEnZLOAu4CZgEHR8RsAEmfBC4BRgInRcSd+bW+2CEPMzMzYBCBLCJuAzYpSb+fdL+sPf15YI8Or3UkcGRJ+oXAhYPNw8zMrMUje5iZWaM5kJmZWaM5kJmZWaM5kJmZWaM5kJmZWaM5kJmZWaM5kJmZWaM5kJmZWaM5kJmZWaM5kJmZWaM5kJmZWaM5kJmZWaM5kJmZWaM5kJmZWaM5kJmZWaM5kJmZWaM5kJmZWaM5kJmZWaM5kJmZWaM5kJmZWaM5kJmZWaM5kJmZWaM5kJmZWaM5kJmZWaM5kJmZWaM5kJmZWaMNGMgkrSHpCkl3S7pT0mdy+gqSJkqanP8vn9Ml6RhJUyTdJmnTwmtNyOtPljShkL6ZpNvzNsdIUn95mJmZtSwyiHVmAYdGxE2SRgE3SpoIfBS4LCK+I+kw4DDgi8BOwLj8twVwLLCFpBWAw4HxQOTXOT8iZuR1DgCuBS4EdgQuyq9ZlkfzfW3ZBdz+mYVTDjOzhhvwiiwiHomIm/LjmcDdwOrAbsApebVTgN3z492AUyO5FlhO0mrADsDEiHgqB6+JwI552TIR8beICODUttcqy8PMzAwY4j0ySWOBTYDrgFUi4hFIwQ5YOa+2OvBgYbNpOa2/9Gkl6fSTh5mZGTCEQCZpaeD3wGcj4tn+Vi1Ji/lIHzRJB0iaJGnS9OnTh7KpmZk13KACmaRFSUHstIg4Jyc/lqsFyf8fz+nTgDUKm48BHh4gfUxJen95zCUijo+I8RExfvTo0YN5S2Zm9goxmFaLAk4E7o6IowqLzgdaLQ8nAOcV0vfOrRe3BJ7J1YKXANtLWj63PtweuCQvmylpy5zX3m2vVZaHmZkZMLhWi1sDHwFul3RLTvsy8B3gLEn7Ag8Ae+RlFwI7A1OA54B9ACLiKUlHADfk9b4REU/lxwcBJwNLklorXpTTO+VhZmYGDCKQRcQ1lN/HAtiuZP0ADu7wWicBJ5WkTwI2KEl/siwPMzOzFo/sYWZmjeZAZmZmjeZAZmZmjeZAZmZmjeZAZmZmjeZAZmZmjeZAZmZmjeZAZmZmjeZAZmZmjeZAZmZmjeZAZmZmjeZAZmZmjeZAZmZmjeZAZmZmjeZAZmZmjeZAZmZmjeZAZmZmjeZAZmZmjeZAZmZmjeZAZmZmjeZAZmZmjeZAZmZmjeZAZmZmjeZAZmZmjeZAZmZmjTZgIJN0kqTHJd1RSFtB0kRJk/P/5XO6JB0jaYqk2yRtWthmQl5/sqQJhfTNJN2etzlGkvrLw8zMrGgwV2QnAzu2pR0GXBYR44DL8nOAnYBx+e8A4FhIQQk4HNgC2Bw4vBCYjs3rtrbbcYA8zMzM5hgwkEXEn4Gn2pJ3A07Jj08Bdi+knxrJtcByklYDdgAmRsRTETEDmAjsmJctExF/i4gATm17rbI8zMzM5pjfe2SrRMQjAPn/yjl9deDBwnrTclrqWpOsAAAgAElEQVR/6dNK0vvLw8zMbI6F3dhDJWkxH+lDy1Q6QNIkSZOmT58+1M3NzKzB5jeQPZarBcn/H8/p04A1CuuNAR4eIH1MSXp/ecwjIo6PiPERMX706NHz+ZbMzKyJ5jeQnQ+0Wh5OAM4rpO+dWy9uCTyTqwUvAbaXtHxu5LE9cEleNlPSlrm14t5tr1WWh5mZ2RyLDLSCpNOBdwArSZpGan34HeAsSfsCDwB75NUvBHYGpgDPAfsARMRTko4AbsjrfSMiWg1IDiK1jFwSuCj/0U8eZmZmcwwYyCJirw6LtitZN4CDO7zOScBJJemTgA1K0p8sy8PMzKzII3uYmVmjOZCZmVmjOZCZmVmjOZCZmVmjOZCZmVmjOZCZmVmjOZCZmVmjOZCZmVmjOZCZmVmjOZCZmVmjOZCZmVmjOZCZmVmjOZCZmVmjOZCZmVmjDTiNi71ybXjKhgv8GrdPuH0hlMTMbP75iszMzBrNgczMzBrNgczMzBrNgczMzBrNgczMzBrNgczMzBrNgczMzBrNgczMzBrNgczMzBrNgczMzBrNgczMzBqt68dalLQjcDQwEjghIr5Tc5FsIbt7vdcv0Pavv+fuhVQSM2uirg5kkkYCPwPeBUwDbpB0fkTcVW/J7JXmZwdevsCvcfBx2y7wa/zwg7su0PaHnnnBApfBrGm6vWpxc2BKRNwfES8CZwC71VwmMzPrIl19RQasDjxYeD4N2KKmspj1hGmHXb3ArzHmO29d4Nf42te+Vuv2AJddvs4Cv8Z22963wK+x6hW3LND2j26z8QKXoZspIuouQ0eS9gB2iIj98vOPAJtHxKfa1jsAOCA/fR1w7wJmvRLwxAK+xoLqhjJAd5TDZejTDeXohjJAd5SjG8oAC6ccr4mI0QujMFXr9iuyacAahedjgIfbV4qI44HjF1amkiZFxPiF9XpNLUO3lMNl6K5ydEMZuqUc3VCGbipHXbr9HtkNwDhJa0laDNgTOL/mMpmZWRfp6iuyiJgl6ZPAJaTm9ydFxJ01F8vMzLpIVwcygIi4ELiw4mwXWjXlAuiGMkB3lMNl6NMN5eiGMkB3lKMbygDdU45adHVjDzMzs4F0+z0yMzOzfjmQGQCSvpv/71F3WcysnKT35f9r1l2WbuKqxZq1dsxOIuKcispxO7ApcF1EbFpFnh3KsQSwK/BW4NXAf4A7gD/2UkMfSX8AOv44I+I9FZZlBLARfd/HnRHxWIX5L9Pf8oh4tqqyAEj6TEQcPVDaMOV9U0Rs2vo/3Pk1hQMZ6WokIr44UNow5f2r/HBlYCugNejfNsCVEdFvoFuI5fg+qVP5UsBzxUVARES/B5OFVIavAe8GrgRuBB4HlgBeS/o8lgAOjYjbhrkctZ9cSHp7fvg+YFXgN/n5XsDUiPhyBWVYB/gi8E5gMjCdvu/jOeAXwCkR8fIwl+NBUlAXKZjOzI+XBh6KiEqvTsqCiKSbI2KTCvK+HJgNjAeuaF9e1fGi2ziQ0XHHvC0i3lhhGS4A9o+IR/Lz1YCfVRjIFo+IFySdFxG1jGcpaZeI+GM/y1cG1oyIScNcjq44uchl+XNEvG2gtGHK+3TgWODqaDtQ5O/iQ8CMiDhluMuS8/w5cHFEnJ+fvxt4W0R8oaL89yK957cAxXG8RgGzI+KdFZRhCVIQ+xVwYPvyiLhsuMvQjbq++f1wknQQ8AlgbUnFs/xRwF8qLs7YVhDLHiOd+Vblb6SqxUqraYrKgliu1lo6Ip6NiMdJV2nDXY59ct4XAOu3n1wMd/5tRktaOyLuz2VYC6hkGKGI2KufZY8DP66iHAWbR8QnCmX4g6TDK8z/r8AjpOGgflhInwkMay1BwXER8VFJp/Zq0CrT04EM+C1wEfBt4LBC+syIeKrislwp6RLgdFI1yp6UVB0Mo8UkTQC2Kqtaq+peHYCk35LONmeTqhiXlXRURHy/qjJkdZ9cAHyOtG/c3yoTfeOKViI3ALo4ImZK+grphOebEXFTleUAnpJ0GKmaNYD/AmZUlXlE/BP4J/DmqvIssbmk1YH3S/oxqYp1jqrvF3YLVy1mee6zVSgE94h4oOIyvI/UyAHgzxFxboV5vwX4MPAB5h0GLCLiYxWW5ZaI2FjSh4HNSPdpbqyyqjeX46fAOOY+uZjSPmh1BeVYHFgvP70nIl6oOP/bIuKNeR/5NvAD4MsRUelMFJJWAr4OtKpV/wwcHhGVDNoraSblDXCqvI98CHAQsCbz1k5E1fcLu4UDGZCHwfoa6Yy7deM6qj5wdgNJ+0bEiTWX4U5gY9IV808j4ipJt0bERjWU5b0UDpxVnlzk/BclHbhaZbgS+EVEvFRhGW6OiE0kfRu4PSJ+W1XjBisn6ZcRsX/d5egWvV612PJZ4HUR8WTVGUu6JiLeUnK2V9lZXqEsKwOvkXR2LstdpAYnw35fqs0vgKnArcCfJb2G+u7d3USqav6TpFdJGhURMyvM/1hgUeDn+flHctp+FZbhIUm/ILVe/G6+QqysD6qkH0bEoZLOpeSKqOqWep36cFVcg3OqpANJn8edEXFNhXl3HV+RAZKuAN4VEbPqLktdJG1NugI6mXRfSqR7IROAD0dEZY1fJI2MiNmF5wJGVv39SNqfdD9qhYhYR9I40s327SoswzxXolVfnUp6FbAj6Wpscm70smFEXFpR/ptHxPWSSj/3qhs95D6XLUsAawH3RsQbKsh7NeD3pABW/J2OAN7Xdk+3ZziQAZJOJE3I+Udgzv2HiDiqhrKsTPpxtMpQyVmepGuBgyLi5rb0jUlVWZXdD5H0D+B3wK8i4u6q8i0pxy3A5qRO4pvktNsjYsMKy3ATsEdE3Jefrw2cXWVnWEk/IH0XPdMhfSgkbQp8PCI+XkFe5wAXRsQJbekfA94TEbsPdxm6kasWkwfy32L5r3KS3kNq0vtq0k3c1wB3A8N+lpct0x7EACLiFkmjKipDyxtJDStOzM3vTwLOqKFF1gsR8WK6IARJi9DPaBvD5AvAFbnVokj7xT4Vl+Ee4Pj8/n8FnB4Rz1RchlYH7SOB9Zn7ZK/qlqRziYibJL2pouzeUFaVGhEn5RadPclXZAWSloqIf9eU963AtsCf8o31bYC9IqKSptaS7ga2iogZbekrAH+NiPXKtxz2cr2N1GpwOeBs4IiImFJR3t8Dngb2Bj5F6nN4V0T8TxX5F8qxOKnGQNTQarFQjteRguhepH6Wv4yIyrqISLoa+Cap1eTuuSwvR8T/VlWGXI5DCk9HkKr2VoyIHSrIe0pErFuSLmBy2bJe4EGDAUlvlnQX6QoISRvlUQSq9FJubDJC0oh8gNi4wvx/BFwq6e2SRuW/d5D62f2ownIgaaSk9+Sb+0eTrlTXBv5AtXPTHUYalul24OM5769UkbGkbfP/9wG7AOsC6wC7lPXzq6A8I0ldANYDniA1xDlE0hkVFuNVEXEJQETcFxFfIY22UrVRhb/FSbckqhoN50JJx0laspWQ72H+DLi4ojJ0HVctJj8GdiD3n4qIW/OVQJWelrQ0qW/MaZIeBypr3BARx0t6GDiCVJ3ZarX4zYj4Q1XlyCaTOoN/PyL+Wkg/u8rvJdIYgr/Mf1V7O2lorHeXLAugyg7qRwHvAS4DvhUR1+dF35V0b1XlAF7IVx735RZ7D5GGEatURHy96jwLPg98D3ggVzcH6STvt6T+lj3JVYuApOsiYoti35gaWoYtRRpZfASpY/KywGl1dAmom6SlI+JfXVCOf1De3HvtivIfAbw/Is6qIr9+yvEx0j3K50qWLVvV/TJJW5BOrpYn3StbBvhelS1qczlGA/9NOuEr3qvbtsIyLE3qrC/g793we6mTr8iSByVtBYSkxYBPk6sZqyBpd1LV0e256qSSQVi72CxJBzPvgaKy0UWy8YXHSwB7ACtUlXlEvJw769cayHJDguUlbcDc38efKwxiK5BaFCu35P1IFfl2cBpwJmm6oQNJXVSmV1mAHLjmaZzVq3yPLDkQOBhYHZhGujd1cBUZ53txnwNWBI6Q9NUq8u1yvyZNXbIDcBUwhjQwa6Ui4snC30MR8WNSg5wqTZT0eUlrSFqh9VdlASTtR6ryvoQ0RNQlpJFwqsp/H+BeUhXvZEm7VpV3Byvm0W9eioir8gnWljWXqaf1/BVZvon9kYj4cE1FeBuwUUTMzjdtrybdp+pl60bEHpJ2i4hTlAYRvqTqQuT+QS0jSFdoVXdFaF2FFk+sWvdFqvIZ4E3AtRGxjaT1SAGtKp8HNoiIxyStSzrRuaDC/Nu1hgd7RNIuwMOkky2rSc8HshxAdqPilnkFL7ZGsYiI59TqtFSxtibF86i4c3jrQPF0rs56lDTqe9WKU3XMIg2b9YEqCxARa1WZXwfPR8Tzklrz1t2Tm+JX5YXIM1JHxJRc/V+nb0paFjgU+AnpXt3nqshYUr/jv8YwTzrbrXo+kGV/URrp/ExgTj+yqGaaivXUNxeagHXy89ZYi1UNXNy60ngd6ey7NQL+u0nVSlU6XtLywFdzOZYGKu0rBBARdTTtnku+Sj+ENKHoAUrDZL0uIqq8IpkmaTng/0hVnTNIVyFVGZNbTrasUXweEf2ehC0s6ps1fsl8b/AZqm/+35oPb3FgE+BO0rHiDcAN1DvFTG3capE5Yy22iypaISkNiNtRpDmQKiPpUuD/RR4YN4/q8buI2LHKcnQDSZ8hjWQxk3R/ZlPgsKrGGMxlOJM0pt7eEbFB7j/0t4ioso9hsTxvJ7WovTgiXqwoz337Wx4VzdagNMbipqQhyyobIqxDWU4HvhsRt+TnGwGfqaFBVFfo+Suy3MT52LqaOFcdqAZhTaB4gHqRiqr1uqx6E+BjEXG0pB1I/ZX2IQW2ygIZsE5EfFDSXgAR8Z+qqp87NCppDZi7NFDJ5LNVBapBuJjUGXwpSc+Sa02g+pkqgNe3ghjM6ftaa3CtU88Hsm5p4txFfg1cr74pM94LnFpR3t1UvQl9s+/uTBo099Ya7mG+mK/CAuaMN1jVEFU30negXpM0G7NIw4U9QBr1vWdExBeAL0g6LyKqGsmjk79LOo65Z8v+e71Fqo+rFoHc5P0/zHuPrJIzzm6Tz+yKM1VX2l+lW6o3Jf2K1CVjLWAjYCRwZURsVmEZtgf+hzRQ7qXA1sBHI+LKCstwHHB+RFyYn+8EvDMiDq2qDN0m3xIYF2meuiWBRaLCeepynp9k7tmyfxoR/6mqDN3EgYw5Izi0i6pGcMhl2JU0PcPLA648/GV5C+lH+qs8isHSEVH2GQ1X/veQuiS8kJ8vDtxa9cDFudp5Y+D+iHg6V7WNqbplmKQVSf2URGoC/0TF+d/YHrwlTYqI8Z22GaZyLBcRT1eZZ4dy1D5PXS7HYqRGQJUMot3Ner5qEbqmifOewNGSfk+N83BJOpzUX+p1pPtBi5KqL7ausBhl1Zt1jHbyZuCWiPi3pP8i3eg/uoqMleal+zJ5xBfg21H9NDYtT0j6CnNXY9UxdNqNkq4n/T6qvE/Z7mDyPHUAkSYbrXTMx3zi+0PStFNrKc0beHhEvLfKcnQLX5EBkvYuS4+Iqu4NtcqxDGmKjH1IB4zW3E9VVlncQmrWe1Nh3MnbKuwG0CpHrdWbuQy3kaoU30gKrieSZuF9ewV5X0y6R/Vn0lBIoyLio8Odb4eyrAAcTqrGilymb1Rd9Z6vkHcgdRLfmDS9zymRJx2tsBxzjc2qNE/bTVX+RiTdCGwHXBE1TfraTXxFlhQnxVuCtIPcRHWNHACIiGfzFdmSwGdJVyJfkHRMRPykomK8GBEhqdW4YKmK8p1L7sNXRT++/szKn8VuwNERcaKkCRXlvWr0zXt2idJM0bXIAeszdeVfKMfLpGmFLlKaYug04HP5Ku1L0Tcq/3C7StKXgSUlvYs0T13VM0S8lKu7i2k9e1XiQAZExKeKz3Ov/V9XWQZJ7yadaa6T8948Ih7PHWLvJo0gUIWzJP0CWC7fC/gY9Uxj0g1mSvoSqSrtbUrDmS1aUd7KncJbR6qRxee92BApd8r+MGmi0xmk0TTOBTYjNdSq6hbBYcC+zD1P3QkV5d1yt6QPkOYvXIt0onFtxWXoGq5aLCFpUeC2iHh9hXmeCpwQEfM0M5e0XURcVmFZ3gVsTzpoXhIRE6vKu5tIWhX4EHBDRFwtaU3gHVVUOUuaCrxMXyArqrQhUreQNJk079ZJ7f0vJX05Ir5VYVlGA0REpaPeF/JfijTazZzfKfD1KJlqpxc4kAGS/kDfZfkIUlPnsyLisPpK1bskrUJq9h7Aw61x9qy3Kc2cXlur3tyH8HBSs3flv9nATyLiG3WVy3o8kCmNpL0Kc1exziL1F3qoipvIkmYyd912naMFlJUH0phyk4BDI+L+Ycx7Y+A40hBID+XkMcDTwCeimrEvO30GUNN3UpfciGFf0r3aV5NPLIDzgBMj4qV+Nl+Y5Wi1Xi0VEe+rqByfI3WOP6DVHUXS2sCxpCG7Kht4vMNn0vqd/rKq4cO6Ra8HsguAL7f3C5I0ntSUtWya+Vc0SV8nHax+Szpw70maG+xe4KCIeMcw5n0L8PGIuK4tfUvgF1HhjN02Zzy/p0ldH6bl5DGkiSRXiIgPVlSOfvtnVVXtLulm4F3t/fhyNeOlrdaDFZXlGNLv8vSc9EHSyd/SwBIRUVWjpK7Q64HsjojYoMOySpqydhjPbo4amjhfFxFbtKVdGxFbSrp1OIOJpMkRMa7DsikRse5w5W3zknRvRJRO1yLp7xHx2qrLVKcBjhcdlw1TWa4qdgPJ1Z5XRcTbJN0VEetXVZZu0OutFpfoZ9mSFZWhOJ5du6onUAR4ObeGOjs/f39beYbTRZL+SOr28GBOW4PUSu3iYc67a9U40soMSXsAv2/dm8p9ufYgtRqsRL4S6q9qsarBcvurrqu6Km8VSWMionWl/GpgdH5c1VicXaPXr8hOBy6PiF+2pe8LbF9V1Uk3yXX+R5NGtQhSk97PkaotNouIa4Y5/52A3UiNPUSq0pozzl+vKY60EhGvlfRq0riTwz7SiqSxwHeBbZl7wODLSdPZVDJsmdJAyR1V1SFa0mwKY7EWF5Gq86rqmoGk95DmJrsn5/9aUiOUy0i3AH5QVVm6Qa8HslVI/VBeJF0ZQTpoLAa8NyIerbAsbytLL2uOP4xlGAl8usqb1ta/LhppZUXS8aLScR5tXvmq+E3AbaQW1gLujB4dMBh6PJC1SNoGaNVv3xkRl9dQhuLIAEuQxnK7MSqY3LOtHFcOZ4OOAfIeCexHalBwUUT8tbDsKxHxzTrKVSdJ10fE5pJuiohNc/+hv1UVyCRtTmqpeYOk9YEdgbsj4qIq8m8rS7E16SKk1sUv9Eor0qLWfeu6y9EtHMi6lKQ1gO9FxF4V53skqfl7+5Q2w970XdIJwKuA64GPkG5eH5KX3VThvZCuIenzwDjgXcC3SSOt/LaKIctyteZOpKAxEdgCuBJ4J6mj/JHDXYZ+yjYCeB9ploSv1lWOukg6ApgUEefVXZZu4EDWpXIrpNuqHgRU0hUlyVHFlWGxyiz3Yfo5sBJpIOVrq2ze3E3qGmlF0u2kwXkXBx4lTWHzrNJcWNdVXb1ZplevTCTNIJ1wvkCaS7HVx7HfVtCvVL3earFrSPoJc48usjFwa9XliIhtqs6zYLFCOWYBB0j6X1LjgqVrK1WN8jh6V7eCl6QlJY2NiKkVZD8rImYDz0m6L/I0MhHxH0mVj7CRGzi0jCDdz656xu5usVLdBegmDmTdY1Lh8SzS9C1/qaMgknYB3kChe0JFQ/BMkrRjRMxpah8R35D0MGn0hF70O2CrwvPZOe1N5asvVC9KelUev2/OxJpKg2rXMVTUHoXHs4CppBauPSciZufvYR3m7kb01w6bvKK5arFmktaMiAfqLkeL0rT2rwK2IY3o/X7g+ojYt9aC9ShJt0TExm1pw9oxvZDP4pFn6W5LXwlYLSJuH+4yWLncRegQUjeV20knNtfW1VCrbiPqLoDxf60HSnOR1W2riNgbmBERXyf1J1uj5jK17hP1ounFKjWludEqaQLfIYgdEBFPVBnEJF1UePzfVeXb5T5LqlqdGhFvJV0xP1JvkerjQFa/Yh1/N0zN0eqL8lzufPsS1c3z1J8T6y5ATQ4EvizpAUkPAl8kzYFVZ3mqtmrh8Z415N+Nnm/1G5O0WETcCaxXc5lq43tk9YsOj+tygdIEht8nzdAcVDRpoKTzOy0CVqyiDN0mj1qxpaSlSbcCZtZcpDoaV3TD76LbPJJ/p38gzSD+FNCz0x35HlnNCsPeiDS+Y2tivNqnDJG0OGnonWcqym8GaTbmf7UvAs6MiFWqKEe3qbHxTVlZiuP7VZXn06SWqyLdu51rwIKoaBqXbpVnB1gW+GNZdXAv8BVZzSJiZN1laCdpK2Asef+QRFQwKzJpXMfnIuKqkjLdW0H+XadT45uK8t6CNIpHq+/YYcCmku4CvlXVCQ7w/wqPf1pRnl0v9zUdDdydk1YkTcHUc3xFZnOR9GtSk95bSE29IV0Zfrq+UvWuVifxwv+lgXMiYvsK8r6TNHLGLEnHk2oLzga2y+k9fSVUJ0mfAL4BPElfV4jotelbWnxFZu3GA+tHl5zhSNo1Ii6ouxw1ej7/bzW+eZLqGt+MyB3TAcYXhgi7Jg9mXLn2MTd7dQxOUtP710fE9LoL0g3catHa3cHcrcTqVsu9oC7yh7bGN1PpmxV4uN0haZ/8+FalmdOR9FpSa9Y63DHA814xDah00t1u5qpFA+aMvh/AKNLwWNdTmKAvIt7TYdPhLtfNPTzG4ghgy9YsADU0vlmWNDfdW0l91zYlTXj6IGm6n8qHUOt1klpV/G8kDSZ9AXP/To+po1x1c9WitXTrRHx19pmqVUS8LOmHpE7prQ7KlbVKywHzo5JGkfo4LgJMi4hamnlL+jZpBoDngD+STrg+FxG/raM8NWnNAv1I/uu5KWzK+IrMAJC0LrBK+/iOecLPh6qahbcTSe+qatT3biLp66QJFM/plvuWAJKWjoj2bhLDnectEbGxpN1JLRk/B1xWxXBd3ULSEsDS7ROc5mHDZvZq83vfI7OWHwNlnW2fy8vq1qsjexxCGiT4BUnPSpop6dm6CwXcVUOerRqknUmDaj9B73WW/jGpK0a7nYGjKi5L13DVorWMjYjb2hMjYpKksVUUwCN7zCsiRtWVt6RDOi2inml1LpJ0B6lbyMH5KqTXrkDeFhFlw4T9mjR8WU9yILOWJfpZtmRFZXgrnUf22LyiMnQFSSOBJVvVd5K2pG++tpsrGqrqW6TWkrNKllVemxMRX5D0feCp3LftedIs0b2kdIiwiIjcQbonOZBZyw2S9o+IXxYT83QRN1ZUBo/s0ee7wOPA9/Lz00lNzZcgNcOv4uz7JuD/ImKe71/SfhXk357nhwqPi4t6qbHHE5I2a/9OJG1KDzfHd2MPA0DSKsC5wIv0Ba7xpKuA90bEo3WVrRdJuhl4U6tDcqsbQj7rvjoi3lJBGV4HPNnesCAvW6Xq1ouSipOrLgFsC9zYSyOM5CvzM0jDlRV/px8DPhQRf6urbHVyILO5SNoG2CA/vTMiLu9v/QrKs0JE9NyZZvvkmZK2j4hL8+N5JtvsRZKWB06OiJ6aJVrSqsCnKPxOgZ9ERM/OR+ZAZl1D0takM82XSWeY3ySN+7go8IFeOtuUdDewefu9sNxJ+bqIGPa5p/L4ij8pm0RT0lLAB4EXIuK04S5LGUmLALdHxOvryN+6h++RWTf5EfABUou4PwK7R8Q1uf7/J8DWdRauYr8EzpR0YEQ8ACDpNcCxeVkVfg58VdKGpPtz00lVeuNIHXFPAioLYpLOpa+5/QjS1DbnVZV/t/G4k30cyKybLNo6+5c0PSKuAYiIm/I0Ij0jIo6S9BxpgN6lSAfwfwPfiYhj+996oZXhFuADecT98cBqpBnE746IOhrfFKdwmQX8MyKm1lCObuFxJzNXLVrXKN4XkrR7RPxfYdkdEbFB561fubpoduhaSfpWRHx5oDTrPR7Zw7rJVyW9CqAtiK0DVDGxZ1eKiH/1ehDLdixJ26XyUnQBSd+WtIykRSRdIumxYveEXuMrMjPrapI+DhwIvBYoVmmOIjW/37OWgtXI407OzffIrGt0eyu5XidpqYj4dw1ZnwVcRhr5/rBC+syIeLyG8nSDecadlNSzVyW+IrOuIWlj4MtAf63kjuu1Eb4lbQWMpXDiGRGVVbXm/E8gjbq+pqSNgI9HxCeqKkNbeVagMKRaRDxcRznqlIfq2ok07uR4YFngjxGxRa0Fq4kDmXWdLmolVztJvyb1pbuFdNCCNLTepztvtdDLcB3wfuD81iSndTS+kbQzafT3McCTwKuByVX0qetGklamb9zJpYFlI+KhustVB1ctWtfJA+VeWXc5usR4YP265yKLiAfbxjec3WndYfQtUl/CS/NwXe8i3R/qOR53cm4OZGbd7Q5gVdJswHV5MFcvhqTFgE8Dd9dQjlkRMV3SCEmKiImSjqyhHN3grYXHc8adxIHMzLrQSsBdkq6nMPdWRLynwjIcCBwNrA5MAy4F6rg/9kxu9HMNcKqkx0nDmfWciDio+Lw17mQ9pamf75FZ16qxlVzXkPT2svSyqW6GsQxbR8RfBkqroByjSDOWjwD2JjVwOLVsdP5e0+vjTjqQWdfptlZyvU7STRGx6UBpFZTDI3tkncadjIjP11eq+jiQWdfpllZydZI0k74D1VyLSK0Wl6mgDG8GtgI+SxrQuWUZ0hx1lXa+7RBQb626HN1A0naFpz0/7qTvkVlX6pJWcrWJiFF1l4E0qerSpONEsTzPkk40KlEc2UPSTYVFo4BJVZWjy2znq9M+viKzriPpbOAo0mjnW5JayY3vxaGIuoGk10TEP2vMf3lgRTyyxxy+Op2bA5l1HUkrkVrJvXrJlDEAABGPSURBVJNUlXYp8OlenCm6G0gaDfw36T5McUSNbSvKfwngpYiYnZ+vSxrV4p8RcX4VZegWHneynAOZdZ1uaSVniaRLgTOBz5MOohOA6RHxxYryvwrYPyL+nmdCuCGX5/XAX3upOs1Xp+UcyKzrdEsrOUsk3RgRm0m6LSLemNOuiojSrgHDkP/tEbFhfvwNYKWI+ISkxYFJrWW9yONOJm7sYV2j0EputKRDCouWAUbWUyoDXsr/H5G0C/AwabzDqhTPtrcFfggQES9I6skO0Z3GnQR6ctxJBzLrJl3RSs7m8U1JywKHAj8hnVh8tsL875T0HeAh0r2hSwFymdTfhq9gHneywFWL1nXqbiVnA5P02Yj4cUV5LUWaOHI14MSIuCmnbw2Mi4iTqyhHN5E0KSLGS7oV2DgiQtL1EbF53WWrgwOZdZ26W8nZwCQ9EBFr1l2OXiXpMuA9wPdIV8iPA1tHxJa1FqwmI+ougFmJ04B7gLWArwNTSS3VrHv0apVet9gdeJ5UxXslqdp11zoLVCcHMutGK0bEiaS+Q1dFxMdIHaOte7gqp15fiojZEfFSRJwYEUcBhwy41SuUA5l1o7layUnahGpbyRlpvEdJz5b8zSS1krP67FiStkvlpegSbrVo3ajuVnJG14z32C9JH4uIk+ouR1U87mQ5BzLrOhFxQX74DLANpFZy9ZXIutgSA6/yinIWcBke2WMubrVojeBWciZpZGu8xV7lcSfL+R6ZNYVbydkUSd+XtH7dBanRJcA6AHncyeuB9YFDJH2rzoLVyYHMmsJVB/ZG4O/ACZKulXSApGGfYLTLrBARf8+PJwBnRMRBwA7Au+srVr0cyKxruJWc9SciZkbELyNiK1KH+cNJLVtPyVVsvaB93MmJkMadBHpy3ElwYw/rIk1oJWf1kTSS1MR8H2AsafDg04C3AheSxmF8pfO4kyUcyMysKSYDVwDfj4i/FtLPlvS2mspUtf1I406uB+wYEf/O6RuQZlXvSW61aGaNIGnpiPhX3eWw7uN7ZGbWFD+TtFzriaTlJfVMZ2jrzIHMzJrijRHxdOtJRMwANqmxPNYlHMjMrClGSFq+9UTSCvg+v+GdwMya44fAXyWdnZ/vARxZY3m6Sq+NO1nkQGZmjRARp0qaROo/JeB9EXFXzcXqJr027uQcbrVoZl1N0jIR8WyuSpxHRDxVdZnq5nEn5+ZAZmZdTdIFEbGrpH8w98gWAiIi1q6paLXJn8XZwK98VepAZmbWOJJGAXuSRjkZAZxEGnfx2VoLVhMHMjPrapI27W95RNzU3/JXujyqyenAcqSrtCMiYkq9paqWA5mZdTVJV/SzOCJi28oK0yVKxp38NX3jTn4rInph3Mk5HMjMzBpG0v2kcSdPbBt3EknHRMSn6ylZPRzIzKwRJC0KHAS0Bgi+EvhFRLxUW6Fq4nEn5+aRPcysKY4FNgN+nv82y2m9yONOFrhDtJk1xZsiYqPC88sl3Vpbaeo1z7iTknp23ElfkZlZU8yWtE7riaS1gV7tFOxxJwt69o2bWeN8AbgiN3T4/+3da8xl5VnG8f/FAAXaoWWQ1gMyHMIhWKCAltJBpVT4IlYltRGcihWpKUSl2JoelSY1agxNmsaWVrClJdYU7IlEREs4NNSiHQYGLKc4gEnTD4CEjhiHQ28/7PV21p7ZBeKH99kP6/9Ldt53PWs+3JlM9j3Ps+597QDrmU3tTZG5kyMOe0jqRpKXAEcya2T3VtX2xiU1k+RoduRO3jDlhA8bmaQuJNkLuAA4hVlU1deBy6rqf5sWtorMnVzMRiapC0m+AGwDrhqWzgb2q6pfa1fV6jJ3cjEbmaQuJLlzp6nFhWuaHoc9JPVic5LXVdU3AZKcBNzauKZVZe7kYu7IJHUhyT3MBj3+c1g6CLgH+D6zY7VjW9W2WsydXMxGJqkLSdY/1/2qeni1atFysZFJUmfMnZxnI5OkziS5HNgDuHJYeivwbFX9Truq2rGRSVJnnOCcZ9aipC4k+YsXsjYR5k6OuCOT1IUkt1fVCTutbZnCtOLOkrwR+DQwlztZVc811fiiZSOTtNSSvINZNNWhwH+Mbq0Fbq2qjU0Ka8zcyR1sZJKWWpKXA/sBfwa8Z3Rr22SzBc2dnGMjk7TUDMrdlbmT82xkkpbagqDcjG5PMijXqcV5Zi1KWmpVdebw85DWtSyRyedOjrkjk7TUDMrdlbmT82xkkpbaKCh3L+CngTuZHS8eC9xWVae0qq0VcyfnebQoaalV1RsAkvwd8Paqumu4fjXwrpa1tTK1RvV8TPaQ1IujVpoYQFXdDbymYT1aEu7IJPXiniEs9ypm04sbmT0X0sS5I5PUi7cB/w78AXAR8O1hbXLMnZznsIekbiTZGzioqu5rXUtL5k7Oc0cmqQtJ3gTcAfzjcP2aJF9tW9XqSvKOJHcBRybZMno9CGxpXV8r7sgkdSHJJuA04KaqOn5Ym9QuxNzJxRz2kNSLZ6rqiSTP/ydfvKqqHkpy4c43kqybajOzkUnqxd1JzgHWJDkc+H3gG41rWm1/C5wJbGJB7iSzr7qZHI8WJXUhyT7A+4EzhqXrgQ9P9atLtIONTNLSS7IG+POqenfrWloyd3IxjxYlLb2qejbJia3rWAKXDj8X5k4y+6LNybGRSerF5mHc/mrgyZXFqvpiu5JWl7mTi9nIJPViHfAYsxH8FQVMppGN7JI7mWSyuZM+I5OkziT5PLNd6Th38mVVdXbTwhox2UNSF5JcmeQVo+v9kvxNy5oaMndyxB2ZpC4k2byS6PFca1Nh7uQO7sgk9WK3JPutXCRZx0Sf85s7OW+S/wgkdelS4BtJrmH2XOgtwJ+2LamZPwFeC9wEUFV3JDm4YT1N2cgkdaGqPpvkW8ymFgOcVVXfblxWK+ZOjtjIJHVjaFxTbV5j5k6O+IxMkvrze8BPAduZBQk/wWx6cZKcWpSkjpg7uSt3ZJK6kWR9kl8Yft87ydrWNa22qnoWMHdyxGdkkrqQ5Hzg7cyiqg4DDgQuA97Ysq5GJp87OWYjk9SLC5mNnN8GUFUPJHll25KaMXdyxEYmqRfbq+qplZHzJLsze/OenKqabBzVIj4jk9SLm5O8D9g7yenMjtWubVxTE+ZOznNqUVIXkuwGnAecwewD0dcDl9cE38TMnZxnI5OkziS5Ezi1qh4frtcBN1fVMW0ra8NnZJK6kGQDcAmwntl7V4CqqkNb1tWIuZMj7sgkdSHJvcA7gU3AsyvrVfVYs6IaSnI0O3Inb5hw7qSNTFIfktxWVSe1rkPLx0YmaaklOWH49S3AGmafldq+cr+qbm9Rl5aHjUzSUkty43Pcrqo67TnuawJsZJK6kOTQqtr6fGtTkWQ9cHhVfS3J3sDuVbWtdV0t+IFoSb24ZsHa1atexRIYcievAT45LB0IfLldRW05fi9pqSU5itl3b708yVmjW/sCe7WpqjlzJ0dsZJKW3ZHAmcArgF8arW8Dzm9SUXvmTo7YyCQttar6CvCVJCdX1b+0rmdJ7Jw7eQETzZ0Ehz0kqTvmTs6zkUmSuubUoqQuJDnkhaxNQZINSf45yf1JtiZ5MMkkP4YA7sgkdSLJ7VV1wk5rm6rqxFY1tWLu5DyHPSQtNcfvF3qiqq5rXcSysJFJWnaO3w9GuZM3JvlLzJ0EPFqU1AnH782d/GHckUnqxWNJbgBeVVWvTnIs8Kaq+nDrwlZLVb0BfnjuZJuq2nNqUVIv/hp4L/A0QFVtAX69aUXtmDs54o5MUi/2qap/XYllGjzTqpgWHHxZzEYmqRePJjmMIVMwyZuB77YtadU5+LKAwx6SujA8A/oU8HrgceBBYGNVPdSyrhYcfJlnI5PUlSQvBXab6pdIalcOe0jqQpJXJbkCuKaqtiU5Osl5retSezYySb34DLOU9x8fru8HLmpWTUPmTs6zkUnqxY9U1ReA7wNU1TOMcgYn5u8XrC0ayZ8EpxYl9eLJJPuzY2rxdcATbUtaXY7fL2Yjk9SLi4GvAocluRU4AHhz25JWneP3Czi1KKkbSXZn9mYe4L6qerpxSU04fj/PRiapC0nWAL8IHMzoNKmqPtKqplaSHAF8ggnnTo457CGpF9cCvwXsD6wdvabI3MkRn5FJ6sWBVXVs6yKWxORzJ8fckUnqxXVJzmhdxJIwd3LEHZmkXnwT+FKS3ZgdqYXZl0nu27asJi5kljt5VJLvMOROti2pHYc9JHUhyVbgV4C7yjcuwNzJFR4tSurFA8DdNjFzJ3fmjkxSF5J8BjgUuA7YvrI+0fH764BPA++vquOGz9dtrqpjGpfWhDsySb14ELgB2BPH782dHHHYQ1IXqupDrWtYIpPPnRyzkUlSf8ydHPEZmSR1yNzJHWxkkrqQZENV3fp8a1Ng7uQ8hz0k9eJjL3BtCsydHPEZmaSlluRk4PXAAUkuHt3aF1jTpqrmzJ0ccUcmadntCbyM2X+8x7uP7zHdAQdzJ0d8RiapC0nWV9XDSdYyy1j879Y1tZLkV4GrmG1Gpp476dGipG6sTbIZWAeQ5FHg3Kq6u21ZTVwKnIy5k4BHi5L68Sng4qpaX1XrgT8c1qbI3MkRd2SSevHSqrpx5aKqbhrS36fou8BNQ+bipHMnwUYmqR9bk3wQ+NxwvZFZ/uIUPTi89hxek+awh6QuJNkP+BBwCrPhhluAS6rq8aaFqTkbmSSpax4tSupCkiOAd7FrLNNprWrScnBHJqkLSe4ELgM2Mfrurara1KyoRsydnGcjk9SFJJuq6sTWdSyDJLdX1QnPtzYVHi1K6sW1SS4AvsT8yPl/tStpdZk7uZiNTFIvzh1+vnu0VsChDWppZefcyRVTzp30aFGSemPu5Dx3ZJLUH3MnR8xalKT+mDs5YiOTpP7skjsJTDV30kYmqQ9JNqyEBCfZmOQjSda3rquRrUk+mOTg4fUBpps7aSOT1I1PAP+T5Djgj4CHgc+2LamZ3wYOAL7I7OMIBwBva1pRQ04tSurCygd+k/wx8J2qumLKHwLWDk4tSurFtiTvBd4K/GySNcAejWtqwtzJee7IJHUhyY8C5wD/VlVfT3IQcGpVTe540dzJeTYySd0YhjsOr6qvJdkHWFNV21rXtdrMnZznsIekLiQ5H7gG+OSw9BPAl9tV1NS1SS5I8mNJ1q28WhfVijsySV1IcgfwWuC2qjp+WLurqo5pW9nqS7Jo1L6qakq5kz/gsIekXmyvqqeSAJBkd2ahwZNTVYe0rmGZeLQoqRc3J3kfsHeS04GrgWsb16Ql4NGipC4k2Q04DzgDCHA9cHn5JjZ5NjJJ3UiyJ3DEcHlfVT3dsh4tB48WJXUhyanAA8BfAR8H7k/yc02LasTcyXnuyCR1Ickm4Jyqum+4PgL4/BQ/T5VkC3AccCzwOeAK4Kyq+vmmhTXijkxSL/ZYaWIAVXU/E42oAp4Zng3+MvDRqvoosLZxTc04fi+pF99KcgWzHQjAbzCLaJoicydHPFqU1IUkLwEuBE5hNrV4C/DxqtretLAGzJ2cZyOT1I0kBwBU1SOta2nN3MkdfEYmaall5pIkjwL3AvcleWT4XrJJMndyno1M0rK7CNgA/ExV7V9V64CTgA1J3tm2tGYuZPZ38j2AqnoAeGXTihqykUladr8JnF1VPwjKraqtwMbh3hRtr6qnVi6mnDsJNjJJy2+Pqnp058XhOdlUJ/XMnRyxkUladk/9P++9mL0HeAS4C/hd4B+ADzStqCGnFiUttSTPAk8uugXsVVWT3JWZO7mDjUySOjPkTl4JPMSsof8kcG5V3dKwrGZsZJLUGXMn5/mMTJL6Y+7kiFmLktQfcydHPFqUpM6YOznPRiZJHTJ3cgefkUlSJ8ydXMxGJkn9MHdyAY8WJakTSTYDp+8c2TUcM/5TVR3fprK23JFJUj/MnVzARiZJ/TB3cgGPFiWpE+ZOLmYjkyR1zaNFSVLXbGSSpK7ZyCRJXbORSZK6ZiOTJHXNRiZJ6tr/AXlgQRnw4DsQAAAAAElFTkSuQmCC"/>
-          <p:cNvSpPr>
-            <a:spLocks noChangeAspect="1" noChangeArrowheads="1"/>
-          </p:cNvSpPr>
-          <p:nvPr/>
-        </p:nvSpPr>
-        <p:spPr bwMode="auto">
+              <a:t>Target </a:t>
+            </a:r>
+            <a:r>
+              <a:rPr lang="en-US" sz="2400" dirty="0"/>
+              <a:t>Variable: Loan Status</a:t>
+            </a:r>
+          </a:p>
+        </p:txBody>
+      </p:sp>
+      <p:sp>
+        <p:nvSpPr>
+          <p:cNvPr id="3" name="Text Placeholder 2"/>
+          <p:cNvSpPr>
+            <a:spLocks noGrp="1"/>
+          </p:cNvSpPr>
+          <p:nvPr>
+            <p:ph type="body" sz="quarter" idx="10"/>
+          </p:nvPr>
+        </p:nvSpPr>
+        <p:spPr>
           <a:xfrm>
-            <a:off x="155575" y="-6350"/>
-            <a:ext cx="304800" cy="304800"/>
+            <a:off x="370115" y="1390650"/>
+            <a:ext cx="8370412" cy="5225810"/>
           </a:xfrm>
-          <a:prstGeom prst="rect">
-            <a:avLst/>
-          </a:prstGeom>
-          <a:noFill/>
-          <a:extLst>
-            <a:ext uri="{909E8E84-426E-40DD-AFC4-6F175D3DCCD1}">
-              <a14:hiddenFill xmlns:a14="http://schemas.microsoft.com/office/drawing/2010/main">
-                <a:solidFill>
-                  <a:srgbClr val="FFFFFF"/>
-                </a:solidFill>
-              </a14:hiddenFill>
-            </a:ext>
-          </a:extLst>
         </p:spPr>
         <p:txBody>
-          <a:bodyPr vert="horz" wrap="square" lIns="91440" tIns="45720" rIns="91440" bIns="45720" numCol="1" anchor="t" anchorCtr="0" compatLnSpc="1">
-            <a:prstTxWarp prst="textNoShape">
-              <a:avLst/>
-            </a:prstTxWarp>
-          </a:bodyPr>
+          <a:bodyPr/>
           <a:lstStyle/>
           <a:p>
-            <a:endParaRPr lang="en-US" dirty="0"/>
-          </a:p>
-        </p:txBody>
-      </p:sp>
-      <p:sp>
-        <p:nvSpPr>
-          <p:cNvPr id="11" name="AutoShape 8" descr="data:image/png;base64,iVBORw0KGgoAAAANSUhEUgAAAbIAAAIICAYAAAALymuSAAAABHNCSVQICAgIfAhkiAAAAAlwSFlzAAALEgAACxIB0t1+/AAAADl0RVh0U29mdHdhcmUAbWF0cGxvdGxpYiB2ZXJzaW9uIDIuMi4yLCBodHRwOi8vbWF0cGxvdGxpYi5vcmcvhp/UCwAAIABJREFUeJzs3XfYHFXd//H3J6EKoYciAUOJIoK0CAg2QOkK+hMFfSQiRRAr6CP66IOK2EXBAiIgoEgR4QGRFmmCSgm9m4ARQg0QIIqUhO/vj3M292Qze5ck98wO+3ld133du2dm9pzdnZ3vzJlTFBGYmZk11Yi6C2BmZrYgHMjMzKzRHMjMzKzRHMjMzKzRHMjMzKzRHMjMzKzR5iuQSYoB/m5Z2AW17iPptZLOl/SkpJfzd79B3eUaKknfzGX/r258PTPr3yILuP3vgX+VpD+wgK9rXU7SSOAc4A3AX4H7gJeBGXWWy+ojaV1gMnBZRLxzIb3mIsBLwH0Rse7CeM0mkfRN4H+Aj0TEb+ouT7da0ED2+YiYujAKYo2zLimIXRER29ZdGDPrXb5HZvNr9fz//lpLYWYWEUP+AyL/jR3Euuvmdf8ELAv8CJhKqi74Qdu6OwMXAk8AL5AOkj8EVujw2isCPwceBv4D3Al8Clg05zmlbf1v5vT/6vB61+TlY0qWrZnzuh94HngS+AOwZcm678yvcwKwAnBsLuMLwD3AZ/v5vFYCvgXcAfwbeAa4DfgOsEpe57j8+gf08zq35XU2GOR3uijwaeDGnO+/gOuBg4CRJd9n2d8JQ8jrYOBa4FngOeDmnP/IkvU3Bb4HTAKm58/xn8CJwNoL8lm27xfAG4Hzgadyuf4G7DDE30fH/Szvsz8gVcE9n/O5GNi+w2u9A/hpLvdTeZvJwI+BlQf4vS2Z3+vU/Jn9AzgCWHSI7+fNwLn5M38BeBy4CTgKGN32nvvdL4byfoD9+nnNP+V1FqHkt172W2xLX4y0b19POt78J7+/S+jnd7WA+9kKpOPTxfk7aX3/lwHvLXndaf28/7eUfEdnA48CL+Ztj6fkWJbXX5r0m/pn4Tv4n/x5TgNmddhuF2Ai6RbC88C9+X0u19/vANgS+CPpuBnAhvT9xubZtvC7D2DSgN/BUL6wQgbzE8j+mr/cJ0n3Vs4BvlJY7/t5veeBq/OXMjmn/Z38g2k7INyTlz8MnJk/4JeAn5Tt3MxnIAO2Bp7Oy+7OZbs65/US8P4OP55zctkfAX6Xy/dCXvaVkvw3AB7Kyx/J259LCtAB7JrX2yg/v6GfA08Afxvk97kI6ccVpB/hucB5wMzC+xiR110ZOJn0g299Nyfnv30GkddSwFV52yfz65xPOji28lLbNv+XP+cb8+PW5xqkH9Tr5/ezbNsvjiH9sO4AziAd5AKYBbxjCL+P0v0MWIMUTIJ0ADkDuByYndM+V/Jat5AOsteT7kmfR7oH3XqN9oN/6/d2NfAX0sHiXNJBpPV9DuqEI7/eboXyXQecnl+r9dvbMq/3vly+1u/xZEr2i6G8H+BtwCl52bNtr/mFwr47P4GsVdaZpJPn04ErSfvkPUP4fIayn+2e06aSjgWnA3/O+1cAh7W99lHArXnZn9ve/7jCep8i3Z+eTTo5/B19J7KPAq9te90l6du3nyQdzy4g7ftn0yGQAV/N27xEOlE6g75gey+FoN32Ozgxb3M78Nv8XtYnnbwEcHCHz/YXefnHB/weBvuFtWUwP4Gs9eNatmSdvfLy24B1C+kjCh/Gb9q2+WVOvwBYspC+JelqYqEEMmC5vDPMAj7Utv4WpAD3DLBiyY8n8k61RGHZVnmHexZ4VSF9UfoOzj8CFmvLa0NgrcLza/O6G5e8j5PysgEDS17/i3n9W5n7QLJ6oUyfHMwBYhB5tXbOM4BlCunL0BdM9yvJq/1HIuDjef2L25YN9bMsXk0c2rbuYRSuAAb5HjsFsoty+qkUroqAt5MOIrPav0/SGfCybWmLFPI4brC/N2Bc3u9eBtYc5Htp/SbKrhg2aNtf5lwN9vN6Q30/AwWqIQeyQjnvp622J+87bx3kZzPU/WxdYIuS1xkHPEg62LefRA90zNqadDyZBmzatqz1+7imLf1r9J2YLFdIX5u+wDSrbZs35/3mWeBNhfQl6DspOLtD2QM4pKTs6+Vlt5QsWyrnNRMYNeB3MdgfZ1smMcDf2A4/rHkOunmdO/LyN5QsG0GK5C8By+e0UaSzulnFHaWwzQ/Kdu5B7BRlgezzOe17Hbb5Ql7+qZIfz1wBrrC8dcDeupD2odZOR9sVSYd8J+T1f9aWvgwpkD9NIVAO8FqtnXfbkmW75WWT29KHHMiAVfP3+E8KJx+F5a/Oy28cwmteR/ohL70An2Vrv7imZNli+Xt8npJqzwFe778KaeMK+0RZNcyP8vJfDuG9Pwo81pbW+r3NAl5Xsk2rWvrDg8zj3rz+0oNYd8BANh/vZzgCWavG4nfzU8753c8GeK2D8msdNNC+1Lb8grx85w7L/5iXb5ifi3TlONfxp7D+ga39py39tJz+jZJtViUdj18G1igp+839vO8r8jpvaktvVSsP6vcwXM3vy9IejIh5+pdJejWp9ds9EXFn+/KIeFnSX0hnf5uS6pPfRDoT+GtE/KMkr9OBQwf9Lvq3ff7/+w7Lr87/Ny9Zdn1EPFmSfi+wA+nA3dJqrnxq5G9yAGeSDn4flvSFiHgup3+YdDbz80JaR5LWJl15PRoRl5escj7p4LuupFUj4tFBlK2TbUkHngsj4j/tCyPiYUn3ARtJWiwiXiyUc0VgV9JZ7nL0tbgdTTrZWZt0RQ9D/yxbLiop04uSppLuna1Aukc3P96a/18YEU+XLD8V+GxhvTkkrU567+uRTlRG5kUjgNGSlomIZ9s2+0dE3FuSTyvt1SXLytwIvBY4VdKRwE1D/EznMZ/vZ2G6m3QFvJukzwGnz+d+PeT9LHdb2YZ0JbUasDgpuLS+j3GDzTx3TdiGdLy9tMNqV5PaHmxOuiBYmxR4HoqIv5Ssfybpnn671n55WvuCiHhU0qXAe0jv64y2Vf7Qz9s4jnTfdH/ghkL6/vn/8f1sO0eVze879S0bm/+vJ2mgnWGl/L/1pf+zw3qDLdNgjM3/r5XU33orlaQ92GHdmfn/4oW0NfL/vw+mUBHxvKRTSAe/PUj3EmCIOwB9n+XUDvlEPpBvRA54g3zdMmPz/wMlHTjAussDjwFI2ov0fpbuZ/1RhcdD+iwLhvJ9DVW/nzPp3hn0tQYFQNKhpIYEi/Xz2qNI1TBFC+u9fBF4PfDe/DdD0t9IVwKnRsS/B/k6wAK9n4UmIp6WtB9pnzoKOErSFNI9stM7nNCVGdJ+JmkN0onhxv2sNqqfZe1WBl6VH780yOPTavl/6fE4ImZImll43ZbV6LuPWaZ0/+0vr+wc0u98L0mHRMS/JL2RFHhviYgb+tl2jgUNZEPxfIf0VheAR+h8VtHS+kD6/cYWQFl3hFba70hncZ3MczVJutQeqqGc7R5HCmT7A6dIGg9sQroSvHUY8l2gM3H6Psub6bt66uRFAElrkW5uQ3qvFwLTWld0ks4iBfKyfWKo5Z2f72uoOpUp2pdL2ppUTf4M6X7HlcAjEfFCXn49qXai7L0vlPcSEQ/m/Wpb0pn924Gd8uMvS9o6IgY1AMICvp/5VdrFKCJOlzSRdBXxLtL72g/YT9KpETFhCHkMdj87iRTEfk9q3HYvMDMiZkvamVQNOJT33npvM0kBoT935f/DdexsKfssOh37iYiXJJ0EfAnYk9TS+4C8eLAn45UGsk6m5f+PRcRHB7nNw/n/azos75TeqqrqdGa/RknaNGAd4Mj5CA5D0TqDfi2pVd+AIuJeSVcA20han/nYAej7LNcqW6h0mtf6PB8ZwuuWaX3XV0XE5wa5za6ks/fvRsTRJcvLRnsY8mdZgX4/50L6w4W09+X/h0XEySXbrLMQyjWgiJhNamU3EebcDvgZqRXeEaT7tYOx0N9PRMyS9DJD+023tn2CFFxOApD0NtIJ696STo6IKwbIftD7maRlgO1I3+8HIqL9RGN+Ri15nHRMmzUfx841O5RzOdJV4ey2RY+QPsvX0Fc9XTS27fWH4njSlf/+kk4j3R75NyXVmJ3U3iE6V01OATaUNNgd+QZSM/bNJZUFrT07bNc6EL+ufYGkN1B+WTwx/3/vIMs2v/6U/+89xO2Oy/8/S3rfzzJvHXVHEXE/qfnwqpLKRujYlXRPakpELGggu5x0pfDuXL8/GMvn//NUleXvbMOSbeb3sxxOrXupu+SDRbuPtK0H/b/3HUj37CoXEQ+TAhike9ctrRPFTt/tkN9PRMwi7TP97S+PAitLWr5k2fYlaaUi4s+ke0Qw9/vqZCj72XKkq6GHS4IYwAc7bNfxM833kP8MLC/pHYMoA6SWmo8Cq0t6c8nyD3TYrrVffrh9gaSVSZ9zkLp8DEmOAZeQqhOPJH1WZw7lPmntgSw7gnTD9xxJG7UvlDRG0sGt5/kNnkb6cn8iaYnCupuTWgCVuTL/n5CrrFrbrErq61B22X0sqcPklyTtJ2muz0zS4pL2yAfVBXE2abzCt0j6vqRF2/LZsFjmgnNJdcz7k86kfjvU+xakDqoAP5I0upDnaqQqEICyq6EhyVVQp5DOvE/LP4C5SNpEUvHH1Dr7myBpqcJ6o0ln0mUHuPn9LIdNREwm/VhHAUcXyyTpLaR9djbpSqel9d73b1t/bVLn/GEn6dD8+2i3c/5fDEqPk97DurlRQ7v5fT+PAKtJ6nT/6ErSb/d/28q+D6nambb0zSS9V9JibelLk/quQed7jEVD2c8eIVUBbpSrWFvrSNJXSd1yyrSucOY5+c6OJAWQUyS9vX2hpJUkfVLS4pDueZO6wEC6N7hsYd2xpL5iZX6a8/lMrmpubbM4aZ9dEjgnIgbzuZVpnZC3amqGUqu0wM3vxw5i3UE1ySX1Dg/SD+FG0iX+haSm+bOBJ9rWX4m+DtPTSFchl5Kab7c+9Hma5JJah7WaQf8hb/MM6cdwHW3N7/M2W9PXI/2BXK7f5fWfyenFjo/9Nk2ncz+jN5LOloK0A59Nqvu+oz2Ptu1aO3MAm8zH91nsEP00fZ06n81p55I7RA/2PfaT11KklqdBam11DX0dg6fS1h+F1Cih1bn0UdL9hfNz2e7Kj4N5RzoY9GfZ6fsoLO844ssQv981Cu9xKql17Z/o6xB7SNv6K9HXVHoqcFb+np7P++u17eVigN8bfc2a5+mQ32H9f5F+fzfn/M8sfIb/Asa3rX9hXnY76aTlBGDC/L6fvN3Pc/p9wG/yax5SWP4G0v3rIPWF/F0u40ukkYHam9+/n75jwGWkk+LWaC5BuvpYZJCfz1D2s6/Q1zXiT/n7n5zL+YP2chb2mefzNheSTrhPYO7+tgcX9qHb6fuN3EK6ogvm7p5S7BD9RP68/kCqzjuHVEPzXMl7LXaIvpT0u30wp/2dzh2iS39XbeuOpK9j/K1DPoYNdYOc6UIPZHndd+QP9aH8BUzPX8YxlHRSJDW9Po7043iedGD7LB2GqMrbLEY68E/NeUwFvk1qzt/fEFWrkYZ0uZO+IZwmkw7ye7ftKPMVyPKyVfJOfW9+TzNIP85vt+8ohW22y69XOtLHIL/TRYHPkIYe+nf+uwH4BOXDRs1XICvstB8lBa8n8/fwEGn0l69SGLUgr7886eSkNTzYVNIV4nKkA9s8gWwon+VAP7j+9ov5+H5XIh1c7yNVj88gXal1GqJqdeDXpAPG86QDxjdIAb6s3+PCDmQTSAf6e0gH/n+Rmq//lJLhwUhNu39DOri3RgQ5YX7fT95mFOmsv9VpeJ73Rxqc4LJcvmfz47eU7aek3/L/kILJA7kcj5EC6ScoDGAwyM9o0L9ZUhXyjbmcT5KC01Zl5SxssxOpyq41MkvZidsmpBOH1jBiM0jB9IS8fftoOaNItS0P5PXvAw4nBbkXSd2lyt7rrvlzezpvNxn4LrmP72B/Bx1e+9d5/dKRPvr7U36BVxT12NQPkn5Bauixf0ScUHd5zKyZcjX31cAFEfHuCvN9FelkdjHg1RHxzFC275Z7ZDafcmOXj5CqRX5bc3HMrAHyvej2+/3r0tcZ+jcVF+lgUg3Lr4caxKA7mt/bfJD0RVLLqneRqgO+EoMYycPMjHR/bllJt5NOgtcAxpOuiM4l3b8cVrnB1rdJ1dE7kW5nfGt+XsuBrLneTapbfxj4Omm4KjOzwfgJqcn/RqR70P8hNeg5FfhFVHPPaVlgX9K9tptJI0UNqnN9u1fkPTIzM+sdvkdmZmaN9oqrWlxppZVi7NixdRfDzKxRbrzxxiciYvTAa3afV1wgGzt2LJMmTaq7GGZmjSKp08j2Xc9Vi2Zm1mgOZGZm1mgOZGZm1mgOZGZm1mgOZGZm1miDCmSSlpN0tqR7JN0t6c2SVpA0UdLk/H/5vK4kHSNpiqTbJG1aeJ0Jef3JkiYU0jeTdHve5pg8KzGd8jAzM2sZ7BXZ0cDFEbEeaUiTu4HDgMsiYhxpyoTD8ro7AePy3wHkQSglrUCaJmAL0kyghxcC07F53dZ2O+b0TnmYmZkBgwhkkpYhzZp6IqTptSPiaWA30vw35P+758e7AadGci2wXJ5peAdgYkQ8FREzgInAjnnZMhHxtzy+16ltr1WWh5mZGTC4DtFrkya4/JWkjUiTwn2GNGHcIwAR8Uhh2vrVmXua8Gk5rb/0aSXp9JPHfBt72B8X9CWY+p1dFvg1zMxs4RhM1eIiwKbAsRGxCWmo/f6q+FSSFvORPmiSDpA0SdKk6dOnD2VTMzNruMEEsmnAtIi4Lj8/mxTYHsvVguT/jxfWX6Ow/RjSVCP9pY8pSaefPOYSEcdHxPiIGD96dCOHCjMzs/k0YCCLiEeBByW9LidtB9wFnA+0Wh5OAM7Lj88H9s6tF7cEnsnVg5cA20taPjfy2B64JC+bKWnL3Fpx77bXKsvDzMwMGPygwZ8CTpO0GHA/sA8pCJ4laV/gAWCPvO6FwM7AFOC5vC4R8ZSkI4Ab8nrfiIin8uODgJNJMx1flP8AvtMhDzMzM2CQgSwibiFNg91uu5J1Azi4w+ucBJxUkj4J2KAk/cmyPMzMzFo8soeZmTWaA5mZmTWaA5mZmTWaA5mZmTWaA5mZmTWaA5mZmTWaA5mZmTWaA5mZmTWaA5mZmTWaA5mZmTWaA5mZmTWaA5mZmTWaA5mZmTWaA5mZmTWaA5mZmTWaA5mZmTWaA5mZmTWaA5mZmTWaA5mZmTWaA5mZmTWaA5mZmTWaA5mZmTWaA5mZmTWaA5mZmTWaA5mZmTWaA5mZmTXaoAKZpKmSbpd0i6RJOW0FSRMlTc7/l8/pknSMpCmSbpO0aeF1JuT1J0uaUEjfLL/+lLyt+svDzMysZShXZNtExMYRMT4/Pwy4LCLGAZfl5wA7AePy3wHAsZCCEnA4sAWwOXB4ITAdm9dtbbfjAHmYmZkBC1a1uBtwSn58CrB7If3USK4FlpO0GrADMDEinoqIGcBEYMe8bJmI+FtEBHBq22uV5WFmZgYMPpAFcKmkGyUdkNNWiYhHAPL/lXP66sCDhW2n5bT+0qeVpPeXh5mZGQCLDHK9rSPiYUkrAxMl3dPPuipJi/lIH7QcXA8AWHPNNYeyqZmZNdygrsgi4uH8/3HgXNI9rsdytSD5/+N59WnAGoXNxwAPD5A+piSdfvJoL9/xETE+IsaPHj16MG/JzMxeIQYMZJKWkjSq9RjYHrgDOB9otTycAJyXH58P7J1bL24JPJOrBS8Btpe0fG7ksT1wSV42U9KWubXi3m2vVZaHmZkZMLiqxVWAc3OL+EWA30bExZJuAM6StC/wALBHXv9CYGdgCvAcsA9ARDwl6QjghrzeNyLiqfz4IOBkYEngovwH8J0OeZiZmQGDCGQRcT+wUUn6k8B2JekBHNzhtU4CTipJnwRsMNg8zMzMWjyyh5mZNZoDmZmZNZoDmZmZNZoDmZmZNZoDmZmZNZoDmZmZNZoDmZmZNZoDmZmZNZoDmZmZNZoDmZmZNZoDmZmZNZoDmZmZNZoDmZmZNZoDmZmZNZoDmZmZNZoDmZmZNZoDmZmZNZoDmZmZNZoDmZmZNZoDmZmZNZoDmZmZNZoDmZmZNZoDmZmZNZoDmZmZNZoDmZmZNdqgA5mkkZJulnRBfr6WpOskTZZ0pqTFcvri+fmUvHxs4TW+lNPvlbRDIX3HnDZF0mGF9NI8zMzMWoZyRfYZ4O7C8+8CP4qIccAMYN+cvi8wIyLWBX6U10PS+sCewBuAHYGf5+A4EvgZsBOwPrBXXre/PMzMzIBBBjJJY4BdgBPycwHbAmfnVU4Bds+Pd8vPycu3y+vvBpwRES9ExD+AKcDm+W9KRNwfES8CZwC7DZCHmZkZMPgrsh8D/w28nJ+vCDwdEbPy82nA6vnx6sCDAHn5M3n9Oelt23RK7y8PMzMzYBCBTNKuwOMRcWMxuWTVGGDZwkovK+MBkiZJmjR9+vSyVczM7BVqMFdkWwPvkTSVVO23LekKbTlJi+R1xgAP58fTgDUA8vJlgaeK6W3bdEp/op885hIRx0fE+IgYP3r06EG8JTMze6UYMJBFxJciYkxEjCU11rg8Ij4MXAG8P682ATgvPz4/PycvvzwiIqfvmVs1rgWMA64HbgDG5RaKi+U8zs/bdMrDzMwMWLB+ZF8EDpE0hXQ/68ScfiKwYk4/BDgMICLuBM4C7gIuBg6OiNn5HtgngUtIrSLPyuv2l4eZmRkAiwy8Sp+IuBK4Mj++n9TisH2d54E9Omx/JHBkSfqFwIUl6aV5mJmZtXhkDzMzazQHMjMzazQHMjMzazQHMjMzazQHMjMzazQHMjMzazQHMjMzazQHMjMzazQHMjMzazQHMjMzazQHMjMzazQHMjMzazQHMjMzazQHMjMzazQHMjMzazQHMjMzazQHMjMzazQHMjMzazQHMjMzazQHMjMzazQHMjMzazQHMjMzazQHMjMzazQHMjMzazQHMjMza7QBA5mkJSRdL+lWSXdK+npOX0vSdZImSzpT0mI5ffH8fEpePrbwWl/K6fdK2qGQvmNOmyLpsEJ6aR5mZmYtg7kiewHYNiI2AjYGdpS0JfBd4EcRMQ6YAeyb198XmBER6wI/yushaX1gT+ANwI7AzyWNlDQS+BmwE7A+sFdel37yMDMzAwYRyCL5V366aP4LYFvg7Jx+CrB7frxbfk5evp0k5fQzIuKFiPgHMAXYPP9NiYj7I+JF4Axgt7xNpzzMzMyAQd4jy1dOtwCPAxOB+4CnI2JWXmUasHp+vDrwIEBe/gywYjG9bZtO6Sv2k4eZmRkwyEAWEbMjYmNgDOkK6vVlq+X/6rBsYaXPQ9IBkiZJmjR9+vSyVczM7BVqSK0WI+Jp4EpgS2A5SYvkRWOAh/PjacAaAHn5ssBTxfS2bTqlP9FPHu3lOj4ixkfE+NGjRw/lLZmZWcMNptXiaEnL5cdLAu8E7gauAN6fV5sAnJcfn5+fk5dfHhGR0/fMrRrXAsYB1wM3AONyC8XFSA1Czs/bdMrDzMwMgEUGXoXVgFNy68IRwFkRcYGku4AzJH0TuBk4Ma9/IvBrSVNIV2J7AkTEnZLOAu4CZgEHR8RsAEmfBC4BRgInRcSd+bW+2CEPMzMzYBCBLCJuAzYpSb+fdL+sPf15YI8Or3UkcGRJ+oXAhYPNw8zMrMUje5iZWaM5kJmZWaM5kJmZWaM5kJmZWaM5kJmZWaM5kJmZWaM5kJmZWaM5kJmZWaM5kJmZWaM5kJmZWaM5kJmZWaM5kJmZWaM5kJmZWaM5kJmZWaM5kJmZWaM5kJmZWaM5kJmZWaM5kJmZWaM5kJmZWaM5kJmZWaM5kJmZWaM5kJmZWaM5kJmZWaM5kJmZWaM5kJmZWaM5kJmZWaMNGMgkrSHpCkl3S7pT0mdy+gqSJkqanP8vn9Ml6RhJUyTdJmnTwmtNyOtPljShkL6ZpNvzNsdIUn95mJmZtSwyiHVmAYdGxE2SRgE3SpoIfBS4LCK+I+kw4DDgi8BOwLj8twVwLLCFpBWAw4HxQOTXOT8iZuR1DgCuBS4EdgQuyq9ZlkfzfW3ZBdz+mYVTDjOzhhvwiiwiHomIm/LjmcDdwOrAbsApebVTgN3z492AUyO5FlhO0mrADsDEiHgqB6+JwI552TIR8beICODUttcqy8PMzAwY4j0ySWOBTYDrgFUi4hFIwQ5YOa+2OvBgYbNpOa2/9Gkl6fSTh5mZGTCEQCZpaeD3wGcj4tn+Vi1Ji/lIHzRJB0iaJGnS9OnTh7KpmZk13KACmaRFSUHstIg4Jyc/lqsFyf8fz+nTgDUKm48BHh4gfUxJen95zCUijo+I8RExfvTo0YN5S2Zm9goxmFaLAk4E7o6IowqLzgdaLQ8nAOcV0vfOrRe3BJ7J1YKXANtLWj63PtweuCQvmylpy5zX3m2vVZaHmZkZMLhWi1sDHwFul3RLTvsy8B3gLEn7Ag8Ae+RlFwI7A1OA54B9ACLiKUlHADfk9b4REU/lxwcBJwNLklorXpTTO+VhZmYGDCKQRcQ1lN/HAtiuZP0ADu7wWicBJ5WkTwI2KEl/siwPMzOzFo/sYWZmjeZAZmZmjeZAZmZmjeZAZmZmjeZAZmZmjeZAZmZmjeZAZmZmjeZAZmZmjeZAZmZmjeZAZmZmjeZAZmZmjeZAZmZmjeZAZmZmjeZAZmZmjeZAZmZmjeZAZmZmjeZAZmZmjeZAZmZmjeZAZmZmjeZAZmZmjeZAZmZmjeZAZmZmjeZAZmZmjeZAZmZmjeZAZmZmjTZgIJN0kqTHJd1RSFtB0kRJk/P/5XO6JB0jaYqk2yRtWthmQl5/sqQJhfTNJN2etzlGkvrLw8zMrGgwV2QnAzu2pR0GXBYR44DL8nOAnYBx+e8A4FhIQQk4HNgC2Bw4vBCYjs3rtrbbcYA8zMzM5hgwkEXEn4Gn2pJ3A07Jj08Bdi+knxrJtcByklYDdgAmRsRTETEDmAjsmJctExF/i4gATm17rbI8zMzM5pjfe2SrRMQjAPn/yjl9deDBwnrTclrqWpOsAAAgAElEQVR/6dNK0vvLw8zMbI6F3dhDJWkxH+lDy1Q6QNIkSZOmT58+1M3NzKzB5jeQPZarBcn/H8/p04A1CuuNAR4eIH1MSXp/ecwjIo6PiPERMX706NHz+ZbMzKyJ5jeQnQ+0Wh5OAM4rpO+dWy9uCTyTqwUvAbaXtHxu5LE9cEleNlPSlrm14t5tr1WWh5mZ2RyLDLSCpNOBdwArSZpGan34HeAsSfsCDwB75NUvBHYGpgDPAfsARMRTko4AbsjrfSMiWg1IDiK1jFwSuCj/0U8eZmZmcwwYyCJirw6LtitZN4CDO7zOScBJJemTgA1K0p8sy8PMzKzII3uYmVmjOZCZmVmjOZCZmVmjOZCZmVmjOZCZmVmjOZCZmVmjOZCZmVmjOZCZmVmjOZCZmVmjOZCZmVmjOZCZmVmjOZCZmVmjOZCZmVmjOZCZmVmjDTiNi71ybXjKhgv8GrdPuH0hlMTMbP75iszMzBrNgczMzBrNgczMzBrNgczMzBrNgczMzBrNgczMzBrNgczMzBrNgczMzBrNgczMzBrNgczMzBrNgczMzBqt68dalLQjcDQwEjghIr5Tc5FsIbt7vdcv0Pavv+fuhVQSM2uirg5kkkYCPwPeBUwDbpB0fkTcVW/J7JXmZwdevsCvcfBx2y7wa/zwg7su0PaHnnnBApfBrGm6vWpxc2BKRNwfES8CZwC71VwmMzPrIl19RQasDjxYeD4N2KKmspj1hGmHXb3ArzHmO29d4Nf42te+Vuv2AJddvs4Cv8Z22963wK+x6hW3LND2j26z8QKXoZspIuouQ0eS9gB2iIj98vOPAJtHxKfa1jsAOCA/fR1w7wJmvRLwxAK+xoLqhjJAd5TDZejTDeXohjJAd5SjG8oAC6ccr4mI0QujMFXr9iuyacAahedjgIfbV4qI44HjF1amkiZFxPiF9XpNLUO3lMNl6K5ydEMZuqUc3VCGbipHXbr9HtkNwDhJa0laDNgTOL/mMpmZWRfp6iuyiJgl6ZPAJaTm9ydFxJ01F8vMzLpIVwcygIi4ELiw4mwXWjXlAuiGMkB3lMNl6NMN5eiGMkB3lKMbygDdU45adHVjDzMzs4F0+z0yMzOzfjmQGQCSvpv/71F3WcysnKT35f9r1l2WbuKqxZq1dsxOIuKcispxO7ApcF1EbFpFnh3KsQSwK/BW4NXAf4A7gD/2UkMfSX8AOv44I+I9FZZlBLARfd/HnRHxWIX5L9Pf8oh4tqqyAEj6TEQcPVDaMOV9U0Rs2vo/3Pk1hQMZ6WokIr44UNow5f2r/HBlYCugNejfNsCVEdFvoFuI5fg+qVP5UsBzxUVARES/B5OFVIavAe8GrgRuBB4HlgBeS/o8lgAOjYjbhrkctZ9cSHp7fvg+YFXgN/n5XsDUiPhyBWVYB/gi8E5gMjCdvu/jOeAXwCkR8fIwl+NBUlAXKZjOzI+XBh6KiEqvTsqCiKSbI2KTCvK+HJgNjAeuaF9e1fGi2ziQ0XHHvC0i3lhhGS4A9o+IR/Lz1YCfVRjIFo+IFySdFxG1jGcpaZeI+GM/y1cG1oyIScNcjq44uchl+XNEvG2gtGHK+3TgWODqaDtQ5O/iQ8CMiDhluMuS8/w5cHFEnJ+fvxt4W0R8oaL89yK957cAxXG8RgGzI+KdFZRhCVIQ+xVwYPvyiLhsuMvQjbq++f1wknQQ8AlgbUnFs/xRwF8qLs7YVhDLHiOd+Vblb6SqxUqraYrKgliu1lo6Ip6NiMdJV2nDXY59ct4XAOu3n1wMd/5tRktaOyLuz2VYC6hkGKGI2KufZY8DP66iHAWbR8QnCmX4g6TDK8z/r8AjpOGgflhInwkMay1BwXER8VFJp/Zq0CrT04EM+C1wEfBt4LBC+syIeKrislwp6RLgdFI1yp6UVB0Mo8UkTQC2Kqtaq+peHYCk35LONmeTqhiXlXRURHy/qjJkdZ9cAHyOtG/c3yoTfeOKViI3ALo4ImZK+grphOebEXFTleUAnpJ0GKmaNYD/AmZUlXlE/BP4J/DmqvIssbmk1YH3S/oxqYp1jqrvF3YLVy1mee6zVSgE94h4oOIyvI/UyAHgzxFxboV5vwX4MPAB5h0GLCLiYxWW5ZaI2FjSh4HNSPdpbqyyqjeX46fAOOY+uZjSPmh1BeVYHFgvP70nIl6oOP/bIuKNeR/5NvAD4MsRUelMFJJWAr4OtKpV/wwcHhGVDNoraSblDXCqvI98CHAQsCbz1k5E1fcLu4UDGZCHwfoa6Yy7deM6qj5wdgNJ+0bEiTWX4U5gY9IV808j4ipJt0bERjWU5b0UDpxVnlzk/BclHbhaZbgS+EVEvFRhGW6OiE0kfRu4PSJ+W1XjBisn6ZcRsX/d5egWvV612PJZ4HUR8WTVGUu6JiLeUnK2V9lZXqEsKwOvkXR2LstdpAYnw35fqs0vgKnArcCfJb2G+u7d3USqav6TpFdJGhURMyvM/1hgUeDn+flHctp+FZbhIUm/ILVe/G6+QqysD6qkH0bEoZLOpeSKqOqWep36cFVcg3OqpANJn8edEXFNhXl3HV+RAZKuAN4VEbPqLktdJG1NugI6mXRfSqR7IROAD0dEZY1fJI2MiNmF5wJGVv39SNqfdD9qhYhYR9I40s327SoswzxXolVfnUp6FbAj6Wpscm70smFEXFpR/ptHxPWSSj/3qhs95D6XLUsAawH3RsQbKsh7NeD3pABW/J2OAN7Xdk+3ZziQAZJOJE3I+Udgzv2HiDiqhrKsTPpxtMpQyVmepGuBgyLi5rb0jUlVWZXdD5H0D+B3wK8i4u6q8i0pxy3A5qRO4pvktNsjYsMKy3ATsEdE3Jefrw2cXWVnWEk/IH0XPdMhfSgkbQp8PCI+XkFe5wAXRsQJbekfA94TEbsPdxm6kasWkwfy32L5r3KS3kNq0vtq0k3c1wB3A8N+lpct0x7EACLiFkmjKipDyxtJDStOzM3vTwLOqKFF1gsR8WK6IARJi9DPaBvD5AvAFbnVokj7xT4Vl+Ee4Pj8/n8FnB4Rz1RchlYH7SOB9Zn7ZK/qlqRziYibJL2pouzeUFaVGhEn5RadPclXZAWSloqIf9eU963AtsCf8o31bYC9IqKSptaS7ga2iogZbekrAH+NiPXKtxz2cr2N1GpwOeBs4IiImFJR3t8Dngb2Bj5F6nN4V0T8TxX5F8qxOKnGQNTQarFQjteRguhepH6Wv4yIyrqISLoa+Cap1eTuuSwvR8T/VlWGXI5DCk9HkKr2VoyIHSrIe0pErFuSLmBy2bJe4EGDAUlvlnQX6QoISRvlUQSq9FJubDJC0oh8gNi4wvx/BFwq6e2SRuW/d5D62f2ownIgaaSk9+Sb+0eTrlTXBv5AtXPTHUYalul24OM5769UkbGkbfP/9wG7AOsC6wC7lPXzq6A8I0ldANYDniA1xDlE0hkVFuNVEXEJQETcFxFfIY22UrVRhb/FSbckqhoN50JJx0laspWQ72H+DLi4ojJ0HVctJj8GdiD3n4qIW/OVQJWelrQ0qW/MaZIeBypr3BARx0t6GDiCVJ3ZarX4zYj4Q1XlyCaTOoN/PyL+Wkg/u8rvJdIYgr/Mf1V7O2lorHeXLAugyg7qRwHvAS4DvhUR1+dF35V0b1XlAF7IVx735RZ7D5GGEatURHy96jwLPg98D3ggVzcH6STvt6T+lj3JVYuApOsiYoti35gaWoYtRRpZfASpY/KywGl1dAmom6SlI+JfXVCOf1De3HvtivIfAbw/Is6qIr9+yvEx0j3K50qWLVvV/TJJW5BOrpYn3StbBvhelS1qczlGA/9NOuEr3qvbtsIyLE3qrC/g793we6mTr8iSByVtBYSkxYBPk6sZqyBpd1LV0e256qSSQVi72CxJBzPvgaKy0UWy8YXHSwB7ACtUlXlEvJw769cayHJDguUlbcDc38efKwxiK5BaFCu35P1IFfl2cBpwJmm6oQNJXVSmV1mAHLjmaZzVq3yPLDkQOBhYHZhGujd1cBUZ53txnwNWBI6Q9NUq8u1yvyZNXbIDcBUwhjQwa6Ui4snC30MR8WNSg5wqTZT0eUlrSFqh9VdlASTtR6ryvoQ0RNQlpJFwqsp/H+BeUhXvZEm7VpV3Byvm0W9eioir8gnWljWXqaf1/BVZvon9kYj4cE1FeBuwUUTMzjdtrybdp+pl60bEHpJ2i4hTlAYRvqTqQuT+QS0jSFdoVXdFaF2FFk+sWvdFqvIZ4E3AtRGxjaT1SAGtKp8HNoiIxyStSzrRuaDC/Nu1hgd7RNIuwMOkky2rSc8HshxAdqPilnkFL7ZGsYiI59TqtFSxtibF86i4c3jrQPF0rs56lDTqe9WKU3XMIg2b9YEqCxARa1WZXwfPR8Tzklrz1t2Tm+JX5YXIM1JHxJRc/V+nb0paFjgU+AnpXt3nqshYUr/jv8YwTzrbrXo+kGV/URrp/ExgTj+yqGaaivXUNxeagHXy89ZYi1UNXNy60ngd6ey7NQL+u0nVSlU6XtLywFdzOZYGKu0rBBARdTTtnku+Sj+ENKHoAUrDZL0uIqq8IpkmaTng/0hVnTNIVyFVGZNbTrasUXweEf2ehC0s6ps1fsl8b/AZqm/+35oPb3FgE+BO0rHiDcAN1DvFTG3capE5Yy22iypaISkNiNtRpDmQKiPpUuD/RR4YN4/q8buI2LHKcnQDSZ8hjWQxk3R/ZlPgsKrGGMxlOJM0pt7eEbFB7j/0t4ioso9hsTxvJ7WovTgiXqwoz337Wx4VzdagNMbipqQhyyobIqxDWU4HvhsRt+TnGwGfqaFBVFfo+Suy3MT52LqaOFcdqAZhTaB4gHqRiqr1uqx6E+BjEXG0pB1I/ZX2IQW2ygIZsE5EfFDSXgAR8Z+qqp87NCppDZi7NFDJ5LNVBapBuJjUGXwpSc+Sa02g+pkqgNe3ghjM6ftaa3CtU88Hsm5p4txFfg1cr74pM94LnFpR3t1UvQl9s+/uTBo099Ya7mG+mK/CAuaMN1jVEFU30negXpM0G7NIw4U9QBr1vWdExBeAL0g6LyKqGsmjk79LOo65Z8v+e71Fqo+rFoHc5P0/zHuPrJIzzm6Tz+yKM1VX2l+lW6o3Jf2K1CVjLWAjYCRwZURsVmEZtgf+hzRQ7qXA1sBHI+LKCstwHHB+RFyYn+8EvDMiDq2qDN0m3xIYF2meuiWBRaLCeepynp9k7tmyfxoR/6mqDN3EgYw5Izi0i6pGcMhl2JU0PcPLA648/GV5C+lH+qs8isHSEVH2GQ1X/veQuiS8kJ8vDtxa9cDFudp5Y+D+iHg6V7WNqbplmKQVSf2URGoC/0TF+d/YHrwlTYqI8Z22GaZyLBcRT1eZZ4dy1D5PXS7HYqRGQJUMot3Ner5qEbqmifOewNGSfk+N83BJOpzUX+p1pPtBi5KqL7ausBhl1Zt1jHbyZuCWiPi3pP8i3eg/uoqMleal+zJ5xBfg21H9NDYtT0j6CnNXY9UxdNqNkq4n/T6qvE/Z7mDyPHUAkSYbrXTMx3zi+0PStFNrKc0beHhEvLfKcnQLX5EBkvYuS4+Iqu4NtcqxDGmKjH1IB4zW3E9VVlncQmrWe1Nh3MnbKuwG0CpHrdWbuQy3kaoU30gKrieSZuF9ewV5X0y6R/Vn0lBIoyLio8Odb4eyrAAcTqrGilymb1Rd9Z6vkHcgdRLfmDS9zymRJx2tsBxzjc2qNE/bTVX+RiTdCGwHXBE1TfraTXxFlhQnxVuCtIPcRHWNHACIiGfzFdmSwGdJVyJfkHRMRPykomK8GBEhqdW4YKmK8p1L7sNXRT++/szKn8VuwNERcaKkCRXlvWr0zXt2idJM0bXIAeszdeVfKMfLpGmFLlKaYug04HP5Ku1L0Tcq/3C7StKXgSUlvYs0T13VM0S8lKu7i2k9e1XiQAZExKeKz3Ov/V9XWQZJ7yadaa6T8948Ih7PHWLvJo0gUIWzJP0CWC7fC/gY9Uxj0g1mSvoSqSrtbUrDmS1aUd7KncJbR6qRxee92BApd8r+MGmi0xmk0TTOBTYjNdSq6hbBYcC+zD1P3QkV5d1yt6QPkOYvXIt0onFtxWXoGq5aLCFpUeC2iHh9hXmeCpwQEfM0M5e0XURcVmFZ3gVsTzpoXhIRE6vKu5tIWhX4EHBDRFwtaU3gHVVUOUuaCrxMXyArqrQhUreQNJk079ZJ7f0vJX05Ir5VYVlGA0REpaPeF/JfijTazZzfKfD1KJlqpxc4kAGS/kDfZfkIUlPnsyLisPpK1bskrUJq9h7Aw61x9qy3Kc2cXlur3tyH8HBSs3flv9nATyLiG3WVy3o8kCmNpL0Kc1exziL1F3qoipvIkmYyd912naMFlJUH0phyk4BDI+L+Ycx7Y+A40hBID+XkMcDTwCeimrEvO30GUNN3UpfciGFf0r3aV5NPLIDzgBMj4qV+Nl+Y5Wi1Xi0VEe+rqByfI3WOP6DVHUXS2sCxpCG7Kht4vMNn0vqd/rKq4cO6Ra8HsguAL7f3C5I0ntSUtWya+Vc0SV8nHax+Szpw70maG+xe4KCIeMcw5n0L8PGIuK4tfUvgF1HhjN02Zzy/p0ldH6bl5DGkiSRXiIgPVlSOfvtnVVXtLulm4F3t/fhyNeOlrdaDFZXlGNLv8vSc9EHSyd/SwBIRUVWjpK7Q64HsjojYoMOySpqydhjPbo4amjhfFxFbtKVdGxFbSrp1OIOJpMkRMa7DsikRse5w5W3zknRvRJRO1yLp7xHx2qrLVKcBjhcdlw1TWa4qdgPJ1Z5XRcTbJN0VEetXVZZu0OutFpfoZ9mSFZWhOJ5du6onUAR4ObeGOjs/f39beYbTRZL+SOr28GBOW4PUSu3iYc67a9U40soMSXsAv2/dm8p9ufYgtRqsRL4S6q9qsarBcvurrqu6Km8VSWMionWl/GpgdH5c1VicXaPXr8hOBy6PiF+2pe8LbF9V1Uk3yXX+R5NGtQhSk97PkaotNouIa4Y5/52A3UiNPUSq0pozzl+vKY60EhGvlfRq0riTwz7SiqSxwHeBbZl7wODLSdPZVDJsmdJAyR1V1SFa0mwKY7EWF5Gq86rqmoGk95DmJrsn5/9aUiOUy0i3AH5QVVm6Qa8HslVI/VBeJF0ZQTpoLAa8NyIerbAsbytLL2uOP4xlGAl8usqb1ta/LhppZUXS8aLScR5tXvmq+E3AbaQW1gLujB4dMBh6PJC1SNoGaNVv3xkRl9dQhuLIAEuQxnK7MSqY3LOtHFcOZ4OOAfIeCexHalBwUUT8tbDsKxHxzTrKVSdJ10fE5pJuiohNc/+hv1UVyCRtTmqpeYOk9YEdgbsj4qIq8m8rS7E16SKk1sUv9Eor0qLWfeu6y9EtHMi6lKQ1gO9FxF4V53skqfl7+5Q2w970XdIJwKuA64GPkG5eH5KX3VThvZCuIenzwDjgXcC3SSOt/LaKIctyteZOpKAxEdgCuBJ4J6mj/JHDXYZ+yjYCeB9ploSv1lWOukg6ApgUEefVXZZu4EDWpXIrpNuqHgRU0hUlyVHFlWGxyiz3Yfo5sBJpIOVrq2ze3E3qGmlF0u2kwXkXBx4lTWHzrNJcWNdVXb1ZplevTCTNIJ1wvkCaS7HVx7HfVtCvVL3earFrSPoJc48usjFwa9XliIhtqs6zYLFCOWYBB0j6X1LjgqVrK1WN8jh6V7eCl6QlJY2NiKkVZD8rImYDz0m6L/I0MhHxH0mVj7CRGzi0jCDdz656xu5usVLdBegmDmTdY1Lh8SzS9C1/qaMgknYB3kChe0JFQ/BMkrRjRMxpah8R35D0MGn0hF70O2CrwvPZOe1N5asvVC9KelUev2/OxJpKg2rXMVTUHoXHs4CppBauPSciZufvYR3m7kb01w6bvKK5arFmktaMiAfqLkeL0rT2rwK2IY3o/X7g+ojYt9aC9ShJt0TExm1pw9oxvZDP4pFn6W5LXwlYLSJuH+4yWLncRegQUjeV20knNtfW1VCrbiPqLoDxf60HSnOR1W2riNgbmBERXyf1J1uj5jK17hP1ounFKjWludEqaQLfIYgdEBFPVBnEJF1UePzfVeXb5T5LqlqdGhFvJV0xP1JvkerjQFa/Yh1/N0zN0eqL8lzufPsS1c3z1J8T6y5ATQ4EvizpAUkPAl8kzYFVZ3mqtmrh8Z415N+Nnm/1G5O0WETcCaxXc5lq43tk9YsOj+tygdIEht8nzdAcVDRpoKTzOy0CVqyiDN0mj1qxpaSlSbcCZtZcpDoaV3TD76LbPJJ/p38gzSD+FNCz0x35HlnNCsPeiDS+Y2tivNqnDJG0OGnonWcqym8GaTbmf7UvAs6MiFWqKEe3qbHxTVlZiuP7VZXn06SWqyLdu51rwIKoaBqXbpVnB1gW+GNZdXAv8BVZzSJiZN1laCdpK2Asef+QRFQwKzJpXMfnIuKqkjLdW0H+XadT45uK8t6CNIpHq+/YYcCmku4CvlXVCQ7w/wqPf1pRnl0v9zUdDdydk1YkTcHUc3xFZnOR9GtSk95bSE29IV0Zfrq+UvWuVifxwv+lgXMiYvsK8r6TNHLGLEnHk2oLzga2y+k9fSVUJ0mfAL4BPElfV4jotelbWnxFZu3GA+tHl5zhSNo1Ii6ouxw1ej7/bzW+eZLqGt+MyB3TAcYXhgi7Jg9mXLn2MTd7dQxOUtP710fE9LoL0g3catHa3cHcrcTqVsu9oC7yh7bGN1PpmxV4uN0haZ/8+FalmdOR9FpSa9Y63DHA814xDah00t1u5qpFA+aMvh/AKNLwWNdTmKAvIt7TYdPhLtfNPTzG4ghgy9YsADU0vlmWNDfdW0l91zYlTXj6IGm6n8qHUOt1klpV/G8kDSZ9AXP/To+po1x1c9WitXTrRHx19pmqVUS8LOmHpE7prQ7KlbVKywHzo5JGkfo4LgJMi4hamnlL+jZpBoDngD+STrg+FxG/raM8NWnNAv1I/uu5KWzK+IrMAJC0LrBK+/iOecLPh6qahbcTSe+qatT3biLp66QJFM/plvuWAJKWjoj2bhLDnectEbGxpN1JLRk/B1xWxXBd3ULSEsDS7ROc5mHDZvZq83vfI7OWHwNlnW2fy8vq1qsjexxCGiT4BUnPSpop6dm6CwXcVUOerRqknUmDaj9B73WW/jGpK0a7nYGjKi5L13DVorWMjYjb2hMjYpKksVUUwCN7zCsiRtWVt6RDOi2inml1LpJ0B6lbyMH5KqTXrkDeFhFlw4T9mjR8WU9yILOWJfpZtmRFZXgrnUf22LyiMnQFSSOBJVvVd5K2pG++tpsrGqrqW6TWkrNKllVemxMRX5D0feCp3LftedIs0b2kdIiwiIjcQbonOZBZyw2S9o+IXxYT83QRN1ZUBo/s0ee7wOPA9/Lz00lNzZcgNcOv4uz7JuD/ImKe71/SfhXk357nhwqPi4t6qbHHE5I2a/9OJG1KDzfHd2MPA0DSKsC5wIv0Ba7xpKuA90bEo3WVrRdJuhl4U6tDcqsbQj7rvjoi3lJBGV4HPNnesCAvW6Xq1ouSipOrLgFsC9zYSyOM5CvzM0jDlRV/px8DPhQRf6urbHVyILO5SNoG2CA/vTMiLu9v/QrKs0JE9NyZZvvkmZK2j4hL8+N5JtvsRZKWB06OiJ6aJVrSqsCnKPxOgZ9ERM/OR+ZAZl1D0takM82XSWeY3ySN+7go8IFeOtuUdDewefu9sNxJ+bqIGPa5p/L4ij8pm0RT0lLAB4EXIuK04S5LGUmLALdHxOvryN+6h++RWTf5EfABUou4PwK7R8Q1uf7/J8DWdRauYr8EzpR0YEQ8ACDpNcCxeVkVfg58VdKGpPtz00lVeuNIHXFPAioLYpLOpa+5/QjS1DbnVZV/t/G4k30cyKybLNo6+5c0PSKuAYiIm/I0Ij0jIo6S9BxpgN6lSAfwfwPfiYhj+996oZXhFuADecT98cBqpBnE746IOhrfFKdwmQX8MyKm1lCObuFxJzNXLVrXKN4XkrR7RPxfYdkdEbFB561fubpoduhaSfpWRHx5oDTrPR7Zw7rJVyW9CqAtiK0DVDGxZ1eKiH/1ehDLdixJ26XyUnQBSd+WtIykRSRdIumxYveEXuMrMjPrapI+DhwIvBYoVmmOIjW/37OWgtXI407OzffIrGt0eyu5XidpqYj4dw1ZnwVcRhr5/rBC+syIeLyG8nSDecadlNSzVyW+IrOuIWlj4MtAf63kjuu1Eb4lbQWMpXDiGRGVVbXm/E8gjbq+pqSNgI9HxCeqKkNbeVagMKRaRDxcRznqlIfq2ok07uR4YFngjxGxRa0Fq4kDmXWdLmolVztJvyb1pbuFdNCCNLTepztvtdDLcB3wfuD81iSndTS+kbQzafT3McCTwKuByVX0qetGklamb9zJpYFlI+KhustVB1ctWtfJA+VeWXc5usR4YP265yKLiAfbxjec3WndYfQtUl/CS/NwXe8i3R/qOR53cm4OZGbd7Q5gVdJswHV5MFcvhqTFgE8Dd9dQjlkRMV3SCEmKiImSjqyhHN3grYXHc8adxIHMzLrQSsBdkq6nMPdWRLynwjIcCBwNrA5MAy4F6rg/9kxu9HMNcKqkx0nDmfWciDio+Lw17mQ9pamf75FZ16qxlVzXkPT2svSyqW6GsQxbR8RfBkqroByjSDOWjwD2JjVwOLVsdP5e0+vjTjqQWdfptlZyvU7STRGx6UBpFZTDI3tkncadjIjP11eq+jiQWdfpllZydZI0k74D1VyLSK0Wl6mgDG8GtgI+SxrQuWUZ0hx1lXa+7RBQb626HN1A0naFpz0/7qTvkVlX6pJWcrWJiFF1l4E0qerSpONEsTzPkk40KlEc2UPSTYVFo4BJVZWjy2znq9M+viKzriPpbOAo0mjnW5JayY3vxaGIuoGk10TEP2vMf3lgRTyyxxy+Op2bA5l1HUkrkVrJvXrJlDEAABGPSURBVJNUlXYp8OlenCm6G0gaDfw36T5McUSNbSvKfwngpYiYnZ+vSxrV4p8RcX4VZegWHneynAOZdZ1uaSVniaRLgTOBz5MOohOA6RHxxYryvwrYPyL+nmdCuCGX5/XAX3upOs1Xp+UcyKzrdEsrOUsk3RgRm0m6LSLemNOuiojSrgHDkP/tEbFhfvwNYKWI+ISkxYFJrWW9yONOJm7sYV2j0EputKRDCouWAUbWUyoDXsr/H5G0C/AwabzDqhTPtrcFfggQES9I6skO0Z3GnQR6ctxJBzLrJl3RSs7m8U1JywKHAj8hnVh8tsL875T0HeAh0r2hSwFymdTfhq9gHneywFWL1nXqbiVnA5P02Yj4cUV5LUWaOHI14MSIuCmnbw2Mi4iTqyhHN5E0KSLGS7oV2DgiQtL1EbF53WWrgwOZdZ26W8nZwCQ9EBFr1l2OXiXpMuA9wPdIV8iPA1tHxJa1FqwmI+ougFmJ04B7gLWArwNTSS3VrHv0apVet9gdeJ5UxXslqdp11zoLVCcHMutGK0bEiaS+Q1dFxMdIHaOte7gqp15fiojZEfFSRJwYEUcBhwy41SuUA5l1o7layUnahGpbyRlpvEdJz5b8zSS1krP67FiStkvlpegSbrVo3ajuVnJG14z32C9JH4uIk+ouR1U87mQ5BzLrOhFxQX74DLANpFZy9ZXIutgSA6/yinIWcBke2WMubrVojeBWciZpZGu8xV7lcSfL+R6ZNYVbydkUSd+XtH7dBanRJcA6AHncyeuB9YFDJH2rzoLVyYHMmsJVB/ZG4O/ACZKulXSApGGfYLTLrBARf8+PJwBnRMRBwA7Au+srVr0cyKxruJWc9SciZkbELyNiK1KH+cNJLVtPyVVsvaB93MmJkMadBHpy3ElwYw/rIk1oJWf1kTSS1MR8H2AsafDg04C3AheSxmF8pfO4kyUcyMysKSYDVwDfj4i/FtLPlvS2mspUtf1I406uB+wYEf/O6RuQZlXvSW61aGaNIGnpiPhX3eWw7uN7ZGbWFD+TtFzriaTlJfVMZ2jrzIHMzJrijRHxdOtJRMwANqmxPNYlHMjMrClGSFq+9UTSCvg+v+GdwMya44fAXyWdnZ/vARxZY3m6Sq+NO1nkQGZmjRARp0qaROo/JeB9EXFXzcXqJr027uQcbrVoZl1N0jIR8WyuSpxHRDxVdZnq5nEn5+ZAZmZdTdIFEbGrpH8w98gWAiIi1q6paLXJn8XZwK98VepAZmbWOJJGAXuSRjkZAZxEGnfx2VoLVhMHMjPrapI27W95RNzU3/JXujyqyenAcqSrtCMiYkq9paqWA5mZdTVJV/SzOCJi28oK0yVKxp38NX3jTn4rInph3Mk5HMjMzBpG0v2kcSdPbBt3EknHRMSn6ylZPRzIzKwRJC0KHAS0Bgi+EvhFRLxUW6Fq4nEn5+aRPcysKY4FNgN+nv82y2m9yONOFrhDtJk1xZsiYqPC88sl3Vpbaeo1z7iTknp23ElfkZlZU8yWtE7riaS1gV7tFOxxJwt69o2bWeN8AbgiN3T4/+3da8xl5VnG8f/FAAXaoWWQ1gMyHMIhWKCAltJBpVT4IlYltRGcihWpKUSl2JoelSY1agxNmsaWVrClJdYU7IlEREs4NNSiHQYGLKc4gEnTD4CEjhiHQ28/7PV21p7ZBeKH99kP6/9Ldt53PWs+3JlM9j3Ps+597QDrmU3tTZG5kyMOe0jqRpKXAEcya2T3VtX2xiU1k+RoduRO3jDlhA8bmaQuJNkLuAA4hVlU1deBy6rqf5sWtorMnVzMRiapC0m+AGwDrhqWzgb2q6pfa1fV6jJ3cjEbmaQuJLlzp6nFhWuaHoc9JPVic5LXVdU3AZKcBNzauKZVZe7kYu7IJHUhyT3MBj3+c1g6CLgH+D6zY7VjW9W2WsydXMxGJqkLSdY/1/2qeni1atFysZFJUmfMnZxnI5OkziS5HNgDuHJYeivwbFX9Truq2rGRSVJnnOCcZ9aipC4k+YsXsjYR5k6OuCOT1IUkt1fVCTutbZnCtOLOkrwR+DQwlztZVc811fiiZSOTtNSSvINZNNWhwH+Mbq0Fbq2qjU0Ka8zcyR1sZJKWWpKXA/sBfwa8Z3Rr22SzBc2dnGMjk7TUDMrdlbmT82xkkpbagqDcjG5PMijXqcV5Zi1KWmpVdebw85DWtSyRyedOjrkjk7TUDMrdlbmT82xkkpbaKCh3L+CngTuZHS8eC9xWVae0qq0VcyfnebQoaalV1RsAkvwd8Paqumu4fjXwrpa1tTK1RvV8TPaQ1IujVpoYQFXdDbymYT1aEu7IJPXiniEs9ypm04sbmT0X0sS5I5PUi7cB/w78AXAR8O1hbXLMnZznsIekbiTZGzioqu5rXUtL5k7Oc0cmqQtJ3gTcAfzjcP2aJF9tW9XqSvKOJHcBRybZMno9CGxpXV8r7sgkdSHJJuA04KaqOn5Ym9QuxNzJxRz2kNSLZ6rqiSTP/ydfvKqqHkpy4c43kqybajOzkUnqxd1JzgHWJDkc+H3gG41rWm1/C5wJbGJB7iSzr7qZHI8WJXUhyT7A+4EzhqXrgQ9P9atLtIONTNLSS7IG+POqenfrWloyd3IxjxYlLb2qejbJia3rWAKXDj8X5k4y+6LNybGRSerF5mHc/mrgyZXFqvpiu5JWl7mTi9nIJPViHfAYsxH8FQVMppGN7JI7mWSyuZM+I5OkziT5PLNd6Th38mVVdXbTwhox2UNSF5JcmeQVo+v9kvxNy5oaMndyxB2ZpC4k2byS6PFca1Nh7uQO7sgk9WK3JPutXCRZx0Sf85s7OW+S/wgkdelS4BtJrmH2XOgtwJ+2LamZPwFeC9wEUFV3JDm4YT1N2cgkdaGqPpvkW8ymFgOcVVXfblxWK+ZOjtjIJHVjaFxTbV5j5k6O+IxMkvrze8BPAduZBQk/wWx6cZKcWpSkjpg7uSt3ZJK6kWR9kl8Yft87ydrWNa22qnoWMHdyxGdkkrqQ5Hzg7cyiqg4DDgQuA97Ysq5GJp87OWYjk9SLC5mNnN8GUFUPJHll25KaMXdyxEYmqRfbq+qplZHzJLsze/OenKqabBzVIj4jk9SLm5O8D9g7yenMjtWubVxTE+ZOznNqUVIXkuwGnAecwewD0dcDl9cE38TMnZxnI5OkziS5Ezi1qh4frtcBN1fVMW0ra8NnZJK6kGQDcAmwntl7V4CqqkNb1tWIuZMj7sgkdSHJvcA7gU3AsyvrVfVYs6IaSnI0O3Inb5hw7qSNTFIfktxWVSe1rkPLx0YmaaklOWH49S3AGmafldq+cr+qbm9Rl5aHjUzSUkty43Pcrqo67TnuawJsZJK6kOTQqtr6fGtTkWQ9cHhVfS3J3sDuVbWtdV0t+IFoSb24ZsHa1atexRIYcievAT45LB0IfLldRW05fi9pqSU5itl3b708yVmjW/sCe7WpqjlzJ0dsZJKW3ZHAmcArgF8arW8Dzm9SUXvmTo7YyCQttar6CvCVJCdX1b+0rmdJ7Jw7eQETzZ0Ehz0kqTvmTs6zkUmSuubUoqQuJDnkhaxNQZINSf45yf1JtiZ5MMkkP4YA7sgkdSLJ7VV1wk5rm6rqxFY1tWLu5DyHPSQtNcfvF3qiqq5rXcSysJFJWnaO3w9GuZM3JvlLzJ0EPFqU1AnH782d/GHckUnqxWNJbgBeVVWvTnIs8Kaq+nDrwlZLVb0BfnjuZJuq2nNqUVIv/hp4L/A0QFVtAX69aUXtmDs54o5MUi/2qap/XYllGjzTqpgWHHxZzEYmqRePJjmMIVMwyZuB77YtadU5+LKAwx6SujA8A/oU8HrgceBBYGNVPdSyrhYcfJlnI5PUlSQvBXab6pdIalcOe0jqQpJXJbkCuKaqtiU5Osl5retSezYySb34DLOU9x8fru8HLmpWTUPmTs6zkUnqxY9U1ReA7wNU1TOMcgYn5u8XrC0ayZ8EpxYl9eLJJPuzY2rxdcATbUtaXY7fL2Yjk9SLi4GvAocluRU4AHhz25JWneP3Czi1KKkbSXZn9mYe4L6qerpxSU04fj/PRiapC0nWAL8IHMzoNKmqPtKqplaSHAF8ggnnTo457CGpF9cCvwXsD6wdvabI3MkRn5FJ6sWBVXVs6yKWxORzJ8fckUnqxXVJzmhdxJIwd3LEHZmkXnwT+FKS3ZgdqYXZl0nu27asJi5kljt5VJLvMOROti2pHYc9JHUhyVbgV4C7yjcuwNzJFR4tSurFA8DdNjFzJ3fmjkxSF5J8BjgUuA7YvrI+0fH764BPA++vquOGz9dtrqpjGpfWhDsySb14ELgB2BPH782dHHHYQ1IXqupDrWtYIpPPnRyzkUlSf8ydHPEZmSR1yNzJHWxkkrqQZENV3fp8a1Ng7uQ8hz0k9eJjL3BtCsydHPEZmaSlluRk4PXAAUkuHt3aF1jTpqrmzJ0ccUcmadntCbyM2X+8x7uP7zHdAQdzJ0d8RiapC0nWV9XDSdYyy1j879Y1tZLkV4GrmG1Gpp476dGipG6sTbIZWAeQ5FHg3Kq6u21ZTVwKnIy5k4BHi5L68Sng4qpaX1XrgT8c1qbI3MkRd2SSevHSqrpx5aKqbhrS36fou8BNQ+bipHMnwUYmqR9bk3wQ+NxwvZFZ/uIUPTi89hxek+awh6QuJNkP+BBwCrPhhluAS6rq8aaFqTkbmSSpax4tSupCkiOAd7FrLNNprWrScnBHJqkLSe4ELgM2Mfrurara1KyoRsydnGcjk9SFJJuq6sTWdSyDJLdX1QnPtzYVHi1K6sW1SS4AvsT8yPl/tStpdZk7uZiNTFIvzh1+vnu0VsChDWppZefcyRVTzp30aFGSemPu5Dx3ZJLUH3MnR8xalKT+mDs5YiOTpP7skjsJTDV30kYmqQ9JNqyEBCfZmOQjSda3rquRrUk+mOTg4fUBpps7aSOT1I1PAP+T5Djgj4CHgc+2LamZ3wYOAL7I7OMIBwBva1pRQ04tSurCygd+k/wx8J2qumLKHwLWDk4tSurFtiTvBd4K/GySNcAejWtqwtzJee7IJHUhyY8C5wD/VlVfT3IQcGpVTe540dzJeTYySd0YhjsOr6qvJdkHWFNV21rXtdrMnZznsIekLiQ5H7gG+OSw9BPAl9tV1NS1SS5I8mNJ1q28WhfVijsySV1IcgfwWuC2qjp+WLurqo5pW9nqS7Jo1L6qakq5kz/gsIekXmyvqqeSAJBkd2ahwZNTVYe0rmGZeLQoqRc3J3kfsHeS04GrgWsb16Ql4NGipC4k2Q04DzgDCHA9cHn5JjZ5NjJJ3UiyJ3DEcHlfVT3dsh4tB48WJXUhyanAA8BfAR8H7k/yc02LasTcyXnuyCR1Ickm4Jyqum+4PgL4/BQ/T5VkC3AccCzwOeAK4Kyq+vmmhTXijkxSL/ZYaWIAVXU/E42oAp4Zng3+MvDRqvoosLZxTc04fi+pF99KcgWzHQjAbzCLaJoicydHPFqU1IUkLwEuBE5hNrV4C/DxqtretLAGzJ2cZyOT1I0kBwBU1SOta2nN3MkdfEYmaall5pIkjwL3AvcleWT4XrJJMndyno1M0rK7CNgA/ExV7V9V64CTgA1J3tm2tGYuZPZ38j2AqnoAeGXTihqykUladr8JnF1VPwjKraqtwMbh3hRtr6qnVi6mnDsJNjJJy2+Pqnp058XhOdlUJ/XMnRyxkUladk/9P++9mL0HeAS4C/hd4B+ADzStqCGnFiUttSTPAk8uugXsVVWT3JWZO7mDjUySOjPkTl4JPMSsof8kcG5V3dKwrGZsZJLUGXMn5/mMTJL6Y+7kiFmLktQfcydHPFqUpM6YOznPRiZJHTJ3cgefkUlSJ8ydXMxGJkn9MHdyAY8WJakTSTYDp+8c2TUcM/5TVR3fprK23JFJUj/MnVzARiZJ/TB3cgGPFiWpE+ZOLmYjkyR1zaNFSVLXbGSSpK7ZyCRJXbORSZK6ZiOTJHXNRiZJ6tr/AXlgQRnw4DsQAAAAAElFTkSuQmCC"/>
-          <p:cNvSpPr>
-            <a:spLocks noChangeAspect="1" noChangeArrowheads="1"/>
-          </p:cNvSpPr>
-          <p:nvPr/>
-        </p:nvSpPr>
-        <p:spPr bwMode="auto">
-          <a:xfrm>
-            <a:off x="155574" y="-144463"/>
-            <a:ext cx="5643029" cy="5643048"/>
-          </a:xfrm>
-          <a:prstGeom prst="rect">
-            <a:avLst/>
-          </a:prstGeom>
-          <a:noFill/>
-          <a:extLst>
-            <a:ext uri="{909E8E84-426E-40DD-AFC4-6F175D3DCCD1}">
-              <a14:hiddenFill xmlns:a14="http://schemas.microsoft.com/office/drawing/2010/main">
-                <a:solidFill>
-                  <a:srgbClr val="FFFFFF"/>
-                </a:solidFill>
-              </a14:hiddenFill>
-            </a:ext>
-          </a:extLst>
-        </p:spPr>
-        <p:txBody>
-          <a:bodyPr vert="horz" wrap="square" lIns="91440" tIns="45720" rIns="91440" bIns="45720" numCol="1" anchor="t" anchorCtr="0" compatLnSpc="1">
-            <a:prstTxWarp prst="textNoShape">
-              <a:avLst/>
-            </a:prstTxWarp>
-          </a:bodyPr>
-          <a:lstStyle/>
-          <a:p>
-            <a:endParaRPr lang="en-US" dirty="0"/>
+            <a:pPr lvl="1">
+              <a:spcBef>
+                <a:spcPts val="1200"/>
+              </a:spcBef>
+              <a:spcAft>
+                <a:spcPts val="600"/>
+              </a:spcAft>
+            </a:pPr>
+            <a:r>
+              <a:rPr lang="en-US" dirty="0" smtClean="0"/>
+              <a:t>Exclude irrelevant and/or sparsely populated loan status categories </a:t>
+            </a:r>
+          </a:p>
+          <a:p>
+            <a:pPr lvl="1">
+              <a:spcBef>
+                <a:spcPts val="1200"/>
+              </a:spcBef>
+              <a:spcAft>
+                <a:spcPts val="600"/>
+              </a:spcAft>
+            </a:pPr>
+            <a:r>
+              <a:rPr lang="en-US" b="1" dirty="0" smtClean="0"/>
+              <a:t>Create binary target loan status variable:</a:t>
+            </a:r>
+          </a:p>
+          <a:p>
+            <a:pPr lvl="2">
+              <a:spcBef>
+                <a:spcPts val="1200"/>
+              </a:spcBef>
+              <a:spcAft>
+                <a:spcPts val="600"/>
+              </a:spcAft>
+            </a:pPr>
+            <a:r>
+              <a:rPr lang="en-US" sz="2400" dirty="0" smtClean="0"/>
+              <a:t> </a:t>
+            </a:r>
+            <a:r>
+              <a:rPr lang="en-US" b="1" dirty="0" smtClean="0"/>
+              <a:t>‘Fully Paid’ loan status: 1 </a:t>
+            </a:r>
+          </a:p>
+          <a:p>
+            <a:pPr lvl="2">
+              <a:spcBef>
+                <a:spcPts val="1200"/>
+              </a:spcBef>
+              <a:spcAft>
+                <a:spcPts val="600"/>
+              </a:spcAft>
+            </a:pPr>
+            <a:r>
+              <a:rPr lang="en-US" dirty="0" smtClean="0"/>
+              <a:t>Combine ‘Default’, ‘Late (31-120 days)’ and ‘Charged Off’ into new category, </a:t>
+            </a:r>
+            <a:r>
+              <a:rPr lang="en-US" b="1" dirty="0" smtClean="0"/>
+              <a:t>‘Not Fully Paid’, which is coded as 0</a:t>
+            </a:r>
           </a:p>
         </p:txBody>
       </p:sp>
     </p:spTree>
     <p:extLst>
       <p:ext uri="{BB962C8B-B14F-4D97-AF65-F5344CB8AC3E}">
-        <p14:creationId xmlns:p14="http://schemas.microsoft.com/office/powerpoint/2010/main" val="1822058964"/>
+        <p14:creationId xmlns:p14="http://schemas.microsoft.com/office/powerpoint/2010/main" val="2211314686"/>
       </p:ext>
     </p:extLst>
   </p:cSld>
@@ -7145,12 +6725,9 @@
           <a:p>
             <a:r>
               <a:rPr lang="en-US" sz="2400" dirty="0" smtClean="0"/>
-              <a:t>Target </a:t>
-            </a:r>
-            <a:r>
-              <a:rPr lang="en-US" sz="2400" dirty="0"/>
-              <a:t>Variable: Loan Status</a:t>
-            </a:r>
+              <a:t>Multicollinearity Check</a:t>
+            </a:r>
+            <a:endParaRPr lang="en-US" sz="2400" dirty="0"/>
           </a:p>
         </p:txBody>
       </p:sp>
@@ -7183,8 +6760,8 @@
               </a:spcAft>
             </a:pPr>
             <a:r>
-              <a:rPr lang="en-US" dirty="0" smtClean="0"/>
-              <a:t>Exclude irrelevant and/or sparsely populated loan status categories </a:t>
+              <a:rPr lang="en-US" sz="1800" b="1" dirty="0" smtClean="0"/>
+              <a:t>Filtered dataset down to 26 relevant variables (18 numeric), with ~ 160,000 observations</a:t>
             </a:r>
           </a:p>
           <a:p>
@@ -7197,8 +6774,8 @@
               </a:spcAft>
             </a:pPr>
             <a:r>
-              <a:rPr lang="en-US" b="1" dirty="0" smtClean="0"/>
-              <a:t>Create binary target loan status variable:</a:t>
+              <a:rPr lang="en-US" sz="1800" dirty="0" smtClean="0"/>
+              <a:t>Correlation heatmap shows that several sets of variables are highly positively correlated (&gt; ~0.4):</a:t>
             </a:r>
           </a:p>
           <a:p>
@@ -7211,12 +6788,8 @@
               </a:spcAft>
             </a:pPr>
             <a:r>
-              <a:rPr lang="en-US" sz="2400" dirty="0" smtClean="0"/>
-              <a:t> </a:t>
-            </a:r>
-            <a:r>
-              <a:rPr lang="en-US" b="1" dirty="0" smtClean="0"/>
-              <a:t>‘Fully Paid’ loan status: 1 </a:t>
+              <a:rPr lang="en-US" sz="1800" dirty="0" smtClean="0"/>
+              <a:t>Loan amount and funded amount (0.998)</a:t>
             </a:r>
           </a:p>
           <a:p>
@@ -7229,20 +6802,90 @@
               </a:spcAft>
             </a:pPr>
             <a:r>
-              <a:rPr lang="en-US" dirty="0" smtClean="0"/>
-              <a:t>Combine ‘Default’, ‘Late (31-120 days)’ and ‘Charged Off’ into new category, </a:t>
-            </a:r>
-            <a:r>
-              <a:rPr lang="en-US" b="1" dirty="0" smtClean="0"/>
-              <a:t>‘Not Fully Paid’, which is coded as 0</a:t>
-            </a:r>
+              <a:rPr lang="en-US" sz="1800" dirty="0" smtClean="0"/>
+              <a:t>Revol_bal (total revolving credit balance) and total_rev_hi_lim (total revolving credit limit) (0.83)</a:t>
+            </a:r>
+          </a:p>
+          <a:p>
+            <a:pPr lvl="2">
+              <a:spcBef>
+                <a:spcPts val="1200"/>
+              </a:spcBef>
+              <a:spcAft>
+                <a:spcPts val="600"/>
+              </a:spcAft>
+            </a:pPr>
+            <a:r>
+              <a:rPr lang="en-US" sz="1800" dirty="0" smtClean="0"/>
+              <a:t>Open_acc (open credit lines) and total_acc (total no. of credit lines) (0.68)</a:t>
+            </a:r>
+          </a:p>
+          <a:p>
+            <a:pPr lvl="2">
+              <a:spcBef>
+                <a:spcPts val="1200"/>
+              </a:spcBef>
+              <a:spcAft>
+                <a:spcPts val="600"/>
+              </a:spcAft>
+            </a:pPr>
+            <a:r>
+              <a:rPr lang="en-US" sz="1800" dirty="0"/>
+              <a:t>Revol_bal and </a:t>
+            </a:r>
+            <a:r>
+              <a:rPr lang="en-US" sz="1800" dirty="0" smtClean="0"/>
+              <a:t>tot_cur_bal (total current balance across accounts) (0.43)</a:t>
+            </a:r>
+            <a:endParaRPr lang="en-US" sz="1800" dirty="0"/>
+          </a:p>
+          <a:p>
+            <a:pPr lvl="2">
+              <a:spcBef>
+                <a:spcPts val="1200"/>
+              </a:spcBef>
+              <a:spcAft>
+                <a:spcPts val="600"/>
+              </a:spcAft>
+            </a:pPr>
+            <a:r>
+              <a:rPr lang="en-US" sz="1800" dirty="0" smtClean="0"/>
+              <a:t>Tot_cur_bal and annual_inc (0.42)</a:t>
+            </a:r>
+          </a:p>
+          <a:p>
+            <a:pPr lvl="1">
+              <a:spcBef>
+                <a:spcPts val="1200"/>
+              </a:spcBef>
+              <a:spcAft>
+                <a:spcPts val="600"/>
+              </a:spcAft>
+            </a:pPr>
+            <a:r>
+              <a:rPr lang="en-US" sz="1800" b="1" dirty="0" smtClean="0"/>
+              <a:t>Eliminate loan amount, total_rev_hi_lim, total_acc and total_cur_bal</a:t>
+            </a:r>
+            <a:endParaRPr lang="en-US" sz="1800" b="1" dirty="0"/>
+          </a:p>
+          <a:p>
+            <a:pPr marL="681037" lvl="2" indent="0">
+              <a:spcBef>
+                <a:spcPts val="1200"/>
+              </a:spcBef>
+              <a:spcAft>
+                <a:spcPts val="600"/>
+              </a:spcAft>
+              <a:buNone/>
+            </a:pPr>
+            <a:endParaRPr lang="en-US" sz="1800" dirty="0" smtClean="0"/>
           </a:p>
         </p:txBody>
       </p:sp>
     </p:spTree>
     <p:extLst>
       <p:ext uri="{BB962C8B-B14F-4D97-AF65-F5344CB8AC3E}">
-        <p14:creationId xmlns:p14="http://schemas.microsoft.com/office/powerpoint/2010/main" val="2211314686"/>
+        <p14:creationId xmlns:p14="http://schemas.microsoft.com/office/powerpoint/2010/main" val="521232572"/>
       </p:ext>
     </p:extLst>
   </p:cSld>
@@ -7293,7 +6936,7 @@
           <a:p>
             <a:r>
               <a:rPr lang="en-US" sz="2400" dirty="0" smtClean="0"/>
-              <a:t>Fully Paid vs. Non-Fully Paid Loans [GRAPHIC]</a:t>
+              <a:t>Other filters</a:t>
             </a:r>
             <a:endParaRPr lang="en-US" sz="2400" dirty="0"/>
           </a:p>
@@ -7301,125 +6944,155 @@
       </p:sp>
       <p:sp>
         <p:nvSpPr>
-          <p:cNvPr id="10" name="AutoShape 6" descr="data:image/png;base64,iVBORw0KGgoAAAANSUhEUgAAAbIAAAIICAYAAAALymuSAAAABHNCSVQICAgIfAhkiAAAAAlwSFlzAAALEgAACxIB0t1+/AAAADl0RVh0U29mdHdhcmUAbWF0cGxvdGxpYiB2ZXJzaW9uIDIuMi4yLCBodHRwOi8vbWF0cGxvdGxpYi5vcmcvhp/UCwAAIABJREFUeJzs3XfYHFXd//H3J6EKoYciAUOJIoK0CAg2QOkK+hMFfSQiRRAr6CP66IOK2EXBAiIgoEgR4QGRFmmCSgm9m4ARQg0QIIqUhO/vj3M292Qze5ck98wO+3ld133du2dm9pzdnZ3vzJlTFBGYmZk11Yi6C2BmZrYgHMjMzKzRHMjMzKzRHMjMzKzRHMjMzKzRHMjMzKzR5iuQSYoB/m5Z2AW17iPptZLOl/SkpJfzd79B3eUaKknfzGX/r258PTPr3yILuP3vgX+VpD+wgK9rXU7SSOAc4A3AX4H7gJeBGXWWy+ojaV1gMnBZRLxzIb3mIsBLwH0Rse7CeM0mkfRN4H+Aj0TEb+ouT7da0ED2+YiYujAKYo2zLimIXRER29ZdGDPrXb5HZvNr9fz//lpLYWYWEUP+AyL/jR3Euuvmdf8ELAv8CJhKqi74Qdu6OwMXAk8AL5AOkj8EVujw2isCPwceBv4D3Al8Clg05zmlbf1v5vT/6vB61+TlY0qWrZnzuh94HngS+AOwZcm678yvcwKwAnBsLuMLwD3AZ/v5vFYCvgXcAfwbeAa4DfgOsEpe57j8+gf08zq35XU2GOR3uijwaeDGnO+/gOuBg4CRJd9n2d8JQ8jrYOBa4FngOeDmnP/IkvU3Bb4HTAKm58/xn8CJwNoL8lm27xfAG4Hzgadyuf4G7DDE30fH/Szvsz8gVcE9n/O5GNi+w2u9A/hpLvdTeZvJwI+BlQf4vS2Z3+vU/Jn9AzgCWHSI7+fNwLn5M38BeBy4CTgKGN32nvvdL4byfoD9+nnNP+V1FqHkt172W2xLX4y0b19POt78J7+/S+jnd7WA+9kKpOPTxfk7aX3/lwHvLXndaf28/7eUfEdnA48CL+Ztj6fkWJbXX5r0m/pn4Tv4n/x5TgNmddhuF2Ai6RbC88C9+X0u19/vANgS+CPpuBnAhvT9xubZtvC7D2DSgN/BUL6wQgbzE8j+mr/cJ0n3Vs4BvlJY7/t5veeBq/OXMjmn/Z38g2k7INyTlz8MnJk/4JeAn5Tt3MxnIAO2Bp7Oy+7OZbs65/US8P4OP55zctkfAX6Xy/dCXvaVkvw3AB7Kyx/J259LCtAB7JrX2yg/v6GfA08Afxvk97kI6ccVpB/hucB5wMzC+xiR110ZOJn0g299Nyfnv30GkddSwFV52yfz65xPOji28lLbNv+XP+cb8+PW5xqkH9Tr5/ezbNsvjiH9sO4AziAd5AKYBbxjCL+P0v0MWIMUTIJ0ADkDuByYndM+V/Jat5AOsteT7kmfR7oH3XqN9oN/6/d2NfAX0sHiXNJBpPV9DuqEI7/eboXyXQecnl+r9dvbMq/3vly+1u/xZEr2i6G8H+BtwCl52bNtr/mFwr47P4GsVdaZpJPn04ErSfvkPUP4fIayn+2e06aSjgWnA3/O+1cAh7W99lHArXnZn9ve/7jCep8i3Z+eTTo5/B19J7KPAq9te90l6du3nyQdzy4g7ftn0yGQAV/N27xEOlE6g75gey+FoN32Ozgxb3M78Nv8XtYnnbwEcHCHz/YXefnHB/weBvuFtWUwP4Gs9eNatmSdvfLy24B1C+kjCh/Gb9q2+WVOvwBYspC+JelqYqEEMmC5vDPMAj7Utv4WpAD3DLBiyY8n8k61RGHZVnmHexZ4VSF9UfoOzj8CFmvLa0NgrcLza/O6G5e8j5PysgEDS17/i3n9W5n7QLJ6oUyfHMwBYhB5tXbOM4BlCunL0BdM9yvJq/1HIuDjef2L25YN9bMsXk0c2rbuYRSuAAb5HjsFsoty+qkUroqAt5MOIrPav0/SGfCybWmLFPI4brC/N2Bc3u9eBtYc5Htp/SbKrhg2aNtf5lwN9vN6Q30/AwWqIQeyQjnvp622J+87bx3kZzPU/WxdYIuS1xkHPEg62LefRA90zNqadDyZBmzatqz1+7imLf1r9J2YLFdIX5u+wDSrbZs35/3mWeBNhfQl6DspOLtD2QM4pKTs6+Vlt5QsWyrnNRMYNeB3MdgfZ1smMcDf2A4/rHkOunmdO/LyN5QsG0GK5C8By+e0UaSzulnFHaWwzQ/Kdu5B7BRlgezzOe17Hbb5Ql7+qZIfz1wBrrC8dcDeupD2odZOR9sVSYd8J+T1f9aWvgwpkD9NIVAO8FqtnXfbkmW75WWT29KHHMiAVfP3+E8KJx+F5a/Oy28cwmteR/ohL70An2Vrv7imZNli+Xt8npJqzwFe778KaeMK+0RZNcyP8vJfDuG9Pwo81pbW+r3NAl5Xsk2rWvrDg8zj3rz+0oNYd8BANh/vZzgCWavG4nfzU8753c8GeK2D8msdNNC+1Lb8grx85w7L/5iXb5ifi3TlONfxp7D+ga39py39tJz+jZJtViUdj18G1igp+839vO8r8jpvaktvVSsP6vcwXM3vy9IejIh5+pdJejWp9ds9EXFn+/KIeFnSX0hnf5uS6pPfRDoT+GtE/KMkr9OBQwf9Lvq3ff7/+w7Lr87/Ny9Zdn1EPFmSfi+wA+nA3dJqrnxq5G9yAGeSDn4flvSFiHgup3+YdDbz80JaR5LWJl15PRoRl5escj7p4LuupFUj4tFBlK2TbUkHngsj4j/tCyPiYUn3ARtJWiwiXiyUc0VgV9JZ7nL0tbgdTTrZWZt0RQ9D/yxbLiop04uSppLuna1Aukc3P96a/18YEU+XLD8V+GxhvTkkrU567+uRTlRG5kUjgNGSlomIZ9s2+0dE3FuSTyvt1SXLytwIvBY4VdKRwE1D/EznMZ/vZ2G6m3QFvJukzwGnz+d+PeT9LHdb2YZ0JbUasDgpuLS+j3GDzTx3TdiGdLy9tMNqV5PaHmxOuiBYmxR4HoqIv5Ssfybpnn671n55WvuCiHhU0qXAe0jv64y2Vf7Qz9s4jnTfdH/ghkL6/vn/8f1sO0eVze879S0bm/+vJ2mgnWGl/L/1pf+zw3qDLdNgjM3/r5XU33orlaQ92GHdmfn/4oW0NfL/vw+mUBHxvKRTSAe/PUj3EmCIOwB9n+XUDvlEPpBvRA54g3zdMmPz/wMlHTjAussDjwFI2ov0fpbuZ/1RhcdD+iwLhvJ9DVW/nzPp3hn0tQYFQNKhpIYEi/Xz2qNI1TBFC+u9fBF4PfDe/DdD0t9IVwKnRsS/B/k6wAK9n4UmIp6WtB9pnzoKOErSFNI9stM7nNCVGdJ+JmkN0onhxv2sNqqfZe1WBl6VH780yOPTavl/6fE4ImZImll43ZbV6LuPWaZ0/+0vr+wc0u98L0mHRMS/JL2RFHhviYgb+tl2jgUNZEPxfIf0VheAR+h8VtHS+kD6/cYWQFl3hFba70hncZ3MczVJutQeqqGc7R5HCmT7A6dIGg9sQroSvHUY8l2gM3H6Psub6bt66uRFAElrkW5uQ3qvFwLTWld0ks4iBfKyfWKo5Z2f72uoOpUp2pdL2ppUTf4M6X7HlcAjEfFCXn49qXai7L0vlPcSEQ/m/Wpb0pn924Gd8uMvS9o6IgY1AMICvp/5VdrFKCJOlzSRdBXxLtL72g/YT9KpETFhCHkMdj87iRTEfk9q3HYvMDMiZkvamVQNOJT33npvM0kBoT935f/DdexsKfssOh37iYiXJJ0EfAnYk9TS+4C8eLAn45UGsk6m5f+PRcRHB7nNw/n/azos75TeqqrqdGa/RknaNGAd4Mj5CA5D0TqDfi2pVd+AIuJeSVcA20han/nYAej7LNcqW6h0mtf6PB8ZwuuWaX3XV0XE5wa5za6ks/fvRsTRJcvLRnsY8mdZgX4/50L6w4W09+X/h0XEySXbrLMQyjWgiJhNamU3EebcDvgZqRXeEaT7tYOx0N9PRMyS9DJD+023tn2CFFxOApD0NtIJ696STo6IKwbIftD7maRlgO1I3+8HIqL9RGN+Ri15nHRMmzUfx841O5RzOdJV4ey2RY+QPsvX0Fc9XTS27fWH4njSlf/+kk4j3R75NyXVmJ3U3iE6V01OATaUNNgd+QZSM/bNJZUFrT07bNc6EL+ufYGkN1B+WTwx/3/vIMs2v/6U/+89xO2Oy/8/S3rfzzJvHXVHEXE/qfnwqpLKRujYlXRPakpELGggu5x0pfDuXL8/GMvn//NUleXvbMOSbeb3sxxOrXupu+SDRbuPtK0H/b/3HUj37CoXEQ+TAhike9ctrRPFTt/tkN9PRMwi7TP97S+PAitLWr5k2fYlaaUi4s+ke0Qw9/vqZCj72XKkq6GHS4IYwAc7bNfxM833kP8MLC/pHYMoA6SWmo8Cq0t6c8nyD3TYrrVffrh9gaSVSZ9zkLp8DEmOAZeQqhOPJH1WZw7lPmntgSw7gnTD9xxJG7UvlDRG0sGt5/kNnkb6cn8iaYnCupuTWgCVuTL/n5CrrFrbrErq61B22X0sqcPklyTtJ2muz0zS4pL2yAfVBXE2abzCt0j6vqRF2/LZsFjmgnNJdcz7k86kfjvU+xakDqoAP5I0upDnaqQqEICyq6EhyVVQp5DOvE/LP4C5SNpEUvHH1Dr7myBpqcJ6o0ln0mUHuPn9LIdNREwm/VhHAUcXyyTpLaR9djbpSqel9d73b1t/bVLn/GEn6dD8+2i3c/5fDEqPk97DurlRQ7v5fT+PAKtJ6nT/6ErSb/d/28q+D6nambb0zSS9V9JibelLk/quQed7jEVD2c8eIVUBbpSrWFvrSNJXSd1yyrSucOY5+c6OJAWQUyS9vX2hpJUkfVLS4pDueZO6wEC6N7hsYd2xpL5iZX6a8/lMrmpubbM4aZ9dEjgnIgbzuZVpnZC3amqGUqu0wM3vxw5i3UE1ySX1Dg/SD+FG0iX+haSm+bOBJ9rWX4m+DtPTSFchl5Kab7c+9Hma5JJah7WaQf8hb/MM6cdwHW3N7/M2W9PXI/2BXK7f5fWfyenFjo/9Nk2ncz+jN5LOloK0A59Nqvu+oz2Ptu1aO3MAm8zH91nsEP00fZ06n81p55I7RA/2PfaT11KklqdBam11DX0dg6fS1h+F1Cih1bn0UdL9hfNz2e7Kj4N5RzoY9GfZ6fsoLO844ssQv981Cu9xKql17Z/o6xB7SNv6K9HXVHoqcFb+np7P++u17eVigN8bfc2a5+mQ32H9f5F+fzfn/M8sfIb/Asa3rX9hXnY76aTlBGDC/L6fvN3Pc/p9wG/yax5SWP4G0v3rIPWF/F0u40ukkYHam9+/n75jwGWkk+LWaC5BuvpYZJCfz1D2s6/Q1zXiT/n7n5zL+YP2chb2mefzNheSTrhPYO7+tgcX9qHb6fuN3EK6ogvm7p5S7BD9RP68/kCqzjuHVEPzXMl7LXaIvpT0u30wp/2dzh2iS39XbeuOpK9j/K1DPoYNdYOc6UIPZHndd+QP9aH8BUzPX8YxlHRSJDW9Po7043iedGD7LB2GqMrbLEY68E/NeUwFvk1qzt/fEFWrkYZ0uZO+IZwmkw7ye7ftKPMVyPKyVfJOfW9+TzNIP85vt+8ohW22y69XOtLHIL/TRYHPkIYe+nf+uwH4BOXDRs1XICvstB8lBa8n8/fwEGn0l69SGLUgr7886eSkNTzYVNIV4nKkA9s8gWwon+VAP7j+9ov5+H5XIh1c7yNVj88gXal1GqJqdeDXpAPG86QDxjdIAb6s3+PCDmQTSAf6e0gH/n+Rmq//lJLhwUhNu39DOri3RgQ5YX7fT95mFOmsv9VpeJ73Rxqc4LJcvmfz47eU7aek3/L/kILJA7kcj5EC6ScoDGAwyM9o0L9ZUhXyjbmcT5KC01Zl5SxssxOpyq41MkvZidsmpBOH1jBiM0jB9IS8fftoOaNItS0P5PXvAw4nBbkXSd2lyt7rrvlzezpvNxn4LrmP72B/Bx1e+9d5/dKRPvr7U36BVxT12NQPkn5Bauixf0ScUHd5zKyZcjX31cAFEfHuCvN9FelkdjHg1RHxzFC275Z7ZDafcmOXj5CqRX5bc3HMrAHyvej2+/3r0tcZ+jcVF+lgUg3Lr4caxKA7mt/bfJD0RVLLqneRqgO+EoMYycPMjHR/bllJt5NOgtcAxpOuiM4l3b8cVrnB1rdJ1dE7kW5nfGt+XsuBrLneTapbfxj4Omm4KjOzwfgJqcn/RqR70P8hNeg5FfhFVHPPaVlgX9K9tptJI0UNqnN9u1fkPTIzM+sdvkdmZmaN9oqrWlxppZVi7NixdRfDzKxRbrzxxiciYvTAa3afV1wgGzt2LJMmTaq7GGZmjSKp08j2Xc9Vi2Zm1mgOZGZm1mgOZGZm1mgOZGZm1mgOZGZm1miDCmSSlpN0tqR7JN0t6c2SVpA0UdLk/H/5vK4kHSNpiqTbJG1aeJ0Jef3JkiYU0jeTdHve5pg8KzGd8jAzM2sZ7BXZ0cDFEbEeaUiTu4HDgMsiYhxpyoTD8ro7AePy3wHkQSglrUCaJmAL0kyghxcC07F53dZ2O+b0TnmYmZkBgwhkkpYhzZp6IqTptSPiaWA30vw35P+758e7AadGci2wXJ5peAdgYkQ8FREzgInAjnnZMhHxtzy+16ltr1WWh5mZGTC4DtFrkya4/JWkjUiTwn2GNGHcIwAR8Uhh2vrVmXua8Gk5rb/0aSXp9JPHfBt72B8X9CWY+p1dFvg1zMxs4RhM1eIiwKbAsRGxCWmo/f6q+FSSFvORPmiSDpA0SdKk6dOnD2VTMzNruMEEsmnAtIi4Lj8/mxTYHsvVguT/jxfWX6Ow/RjSVCP9pY8pSaefPOYSEcdHxPiIGD96dCOHCjMzs/k0YCCLiEeBByW9LidtB9wFnA+0Wh5OAM7Lj88H9s6tF7cEnsnVg5cA20taPjfy2B64JC+bKWnL3Fpx77bXKsvDzMwMGPygwZ8CTpO0GHA/sA8pCJ4laV/gAWCPvO6FwM7AFOC5vC4R8ZSkI4Ab8nrfiIin8uODgJNJMx1flP8AvtMhDzMzM2CQgSwibiFNg91uu5J1Azi4w+ucBJxUkj4J2KAk/cmyPMzMzFo8soeZmTWaA5mZmTWaA5mZmTWaA5mZmTWaA5mZmTWaA5mZmTWaA5mZmTWaA5mZmTWaA5mZmTWaA5mZmTWaA5mZmTWaA5mZmTWaA5mZmTWaA5mZmTWaA5mZmTWaA5mZmTWaA5mZmTWaA5mZmTWaA5mZmTWaA5mZmTWaA5mZmTWaA5mZmTWaA5mZmTWaA5mZmTWaA5mZmTWaA5mZmTXaoAKZpKmSbpd0i6RJOW0FSRMlTc7/l8/pknSMpCmSbpO0aeF1JuT1J0uaUEjfLL/+lLyt+svDzMysZShXZNtExMYRMT4/Pwy4LCLGAZfl5wA7AePy3wHAsZCCEnA4sAWwOXB4ITAdm9dtbbfjAHmYmZkBC1a1uBtwSn58CrB7If3USK4FlpO0GrADMDEinoqIGcBEYMe8bJmI+FtEBHBq22uV5WFmZgYMPpAFcKmkGyUdkNNWiYhHAPL/lXP66sCDhW2n5bT+0qeVpPeXh5mZGQCLDHK9rSPiYUkrAxMl3dPPuipJi/lIH7QcXA8AWHPNNYeyqZmZNdygrsgi4uH8/3HgXNI9rsdytSD5/+N59WnAGoXNxwAPD5A+piSdfvJoL9/xETE+IsaPHj16MG/JzMxeIQYMZJKWkjSq9RjYHrgDOB9otTycAJyXH58P7J1bL24JPJOrBS8Btpe0fG7ksT1wSV42U9KWubXi3m2vVZaHmZkZMLiqxVWAc3OL+EWA30bExZJuAM6StC/wALBHXv9CYGdgCvAcsA9ARDwl6QjghrzeNyLiqfz4IOBkYEngovwH8J0OeZiZmQGDCGQRcT+wUUn6k8B2JekBHNzhtU4CTipJnwRsMNg8zMzMWjyyh5mZNZoDmZmZNZoDmZmZNZoDmZmZNZoDmZmZNZoDmZmZNZoDmZmZNZoDmZmZNZoDmZmZNZoDmZmZNZoDmZmZNZoDmZmZNZoDmZmZNZoDmZmZNZoDmZmZNZoDmZmZNZoDmZmZNZoDmZmZNZoDmZmZNZoDmZmZNZoDmZmZNZoDmZmZNZoDmZmZNZoDmZmZNZoDmZmZNdqgA5mkkZJulnRBfr6WpOskTZZ0pqTFcvri+fmUvHxs4TW+lNPvlbRDIX3HnDZF0mGF9NI8zMzMWoZyRfYZ4O7C8+8CP4qIccAMYN+cvi8wIyLWBX6U10PS+sCewBuAHYGf5+A4EvgZsBOwPrBXXre/PMzMzIBBBjJJY4BdgBPycwHbAmfnVU4Bds+Pd8vPycu3y+vvBpwRES9ExD+AKcDm+W9KRNwfES8CZwC7DZCHmZkZMPgrsh8D/w28nJ+vCDwdEbPy82nA6vnx6sCDAHn5M3n9Oelt23RK7y8PMzMzYBCBTNKuwOMRcWMxuWTVGGDZwkovK+MBkiZJmjR9+vSyVczM7BVqMFdkWwPvkTSVVO23LekKbTlJi+R1xgAP58fTgDUA8vJlgaeK6W3bdEp/op885hIRx0fE+IgYP3r06EG8JTMze6UYMJBFxJciYkxEjCU11rg8Ij4MXAG8P682ATgvPz4/PycvvzwiIqfvmVs1rgWMA64HbgDG5RaKi+U8zs/bdMrDzMwMWLB+ZF8EDpE0hXQ/68ScfiKwYk4/BDgMICLuBM4C7gIuBg6OiNn5HtgngUtIrSLPyuv2l4eZmRkAiwy8Sp+IuBK4Mj++n9TisH2d54E9Omx/JHBkSfqFwIUl6aV5mJmZtXhkDzMzazQHMjMzazQHMjMzazQHMjMzazQHMjMzazQHMjMzazQHMjMzazQHMjMzazQHMjMzazQHMjMzazQHMjMzazQHMjMzazQHMjMzazQHMjMzazQHMjMzazQHMjMzazQHMjMzazQHMjMzazQHMjMzazQHMjMzazQHMjMzazQHMjMzazQHMjMzazQHMjMzazQHMjMza7QBA5mkJSRdL+lWSXdK+npOX0vSdZImSzpT0mI5ffH8fEpePrbwWl/K6fdK2qGQvmNOmyLpsEJ6aR5mZmYtg7kiewHYNiI2AjYGdpS0JfBd4EcRMQ6YAeyb198XmBER6wI/yushaX1gT+ANwI7AzyWNlDQS+BmwE7A+sFdel37yMDMzAwYRyCL5V366aP4LYFvg7Jx+CrB7frxbfk5evp0k5fQzIuKFiPgHMAXYPP9NiYj7I+JF4Axgt7xNpzzMzMyAQd4jy1dOtwCPAxOB+4CnI2JWXmUasHp+vDrwIEBe/gywYjG9bZtO6Sv2k4eZmRkwyEAWEbMjYmNgDOkK6vVlq+X/6rBsYaXPQ9IBkiZJmjR9+vSyVczM7BVqSK0WI+Jp4EpgS2A5SYvkRWOAh/PjacAaAHn5ssBTxfS2bTqlP9FPHu3lOj4ixkfE+NGjRw/lLZmZWcMNptXiaEnL5cdLAu8E7gauAN6fV5sAnJcfn5+fk5dfHhGR0/fMrRrXAsYB1wM3AONyC8XFSA1Czs/bdMrDzMwMgEUGXoXVgFNy68IRwFkRcYGku4AzJH0TuBk4Ma9/IvBrSVNIV2J7AkTEnZLOAu4CZgEHR8RsAEmfBC4BRgInRcSd+bW+2CEPMzMzYBCBLCJuAzYpSb+fdL+sPf15YI8Or3UkcGRJ+oXAhYPNw8zMrMUje5iZWaM5kJmZWaM5kJmZWaM5kJmZWaM5kJmZWaM5kJmZWaM5kJmZWaM5kJmZWaM5kJmZWaM5kJmZWaM5kJmZWaM5kJmZWaM5kJmZWaM5kJmZWaM5kJmZWaM5kJmZWaM5kJmZWaM5kJmZWaM5kJmZWaM5kJmZWaM5kJmZWaM5kJmZWaM5kJmZWaM5kJmZWaM5kJmZWaM5kJmZWaMNGMgkrSHpCkl3S7pT0mdy+gqSJkqanP8vn9Ml6RhJUyTdJmnTwmtNyOtPljShkL6ZpNvzNsdIUn95mJmZtSwyiHVmAYdGxE2SRgE3SpoIfBS4LCK+I+kw4DDgi8BOwLj8twVwLLCFpBWAw4HxQOTXOT8iZuR1DgCuBS4EdgQuyq9ZlkfzfW3ZBdz+mYVTDjOzhhvwiiwiHomIm/LjmcDdwOrAbsApebVTgN3z492AUyO5FlhO0mrADsDEiHgqB6+JwI552TIR8beICODUttcqy8PMzAwY4j0ySWOBTYDrgFUi4hFIwQ5YOa+2OvBgYbNpOa2/9Gkl6fSTh5mZGTCEQCZpaeD3wGcj4tn+Vi1Ji/lIHzRJB0iaJGnS9OnTh7KpmZk13KACmaRFSUHstIg4Jyc/lqsFyf8fz+nTgDUKm48BHh4gfUxJen95zCUijo+I8RExfvTo0YN5S2Zm9goxmFaLAk4E7o6IowqLzgdaLQ8nAOcV0vfOrRe3BJ7J1YKXANtLWj63PtweuCQvmylpy5zX3m2vVZaHmZkZMLhWi1sDHwFul3RLTvsy8B3gLEn7Ag8Ae+RlFwI7A1OA54B9ACLiKUlHADfk9b4REU/lxwcBJwNLklorXpTTO+VhZmYGDCKQRcQ1lN/HAtiuZP0ADu7wWicBJ5WkTwI2KEl/siwPMzOzFo/sYWZmjeZAZmZmjeZAZmZmjeZAZmZmjeZAZmZmjeZAZmZmjeZAZmZmjeZAZmZmjeZAZmZmjeZAZmZmjeZAZmZmjeZAZmZmjeZAZmZmjeZAZmZmjeZAZmZmjeZAZmZmjeZAZmZmjeZAZmZmjeZAZmZmjeZAZmZmjeZAZmZmjeZAZmZmjeZAZmZmjeZAZmZmjeZAZmZmjTZgIJN0kqTHJd1RSFtB0kRJk/P/5XO6JB0jaYqk2yRtWthmQl5/sqQJhfTNJN2etzlGkvrLw8zMrGgwV2QnAzu2pR0GXBYR44DL8nOAnYBx+e8A4FhIQQk4HNgC2Bw4vBCYjs3rtrbbcYA8zMzM5hgwkEXEn4Gn2pJ3A07Jj08Bdi+knxrJtcByklYDdgAmRsRTETEDmAjsmJctExF/i4gATm17rbI8zMzM5pjfe2SrRMQjAPn/yjl9deDBwnrTclrqWpOsAAAgAElEQVR/6dNK0vvLw8zMbI6F3dhDJWkxH+lDy1Q6QNIkSZOmT58+1M3NzKzB5jeQPZarBcn/H8/p04A1CuuNAR4eIH1MSXp/ecwjIo6PiPERMX706NHz+ZbMzKyJ5jeQnQ+0Wh5OAM4rpO+dWy9uCTyTqwUvAbaXtHxu5LE9cEleNlPSlrm14t5tr1WWh5mZ2RyLDLSCpNOBdwArSZpGan34HeAsSfsCDwB75NUvBHYGpgDPAfsARMRTko4AbsjrfSMiWg1IDiK1jFwSuCj/0U8eZmZmcwwYyCJirw6LtitZN4CDO7zOScBJJemTgA1K0p8sy8PMzKzII3uYmVmjOZCZmVmjOZCZmVmjOZCZmVmjOZCZmVmjOZCZmVmjOZCZmVmjOZCZmVmjOZCZmVmjOZCZmVmjOZCZmVmjOZCZmVmjOZCZmVmjOZCZmVmjDTiNi71ybXjKhgv8GrdPuH0hlMTMbP75iszMzBrNgczMzBrNgczMzBrNgczMzBrNgczMzBrNgczMzBrNgczMzBrNgczMzBrNgczMzBrNgczMzBrNgczMzBqt68dalLQjcDQwEjghIr5Tc5FsIbt7vdcv0Pavv+fuhVQSM2uirg5kkkYCPwPeBUwDbpB0fkTcVW/J7JXmZwdevsCvcfBx2y7wa/zwg7su0PaHnnnBApfBrGm6vWpxc2BKRNwfES8CZwC71VwmMzPrIl19RQasDjxYeD4N2KKmspj1hGmHXb3ArzHmO29d4Nf42te+Vuv2AJddvs4Cv8Z22963wK+x6hW3LND2j26z8QKXoZspIuouQ0eS9gB2iIj98vOPAJtHxKfa1jsAOCA/fR1w7wJmvRLwxAK+xoLqhjJAd5TDZejTDeXohjJAd5SjG8oAC6ccr4mI0QujMFXr9iuyacAahedjgIfbV4qI44HjF1amkiZFxPiF9XpNLUO3lMNl6K5ydEMZuqUc3VCGbipHXbr9HtkNwDhJa0laDNgTOL/mMpmZWRfp6iuyiJgl6ZPAJaTm9ydFxJ01F8vMzLpIVwcygIi4ELiw4mwXWjXlAuiGMkB3lMNl6NMN5eiGMkB3lKMbygDdU45adHVjDzMzs4F0+z0yMzOzfjmQGQCSvpv/71F3WcysnKT35f9r1l2WbuKqxZq1dsxOIuKcispxO7ApcF1EbFpFnh3KsQSwK/BW4NXAf4A7gD/2UkMfSX8AOv44I+I9FZZlBLARfd/HnRHxWIX5L9Pf8oh4tqqyAEj6TEQcPVDaMOV9U0Rs2vo/3Pk1hQMZ6WokIr44UNow5f2r/HBlYCugNejfNsCVEdFvoFuI5fg+qVP5UsBzxUVARES/B5OFVIavAe8GrgRuBB4HlgBeS/o8lgAOjYjbhrkctZ9cSHp7fvg+YFXgN/n5XsDUiPhyBWVYB/gi8E5gMjCdvu/jOeAXwCkR8fIwl+NBUlAXKZjOzI+XBh6KiEqvTsqCiKSbI2KTCvK+HJgNjAeuaF9e1fGi2ziQ0XHHvC0i3lhhGS4A9o+IR/Lz1YCfVRjIFo+IFySdFxG1jGcpaZeI+GM/y1cG1oyIScNcjq44uchl+XNEvG2gtGHK+3TgWODqaDtQ5O/iQ8CMiDhluMuS8/w5cHFEnJ+fvxt4W0R8oaL89yK957cAxXG8RgGzI+KdFZRhCVIQ+xVwYPvyiLhsuMvQjbq++f1wknQQ8AlgbUnFs/xRwF8qLs7YVhDLHiOd+Vblb6SqxUqraYrKgliu1lo6Ip6NiMdJV2nDXY59ct4XAOu3n1wMd/5tRktaOyLuz2VYC6hkGKGI2KufZY8DP66iHAWbR8QnCmX4g6TDK8z/r8AjpOGgflhInwkMay1BwXER8VFJp/Zq0CrT04EM+C1wEfBt4LBC+syIeKrislwp6RLgdFI1yp6UVB0Mo8UkTQC2Kqtaq+peHYCk35LONmeTqhiXlXRURHy/qjJkdZ9cAHyOtG/c3yoTfeOKViI3ALo4ImZK+grphOebEXFTleUAnpJ0GKmaNYD/AmZUlXlE/BP4J/DmqvIssbmk1YH3S/oxqYp1jqrvF3YLVy1mee6zVSgE94h4oOIyvI/UyAHgzxFxboV5vwX4MPAB5h0GLCLiYxWW5ZaI2FjSh4HNSPdpbqyyqjeX46fAOOY+uZjSPmh1BeVYHFgvP70nIl6oOP/bIuKNeR/5NvAD4MsRUelMFJJWAr4OtKpV/wwcHhGVDNoraSblDXCqvI98CHAQsCbz1k5E1fcLu4UDGZCHwfoa6Yy7deM6qj5wdgNJ+0bEiTWX4U5gY9IV808j4ipJt0bERjWU5b0UDpxVnlzk/BclHbhaZbgS+EVEvFRhGW6OiE0kfRu4PSJ+W1XjBisn6ZcRsX/d5egWvV612PJZ4HUR8WTVGUu6JiLeUnK2V9lZXqEsKwOvkXR2LstdpAYnw35fqs0vgKnArcCfJb2G+u7d3USqav6TpFdJGhURMyvM/1hgUeDn+flHctp+FZbhIUm/ILVe/G6+QqysD6qkH0bEoZLOpeSKqOqWep36cFVcg3OqpANJn8edEXFNhXl3HV+RAZKuAN4VEbPqLktdJG1NugI6mXRfSqR7IROAD0dEZY1fJI2MiNmF5wJGVv39SNqfdD9qhYhYR9I40s327SoswzxXolVfnUp6FbAj6Wpscm70smFEXFpR/ptHxPWSSj/3qhs95D6XLUsAawH3RsQbKsh7NeD3pABW/J2OAN7Xdk+3ZziQAZJOJE3I+Udgzv2HiDiqhrKsTPpxtMpQyVmepGuBgyLi5rb0jUlVWZXdD5H0D+B3wK8i4u6q8i0pxy3A5qRO4pvktNsjYsMKy3ATsEdE3Jefrw2cXWVnWEk/IH0XPdMhfSgkbQp8PCI+XkFe5wAXRsQJbekfA94TEbsPdxm6kasWkwfy32L5r3KS3kNq0vtq0k3c1wB3A8N+lpct0x7EACLiFkmjKipDyxtJDStOzM3vTwLOqKFF1gsR8WK6IARJi9DPaBvD5AvAFbnVokj7xT4Vl+Ee4Pj8/n8FnB4Rz1RchlYH7SOB9Zn7ZK/qlqRziYibJL2pouzeUFaVGhEn5RadPclXZAWSloqIf9eU963AtsCf8o31bYC9IqKSptaS7ga2iogZbekrAH+NiPXKtxz2cr2N1GpwOeBs4IiImFJR3t8Dngb2Bj5F6nN4V0T8TxX5F8qxOKnGQNTQarFQjteRguhepH6Wv4yIyrqISLoa+Cap1eTuuSwvR8T/VlWGXI5DCk9HkKr2VoyIHSrIe0pErFuSLmBy2bJe4EGDAUlvlnQX6QoISRvlUQSq9FJubDJC0oh8gNi4wvx/BFwq6e2SRuW/d5D62f2ownIgaaSk9+Sb+0eTrlTXBv5AtXPTHUYalul24OM5769UkbGkbfP/9wG7AOsC6wC7lPXzq6A8I0ldANYDniA1xDlE0hkVFuNVEXEJQETcFxFfIY22UrVRhb/FSbckqhoN50JJx0laspWQ72H+DLi4ojJ0HVctJj8GdiD3n4qIW/OVQJWelrQ0qW/MaZIeBypr3BARx0t6GDiCVJ3ZarX4zYj4Q1XlyCaTOoN/PyL+Wkg/u8rvJdIYgr/Mf1V7O2lorHeXLAugyg7qRwHvAS4DvhUR1+dF35V0b1XlAF7IVx735RZ7D5GGEatURHy96jwLPg98D3ggVzcH6STvt6T+lj3JVYuApOsiYoti35gaWoYtRRpZfASpY/KywGl1dAmom6SlI+JfXVCOf1De3HvtivIfAbw/Is6qIr9+yvEx0j3K50qWLVvV/TJJW5BOrpYn3StbBvhelS1qczlGA/9NOuEr3qvbtsIyLE3qrC/g793we6mTr8iSByVtBYSkxYBPk6sZqyBpd1LV0e256qSSQVi72CxJBzPvgaKy0UWy8YXHSwB7ACtUlXlEvJw769cayHJDguUlbcDc38efKwxiK5BaFCu35P1IFfl2cBpwJmm6oQNJXVSmV1mAHLjmaZzVq3yPLDkQOBhYHZhGujd1cBUZ53txnwNWBI6Q9NUq8u1yvyZNXbIDcBUwhjQwa6Ui4snC30MR8WNSg5wqTZT0eUlrSFqh9VdlASTtR6ryvoQ0RNQlpJFwqsp/H+BeUhXvZEm7VpV3Byvm0W9eioir8gnWljWXqaf1/BVZvon9kYj4cE1FeBuwUUTMzjdtrybdp+pl60bEHpJ2i4hTlAYRvqTqQuT+QS0jSFdoVXdFaF2FFk+sWvdFqvIZ4E3AtRGxjaT1SAGtKp8HNoiIxyStSzrRuaDC/Nu1hgd7RNIuwMOkky2rSc8HshxAdqPilnkFL7ZGsYiI59TqtFSxtibF86i4c3jrQPF0rs56lDTqe9WKU3XMIg2b9YEqCxARa1WZXwfPR8Tzklrz1t2Tm+JX5YXIM1JHxJRc/V+nb0paFjgU+AnpXt3nqshYUr/jv8YwTzrbrXo+kGV/URrp/ExgTj+yqGaaivXUNxeagHXy89ZYi1UNXNy60ngd6ey7NQL+u0nVSlU6XtLywFdzOZYGKu0rBBARdTTtnku+Sj+ENKHoAUrDZL0uIqq8IpkmaTng/0hVnTNIVyFVGZNbTrasUXweEf2ehC0s6ps1fsl8b/AZqm/+35oPb3FgE+BO0rHiDcAN1DvFTG3capE5Yy22iypaISkNiNtRpDmQKiPpUuD/RR4YN4/q8buI2LHKcnQDSZ8hjWQxk3R/ZlPgsKrGGMxlOJM0pt7eEbFB7j/0t4ioso9hsTxvJ7WovTgiXqwoz337Wx4VzdagNMbipqQhyyobIqxDWU4HvhsRt+TnGwGfqaFBVFfo+Suy3MT52LqaOFcdqAZhTaB4gHqRiqr1uqx6E+BjEXG0pB1I/ZX2IQW2ygIZsE5EfFDSXgAR8Z+qqp87NCppDZi7NFDJ5LNVBapBuJjUGXwpSc+Sa02g+pkqgNe3ghjM6ftaa3CtU88Hsm5p4txFfg1cr74pM94LnFpR3t1UvQl9s+/uTBo099Ya7mG+mK/CAuaMN1jVEFU30negXpM0G7NIw4U9QBr1vWdExBeAL0g6LyKqGsmjk79LOo65Z8v+e71Fqo+rFoHc5P0/zHuPrJIzzm6Tz+yKM1VX2l+lW6o3Jf2K1CVjLWAjYCRwZURsVmEZtgf+hzRQ7qXA1sBHI+LKCstwHHB+RFyYn+8EvDMiDq2qDN0m3xIYF2meuiWBRaLCeepynp9k7tmyfxoR/6mqDN3EgYw5Izi0i6pGcMhl2JU0PcPLA648/GV5C+lH+qs8isHSEVH2GQ1X/veQuiS8kJ8vDtxa9cDFudp5Y+D+iHg6V7WNqbplmKQVSf2URGoC/0TF+d/YHrwlTYqI8Z22GaZyLBcRT1eZZ4dy1D5PXS7HYqRGQJUMot3Ner5qEbqmifOewNGSfk+N83BJOpzUX+p1pPtBi5KqL7ausBhl1Zt1jHbyZuCWiPi3pP8i3eg/uoqMleal+zJ5xBfg21H9NDYtT0j6CnNXY9UxdNqNkq4n/T6qvE/Z7mDyPHUAkSYbrXTMx3zi+0PStFNrKc0beHhEvLfKcnQLX5EBkvYuS4+Iqu4NtcqxDGmKjH1IB4zW3E9VVlncQmrWe1Nh3MnbKuwG0CpHrdWbuQy3kaoU30gKrieSZuF9ewV5X0y6R/Vn0lBIoyLio8Odb4eyrAAcTqrGilymb1Rd9Z6vkHcgdRLfmDS9zymRJx2tsBxzjc2qNE/bTVX+RiTdCGwHXBE1TfraTXxFlhQnxVuCtIPcRHWNHACIiGfzFdmSwGdJVyJfkHRMRPykomK8GBEhqdW4YKmK8p1L7sNXRT++/szKn8VuwNERcaKkCRXlvWr0zXt2idJM0bXIAeszdeVfKMfLpGmFLlKaYug04HP5Ku1L0Tcq/3C7StKXgSUlvYs0T13VM0S8lKu7i2k9e1XiQAZExKeKz3Ov/V9XWQZJ7yadaa6T8948Ih7PHWLvJo0gUIWzJP0CWC7fC/gY9Uxj0g1mSvoSqSrtbUrDmS1aUd7KncJbR6qRxee92BApd8r+MGmi0xmk0TTOBTYjNdSq6hbBYcC+zD1P3QkV5d1yt6QPkOYvXIt0onFtxWXoGq5aLCFpUeC2iHh9hXmeCpwQEfM0M5e0XURcVmFZ3gVsTzpoXhIRE6vKu5tIWhX4EHBDRFwtaU3gHVVUOUuaCrxMXyArqrQhUreQNJk079ZJ7f0vJX05Ir5VYVlGA0REpaPeF/JfijTazZzfKfD1KJlqpxc4kAGS/kDfZfkIUlPnsyLisPpK1bskrUJq9h7Aw61x9qy3Kc2cXlur3tyH8HBSs3flv9nATyLiG3WVy3o8kCmNpL0Kc1exziL1F3qoipvIkmYyd912naMFlJUH0phyk4BDI+L+Ycx7Y+A40hBID+XkMcDTwCeimrEvO30GUNN3UpfciGFf0r3aV5NPLIDzgBMj4qV+Nl+Y5Wi1Xi0VEe+rqByfI3WOP6DVHUXS2sCxpCG7Kht4vMNn0vqd/rKq4cO6Ra8HsguAL7f3C5I0ntSUtWya+Vc0SV8nHax+Szpw70maG+xe4KCIeMcw5n0L8PGIuK4tfUvgF1HhjN02Zzy/p0ldH6bl5DGkiSRXiIgPVlSOfvtnVVXtLulm4F3t/fhyNeOlrdaDFZXlGNLv8vSc9EHSyd/SwBIRUVWjpK7Q64HsjojYoMOySpqydhjPbo4amjhfFxFbtKVdGxFbSrp1OIOJpMkRMa7DsikRse5w5W3zknRvRJRO1yLp7xHx2qrLVKcBjhcdlw1TWa4qdgPJ1Z5XRcTbJN0VEetXVZZu0OutFpfoZ9mSFZWhOJ5du6onUAR4ObeGOjs/f39beYbTRZL+SOr28GBOW4PUSu3iYc67a9U40soMSXsAv2/dm8p9ufYgtRqsRL4S6q9qsarBcvurrqu6Km8VSWMionWl/GpgdH5c1VicXaPXr8hOBy6PiF+2pe8LbF9V1Uk3yXX+R5NGtQhSk97PkaotNouIa4Y5/52A3UiNPUSq0pozzl+vKY60EhGvlfRq0riTwz7SiqSxwHeBbZl7wODLSdPZVDJsmdJAyR1V1SFa0mwKY7EWF5Gq86rqmoGk95DmJrsn5/9aUiOUy0i3AH5QVVm6Qa8HslVI/VBeJF0ZQTpoLAa8NyIerbAsbytLL2uOP4xlGAl8usqb1ta/LhppZUXS8aLScR5tXvmq+E3AbaQW1gLujB4dMBh6PJC1SNoGaNVv3xkRl9dQhuLIAEuQxnK7MSqY3LOtHFcOZ4OOAfIeCexHalBwUUT8tbDsKxHxzTrKVSdJ10fE5pJuiohNc/+hv1UVyCRtTmqpeYOk9YEdgbsj4qIq8m8rS7E16SKk1sUv9Eor0qLWfeu6y9EtHMi6lKQ1gO9FxF4V53skqfl7+5Q2w970XdIJwKuA64GPkG5eH5KX3VThvZCuIenzwDjgXcC3SSOt/LaKIctyteZOpKAxEdgCuBJ4J6mj/JHDXYZ+yjYCeB9ploSv1lWOukg6ApgUEefVXZZu4EDWpXIrpNuqHgRU0hUlyVHFlWGxyiz3Yfo5sBJpIOVrq2ze3E3qGmlF0u2kwXkXBx4lTWHzrNJcWNdVXb1ZplevTCTNIJ1wvkCaS7HVx7HfVtCvVL3earFrSPoJc48usjFwa9XliIhtqs6zYLFCOWYBB0j6X1LjgqVrK1WN8jh6V7eCl6QlJY2NiKkVZD8rImYDz0m6L/I0MhHxH0mVj7CRGzi0jCDdz656xu5usVLdBegmDmTdY1Lh8SzS9C1/qaMgknYB3kChe0JFQ/BMkrRjRMxpah8R35D0MGn0hF70O2CrwvPZOe1N5asvVC9KelUev2/OxJpKg2rXMVTUHoXHs4CppBauPSciZufvYR3m7kb01w6bvKK5arFmktaMiAfqLkeL0rT2rwK2IY3o/X7g+ojYt9aC9ShJt0TExm1pw9oxvZDP4pFn6W5LXwlYLSJuH+4yWLncRegQUjeV20knNtfW1VCrbiPqLoDxf60HSnOR1W2riNgbmBERXyf1J1uj5jK17hP1ounFKjWludEqaQLfIYgdEBFPVBnEJF1UePzfVeXb5T5LqlqdGhFvJV0xP1JvkerjQFa/Yh1/N0zN0eqL8lzufPsS1c3z1J8T6y5ATQ4EvizpAUkPAl8kzYFVZ3mqtmrh8Z415N+Nnm/1G5O0WETcCaxXc5lq43tk9YsOj+tygdIEht8nzdAcVDRpoKTzOy0CVqyiDN0mj1qxpaSlSbcCZtZcpDoaV3TD76LbPJJ/p38gzSD+FNCz0x35HlnNCsPeiDS+Y2tivNqnDJG0OGnonWcqym8GaTbmf7UvAs6MiFWqKEe3qbHxTVlZiuP7VZXn06SWqyLdu51rwIKoaBqXbpVnB1gW+GNZdXAv8BVZzSJiZN1laCdpK2Asef+QRFQwKzJpXMfnIuKqkjLdW0H+XadT45uK8t6CNIpHq+/YYcCmku4CvlXVCQ7w/wqPf1pRnl0v9zUdDdydk1YkTcHUc3xFZnOR9GtSk95bSE29IV0Zfrq+UvWuVifxwv+lgXMiYvsK8r6TNHLGLEnHk2oLzga2y+k9fSVUJ0mfAL4BPElfV4jotelbWnxFZu3GA+tHl5zhSNo1Ii6ouxw1ej7/bzW+eZLqGt+MyB3TAcYXhgi7Jg9mXLn2MTd7dQxOUtP710fE9LoL0g3catHa3cHcrcTqVsu9oC7yh7bGN1PpmxV4uN0haZ/8+FalmdOR9FpSa9Y63DHA814xDah00t1u5qpFA+aMvh/AKNLwWNdTmKAvIt7TYdPhLtfNPTzG4ghgy9YsADU0vlmWNDfdW0l91zYlTXj6IGm6n8qHUOt1klpV/G8kDSZ9AXP/To+po1x1c9WitXTrRHx19pmqVUS8LOmHpE7prQ7KlbVKywHzo5JGkfo4LgJMi4hamnlL+jZpBoDngD+STrg+FxG/raM8NWnNAv1I/uu5KWzK+IrMAJC0LrBK+/iOecLPh6qahbcTSe+qatT3biLp66QJFM/plvuWAJKWjoj2bhLDnectEbGxpN1JLRk/B1xWxXBd3ULSEsDS7ROc5mHDZvZq83vfI7OWHwNlnW2fy8vq1qsjexxCGiT4BUnPSpop6dm6CwXcVUOerRqknUmDaj9B73WW/jGpK0a7nYGjKi5L13DVorWMjYjb2hMjYpKksVUUwCN7zCsiRtWVt6RDOi2inml1LpJ0B6lbyMH5KqTXrkDeFhFlw4T9mjR8WU9yILOWJfpZtmRFZXgrnUf22LyiMnQFSSOBJVvVd5K2pG++tpsrGqrqW6TWkrNKllVemxMRX5D0feCp3LftedIs0b2kdIiwiIjcQbonOZBZyw2S9o+IXxYT83QRN1ZUBo/s0ee7wOPA9/Lz00lNzZcgNcOv4uz7JuD/ImKe71/SfhXk357nhwqPi4t6qbHHE5I2a/9OJG1KDzfHd2MPA0DSKsC5wIv0Ba7xpKuA90bEo3WVrRdJuhl4U6tDcqsbQj7rvjoi3lJBGV4HPNnesCAvW6Xq1ouSipOrLgFsC9zYSyOM5CvzM0jDlRV/px8DPhQRf6urbHVyILO5SNoG2CA/vTMiLu9v/QrKs0JE9NyZZvvkmZK2j4hL8+N5JtvsRZKWB06OiJ6aJVrSqsCnKPxOgZ9ERM/OR+ZAZl1D0takM82XSWeY3ySN+7go8IFeOtuUdDewefu9sNxJ+bqIGPa5p/L4ij8pm0RT0lLAB4EXIuK04S5LGUmLALdHxOvryN+6h++RWTf5EfABUou4PwK7R8Q1uf7/J8DWdRauYr8EzpR0YEQ8ACDpNcCxeVkVfg58VdKGpPtz00lVeuNIHXFPAioLYpLOpa+5/QjS1DbnVZV/t/G4k30cyKybLNo6+5c0PSKuAYiIm/I0Ij0jIo6S9BxpgN6lSAfwfwPfiYhj+996oZXhFuADecT98cBqpBnE746IOhrfFKdwmQX8MyKm1lCObuFxJzNXLVrXKN4XkrR7RPxfYdkdEbFB561fubpoduhaSfpWRHx5oDTrPR7Zw7rJVyW9CqAtiK0DVDGxZ1eKiH/1ehDLdixJ26XyUnQBSd+WtIykRSRdIumxYveEXuMrMjPrapI+DhwIvBYoVmmOIjW/37OWgtXI407OzffIrGt0eyu5XidpqYj4dw1ZnwVcRhr5/rBC+syIeLyG8nSDecadlNSzVyW+IrOuIWlj4MtAf63kjuu1Eb4lbQWMpXDiGRGVVbXm/E8gjbq+pqSNgI9HxCeqKkNbeVagMKRaRDxcRznqlIfq2ok07uR4YFngjxGxRa0Fq4kDmXWdLmolVztJvyb1pbuFdNCCNLTepztvtdDLcB3wfuD81iSndTS+kbQzafT3McCTwKuByVX0qetGklamb9zJpYFlI+KhustVB1ctWtfJA+VeWXc5usR4YP265yKLiAfbxjec3WndYfQtUl/CS/NwXe8i3R/qOR53cm4OZGbd7Q5gVdJswHV5MFcvhqTFgE8Dd9dQjlkRMV3SCEmKiImSjqyhHN3grYXHc8adxIHMzLrQSsBdkq6nMPdWRLynwjIcCBwNrA5MAy4F6rg/9kxu9HMNcKqkx0nDmfWciDio+Lw17mQ9pamf75FZ16qxlVzXkPT2svSyqW6GsQxbR8RfBkqroByjSDOWjwD2JjVwOLVsdP5e0+vjTjqQWdfptlZyvU7STRGx6UBpFZTDI3tkncadjIjP11eq+jiQWdfpllZydZI0k74D1VyLSK0Wl6mgDG8GtgI+SxrQuWUZ0hx1lXa+7RBQb626HN1A0naFpz0/7qTvkVlX6pJWcrWJiFF1l4E0qerSpONEsTzPkk40KlEc2UPSTYVFo4BJVZWjy2znq9M+viKzriPpbOAo0mjnW5JayY3vxaGIuoGk10TEP2vMf3lgRTyyxxy+Op2bA5l1HUkrkVrJvXrJlDEAABGPSURBVJNUlXYp8OlenCm6G0gaDfw36T5McUSNbSvKfwngpYiYnZ+vSxrV4p8RcX4VZegWHneynAOZdZ1uaSVniaRLgTOBz5MOohOA6RHxxYryvwrYPyL+nmdCuCGX5/XAX3upOs1Xp+UcyKzrdEsrOUsk3RgRm0m6LSLemNOuiojSrgHDkP/tEbFhfvwNYKWI+ISkxYFJrWW9yONOJm7sYV2j0EputKRDCouWAUbWUyoDXsr/H5G0C/AwabzDqhTPtrcFfggQES9I6skO0Z3GnQR6ctxJBzLrJl3RSs7m8U1JywKHAj8hnVh8tsL875T0HeAh0r2hSwFymdTfhq9gHneywFWL1nXqbiVnA5P02Yj4cUV5LUWaOHI14MSIuCmnbw2Mi4iTqyhHN5E0KSLGS7oV2DgiQtL1EbF53WWrgwOZdZ26W8nZwCQ9EBFr1l2OXiXpMuA9wPdIV8iPA1tHxJa1FqwmI+ougFmJ04B7gLWArwNTSS3VrHv0apVet9gdeJ5UxXslqdp11zoLVCcHMutGK0bEiaS+Q1dFxMdIHaOte7gqp15fiojZEfFSRJwYEUcBhwy41SuUA5l1o7layUnahGpbyRlpvEdJz5b8zSS1krP67FiStkvlpegSbrVo3ajuVnJG14z32C9JH4uIk+ouR1U87mQ5BzLrOhFxQX74DLANpFZy9ZXIutgSA6/yinIWcBke2WMubrVojeBWciZpZGu8xV7lcSfL+R6ZNYVbydkUSd+XtH7dBanRJcA6AHncyeuB9YFDJH2rzoLVyYHMmsJVB/ZG4O/ACZKulXSApGGfYLTLrBARf8+PJwBnRMRBwA7Au+srVr0cyKxruJWc9SciZkbELyNiK1KH+cNJLVtPyVVsvaB93MmJkMadBHpy3ElwYw/rIk1oJWf1kTSS1MR8H2AsafDg04C3AheSxmF8pfO4kyUcyMysKSYDVwDfj4i/FtLPlvS2mspUtf1I406uB+wYEf/O6RuQZlXvSW61aGaNIGnpiPhX3eWw7uN7ZGbWFD+TtFzriaTlJfVMZ2jrzIHMzJrijRHxdOtJRMwANqmxPNYlHMjMrClGSFq+9UTSCvg+v+GdwMya44fAXyWdnZ/vARxZY3m6Sq+NO1nkQGZmjRARp0qaROo/JeB9EXFXzcXqJr027uQcbrVoZl1N0jIR8WyuSpxHRDxVdZnq5nEn5+ZAZmZdTdIFEbGrpH8w98gWAiIi1q6paLXJn8XZwK98VepAZmbWOJJGAXuSRjkZAZxEGnfx2VoLVhMHMjPrapI27W95RNzU3/JXujyqyenAcqSrtCMiYkq9paqWA5mZdTVJV/SzOCJi28oK0yVKxp38NX3jTn4rInph3Mk5HMjMzBpG0v2kcSdPbBt3EknHRMSn6ylZPRzIzKwRJC0KHAS0Bgi+EvhFRLxUW6Fq4nEn5+aRPcysKY4FNgN+nv82y2m9yONOFrhDtJk1xZsiYqPC88sl3Vpbaeo1z7iTknp23ElfkZlZU8yWtE7riaS1gV7tFOxxJwt69o2bWeN8AbgiN3T4/+3da8xl5VnG8f/FAAXaoWWQ1gMyHMIhWKCAltJBpVT4IlYltRGcihWpKUSl2JoelSY1agxNmsaWVrClJdYU7IlEREs4NNSiHQYGLKc4gEnTD4CEjhiHQ28/7PV21p7ZBeKH99kP6/9Ldt53PWs+3JlM9j3Ps+597QDrmU3tTZG5kyMOe0jqRpKXAEcya2T3VtX2xiU1k+RoduRO3jDlhA8bmaQuJNkLuAA4hVlU1deBy6rqf5sWtorMnVzMRiapC0m+AGwDrhqWzgb2q6pfa1fV6jJ3cjEbmaQuJLlzp6nFhWuaHoc9JPVic5LXVdU3AZKcBNzauKZVZe7kYu7IJHUhyT3MBj3+c1g6CLgH+D6zY7VjW9W2WsydXMxGJqkLSdY/1/2qeni1atFysZFJUmfMnZxnI5OkziS5HNgDuHJYeivwbFX9Truq2rGRSVJnnOCcZ9aipC4k+YsXsjYR5k6OuCOT1IUkt1fVCTutbZnCtOLOkrwR+DQwlztZVc811fiiZSOTtNSSvINZNNWhwH+Mbq0Fbq2qjU0Ka8zcyR1sZJKWWpKXA/sBfwa8Z3Rr22SzBc2dnGMjk7TUDMrdlbmT82xkkpbagqDcjG5PMijXqcV5Zi1KWmpVdebw85DWtSyRyedOjrkjk7TUDMrdlbmT82xkkpbaKCh3L+CngTuZHS8eC9xWVae0qq0VcyfnebQoaalV1RsAkvwd8Paqumu4fjXwrpa1tTK1RvV8TPaQ1IujVpoYQFXdDbymYT1aEu7IJPXiniEs9ypm04sbmT0X0sS5I5PUi7cB/w78AXAR8O1hbXLMnZznsIekbiTZGzioqu5rXUtL5k7Oc0cmqQtJ3gTcAfzjcP2aJF9tW9XqSvKOJHcBRybZMno9CGxpXV8r7sgkdSHJJuA04KaqOn5Ym9QuxNzJxRz2kNSLZ6rqiSTP/ydfvKqqHkpy4c43kqybajOzkUnqxd1JzgHWJDkc+H3gG41rWm1/C5wJbGJB7iSzr7qZHI8WJXUhyT7A+4EzhqXrgQ9P9atLtIONTNLSS7IG+POqenfrWloyd3IxjxYlLb2qejbJia3rWAKXDj8X5k4y+6LNybGRSerF5mHc/mrgyZXFqvpiu5JWl7mTi9nIJPViHfAYsxH8FQVMppGN7JI7mWSyuZM+I5OkziT5PLNd6Th38mVVdXbTwhox2UNSF5JcmeQVo+v9kvxNy5oaMndyxB2ZpC4k2byS6PFca1Nh7uQO7sgk9WK3JPutXCRZx0Sf85s7OW+S/wgkdelS4BtJrmH2XOgtwJ+2LamZPwFeC9wEUFV3JDm4YT1N2cgkdaGqPpvkW8ymFgOcVVXfblxWK+ZOjtjIJHVjaFxTbV5j5k6O+IxMkvrze8BPAduZBQk/wWx6cZKcWpSkjpg7uSt3ZJK6kWR9kl8Yft87ydrWNa22qnoWMHdyxGdkkrqQ5Hzg7cyiqg4DDgQuA97Ysq5GJp87OWYjk9SLC5mNnN8GUFUPJHll25KaMXdyxEYmqRfbq+qplZHzJLsze/OenKqabBzVIj4jk9SLm5O8D9g7yenMjtWubVxTE+ZOznNqUVIXkuwGnAecwewD0dcDl9cE38TMnZxnI5OkziS5Ezi1qh4frtcBN1fVMW0ra8NnZJK6kGQDcAmwntl7V4CqqkNb1tWIuZMj7sgkdSHJvcA7gU3AsyvrVfVYs6IaSnI0O3Inb5hw7qSNTFIfktxWVSe1rkPLx0YmaaklOWH49S3AGmafldq+cr+qbm9Rl5aHjUzSUkty43Pcrqo67TnuawJsZJK6kOTQqtr6fGtTkWQ9cHhVfS3J3sDuVbWtdV0t+IFoSb24ZsHa1atexRIYcievAT45LB0IfLldRW05fi9pqSU5itl3b708yVmjW/sCe7WpqjlzJ0dsZJKW3ZHAmcArgF8arW8Dzm9SUXvmTo7YyCQttar6CvCVJCdX1b+0rmdJ7Jw7eQETzZ0Ehz0kqTvmTs6zkUmSuubUoqQuJDnkhaxNQZINSf45yf1JtiZ5MMkkP4YA7sgkdSLJ7VV1wk5rm6rqxFY1tWLu5DyHPSQtNcfvF3qiqq5rXcSysJFJWnaO3w9GuZM3JvlLzJ0EPFqU1AnH782d/GHckUnqxWNJbgBeVVWvTnIs8Kaq+nDrwlZLVb0BfnjuZJuq2nNqUVIv/hp4L/A0QFVtAX69aUXtmDs54o5MUi/2qap/XYllGjzTqpgWHHxZzEYmqRePJjmMIVMwyZuB77YtadU5+LKAwx6SujA8A/oU8HrgceBBYGNVPdSyrhYcfJlnI5PUlSQvBXab6pdIalcOe0jqQpJXJbkCuKaqtiU5Osl5retSezYySb34DLOU9x8fru8HLmpWTUPmTs6zkUnqxY9U1ReA7wNU1TOMcgYn5u8XrC0ayZ8EpxYl9eLJJPuzY2rxdcATbUtaXY7fL2Yjk9SLi4GvAocluRU4AHhz25JWneP3Czi1KKkbSXZn9mYe4L6qerpxSU04fj/PRiapC0nWAL8IHMzoNKmqPtKqplaSHAF8ggnnTo457CGpF9cCvwXsD6wdvabI3MkRn5FJ6sWBVXVs6yKWxORzJ8fckUnqxXVJzmhdxJIwd3LEHZmkXnwT+FKS3ZgdqYXZl0nu27asJi5kljt5VJLvMOROti2pHYc9JHUhyVbgV4C7yjcuwNzJFR4tSurFA8DdNjFzJ3fmjkxSF5J8BjgUuA7YvrI+0fH764BPA++vquOGz9dtrqpjGpfWhDsySb14ELgB2BPH782dHHHYQ1IXqupDrWtYIpPPnRyzkUlSf8ydHPEZmSR1yNzJHWxkkrqQZENV3fp8a1Ng7uQ8hz0k9eJjL3BtCsydHPEZmaSlluRk4PXAAUkuHt3aF1jTpqrmzJ0ccUcmadntCbyM2X+8x7uP7zHdAQdzJ0d8RiapC0nWV9XDSdYyy1j879Y1tZLkV4GrmG1Gpp476dGipG6sTbIZWAeQ5FHg3Kq6u21ZTVwKnIy5k4BHi5L68Sng4qpaX1XrgT8c1qbI3MkRd2SSevHSqrpx5aKqbhrS36fou8BNQ+bipHMnwUYmqR9bk3wQ+NxwvZFZ/uIUPTi89hxek+awh6QuJNkP+BBwCrPhhluAS6rq8aaFqTkbmSSpax4tSupCkiOAd7FrLNNprWrScnBHJqkLSe4ELgM2Mfrurara1KyoRsydnGcjk9SFJJuq6sTWdSyDJLdX1QnPtzYVHi1K6sW1SS4AvsT8yPl/tStpdZk7uZiNTFIvzh1+vnu0VsChDWppZefcyRVTzp30aFGSemPu5Dx3ZJLUH3MnR8xalKT+mDs5YiOTpP7skjsJTDV30kYmqQ9JNqyEBCfZmOQjSda3rquRrUk+mOTg4fUBpps7aSOT1I1PAP+T5Djgj4CHgc+2LamZ3wYOAL7I7OMIBwBva1pRQ04tSurCygd+k/wx8J2qumLKHwLWDk4tSurFtiTvBd4K/GySNcAejWtqwtzJee7IJHUhyY8C5wD/VlVfT3IQcGpVTe540dzJeTYySd0YhjsOr6qvJdkHWFNV21rXtdrMnZznsIekLiQ5H7gG+OSw9BPAl9tV1NS1SS5I8mNJ1q28WhfVijsySV1IcgfwWuC2qjp+WLurqo5pW9nqS7Jo1L6qakq5kz/gsIekXmyvqqeSAJBkd2ahwZNTVYe0rmGZeLQoqRc3J3kfsHeS04GrgWsb16Ql4NGipC4k2Q04DzgDCHA9cHn5JjZ5NjJJ3UiyJ3DEcHlfVT3dsh4tB48WJXUhyanAA8BfAR8H7k/yc02LasTcyXnuyCR1Ickm4Jyqum+4PgL4/BQ/T5VkC3AccCzwOeAK4Kyq+vmmhTXijkxSL/ZYaWIAVXU/E42oAp4Zng3+MvDRqvoosLZxTc04fi+pF99KcgWzHQjAbzCLaJoicydHPFqU1IUkLwEuBE5hNrV4C/DxqtretLAGzJ2cZyOT1I0kBwBU1SOta2nN3MkdfEYmaall5pIkjwL3AvcleWT4XrJJMndyno1M0rK7CNgA/ExV7V9V64CTgA1J3tm2tGYuZPZ38j2AqnoAeGXTihqykUladr8JnF1VPwjKraqtwMbh3hRtr6qnVi6mnDsJNjJJy2+Pqnp058XhOdlUJ/XMnRyxkUladk/9P++9mL0HeAS4C/hd4B+ADzStqCGnFiUttSTPAk8uugXsVVWT3JWZO7mDjUySOjPkTl4JPMSsof8kcG5V3dKwrGZsZJLUGXMn5/mMTJL6Y+7kiFmLktQfcydHPFqUpM6YOznPRiZJHTJ3cgefkUlSJ8ydXMxGJkn9MHdyAY8WJakTSTYDp+8c2TUcM/5TVR3fprK23JFJUj/MnVzARiZJ/TB3cgGPFiWpE+ZOLmYjkyR1zaNFSVLXbGSSpK7ZyCRJXbORSZK6ZiOTJHXNRiZJ6tr/AXlgQRnw4DsQAAAAAElFTkSuQmCC"/>
-          <p:cNvSpPr>
-            <a:spLocks noChangeAspect="1" noChangeArrowheads="1"/>
-          </p:cNvSpPr>
-          <p:nvPr/>
-        </p:nvSpPr>
-        <p:spPr bwMode="auto">
+          <p:cNvPr id="3" name="Text Placeholder 2"/>
+          <p:cNvSpPr>
+            <a:spLocks noGrp="1"/>
+          </p:cNvSpPr>
+          <p:nvPr>
+            <p:ph type="body" sz="quarter" idx="10"/>
+          </p:nvPr>
+        </p:nvSpPr>
+        <p:spPr>
           <a:xfrm>
-            <a:off x="155575" y="-6350"/>
-            <a:ext cx="304800" cy="304800"/>
+            <a:off x="333169" y="1252104"/>
+            <a:ext cx="8370412" cy="5225810"/>
           </a:xfrm>
-          <a:prstGeom prst="rect">
-            <a:avLst/>
-          </a:prstGeom>
-          <a:noFill/>
-          <a:extLst>
-            <a:ext uri="{909E8E84-426E-40DD-AFC4-6F175D3DCCD1}">
-              <a14:hiddenFill xmlns:a14="http://schemas.microsoft.com/office/drawing/2010/main">
-                <a:solidFill>
-                  <a:srgbClr val="FFFFFF"/>
-                </a:solidFill>
-              </a14:hiddenFill>
-            </a:ext>
-          </a:extLst>
         </p:spPr>
         <p:txBody>
-          <a:bodyPr vert="horz" wrap="square" lIns="91440" tIns="45720" rIns="91440" bIns="45720" numCol="1" anchor="t" anchorCtr="0" compatLnSpc="1">
-            <a:prstTxWarp prst="textNoShape">
-              <a:avLst/>
-            </a:prstTxWarp>
-          </a:bodyPr>
+          <a:bodyPr/>
           <a:lstStyle/>
           <a:p>
-            <a:endParaRPr lang="en-US" dirty="0"/>
-          </a:p>
-        </p:txBody>
-      </p:sp>
-      <p:sp>
-        <p:nvSpPr>
-          <p:cNvPr id="11" name="AutoShape 8" descr="data:image/png;base64,iVBORw0KGgoAAAANSUhEUgAAAbIAAAIICAYAAAALymuSAAAABHNCSVQICAgIfAhkiAAAAAlwSFlzAAALEgAACxIB0t1+/AAAADl0RVh0U29mdHdhcmUAbWF0cGxvdGxpYiB2ZXJzaW9uIDIuMi4yLCBodHRwOi8vbWF0cGxvdGxpYi5vcmcvhp/UCwAAIABJREFUeJzs3XfYHFXd//H3J6EKoYciAUOJIoK0CAg2QOkK+hMFfSQiRRAr6CP66IOK2EXBAiIgoEgR4QGRFmmCSgm9m4ARQg0QIIqUhO/vj3M292Qze5ck98wO+3ld133du2dm9pzdnZ3vzJlTFBGYmZk11Yi6C2BmZrYgHMjMzKzRHMjMzKzRHMjMzKzRHMjMzKzRHMjMzKzR5iuQSYoB/m5Z2AW17iPptZLOl/SkpJfzd79B3eUaKknfzGX/r258PTPr3yILuP3vgX+VpD+wgK9rXU7SSOAc4A3AX4H7gJeBGXWWy+ojaV1gMnBZRLxzIb3mIsBLwH0Rse7CeM0mkfRN4H+Aj0TEb+ouT7da0ED2+YiYujAKYo2zLimIXRER29ZdGDPrXb5HZvNr9fz//lpLYWYWEUP+AyL/jR3Euuvmdf8ELAv8CJhKqi74Qdu6OwMXAk8AL5AOkj8EVujw2isCPwceBv4D3Al8Clg05zmlbf1v5vT/6vB61+TlY0qWrZnzuh94HngS+AOwZcm678yvcwKwAnBsLuMLwD3AZ/v5vFYCvgXcAfwbeAa4DfgOsEpe57j8+gf08zq35XU2GOR3uijwaeDGnO+/gOuBg4CRJd9n2d8JQ8jrYOBa4FngOeDmnP/IkvU3Bb4HTAKm58/xn8CJwNoL8lm27xfAG4Hzgadyuf4G7DDE30fH/Szvsz8gVcE9n/O5GNi+w2u9A/hpLvdTeZvJwI+BlQf4vS2Z3+vU/Jn9AzgCWHSI7+fNwLn5M38BeBy4CTgKGN32nvvdL4byfoD9+nnNP+V1FqHkt172W2xLX4y0b19POt78J7+/S+jnd7WA+9kKpOPTxfk7aX3/lwHvLXndaf28/7eUfEdnA48CL+Ztj6fkWJbXX5r0m/pn4Tv4n/x5TgNmddhuF2Ai6RbC88C9+X0u19/vANgS+CPpuBnAhvT9xubZtvC7D2DSgN/BUL6wQgbzE8j+mr/cJ0n3Vs4BvlJY7/t5veeBq/OXMjmn/Z38g2k7INyTlz8MnJk/4JeAn5Tt3MxnIAO2Bp7Oy+7OZbs65/US8P4OP55zctkfAX6Xy/dCXvaVkvw3AB7Kyx/J259LCtAB7JrX2yg/v6GfA08Afxvk97kI6ccVpB/hucB5wMzC+xiR110ZOJn0g299Nyfnv30GkddSwFV52yfz65xPOji28lLbNv+XP+cb8+PW5xqkH9Tr5/ezbNsvjiH9sO4AziAd5AKYBbxjCL+P0v0MWIMUTIJ0ADkDuByYndM+V/Jat5AOsteT7kmfR7oH3XqN9oN/6/d2NfAX0sHiXNJBpPV9DuqEI7/eboXyXQecnl+r9dvbMq/3vly+1u/xZEr2i6G8H+BtwCl52bNtr/mFwr47P4GsVdaZpJPn04ErSfvkPUP4fIayn+2e06aSjgWnA3/O+1cAh7W99lHArXnZn9ve/7jCep8i3Z+eTTo5/B19J7KPAq9te90l6du3nyQdzy4g7ftn0yGQAV/N27xEOlE6g75gey+FoN32Ozgxb3M78Nv8XtYnnbwEcHCHz/YXefnHB/weBvuFtWUwP4Gs9eNatmSdvfLy24B1C+kjCh/Gb9q2+WVOvwBYspC+JelqYqEEMmC5vDPMAj7Utv4WpAD3DLBiyY8n8k61RGHZVnmHexZ4VSF9UfoOzj8CFmvLa0NgrcLza/O6G5e8j5PysgEDS17/i3n9W5n7QLJ6oUyfHMwBYhB5tXbOM4BlCunL0BdM9yvJq/1HIuDjef2L25YN9bMsXk0c2rbuYRSuAAb5HjsFsoty+qkUroqAt5MOIrPav0/SGfCybWmLFPI4brC/N2Bc3u9eBtYc5Htp/SbKrhg2aNtf5lwN9vN6Q30/AwWqIQeyQjnvp622J+87bx3kZzPU/WxdYIuS1xkHPEg62LefRA90zNqadDyZBmzatqz1+7imLf1r9J2YLFdIX5u+wDSrbZs35/3mWeBNhfQl6DspOLtD2QM4pKTs6+Vlt5QsWyrnNRMYNeB3MdgfZ1smMcDf2A4/rHkOunmdO/LyN5QsG0GK5C8By+e0UaSzulnFHaWwzQ/Kdu5B7BRlgezzOe17Hbb5Ql7+qZIfz1wBrrC8dcDeupD2odZOR9sVSYd8J+T1f9aWvgwpkD9NIVAO8FqtnXfbkmW75WWT29KHHMiAVfP3+E8KJx+F5a/Oy28cwmteR/ohL70An2Vrv7imZNli+Xt8npJqzwFe778KaeMK+0RZNcyP8vJfDuG9Pwo81pbW+r3NAl5Xsk2rWvrDg8zj3rz+0oNYd8BANh/vZzgCWavG4nfzU8753c8GeK2D8msdNNC+1Lb8grx85w7L/5iXb5ifi3TlONfxp7D+ga39py39tJz+jZJtViUdj18G1igp+839vO8r8jpvaktvVSsP6vcwXM3vy9IejIh5+pdJejWp9ds9EXFn+/KIeFnSX0hnf5uS6pPfRDoT+GtE/KMkr9OBQwf9Lvq3ff7/+w7Lr87/Ny9Zdn1EPFmSfi+wA+nA3dJqrnxq5G9yAGeSDn4flvSFiHgup3+YdDbz80JaR5LWJl15PRoRl5escj7p4LuupFUj4tFBlK2TbUkHngsj4j/tCyPiYUn3ARtJWiwiXiyUc0VgV9JZ7nL0tbgdTTrZWZt0RQ9D/yxbLiop04uSppLuna1Aukc3P96a/18YEU+XLD8V+GxhvTkkrU567+uRTlRG5kUjgNGSlomIZ9s2+0dE3FuSTyvt1SXLytwIvBY4VdKRwE1D/EznMZ/vZ2G6m3QFvJukzwGnz+d+PeT9LHdb2YZ0JbUasDgpuLS+j3GDzTx3TdiGdLy9tMNqV5PaHmxOuiBYmxR4HoqIv5Ssfybpnn671n55WvuCiHhU0qXAe0jv64y2Vf7Qz9s4jnTfdH/ghkL6/vn/8f1sO0eVze879S0bm/+vJ2mgnWGl/L/1pf+zw3qDLdNgjM3/r5XU33orlaQ92GHdmfn/4oW0NfL/vw+mUBHxvKRTSAe/PUj3EmCIOwB9n+XUDvlEPpBvRA54g3zdMmPz/wMlHTjAussDjwFI2ov0fpbuZ/1RhcdD+iwLhvJ9DVW/nzPp3hn0tQYFQNKhpIYEi/Xz2qNI1TBFC+u9fBF4PfDe/DdD0t9IVwKnRsS/B/k6wAK9n4UmIp6WtB9pnzoKOErSFNI9stM7nNCVGdJ+JmkN0onhxv2sNqqfZe1WBl6VH780yOPTavl/6fE4ImZImll43ZbV6LuPWaZ0/+0vr+wc0u98L0mHRMS/JL2RFHhviYgb+tl2jgUNZEPxfIf0VheAR+h8VtHS+kD6/cYWQFl3hFba70hncZ3MczVJutQeqqGc7R5HCmT7A6dIGg9sQroSvHUY8l2gM3H6Psub6bt66uRFAElrkW5uQ3qvFwLTWld0ks4iBfKyfWKo5Z2f72uoOpUp2pdL2ppUTf4M6X7HlcAjEfFCXn49qXai7L0vlPcSEQ/m/Wpb0pn924Gd8uMvS9o6IgY1AMICvp/5VdrFKCJOlzSRdBXxLtL72g/YT9KpETFhCHkMdj87iRTEfk9q3HYvMDMiZkvamVQNOJT33npvM0kBoT935f/DdexsKfssOh37iYiXJJ0EfAnYk9TS+4C8eLAn45UGsk6m5f+PRcRHB7nNw/n/azos75TeqqrqdGa/RknaNGAd4Mj5CA5D0TqDfi2pVd+AIuJeSVcA20han/nYAej7LNcqW6h0mtf6PB8ZwuuWaX3XV0XE5wa5za6ks/fvRsTRJcvLRnsY8mdZgX4/50L6w4W09+X/h0XEySXbrLMQyjWgiJhNamU3EebcDvgZqRXeEaT7tYOx0N9PRMyS9DJD+023tn2CFFxOApD0NtIJ696STo6IKwbIftD7maRlgO1I3+8HIqL9RGN+Ri15nHRMmzUfx841O5RzOdJV4ey2RY+QPsvX0Fc9XTS27fWH4njSlf/+kk4j3R75NyXVmJ3U3iE6V01OATaUNNgd+QZSM/bNJZUFrT07bNc6EL+ufYGkN1B+WTwx/3/vIMs2v/6U/+89xO2Oy/8/S3rfzzJvHXVHEXE/qfnwqpLKRujYlXRPakpELGggu5x0pfDuXL8/GMvn//NUleXvbMOSbeb3sxxOrXupu+SDRbuPtK0H/b/3HUj37CoXEQ+TAhike9ctrRPFTt/tkN9PRMwi7TP97S+PAitLWr5k2fYlaaUi4s+ke0Qw9/vqZCj72XKkq6GHS4IYwAc7bNfxM833kP8MLC/pHYMoA6SWmo8Cq0t6c8nyD3TYrrVffrh9gaSVSZ9zkLp8DEmOAZeQqhOPJH1WZw7lPmntgSw7gnTD9xxJG7UvlDRG0sGt5/kNnkb6cn8iaYnCupuTWgCVuTL/n5CrrFrbrErq61B22X0sqcPklyTtJ2muz0zS4pL2yAfVBXE2abzCt0j6vqRF2/LZsFjmgnNJdcz7k86kfjvU+xakDqoAP5I0upDnaqQqEICyq6EhyVVQp5DOvE/LP4C5SNpEUvHH1Dr7myBpqcJ6o0ln0mUHuPn9LIdNREwm/VhHAUcXyyTpLaR9djbpSqel9d73b1t/bVLn/GEn6dD8+2i3c/5fDEqPk97DurlRQ7v5fT+PAKtJ6nT/6ErSb/d/28q+D6nambb0zSS9V9JibelLk/quQed7jEVD2c8eIVUBbpSrWFvrSNJXSd1yyrSucOY5+c6OJAWQUyS9vX2hpJUkfVLS4pDueZO6wEC6N7hsYd2xpL5iZX6a8/lMrmpubbM4aZ9dEjgnIgbzuZVpnZC3amqGUqu0wM3vxw5i3UE1ySX1Dg/SD+FG0iX+haSm+bOBJ9rWX4m+DtPTSFchl5Kab7c+9Hma5JJah7WaQf8hb/MM6cdwHW3N7/M2W9PXI/2BXK7f5fWfyenFjo/9Nk2ncz+jN5LOloK0A59Nqvu+oz2Ptu1aO3MAm8zH91nsEP00fZ06n81p55I7RA/2PfaT11KklqdBam11DX0dg6fS1h+F1Cih1bn0UdL9hfNz2e7Kj4N5RzoY9GfZ6fsoLO844ssQv981Cu9xKql17Z/o6xB7SNv6K9HXVHoqcFb+np7P++u17eVigN8bfc2a5+mQ32H9f5F+fzfn/M8sfIb/Asa3rX9hXnY76aTlBGDC/L6fvN3Pc/p9wG/yax5SWP4G0v3rIPWF/F0u40ukkYHam9+/n75jwGWkk+LWaC5BuvpYZJCfz1D2s6/Q1zXiT/n7n5zL+YP2chb2mefzNheSTrhPYO7+tgcX9qHb6fuN3EK6ogvm7p5S7BD9RP68/kCqzjuHVEPzXMl7LXaIvpT0u30wp/2dzh2iS39XbeuOpK9j/K1DPoYNdYOc6UIPZHndd+QP9aH8BUzPX8YxlHRSJDW9Po7043iedGD7LB2GqMrbLEY68E/NeUwFvk1qzt/fEFWrkYZ0uZO+IZwmkw7ye7ftKPMVyPKyVfJOfW9+TzNIP85vt+8ohW22y69XOtLHIL/TRYHPkIYe+nf+uwH4BOXDRs1XICvstB8lBa8n8/fwEGn0l69SGLUgr7886eSkNTzYVNIV4nKkA9s8gWwon+VAP7j+9ov5+H5XIh1c7yNVj88gXal1GqJqdeDXpAPG86QDxjdIAb6s3+PCDmQTSAf6e0gH/n+Rmq//lJLhwUhNu39DOri3RgQ5YX7fT95mFOmsv9VpeJ73Rxqc4LJcvmfz47eU7aek3/L/kILJA7kcj5EC6ScoDGAwyM9o0L9ZUhXyjbmcT5KC01Zl5SxssxOpyq41MkvZidsmpBOH1jBiM0jB9IS8fftoOaNItS0P5PXvAw4nBbkXSd2lyt7rrvlzezpvNxn4LrmP72B/Bx1e+9d5/dKRPvr7U36BVxT12NQPkn5Bauixf0ScUHd5zKyZcjX31cAFEfHuCvN9FelkdjHg1RHxzFC275Z7ZDafcmOXj5CqRX5bc3HMrAHyvej2+/3r0tcZ+jcVF+lgUg3Lr4caxKA7mt/bfJD0RVLLqneRqgO+EoMYycPMjHR/bllJt5NOgtcAxpOuiM4l3b8cVrnB1rdJ1dE7kW5nfGt+XsuBrLneTapbfxj4Omm4KjOzwfgJqcn/RqR70P8hNeg5FfhFVHPPaVlgX9K9tptJI0UNqnN9u1fkPTIzM+sdvkdmZmaN9oqrWlxppZVi7NixdRfDzKxRbrzxxiciYvTAa3afV1wgGzt2LJMmTaq7GGZmjSKp08j2Xc9Vi2Zm1mgOZGZm1mgOZGZm1mgOZGZm1mgOZGZm1miDCmSSlpN0tqR7JN0t6c2SVpA0UdLk/H/5vK4kHSNpiqTbJG1aeJ0Jef3JkiYU0jeTdHve5pg8KzGd8jAzM2sZ7BXZ0cDFEbEeaUiTu4HDgMsiYhxpyoTD8ro7AePy3wHkQSglrUCaJmAL0kyghxcC07F53dZ2O+b0TnmYmZkBgwhkkpYhzZp6IqTptSPiaWA30vw35P+758e7AadGci2wXJ5peAdgYkQ8FREzgInAjnnZMhHxtzy+16ltr1WWh5mZGTC4DtFrkya4/JWkjUiTwn2GNGHcIwAR8Uhh2vrVmXua8Gk5rb/0aSXp9JPHfBt72B8X9CWY+p1dFvg1zMxs4RhM1eIiwKbAsRGxCWmo/f6q+FSSFvORPmiSDpA0SdKk6dOnD2VTMzNruMEEsmnAtIi4Lj8/mxTYHsvVguT/jxfWX6Ow/RjSVCP9pY8pSaefPOYSEcdHxPiIGD96dCOHCjMzs/k0YCCLiEeBByW9LidtB9wFnA+0Wh5OAM7Lj88H9s6tF7cEnsnVg5cA20taPjfy2B64JC+bKWnL3Fpx77bXKsvDzMwMGPygwZ8CTpO0GHA/sA8pCJ4laV/gAWCPvO6FwM7AFOC5vC4R8ZSkI4Ab8nrfiIin8uODgJNJMx1flP8AvtMhDzMzM2CQgSwibiFNg91uu5J1Azi4w+ucBJxUkj4J2KAk/cmyPMzMzFo8soeZmTWaA5mZmTWaA5mZmTWaA5mZmTWaA5mZmTWaA5mZmTWaA5mZmTWaA5mZmTWaA5mZmTWaA5mZmTWaA5mZmTWaA5mZmTWaA5mZmTWaA5mZmTWaA5mZmTWaA5mZmTWaA5mZmTWaA5mZmTWaA5mZmTWaA5mZmTWaA5mZmTWaA5mZmTWaA5mZmTWaA5mZmTWaA5mZmTWaA5mZmTXaoAKZpKmSbpd0i6RJOW0FSRMlTc7/l8/pknSMpCmSbpO0aeF1JuT1J0uaUEjfLL/+lLyt+svDzMysZShXZNtExMYRMT4/Pwy4LCLGAZfl5wA7AePy3wHAsZCCEnA4sAWwOXB4ITAdm9dtbbfjAHmYmZkBC1a1uBtwSn58CrB7If3USK4FlpO0GrADMDEinoqIGcBEYMe8bJmI+FtEBHBq22uV5WFmZgYMPpAFcKmkGyUdkNNWiYhHAPL/lXP66sCDhW2n5bT+0qeVpPeXh5mZGQCLDHK9rSPiYUkrAxMl3dPPuipJi/lIH7QcXA8AWHPNNYeyqZmZNdygrsgi4uH8/3HgXNI9rsdytSD5/+N59WnAGoXNxwAPD5A+piSdfvJoL9/xETE+IsaPHj16MG/JzMxeIQYMZJKWkjSq9RjYHrgDOB9otTycAJyXH58P7J1bL24JPJOrBS8Btpe0fG7ksT1wSV42U9KWubXi3m2vVZaHmZkZMLiqxVWAc3OL+EWA30bExZJuAM6StC/wALBHXv9CYGdgCvAcsA9ARDwl6QjghrzeNyLiqfz4IOBkYEngovwH8J0OeZiZmQGDCGQRcT+wUUn6k8B2JekBHNzhtU4CTipJnwRsMNg8zMzMWjyyh5mZNZoDmZmZNZoDmZmZNZoDmZmZNZoDmZmZNZoDmZmZNZoDmZmZNZoDmZmZNZoDmZmZNZoDmZmZNZoDmZmZNZoDmZmZNZoDmZmZNZoDmZmZNZoDmZmZNZoDmZmZNZoDmZmZNZoDmZmZNZoDmZmZNZoDmZmZNZoDmZmZNZoDmZmZNZoDmZmZNZoDmZmZNZoDmZmZNdqgA5mkkZJulnRBfr6WpOskTZZ0pqTFcvri+fmUvHxs4TW+lNPvlbRDIX3HnDZF0mGF9NI8zMzMWoZyRfYZ4O7C8+8CP4qIccAMYN+cvi8wIyLWBX6U10PS+sCewBuAHYGf5+A4EvgZsBOwPrBXXre/PMzMzIBBBjJJY4BdgBPycwHbAmfnVU4Bds+Pd8vPycu3y+vvBpwRES9ExD+AKcDm+W9KRNwfES8CZwC7DZCHmZkZMPgrsh8D/w28nJ+vCDwdEbPy82nA6vnx6sCDAHn5M3n9Oelt23RK7y8PMzMzYBCBTNKuwOMRcWMxuWTVGGDZwkovK+MBkiZJmjR9+vSyVczM7BVqMFdkWwPvkTSVVO23LekKbTlJi+R1xgAP58fTgDUA8vJlgaeK6W3bdEp/op885hIRx0fE+IgYP3r06EG8JTMze6UYMJBFxJciYkxEjCU11rg8Ij4MXAG8P682ATgvPz4/PycvvzwiIqfvmVs1rgWMA64HbgDG5RaKi+U8zs/bdMrDzMwMWLB+ZF8EDpE0hXQ/68ScfiKwYk4/BDgMICLuBM4C7gIuBg6OiNn5HtgngUtIrSLPyuv2l4eZmRkAiwy8Sp+IuBK4Mj++n9TisH2d54E9Omx/JHBkSfqFwIUl6aV5mJmZtXhkDzMzazQHMjMzazQHMjMzazQHMjMzazQHMjMzazQHMjMzazQHMjMzazQHMjMzazQHMjMzazQHMjMzazQHMjMzazQHMjMzazQHMjMzazQHMjMzazQHMjMzazQHMjMzazQHMjMzazQHMjMzazQHMjMzazQHMjMzazQHMjMzazQHMjMzazQHMjMzazQHMjMzazQHMjMza7QBA5mkJSRdL+lWSXdK+npOX0vSdZImSzpT0mI5ffH8fEpePrbwWl/K6fdK2qGQvmNOmyLpsEJ6aR5mZmYtg7kiewHYNiI2AjYGdpS0JfBd4EcRMQ6YAeyb198XmBER6wI/yushaX1gT+ANwI7AzyWNlDQS+BmwE7A+sFdel37yMDMzAwYRyCL5V366aP4LYFvg7Jx+CrB7frxbfk5evp0k5fQzIuKFiPgHMAXYPP9NiYj7I+JF4Axgt7xNpzzMzMyAQd4jy1dOtwCPAxOB+4CnI2JWXmUasHp+vDrwIEBe/gywYjG9bZtO6Sv2k4eZmRkwyEAWEbMjYmNgDOkK6vVlq+X/6rBsYaXPQ9IBkiZJmjR9+vSyVczM7BVqSK0WI+Jp4EpgS2A5SYvkRWOAh/PjacAaAHn5ssBTxfS2bTqlP9FPHu3lOj4ixkfE+NGjRw/lLZmZWcMNptXiaEnL5cdLAu8E7gauAN6fV5sAnJcfn5+fk5dfHhGR0/fMrRrXAsYB1wM3AONyC8XFSA1Czs/bdMrDzMwMgEUGXoXVgFNy68IRwFkRcYGku4AzJH0TuBk4Ma9/IvBrSVNIV2J7AkTEnZLOAu4CZgEHR8RsAEmfBC4BRgInRcSd+bW+2CEPMzMzYBCBLCJuAzYpSb+fdL+sPf15YI8Or3UkcGRJ+oXAhYPNw8zMrMUje5iZWaM5kJmZWaM5kJmZWaM5kJmZWaM5kJmZWaM5kJmZWaM5kJmZWaM5kJmZWaM5kJmZWaM5kJmZWaM5kJmZWaM5kJmZWaM5kJmZWaM5kJmZWaM5kJmZWaM5kJmZWaM5kJmZWaM5kJmZWaM5kJmZWaM5kJmZWaM5kJmZWaM5kJmZWaM5kJmZWaM5kJmZWaM5kJmZWaM5kJmZWaMNGMgkrSHpCkl3S7pT0mdy+gqSJkqanP8vn9Ml6RhJUyTdJmnTwmtNyOtPljShkL6ZpNvzNsdIUn95mJmZtSwyiHVmAYdGxE2SRgE3SpoIfBS4LCK+I+kw4DDgi8BOwLj8twVwLLCFpBWAw4HxQOTXOT8iZuR1DgCuBS4EdgQuyq9ZlkfzfW3ZBdz+mYVTDjOzhhvwiiwiHomIm/LjmcDdwOrAbsApebVTgN3z492AUyO5FlhO0mrADsDEiHgqB6+JwI552TIR8beICODUttcqy8PMzAwY4j0ySWOBTYDrgFUi4hFIwQ5YOa+2OvBgYbNpOa2/9Gkl6fSTh5mZGTCEQCZpaeD3wGcj4tn+Vi1Ji/lIHzRJB0iaJGnS9OnTh7KpmZk13KACmaRFSUHstIg4Jyc/lqsFyf8fz+nTgDUKm48BHh4gfUxJen95zCUijo+I8RExfvTo0YN5S2Zm9goxmFaLAk4E7o6IowqLzgdaLQ8nAOcV0vfOrRe3BJ7J1YKXANtLWj63PtweuCQvmylpy5zX3m2vVZaHmZkZMLhWi1sDHwFul3RLTvsy8B3gLEn7Ag8Ae+RlFwI7A1OA54B9ACLiKUlHADfk9b4REU/lxwcBJwNLklorXpTTO+VhZmYGDCKQRcQ1lN/HAtiuZP0ADu7wWicBJ5WkTwI2KEl/siwPMzOzFo/sYWZmjeZAZmZmjeZAZmZmjeZAZmZmjeZAZmZmjeZAZmZmjeZAZmZmjeZAZmZmjeZAZmZmjeZAZmZmjeZAZmZmjeZAZmZmjeZAZmZmjeZAZmZmjeZAZmZmjeZAZmZmjeZAZmZmjeZAZmZmjeZAZmZmjeZAZmZmjeZAZmZmjeZAZmZmjeZAZmZmjeZAZmZmjeZAZmZmjTZgIJN0kqTHJd1RSFtB0kRJk/P/5XO6JB0jaYqk2yRtWthmQl5/sqQJhfTNJN2etzlGkvrLw8zMrGgwV2QnAzu2pR0GXBYR44DL8nOAnYBx+e8A4FhIQQk4HNgC2Bw4vBCYjs3rtrbbcYA8zMzM5hgwkEXEn4Gn2pJ3A07Jj08Bdi+knxrJtcByklYDdgAmRsRTETEDmAjsmJctExF/i4gATm17rbI8zMzM5pjfe2SrRMQjAPn/yjl9deDBwnrTclrqWpOsAAAgAElEQVR/6dNK0vvLw8zMbI6F3dhDJWkxH+lDy1Q6QNIkSZOmT58+1M3NzKzB5jeQPZarBcn/H8/p04A1CuuNAR4eIH1MSXp/ecwjIo6PiPERMX706NHz+ZbMzKyJ5jeQnQ+0Wh5OAM4rpO+dWy9uCTyTqwUvAbaXtHxu5LE9cEleNlPSlrm14t5tr1WWh5mZ2RyLDLSCpNOBdwArSZpGan34HeAsSfsCDwB75NUvBHYGpgDPAfsARMRTko4AbsjrfSMiWg1IDiK1jFwSuCj/0U8eZmZmcwwYyCJirw6LtitZN4CDO7zOScBJJemTgA1K0p8sy8PMzKzII3uYmVmjOZCZmVmjOZCZmVmjOZCZmVmjOZCZmVmjOZCZmVmjOZCZmVmjOZCZmVmjOZCZmVmjOZCZmVmjOZCZmVmjOZCZmVmjOZCZmVmjOZCZmVmjDTiNi71ybXjKhgv8GrdPuH0hlMTMbP75iszMzBrNgczMzBrNgczMzBrNgczMzBrNgczMzBrNgczMzBrNgczMzBrNgczMzBrNgczMzBrNgczMzBrNgczMzBqt68dalLQjcDQwEjghIr5Tc5FsIbt7vdcv0Pavv+fuhVQSM2uirg5kkkYCPwPeBUwDbpB0fkTcVW/J7JXmZwdevsCvcfBx2y7wa/zwg7su0PaHnnnBApfBrGm6vWpxc2BKRNwfES8CZwC71VwmMzPrIl19RQasDjxYeD4N2KKmspj1hGmHXb3ArzHmO29d4Nf42te+Vuv2AJddvs4Cv8Z22963wK+x6hW3LND2j26z8QKXoZspIuouQ0eS9gB2iIj98vOPAJtHxKfa1jsAOCA/fR1w7wJmvRLwxAK+xoLqhjJAd5TDZejTDeXohjJAd5SjG8oAC6ccr4mI0QujMFXr9iuyacAahedjgIfbV4qI44HjF1amkiZFxPiF9XpNLUO3lMNl6K5ydEMZuqUc3VCGbipHXbr9HtkNwDhJa0laDNgTOL/mMpmZWRfp6iuyiJgl6ZPAJaTm9ydFxJ01F8vMzLpIVwcygIi4ELiw4mwXWjXlAuiGMkB3lMNl6NMN5eiGMkB3lKMbygDdU45adHVjDzMzs4F0+z0yMzOzfjmQGQCSvpv/71F3WcysnKT35f9r1l2WbuKqxZq1dsxOIuKcispxO7ApcF1EbFpFnh3KsQSwK/BW4NXAf4A7gD/2UkMfSX8AOv44I+I9FZZlBLARfd/HnRHxWIX5L9Pf8oh4tqqyAEj6TEQcPVDaMOV9U0Rs2vo/3Pk1hQMZ6WokIr44UNow5f2r/HBlYCugNejfNsCVEdFvoFuI5fg+qVP5UsBzxUVARES/B5OFVIavAe8GrgRuBB4HlgBeS/o8lgAOjYjbhrkctZ9cSHp7fvg+YFXgN/n5XsDUiPhyBWVYB/gi8E5gMjCdvu/jOeAXwCkR8fIwl+NBUlAXKZjOzI+XBh6KiEqvTsqCiKSbI2KTCvK+HJgNjAeuaF9e1fGi2ziQ0XHHvC0i3lhhGS4A9o+IR/Lz1YCfVRjIFo+IFySdFxG1jGcpaZeI+GM/y1cG1oyIScNcjq44uchl+XNEvG2gtGHK+3TgWODqaDtQ5O/iQ8CMiDhluMuS8/w5cHFEnJ+fvxt4W0R8oaL89yK957cAxXG8RgGzI+KdFZRhCVIQ+xVwYPvyiLhsuMvQjbq++f1wknQQ8AlgbUnFs/xRwF8qLs7YVhDLHiOd+Vblb6SqxUqraYrKgliu1lo6Ip6NiMdJV2nDXY59ct4XAOu3n1wMd/5tRktaOyLuz2VYC6hkGKGI2KufZY8DP66iHAWbR8QnCmX4g6TDK8z/r8AjpOGgflhInwkMay1BwXER8VFJp/Zq0CrT04EM+C1wEfBt4LBC+syIeKrislwp6RLgdFI1yp6UVB0Mo8UkTQC2Kqtaq+peHYCk35LONmeTqhiXlXRURHy/qjJkdZ9cAHyOtG/c3yoTfeOKViI3ALo4ImZK+grphOebEXFTleUAnpJ0GKmaNYD/AmZUlXlE/BP4J/DmqvIssbmk1YH3S/oxqYp1jqrvF3YLVy1mee6zVSgE94h4oOIyvI/UyAHgzxFxboV5vwX4MPAB5h0GLCLiYxWW5ZaI2FjSh4HNSPdpbqyyqjeX46fAOOY+uZjSPmh1BeVYHFgvP70nIl6oOP/bIuKNeR/5NvAD4MsRUelMFJJWAr4OtKpV/wwcHhGVDNoraSblDXCqvI98CHAQsCbz1k5E1fcLu4UDGZCHwfoa6Yy7deM6qj5wdgNJ+0bEiTWX4U5gY9IV808j4ipJt0bERjWU5b0UDpxVnlzk/BclHbhaZbgS+EVEvFRhGW6OiE0kfRu4PSJ+W1XjBisn6ZcRsX/d5egWvV612PJZ4HUR8WTVGUu6JiLeUnK2V9lZXqEsKwOvkXR2LstdpAYnw35fqs0vgKnArcCfJb2G+u7d3USqav6TpFdJGhURMyvM/1hgUeDn+flHctp+FZbhIUm/ILVe/G6+QqysD6qkH0bEoZLOpeSKqOqWep36cFVcg3OqpANJn8edEXFNhXl3HV+RAZKuAN4VEbPqLktdJG1NugI6mXRfSqR7IROAD0dEZY1fJI2MiNmF5wJGVv39SNqfdD9qhYhYR9I40s327SoswzxXolVfnUp6FbAj6Wpscm70smFEXFpR/ptHxPWSSj/3qhs95D6XLUsAawH3RsQbKsh7NeD3pABW/J2OAN7Xdk+3ZziQAZJOJE3I+Udgzv2HiDiqhrKsTPpxtMpQyVmepGuBgyLi5rb0jUlVWZXdD5H0D+B3wK8i4u6q8i0pxy3A5qRO4pvktNsjYsMKy3ATsEdE3Jefrw2cXWVnWEk/IH0XPdMhfSgkbQp8PCI+XkFe5wAXRsQJbekfA94TEbsPdxm6kasWkwfy32L5r3KS3kNq0vtq0k3c1wB3A8N+lpct0x7EACLiFkmjKipDyxtJDStOzM3vTwLOqKFF1gsR8WK6IARJi9DPaBvD5AvAFbnVokj7xT4Vl+Ee4Pj8/n8FnB4Rz1RchlYH7SOB9Zn7ZK/qlqRziYibJL2pouzeUFaVGhEn5RadPclXZAWSloqIf9eU963AtsCf8o31bYC9IqKSptaS7ga2iogZbekrAH+NiPXKtxz2cr2N1GpwOeBs4IiImFJR3t8Dngb2Bj5F6nN4V0T8TxX5F8qxOKnGQNTQarFQjteRguhepH6Wv4yIyrqISLoa+Cap1eTuuSwvR8T/VlWGXI5DCk9HkKr2VoyIHSrIe0pErFuSLmBy2bJe4EGDAUlvlnQX6QoISRvlUQSq9FJubDJC0oh8gNi4wvx/BFwq6e2SRuW/d5D62f2ownIgaaSk9+Sb+0eTrlTXBv5AtXPTHUYalul24OM5769UkbGkbfP/9wG7AOsC6wC7lPXzq6A8I0ldANYDniA1xDlE0hkVFuNVEXEJQETcFxFfIY22UrVRhb/FSbckqhoN50JJx0laspWQ72H+DLi4ojJ0HVctJj8GdiD3n4qIW/OVQJWelrQ0qW/MaZIeBypr3BARx0t6GDiCVJ3ZarX4zYj4Q1XlyCaTOoN/PyL+Wkg/u8rvJdIYgr/Mf1V7O2lorHeXLAugyg7qRwHvAS4DvhUR1+dF35V0b1XlAF7IVx735RZ7D5GGEatURHy96jwLPg98D3ggVzcH6STvt6T+lj3JVYuApOsiYoti35gaWoYtRRpZfASpY/KywGl1dAmom6SlI+JfXVCOf1De3HvtivIfAbw/Is6qIr9+yvEx0j3K50qWLVvV/TJJW5BOrpYn3StbBvhelS1qczlGA/9NOuEr3qvbtsIyLE3qrC/g793we6mTr8iSByVtBYSkxYBPk6sZqyBpd1LV0e256qSSQVi72CxJBzPvgaKy0UWy8YXHSwB7ACtUlXlEvJw769cayHJDguUlbcDc38efKwxiK5BaFCu35P1IFfl2cBpwJmm6oQNJXVSmV1mAHLjmaZzVq3yPLDkQOBhYHZhGujd1cBUZ53txnwNWBI6Q9NUq8u1yvyZNXbIDcBUwhjQwa6Ui4snC30MR8WNSg5wqTZT0eUlrSFqh9VdlASTtR6ryvoQ0RNQlpJFwqsp/H+BeUhXvZEm7VpV3Byvm0W9eioir8gnWljWXqaf1/BVZvon9kYj4cE1FeBuwUUTMzjdtrybdp+pl60bEHpJ2i4hTlAYRvqTqQuT+QS0jSFdoVXdFaF2FFk+sWvdFqvIZ4E3AtRGxjaT1SAGtKp8HNoiIxyStSzrRuaDC/Nu1hgd7RNIuwMOkky2rSc8HshxAdqPilnkFL7ZGsYiI59TqtFSxtibF86i4c3jrQPF0rs56lDTqe9WKU3XMIg2b9YEqCxARa1WZXwfPR8Tzklrz1t2Tm+JX5YXIM1JHxJRc/V+nb0paFjgU+AnpXt3nqshYUr/jv8YwTzrbrXo+kGV/URrp/ExgTj+yqGaaivXUNxeagHXy89ZYi1UNXNy60ngd6ey7NQL+u0nVSlU6XtLywFdzOZYGKu0rBBARdTTtnku+Sj+ENKHoAUrDZL0uIqq8IpkmaTng/0hVnTNIVyFVGZNbTrasUXweEf2ehC0s6ps1fsl8b/AZqm/+35oPb3FgE+BO0rHiDcAN1DvFTG3capE5Yy22iypaISkNiNtRpDmQKiPpUuD/RR4YN4/q8buI2LHKcnQDSZ8hjWQxk3R/ZlPgsKrGGMxlOJM0pt7eEbFB7j/0t4ioso9hsTxvJ7WovTgiXqwoz337Wx4VzdagNMbipqQhyyobIqxDWU4HvhsRt+TnGwGfqaFBVFfo+Suy3MT52LqaOFcdqAZhTaB4gHqRiqr1uqx6E+BjEXG0pB1I/ZX2IQW2ygIZsE5EfFDSXgAR8Z+qqp87NCppDZi7NFDJ5LNVBapBuJjUGXwpSc+Sa02g+pkqgNe3ghjM6ftaa3CtU88Hsm5p4txFfg1cr74pM94LnFpR3t1UvQl9s+/uTBo099Ya7mG+mK/CAuaMN1jVEFU30negXpM0G7NIw4U9QBr1vWdExBeAL0g6LyKqGsmjk79LOo65Z8v+e71Fqo+rFoHc5P0/zHuPrJIzzm6Tz+yKM1VX2l+lW6o3Jf2K1CVjLWAjYCRwZURsVmEZtgf+hzRQ7qXA1sBHI+LKCstwHHB+RFyYn+8EvDMiDq2qDN0m3xIYF2meuiWBRaLCeepynp9k7tmyfxoR/6mqDN3EgYw5Izi0i6pGcMhl2JU0PcPLA648/GV5C+lH+qs8isHSEVH2GQ1X/veQuiS8kJ8vDtxa9cDFudp5Y+D+iHg6V7WNqbplmKQVSf2URGoC/0TF+d/YHrwlTYqI8Z22GaZyLBcRT1eZZ4dy1D5PXS7HYqRGQJUMot3Ner5qEbqmifOewNGSfk+N83BJOpzUX+p1pPtBi5KqL7ausBhl1Zt1jHbyZuCWiPi3pP8i3eg/uoqMleal+zJ5xBfg21H9NDYtT0j6CnNXY9UxdNqNkq4n/T6qvE/Z7mDyPHUAkSYbrXTMx3zi+0PStFNrKc0beHhEvLfKcnQLX5EBkvYuS4+Iqu4NtcqxDGmKjH1IB4zW3E9VVlncQmrWe1Nh3MnbKuwG0CpHrdWbuQy3kaoU30gKrieSZuF9ewV5X0y6R/Vn0lBIoyLio8Odb4eyrAAcTqrGilymb1Rd9Z6vkHcgdRLfmDS9zymRJx2tsBxzjc2qNE/bTVX+RiTdCGwHXBE1TfraTXxFlhQnxVuCtIPcRHWNHACIiGfzFdmSwGdJVyJfkHRMRPykomK8GBEhqdW4YKmK8p1L7sNXRT++/szKn8VuwNERcaKkCRXlvWr0zXt2idJM0bXIAeszdeVfKMfLpGmFLlKaYug04HP5Ku1L0Tcq/3C7StKXgSUlvYs0T13VM0S8lKu7i2k9e1XiQAZExKeKz3Ov/V9XWQZJ7yadaa6T8948Ih7PHWLvJo0gUIWzJP0CWC7fC/gY9Uxj0g1mSvoSqSrtbUrDmS1aUd7KncJbR6qRxee92BApd8r+MGmi0xmk0TTOBTYjNdSq6hbBYcC+zD1P3QkV5d1yt6QPkOYvXIt0onFtxWXoGq5aLCFpUeC2iHh9hXmeCpwQEfM0M5e0XURcVmFZ3gVsTzpoXhIRE6vKu5tIWhX4EHBDRFwtaU3gHVVUOUuaCrxMXyArqrQhUreQNJk079ZJ7f0vJX05Ir5VYVlGA0REpaPeF/JfijTazZzfKfD1KJlqpxc4kAGS/kDfZfkIUlPnsyLisPpK1bskrUJq9h7Aw61x9qy3Kc2cXlur3tyH8HBSs3flv9nATyLiG3WVy3o8kCmNpL0Kc1exziL1F3qoipvIkmYyd912naMFlJUH0phyk4BDI+L+Ycx7Y+A40hBID+XkMcDTwCeimrEvO30GUNN3UpfciGFf0r3aV5NPLIDzgBMj4qV+Nl+Y5Wi1Xi0VEe+rqByfI3WOP6DVHUXS2sCxpCG7Kht4vMNn0vqd/rKq4cO6Ra8HsguAL7f3C5I0ntSUtWya+Vc0SV8nHax+Szpw70maG+xe4KCIeMcw5n0L8PGIuK4tfUvgF1HhjN02Zzy/p0ldH6bl5DGkiSRXiIgPVlSOfvtnVVXtLulm4F3t/fhyNeOlrdaDFZXlGNLv8vSc9EHSyd/SwBIRUVWjpK7Q64HsjojYoMOySpqydhjPbo4amjhfFxFbtKVdGxFbSrp1OIOJpMkRMa7DsikRse5w5W3zknRvRJRO1yLp7xHx2qrLVKcBjhcdlw1TWa4qdgPJ1Z5XRcTbJN0VEetXVZZu0OutFpfoZ9mSFZWhOJ5du6onUAR4ObeGOjs/f39beYbTRZL+SOr28GBOW4PUSu3iYc67a9U40soMSXsAv2/dm8p9ufYgtRqsRL4S6q9qsarBcvurrqu6Km8VSWMionWl/GpgdH5c1VicXaPXr8hOBy6PiF+2pe8LbF9V1Uk3yXX+R5NGtQhSk97PkaotNouIa4Y5/52A3UiNPUSq0pozzl+vKY60EhGvlfRq0riTwz7SiqSxwHeBbZl7wODLSdPZVDJsmdJAyR1V1SFa0mwKY7EWF5Gq86rqmoGk95DmJrsn5/9aUiOUy0i3AH5QVVm6Qa8HslVI/VBeJF0ZQTpoLAa8NyIerbAsbytLL2uOP4xlGAl8usqb1ta/LhppZUXS8aLScR5tXvmq+E3AbaQW1gLujB4dMBh6PJC1SNoGaNVv3xkRl9dQhuLIAEuQxnK7MSqY3LOtHFcOZ4OOAfIeCexHalBwUUT8tbDsKxHxzTrKVSdJ10fE5pJuiohNc/+hv1UVyCRtTmqpeYOk9YEdgbsj4qIq8m8rS7E16SKk1sUv9Eor0qLWfeu6y9EtHMi6lKQ1gO9FxF4V53skqfl7+5Q2w970XdIJwKuA64GPkG5eH5KX3VThvZCuIenzwDjgXcC3SSOt/LaKIctyteZOpKAxEdgCuBJ4J6mj/JHDXYZ+yjYCeB9ploSv1lWOukg6ApgUEefVXZZu4EDWpXIrpNuqHgRU0hUlyVHFlWGxyiz3Yfo5sBJpIOVrq2ze3E3qGmlF0u2kwXkXBx4lTWHzrNJcWNdVXb1ZplevTCTNIJ1wvkCaS7HVx7HfVtCvVL3earFrSPoJc48usjFwa9XliIhtqs6zYLFCOWYBB0j6X1LjgqVrK1WN8jh6V7eCl6QlJY2NiKkVZD8rImYDz0m6L/I0MhHxH0mVj7CRGzi0jCDdz656xu5usVLdBegmDmTdY1Lh8SzS9C1/qaMgknYB3kChe0JFQ/BMkrRjRMxpah8R35D0MGn0hF70O2CrwvPZOe1N5asvVC9KelUev2/OxJpKg2rXMVTUHoXHs4CppBauPSciZufvYR3m7kb01w6bvKK5arFmktaMiAfqLkeL0rT2rwK2IY3o/X7g+ojYt9aC9ShJt0TExm1pw9oxvZDP4pFn6W5LXwlYLSJuH+4yWLncRegQUjeV20knNtfW1VCrbiPqLoDxf60HSnOR1W2riNgbmBERXyf1J1uj5jK17hP1ounFKjWludEqaQLfIYgdEBFPVBnEJF1UePzfVeXb5T5LqlqdGhFvJV0xP1JvkerjQFa/Yh1/N0zN0eqL8lzufPsS1c3z1J8T6y5ATQ4EvizpAUkPAl8kzYFVZ3mqtmrh8Z415N+Nnm/1G5O0WETcCaxXc5lq43tk9YsOj+tygdIEht8nzdAcVDRpoKTzOy0CVqyiDN0mj1qxpaSlSbcCZtZcpDoaV3TD76LbPJJ/p38gzSD+FNCz0x35HlnNCsPeiDS+Y2tivNqnDJG0OGnonWcqym8GaTbmf7UvAs6MiFWqKEe3qbHxTVlZiuP7VZXn06SWqyLdu51rwIKoaBqXbpVnB1gW+GNZdXAv8BVZzSJiZN1laCdpK2Asef+QRFQwKzJpXMfnIuKqkjLdW0H+XadT45uK8t6CNIpHq+/YYcCmku4CvlXVCQ7w/wqPf1pRnl0v9zUdDdydk1YkTcHUc3xFZnOR9GtSk95bSE29IV0Zfrq+UvWuVifxwv+lgXMiYvsK8r6TNHLGLEnHk2oLzga2y+k9fSVUJ0mfAL4BPElfV4jotelbWnxFZu3GA+tHl5zhSNo1Ii6ouxw1ej7/bzW+eZLqGt+MyB3TAcYXhgi7Jg9mXLn2MTd7dQxOUtP710fE9LoL0g3catHa3cHcrcTqVsu9oC7yh7bGN1PpmxV4uN0haZ/8+FalmdOR9FpSa9Y63DHA814xDah00t1u5qpFA+aMvh/AKNLwWNdTmKAvIt7TYdPhLtfNPTzG4ghgy9YsADU0vlmWNDfdW0l91zYlTXj6IGm6n8qHUOt1klpV/G8kDSZ9AXP/To+po1x1c9WitXTrRHx19pmqVUS8LOmHpE7prQ7KlbVKywHzo5JGkfo4LgJMi4hamnlL+jZpBoDngD+STrg+FxG/raM8NWnNAv1I/uu5KWzK+IrMAJC0LrBK+/iOecLPh6qahbcTSe+qatT3biLp66QJFM/plvuWAJKWjoj2bhLDnectEbGxpN1JLRk/B1xWxXBd3ULSEsDS7ROc5mHDZvZq83vfI7OWHwNlnW2fy8vq1qsjexxCGiT4BUnPSpop6dm6CwXcVUOerRqknUmDaj9B73WW/jGpK0a7nYGjKi5L13DVorWMjYjb2hMjYpKksVUUwCN7zCsiRtWVt6RDOi2inml1LpJ0B6lbyMH5KqTXrkDeFhFlw4T9mjR8WU9yILOWJfpZtmRFZXgrnUf22LyiMnQFSSOBJVvVd5K2pG++tpsrGqrqW6TWkrNKllVemxMRX5D0feCp3LftedIs0b2kdIiwiIjcQbonOZBZyw2S9o+IXxYT83QRN1ZUBo/s0ee7wOPA9/Lz00lNzZcgNcOv4uz7JuD/ImKe71/SfhXk357nhwqPi4t6qbHHE5I2a/9OJG1KDzfHd2MPA0DSKsC5wIv0Ba7xpKuA90bEo3WVrRdJuhl4U6tDcqsbQj7rvjoi3lJBGV4HPNnesCAvW6Xq1ouSipOrLgFsC9zYSyOM5CvzM0jDlRV/px8DPhQRf6urbHVyILO5SNoG2CA/vTMiLu9v/QrKs0JE9NyZZvvkmZK2j4hL8+N5JtvsRZKWB06OiJ6aJVrSqsCnKPxOgZ9ERM/OR+ZAZl1D0takM82XSWeY3ySN+7go8IFeOtuUdDewefu9sNxJ+bqIGPa5p/L4ij8pm0RT0lLAB4EXIuK04S5LGUmLALdHxOvryN+6h++RWTf5EfABUou4PwK7R8Q1uf7/J8DWdRauYr8EzpR0YEQ8ACDpNcCxeVkVfg58VdKGpPtz00lVeuNIHXFPAioLYpLOpa+5/QjS1DbnVZV/t/G4k30cyKybLNo6+5c0PSKuAYiIm/I0Ij0jIo6S9BxpgN6lSAfwfwPfiYhj+996oZXhFuADecT98cBqpBnE746IOhrfFKdwmQX8MyKm1lCObuFxJzNXLVrXKN4XkrR7RPxfYdkdEbFB561fubpoduhaSfpWRHx5oDTrPR7Zw7rJVyW9CqAtiK0DVDGxZ1eKiH/1ehDLdixJ26XyUnQBSd+WtIykRSRdIumxYveEXuMrMjPrapI+DhwIvBYoVmmOIjW/37OWgtXI407OzffIrGt0eyu5XidpqYj4dw1ZnwVcRhr5/rBC+syIeLyG8nSDecadlNSzVyW+IrOuIWlj4MtAf63kjuu1Eb4lbQWMpXDiGRGVVbXm/E8gjbq+pqSNgI9HxCeqKkNbeVagMKRaRDxcRznqlIfq2ok07uR4YFngjxGxRa0Fq4kDmXWdLmolVztJvyb1pbuFdNCCNLTepztvtdDLcB3wfuD81iSndTS+kbQzafT3McCTwKuByVX0qetGklamb9zJpYFlI+KhustVB1ctWtfJA+VeWXc5usR4YP265yKLiAfbxjec3WndYfQtUl/CS/NwXe8i3R/qOR53cm4OZGbd7Q5gVdJswHV5MFcvhqTFgE8Dd9dQjlkRMV3SCEmKiImSjqyhHN3grYXHc8adxIHMzLrQSsBdkq6nMPdWRLynwjIcCBwNrA5MAy4F6rg/9kxu9HMNcKqkx0nDmfWciDio+Lw17mQ9pamf75FZ16qxlVzXkPT2svSyqW6GsQxbR8RfBkqroByjSDOWjwD2JjVwOLVsdP5e0+vjTjqQWdfptlZyvU7STRGx6UBpFZTDI3tkncadjIjP11eq+jiQWdfpllZydZI0k74D1VyLSK0Wl6mgDG8GtgI+SxrQuWUZ0hx1lXa+7RBQb626HN1A0naFpz0/7qTvkVlX6pJWcrWJiFF1l4E0qerSpONEsTzPkk40KlEc2UPSTYVFo4BJVZWjy2znq9M+viKzriPpbOAo0mjnW5JayY3vxaGIuoGk10TEP2vMf3lgRTyyxxy+Op2bA5l1HUkrkVrJvXrJlDEAABGPSURBVJNUlXYp8OlenCm6G0gaDfw36T5McUSNbSvKfwngpYiYnZ+vSxrV4p8RcX4VZegWHneynAOZdZ1uaSVniaRLgTOBz5MOohOA6RHxxYryvwrYPyL+nmdCuCGX5/XAX3upOs1Xp+UcyKzrdEsrOUsk3RgRm0m6LSLemNOuiojSrgHDkP/tEbFhfvwNYKWI+ISkxYFJrWW9yONOJm7sYV2j0EputKRDCouWAUbWUyoDXsr/H5G0C/AwabzDqhTPtrcFfggQES9I6skO0Z3GnQR6ctxJBzLrJl3RSs7m8U1JywKHAj8hnVh8tsL875T0HeAh0r2hSwFymdTfhq9gHneywFWL1nXqbiVnA5P02Yj4cUV5LUWaOHI14MSIuCmnbw2Mi4iTqyhHN5E0KSLGS7oV2DgiQtL1EbF53WWrgwOZdZ26W8nZwCQ9EBFr1l2OXiXpMuA9wPdIV8iPA1tHxJa1FqwmI+ougFmJ04B7gLWArwNTSS3VrHv0apVet9gdeJ5UxXslqdp11zoLVCcHMutGK0bEiaS+Q1dFxMdIHaOte7gqp15fiojZEfFSRJwYEUcBhwy41SuUA5l1o7layUnahGpbyRlpvEdJz5b8zSS1krP67FiStkvlpegSbrVo3ajuVnJG14z32C9JH4uIk+ouR1U87mQ5BzLrOhFxQX74DLANpFZy9ZXIutgSA6/yinIWcBke2WMubrVojeBWciZpZGu8xV7lcSfL+R6ZNYVbydkUSd+XtH7dBanRJcA6AHncyeuB9YFDJH2rzoLVyYHMmsJVB/ZG4O/ACZKulXSApGGfYLTLrBARf8+PJwBnRMRBwA7Au+srVr0cyKxruJWc9SciZkbELyNiK1KH+cNJLVtPyVVsvaB93MmJkMadBHpy3ElwYw/rIk1oJWf1kTSS1MR8H2AsafDg04C3AheSxmF8pfO4kyUcyMysKSYDVwDfj4i/FtLPlvS2mspUtf1I406uB+wYEf/O6RuQZlXvSW61aGaNIGnpiPhX3eWw7uN7ZGbWFD+TtFzriaTlJfVMZ2jrzIHMzJrijRHxdOtJRMwANqmxPNYlHMjMrClGSFq+9UTSCvg+v+GdwMya44fAXyWdnZ/vARxZY3m6Sq+NO1nkQGZmjRARp0qaROo/JeB9EXFXzcXqJr027uQcbrVoZl1N0jIR8WyuSpxHRDxVdZnq5nEn5+ZAZmZdTdIFEbGrpH8w98gWAiIi1q6paLXJn8XZwK98VepAZmbWOJJGAXuSRjkZAZxEGnfx2VoLVhMHMjPrapI27W95RNzU3/JXujyqyenAcqSrtCMiYkq9paqWA5mZdTVJV/SzOCJi28oK0yVKxp38NX3jTn4rInph3Mk5HMjMzBpG0v2kcSdPbBt3EknHRMSn6ylZPRzIzKwRJC0KHAS0Bgi+EvhFRLxUW6Fq4nEn5+aRPcysKY4FNgN+nv82y2m9yONOFrhDtJk1xZsiYqPC88sl3Vpbaeo1z7iTknp23ElfkZlZU8yWtE7riaS1gV7tFOxxJwt69o2bWeN8AbgiN3T4/+3da8xl5VnG8f/FAAXaoWWQ1gMyHMIhWKCAltJBpVT4IlYltRGcihWpKUSl2JoelSY1agxNmsaWVrClJdYU7IlEREs4NNSiHQYGLKc4gEnTD4CEjhiHQ28/7PV21p7ZBeKH99kP6/9Ldt53PWs+3JlM9j3Ps+597QDrmU3tTZG5kyMOe0jqRpKXAEcya2T3VtX2xiU1k+RoduRO3jDlhA8bmaQuJNkLuAA4hVlU1deBy6rqf5sWtorMnVzMRiapC0m+AGwDrhqWzgb2q6pfa1fV6jJ3cjEbmaQuJLlzp6nFhWuaHoc9JPVic5LXVdU3AZKcBNzauKZVZe7kYu7IJHUhyT3MBj3+c1g6CLgH+D6zY7VjW9W2WsydXMxGJqkLSdY/1/2qeni1atFysZFJUmfMnZxnI5OkziS5HNgDuHJYeivwbFX9Truq2rGRSVJnnOCcZ9aipC4k+YsXsjYR5k6OuCOT1IUkt1fVCTutbZnCtOLOkrwR+DQwlztZVc811fiiZSOTtNSSvINZNNWhwH+Mbq0Fbq2qjU0Ka8zcyR1sZJKWWpKXA/sBfwa8Z3Rr22SzBc2dnGMjk7TUDMrdlbmT82xkkpbagqDcjG5PMijXqcV5Zi1KWmpVdebw85DWtSyRyedOjrkjk7TUDMrdlbmT82xkkpbaKCh3L+CngTuZHS8eC9xWVae0qq0VcyfnebQoaalV1RsAkvwd8Paqumu4fjXwrpa1tTK1RvV8TPaQ1IujVpoYQFXdDbymYT1aEu7IJPXiniEs9ypm04sbmT0X0sS5I5PUi7cB/w78AXAR8O1hbXLMnZznsIekbiTZGzioqu5rXUtL5k7Oc0cmqQtJ3gTcAfzjcP2aJF9tW9XqSvKOJHcBRybZMno9CGxpXV8r7sgkdSHJJuA04KaqOn5Ym9QuxNzJxRz2kNSLZ6rqiSTP/ydfvKqqHkpy4c43kqybajOzkUnqxd1JzgHWJDkc+H3gG41rWm1/C5wJbGJB7iSzr7qZHI8WJXUhyT7A+4EzhqXrgQ9P9atLtIONTNLSS7IG+POqenfrWloyd3IxjxYlLb2qejbJia3rWAKXDj8X5k4y+6LNybGRSerF5mHc/mrgyZXFqvpiu5JWl7mTi9nIJPViHfAYsxH8FQVMppGN7JI7mWSyuZM+I5OkziT5PLNd6Th38mVVdXbTwhox2UNSF5JcmeQVo+v9kvxNy5oaMndyxB2ZpC4k2byS6PFca1Nh7uQO7sgk9WK3JPutXCRZx0Sf85s7OW+S/wgkdelS4BtJrmH2XOgtwJ+2LamZPwFeC9wEUFV3JDm4YT1N2cgkdaGqPpvkW8ymFgOcVVXfblxWK+ZOjtjIJHVjaFxTbV5j5k6O+IxMkvrze8BPAduZBQk/wWx6cZKcWpSkjpg7uSt3ZJK6kWR9kl8Yft87ydrWNa22qnoWMHdyxGdkkrqQ5Hzg7cyiqg4DDgQuA97Ysq5GJp87OWYjk9SLC5mNnN8GUFUPJHll25KaMXdyxEYmqRfbq+qplZHzJLsze/OenKqabBzVIj4jk9SLm5O8D9g7yenMjtWubVxTE+ZOznNqUVIXkuwGnAecwewD0dcDl9cE38TMnZxnI5OkziS5Ezi1qh4frtcBN1fVMW0ra8NnZJK6kGQDcAmwntl7V4CqqkNb1tWIuZMj7sgkdSHJvcA7gU3AsyvrVfVYs6IaSnI0O3Inb5hw7qSNTFIfktxWVSe1rkPLx0YmaaklOWH49S3AGmafldq+cr+qbm9Rl5aHjUzSUkty43Pcrqo67TnuawJsZJK6kOTQqtr6fGtTkWQ9cHhVfS3J3sDuVbWtdV0t+IFoSb24ZsHa1atexRIYcievAT45LB0IfLldRW05fi9pqSU5itl3b708yVmjW/sCe7WpqjlzJ0dsZJKW3ZHAmcArgF8arW8Dzm9SUXvmTo7YyCQttar6CvCVJCdX1b+0rmdJ7Jw7eQETzZ0Ehz0kqTvmTs6zkUmSuubUoqQuJDnkhaxNQZINSf45yf1JtiZ5MMkkP4YA7sgkdSLJ7VV1wk5rm6rqxFY1tWLu5DyHPSQtNcfvF3qiqq5rXcSysJFJWnaO3w9GuZM3JvlLzJ0EPFqU1AnH782d/GHckUnqxWNJbgBeVVWvTnIs8Kaq+nDrwlZLVb0BfnjuZJuq2nNqUVIv/hp4L/A0QFVtAX69aUXtmDs54o5MUi/2qap/XYllGjzTqpgWHHxZzEYmqRePJjmMIVMwyZuB77YtadU5+LKAwx6SujA8A/oU8HrgceBBYGNVPdSyrhYcfJlnI5PUlSQvBXab6pdIalcOe0jqQpJXJbkCuKaqtiU5Osl5retSezYySb34DLOU9x8fru8HLmpWTUPmTs6zkUnqxY9U1ReA7wNU1TOMcgYn5u8XrC0ayZ8EpxYl9eLJJPuzY2rxdcATbUtaXY7fL2Yjk9SLi4GvAocluRU4AHhz25JWneP3Czi1KKkbSXZn9mYe4L6qerpxSU04fj/PRiapC0nWAL8IHMzoNKmqPtKqplaSHAF8ggnnTo457CGpF9cCvwXsD6wdvabI3MkRn5FJ6sWBVXVs6yKWxORzJ8fckUnqxXVJzmhdxJIwd3LEHZmkXnwT+FKS3ZgdqYXZl0nu27asJi5kljt5VJLvMOROti2pHYc9JHUhyVbgV4C7yjcuwNzJFR4tSurFA8DdNjFzJ3fmjkxSF5J8BjgUuA7YvrI+0fH764BPA++vquOGz9dtrqpjGpfWhDsySb14ELgB2BPH782dHHHYQ1IXqupDrWtYIpPPnRyzkUlSf8ydHPEZmSR1yNzJHWxkkrqQZENV3fp8a1Ng7uQ8hz0k9eJjL3BtCsydHPEZmaSlluRk4PXAAUkuHt3aF1jTpqrmzJ0ccUcmadntCbyM2X+8x7uP7zHdAQdzJ0d8RiapC0nWV9XDSdYyy1j879Y1tZLkV4GrmG1Gpp476dGipG6sTbIZWAeQ5FHg3Kq6u21ZTVwKnIy5k4BHi5L68Sng4qpaX1XrgT8c1qbI3MkRd2SSevHSqrpx5aKqbhrS36fou8BNQ+bipHMnwUYmqR9bk3wQ+NxwvZFZ/uIUPTi89hxek+awh6QuJNkP+BBwCrPhhluAS6rq8aaFqTkbmSSpax4tSupCkiOAd7FrLNNprWrScnBHJqkLSe4ELgM2Mfrurara1KyoRsydnGcjk9SFJJuq6sTWdSyDJLdX1QnPtzYVHi1K6sW1SS4AvsT8yPl/tStpdZk7uZiNTFIvzh1+vnu0VsChDWppZefcyRVTzp30aFGSemPu5Dx3ZJLUH3MnR8xalKT+mDs5YiOTpP7skjsJTDV30kYmqQ9JNqyEBCfZmOQjSda3rquRrUk+mOTg4fUBpps7aSOT1I1PAP+T5Djgj4CHgc+2LamZ3wYOAL7I7OMIBwBva1pRQ04tSurCygd+k/wx8J2qumLKHwLWDk4tSurFtiTvBd4K/GySNcAejWtqwtzJee7IJHUhyY8C5wD/VlVfT3IQcGpVTe540dzJeTYySd0YhjsOr6qvJdkHWFNV21rXtdrMnZznsIekLiQ5H7gG+OSw9BPAl9tV1NS1SS5I8mNJ1q28WhfVijsySV1IcgfwWuC2qjp+WLurqo5pW9nqS7Jo1L6qakq5kz/gsIekXmyvqqeSAJBkd2ahwZNTVYe0rmGZeLQoqRc3J3kfsHeS04GrgWsb16Ql4NGipC4k2Q04DzgDCHA9cHn5JjZ5NjJJ3UiyJ3DEcHlfVT3dsh4tB48WJXUhyanAA8BfAR8H7k/yc02LasTcyXnuyCR1Ickm4Jyqum+4PgL4/BQ/T5VkC3AccCzwOeAK4Kyq+vmmhTXijkxSL/ZYaWIAVXU/E42oAp4Zng3+MvDRqvoosLZxTc04fi+pF99KcgWzHQjAbzCLaJoicydHPFqU1IUkLwEuBE5hNrV4C/DxqtretLAGzJ2cZyOT1I0kBwBU1SOta2nN3MkdfEYmaall5pIkjwL3AvcleWT4XrJJMndyno1M0rK7CNgA/ExV7V9V64CTgA1J3tm2tGYuZPZ38j2AqnoAeGXTihqykUladr8JnF1VPwjKraqtwMbh3hRtr6qnVi6mnDsJNjJJy2+Pqnp058XhOdlUJ/XMnRyxkUladk/9P++9mL0HeAS4C/hd4B+ADzStqCGnFiUttSTPAk8uugXsVVWT3JWZO7mDjUySOjPkTl4JPMSsof8kcG5V3dKwrGZsZJLUGXMn5/mMTJL6Y+7kiFmLktQfcydHPFqUpM6YOznPRiZJHTJ3cgefkUlSJ8ydXMxGJkn9MHdyAY8WJakTSTYDp+8c2TUcM/5TVR3fprK23JFJUj/MnVzARiZJ/TB3cgGPFiWpE+ZOLmYjkyR1zaNFSVLXbGSSpK7ZyCRJXbORSZK6ZiOTJHXNRiZJ6tr/AXlgQRnw4DsQAAAAAElFTkSuQmCC"/>
-          <p:cNvSpPr>
-            <a:spLocks noChangeAspect="1" noChangeArrowheads="1"/>
-          </p:cNvSpPr>
-          <p:nvPr/>
-        </p:nvSpPr>
-        <p:spPr bwMode="auto">
-          <a:xfrm>
-            <a:off x="155574" y="-144463"/>
-            <a:ext cx="5643029" cy="5643048"/>
-          </a:xfrm>
-          <a:prstGeom prst="rect">
-            <a:avLst/>
-          </a:prstGeom>
-          <a:noFill/>
-          <a:extLst>
-            <a:ext uri="{909E8E84-426E-40DD-AFC4-6F175D3DCCD1}">
-              <a14:hiddenFill xmlns:a14="http://schemas.microsoft.com/office/drawing/2010/main">
-                <a:solidFill>
-                  <a:srgbClr val="FFFFFF"/>
-                </a:solidFill>
-              </a14:hiddenFill>
-            </a:ext>
-          </a:extLst>
-        </p:spPr>
-        <p:txBody>
-          <a:bodyPr vert="horz" wrap="square" lIns="91440" tIns="45720" rIns="91440" bIns="45720" numCol="1" anchor="t" anchorCtr="0" compatLnSpc="1">
-            <a:prstTxWarp prst="textNoShape">
-              <a:avLst/>
-            </a:prstTxWarp>
-          </a:bodyPr>
-          <a:lstStyle/>
-          <a:p>
-            <a:endParaRPr lang="en-US" dirty="0"/>
-          </a:p>
-        </p:txBody>
-      </p:sp>
-      <p:sp>
-        <p:nvSpPr>
-          <p:cNvPr id="3" name="AutoShape 2" descr="data:image/png;base64,iVBORw0KGgoAAAANSUhEUgAAAZQAAAFJCAYAAAC8ZdtRAAAABHNCSVQICAgIfAhkiAAAAAlwSFlzAAALEgAACxIB0t1+/AAAADl0RVh0U29mdHdhcmUAbWF0cGxvdGxpYiB2ZXJzaW9uIDIuMi4yLCBodHRwOi8vbWF0cGxvdGxpYi5vcmcvhp/UCwAAIABJREFUeJzt3XucHFWZ//HPl0QuCjEBAiIBEzSIgBohP4wXBEUl4AXwshtEyCJrvMCqq7iiuwqK7iK7oLKL8IuSJSAmIAhEjcYsoogLykSRq5ghIIxEEkiAKBgMPPvHOZ3UdKp7eqZr0j3x+369+tXdzzlVdWqmup+uc051KyIwMzNr1xadboCZmW0enFDMzKwSTihmZlYJJxQzM6uEE4qZmVXCCcXMzCox4hKKpBjgdnMF27g+r2tCXbxP0rp2199ku6NL9udpSY9KukHShySNrmA7Z+R1zxjEMnvlZX7Q7vY7pbAPIam30d+y8Pc5eVO3sa4dfxjgWP9DBdu4PK9ral28J8d3bHcbTbb9UMk+rZG0RNKnJG1TwTY+ktf7kUEsM3aw7yWSrhrsdjZHbb85ddAVwB9L4vdt6oYMk28BjwMCJgKvBKYBb5F0eET8pYNt2xw8H5gJXDCcG5F0I/ByYJeIGGoCWAisLIk/OuSGdZfvAg/nx7uRjvX9gLdLOigiyl7n1oVGckI5OSLu7XQjhtFHI6Kv9kTSfsCPgdcD7wH+fxvrPgu4EPh9G+sYyZ4AtgE+LeniiHiy0w0awOkRcWOnGzGMPhsRPbUnkvYkHev7AR8DPtvGuucCPwAebKeB1poR1+X11yoifgl8OT89ss11rYyI30TEmvZbNiItI73JPA84ocNtsToR8Vvg8/lpu8f66nysr26/ZTaQzTqhSHp97tf8eoPyz+fydw9x/dPy8v/bpM7Hcp3/GMo26vwq3+9eWP8Okj4saZGk30laK+lhSf8j6a0N2tRwDEXSREnfzP3bf5J0k6S/HUwjJW2dx30elzSmQZ0X5TbcUYhtIendkn4q6UFJf87jVtdK+sRg2tCCz+T7f5a0dasLSdpW0mmSbpf0RN7Pn0j6m7p6e0kKUncXwPLCOMGfK9qH4vb2zev+boPyk9oZF5K0Rx7P65WkBnWOydv4xlC2UafsWN9O0vskfUfSsnx8PJKPl9LXcLMxFEk7S/p6Hqt6QtItkmZV0PaWSDpY0vfy63WtpLslfUXSTiV1h7LvX877fqSkqZIW5mX+JOk6SQc3WO6gvJ37crsezO8DZ0oa22yfNuuEMtxyN8TNwCsk7dOg2t/n+69VsMnt8v3aQuy1pDOXPYHfAt8G7gAOBq6W9PFWVy5pMvAL4GhgNbAgb2s+cGKr64mIP+d2bAO8rUG1Y/J98c3nS8DFwFTg13kddwF7AZ9udfsttvEm0v7tCryvlWXyi+l64FRgB+A7wA2ksa1LJZ1VqP4oqbvlofz8svx8LmkfR5SIWAb8kDT29LoG1WpvxsN1rL8UOB94GXAPcCUp8RwAXDyYD22SngPcSDpDfRK4mvS/Og84vd3Gt7D9DwI/AqYDt5KOdQEfApZImlS3SDv7fhDwM9Kx/gPSa+pA4IeSDqhr17tI3Y1vAvpyu5YAY4GPA/0mKm0kIkbUDYh8m9hC3dfnul9vUP75XP7uuvj1OT6hLt4HrKuLvT/X/XLJ+l+Ty37S4r6NLuzfhJLyb+WyCwuxPYH/V1L3haQxkidJA8LFsjPyembUxa/N8a8CowrxtwNP5bIftLgvh+T6ixuULwOeBp6Xn28H/AVYVYsV6m4BHFzBsbNXbtNt+flLcxv+ADyz5O9zct3yX6v9DYBnFeIvJr0ZBTC9bpkbc/w5Q2jvH/Ky01qou2+u+90G5Sc12KfLc3xqXbwnx3csxI7Msfkl698zl/1mEPv3UNm2c9l/1h9vpDez1wCqqzsBuDPXf3Fd2Udy/CN18Xk5/i1gy0L8YODPuezmQezLVWXbaVD3Rfl1+WfgkEJ8NGmSSAA/LtnHwe77l9nwfvK+urLae99VdfGbc/wNJe1+GTCu2b6N5DOUe1Q+lXLiJm7HN4A1wLGStqorq31imz3UlSuZKOlM4B2kf/b6AfmI+G2kT9v9RMRdpDfGZwBvbmE7LyK9mFYBH4+IpwrruoL0aXwwriUltNdJem7dtl4JTAKuj4jf5fBY0gvqrkKstv2nI+LHg9z+gCLi16TZgjsDH2xWN5+dHEdKrB+MiD8V1nMr8G/56YerbidwQ4NjfdowbKuZ75A+VB2ljacTV3J2ImmCpE8BH8ih82tlEdEXEddFfncrxtnQhTngmIuk8cA7SWc//xCFSRn5OLuwnX1owftJr8s5EXFNYdvrSAlwNXCQpJcWytrZ90URUT+J599I+39QXXw8sI70+u0nIn4VA4xFjeRZXo2mDW/SKYYR8UdJl5AOkrcD3wSQNC4/X0X6FDhY95d0VT9JegHcUAxKGkU6I3gl8BxgK9Lpc+30dHIL2zsw33+3+GZZMA84orWmpyQgaR5wMjADOLtQXOvuuqQQ6yPNxHm5pM8CF0TEppgCfiqpW+4Tks6PxlNUDwC2JCXBZSXlFwH/Abxakupf+G1qNG24LDZsIuIppfHI00jJ9WwASVvm50+SuvQG66aSY/0p4F8i4qpiMI/fHEj6tL4rsDXpWN8hV2nlWH8FMAq4Jsqncs+jxW7QIaq91i6pL4iINZKuJM3kPJDU9Qu0te/fL9nOnyT9HthD0jYR8UQuWgK8hdSNdgZwy2CO5ZGcULpp2vB5pITyXnJCIb3AtgbOj4i1jRZsonYdSpCS5J3AlRGxvFhJ0u6kT44vabKu7ZqU1dTOIn7XoPzeFtZR72JSQjmGDW8+o4G/Ib35fKtWMSJC0rGkv99ngM9Iug+4Ltf7TsVv0rXt3pET3zGk/ut/bVC19ve5t8F6Vkr6I7AtMIZqrxHppmnDXwP+hXSs1z4kHEX6ZDs/Ih5qtGATtetQAvgT0Evqirm3WCmfFV0FvKrJujp1rA9G02OJNEYCKWkAbe/7/Q3itVmeW5Gm0gP8I2mcbEa+Paw06eg7wDcKiafUSO7yqkIl+x8Rt5AGZw/OA9uwYTB+qN1dH42Iv4uI4yPiHyLiq/XJJJtLSibfIg0OjyONf4gNZxSls3LqtFJnUPLf5VZgP0l75fChwI7AwohYVVd/Melgfhdpv54G3k0aMF2Uz8SGw2dJn4hPlvTsAeq2ktS68VfrqjrWHyC9uewl6dU5/N58P9Rj/bOFY/2kiPhygw+L/0l6Q/0h6VP6DsDofKzXZtN15FgfooGOk2J5O/v+dMsNirgbmAIclrf5e1KX+Wzgdkk7N1t+c08otb7RbRuU71bhtmp9vX+fxwj2JXWP3FnhNvqRtD1p3OM+0gD7zyPikYioHUAvGMTqHsj3z2tQ3ig+kNppfW1qY1l313oR8VhEzMtvMJOA/YGlwBtIiaZyEbGU1GU1jvQJrUzt71M/+wZY/wlyW9LZZCeu7+nEsf5eSbVZX0sjYqN+96rk7p4jSWcwb42In0bEqsJYXzcc64PdfumxRPpmjPX1Kt73AUXEXyLiBxHxoYh4Kenv8YPc3s80W3ZzTyi1T/QvrC/IA+ivqXBbl5HGS/6ODQO8Qx6Mb1FtTvgDhSQCrD8IB3P9yE/z/ZskPbOkvOXv/apzCekT0rskbUs6a3qU1M0xoEgXdNauI9p3iG1oxedIs8z+kZRY6v2C9Kb9Ckl7lJQfm++vr+uaq73RD3f3cm1G2GRJ/V7X+Vh4fYXbWgzcTRrYPpn0ybiKqcLNbEPqQl7ZoAv56EGs6wbSGelBDT5xD/VYb1XttXZMfUF+jRxVV6/KfR+0iLifDZNOmr4GN/eE0ksa7J0iaf0MiDyIeA6Fi6baFenai7nATqQDZTWFMYJh8nvSp5b9ijN+8hvKaaSB5JZExB2k8YodgDOLb0r5b9fygHzdevvyeicBZwLPBC7Pf6/1JD1f0rH1yUzSM0hnJ1DoC5Y0SdJvJP2aCuQuljmk8Y+NLhSLiEdIY0KjgHOL7czXIH0qPz2nbtHap9GNPtRUKSIeI12X8Fw2dEHVjoXPk7oxqtpWkD4sbUMaO3ySYZ4ZFRGPk17Lz5P0pmJZvqZjwJmMhXWtIE3q2Qr4Sn4/qK3rNcDxlTS6sfNJH17eI2n9NT25S/dsYHvSpQa/zu2tbN8HIumf8iy4eofn+0bjMUmzOcXdeGMQ16Hk+u/J9Z8iTYW7ivTP+QMpAbR1HUpd+Z6kT+MBfGUI+9b0OpQGy5yW6/+F9MlxHimR/oX0nV1BmhhQXKbRdSgvZMO1Ab8lDZD/NO/TfzGI61Dq1ntCYb8CeG1JnWlsGJS9Lm/7StJZZpAu1tyuUL92TcmfB9GOftehlJRPYMM1CGXXbIwlzbqJfPxcSpqBtTbHzipZ57ty2epc/+vAeS22t+XrUHL9NxeOv5+R3jSXkc4Iz2+wTy1fh1JXvmPhb3XpYI+JvI6G16E0qF+75utp0sV33wRuy8/PpPy6ikbXoTyXNCgf+X4ecA1pymztWB/KdSj3kq49KrtdVKj/wdzu2vvSN0lnfUF6055Uwb7XrkM5skGba9ecjC3EIv8NevLxehkbrnN5BNin6d9hKAdCJ28MMqHkZY4lvRGsJU21/CapT7ntCxtLtnVfXrbpH77BskNJKCJ1s/2S9Gb8MPA90kDddAaRUHLZHqQr4x8mzTJbQnpTrL0ZDyWhPJs0i6T2YtmipM5YUvfJ90izXJ4gveEsAf4JGFNXv/KEkuucU/gfnFxSvi1pEP9O0hvqY6QE+LdN1vnxXH/tYNrMIBNKXuatpO65J0hJ7Mq8321f2FiyrZtynUNabV/d8oNKKHmZo4Cf57/7auB/SGewUxhEQsllu5AuJFyR/5e3ka5/GcvQE0qz2811y7w2H++rSGd59+Tjb+eK9n0oCeW9pNf/XaSxwDWkD3NfAnYf6O+gvBKrgKRXAP8L/CwiXj1QfbORKg/GLyV9qt4z/EZibP5jKJvaP+f7/+poK8yG36dIZ8fnOplYjc9Q2pTn4h9Pmv1wAOk0cv+om3VlNtJJegnp4s8XkL6y43fA3pEGjc1G9JXy3WIv0sD/GlJ/6IlOJraZ2p00weJx0jflfsjJxIp8hmJmZpXwGIqZmVVis+vy2nHHHWPixImdboaZ2YiyZMmShyKi7KLGlm12CWXixIn09PR0uhlmZiOKpEbfvtwyd3mZmVklnFDMzKwSTihmZlYJJxQzM6uEE4qZmVXCCcXMzCrhhGJmZpVwQjEzs0psdhc2jhQTT/lep5uwWbn3jDcNXMnMhpXPUMzMrBJOKGZmVgknFDMzq8SACUXSbpKulXSnpNslfTjHt5e0WNLSfD8uxyXpHEm9km6RtF9hXTNz/aWSZhbi+0u6NS9zjiQ124aZmXWfVs5Q1gEfi4gXAdOAEyXtDZwCXBMRk4Fr8nOAw4DJ+TYLOA9ScgBOBV5O+qncUwsJ4rxct7bc9BxvtA0zM+syAyaUiFgeEb/Mj9cAdwK7AkcAc3O1ucCR+fERwEWR3AiMlbQLcCiwOCJWRcRqYDEwPZeNiYgbIv185EV16yrbhpmZdZlBjaFImgi8DPg5sHNELIeUdICdcrVdgfsLi/XlWLN4X0mcJtswM7Mu03JCkbQtcAXwkYh4rFnVklgMId4ySbMk9UjqWbly5WAWNTOzirSUUCQ9g5RMLomIb+fwg7m7iny/Isf7gN0Ki08AHhggPqEk3mwb/UTE7IiYGhFTx49v6xcszcxsiFqZ5SXgAuDOiDi7ULQAqM3UmglcXYgfl2d7TQMezd1Vi4A3ShqXB+PfCCzKZWskTcvbOq5uXWXbMDOzLtPKV6+8CjgWuFXSzTn2KeAM4DJJJwD3Ae/MZQuBw4Fe4HHgeICIWCXpdOCmXO9zEbEqP/4AcCGwDfD9fKPJNszMrMsMmFAi4nrKxzkADimpH8CJDdY1B5hTEu8B9i2JP1y2DTMz6z6+Ut7MzCrhhGJmZpVwQjEzs0o4oZiZWSWcUMzMrBJOKGZmVgknFDMzq4QTipmZVcIJxczMKuGEYmZmlXBCMTOzSjihmJlZJZxQzMysEk4oZmZWCScUMzOrhBOKmZlVopWfAJ4jaYWk2wqxSyXdnG/31n7JUdJESU8Uys4vLLO/pFsl9Uo6J//cL5K2l7RY0tJ8Py7Hlev1SrpF0n7V776ZmVWllTOUC4HpxUBE/G1ETImIKcAVwLcLxXfXyiLi/YX4ecAsYHK+1dZ5CnBNREwGrsnPAQ4r1J2Vlzczsy41YEKJiOuAVWVl+Szjb4B5zdYhaRdgTETckH8i+CLgyFx8BDA3P55bF78okhuBsXk9ZmbWhdodQzkQeDAilhZikyT9StJPJB2YY7sCfYU6fTkGsHNELAfI9zsVlrm/wTJmZtZlRre5/NH0PztZDuweEQ9L2h+4StI+gEqWjQHW3fIykmaRusXYfffdB2y0mZlVb8hnKJJGA28DLq3FImJtRDycHy8B7gb2JJ1dTCgsPgF4ID9+sNaVle9X5HgfsFuDZfqJiNkRMTUipo4fP36ou2RmZm1op8vr9cBvImJ9V5ak8ZJG5cd7kAbUl+WurDWSpuVxl+OAq/NiC4CZ+fHMuvhxebbXNODRWteYmZl1n1amDc8DbgBeKKlP0gm5aAYbD8a/BrhF0q+By4H3R0RtQP8DwNeBXtKZy/dz/AzgDZKWAm/IzwEWAsty/a8BHxz87pmZ2aYy4BhKRBzdIP53JbErSNOIy+r3APuWxB8GDimJB3DiQO0zM7Pu4CvlzcysEk4oZmZWCScUMzOrhBOKmZlVwgnFzMwq4YRiZmaVcEIxM7NKOKGYmVklnFDMzKwSTihmZlYJJxQzM6uEE4qZmVXCCcXMzCrhhGJmZpVwQjEzs0o4oZiZWSVa+cXGOZJWSLqtEDtN0u8l3ZxvhxfKPimpV9Jdkg4txKfnWK+kUwrxSZJ+LmmppEslbZnjW+Xnvbl8YlU7bWZm1WvlDOVCYHpJ/EsRMSXfFgJI2pv008D75GW+KmlU/p35c4HDgL2Bo3NdgC/mdU0GVgO1nxg+AVgdES8AvpTrmZlZlxowoUTEdcCqgeplRwDzI2JtRNxD+j34A/KtNyKWRcSTwHzgCEkCXkf6/XmAucCRhXXNzY8vBw7J9c3MrAu1M4ZykqRbcpfYuBzbFbi/UKcvxxrFdwAeiYh1dfF+68rlj+b6ZmbWhYaaUM4Dng9MAZYDZ+V42RlEDCHebF0bkTRLUo+knpUrVzZrt5mZDZMhJZSIeDAinoqIp4Gvkbq0IJ1h7FaoOgF4oEn8IWCspNF18X7ryuXPpkHXW0TMjoipETF1/PjxQ9klMzNr05ASiqRdCk+PAmozwBYAM/IMrUnAZOAXwE3A5Dyja0vSwP2CiAjgWuAdefmZwNWFdc3Mj98B/CjXNzOzLjR6oAqS5gEHAztK6gNOBQ6WNIXUBXUv8D6AiLhd0mXAHcA64MSIeCqv5yRgETAKmBMRt+dNfAKYL+nzwK+AC3L8AuBiSb2kM5MZbe+tmZkNmwETSkQcXRK+oCRWq/8F4Asl8YXAwpL4MjZ0mRXjfwbeOVD7zMysO/hKeTMzq4QTipmZVcIJxczMKuGEYmZmlXBCMTOzSjihmJlZJZxQzMysEk4oZmZWCScUMzOrhBOKmZlVwgnFzMwq4YRiZmaVcEIxM7NKOKGYmVklnFDMzKwSTihmZlaJAROKpDmSVki6rRD7d0m/kXSLpCsljc3xiZKekHRzvp1fWGZ/SbdK6pV0jiTl+PaSFktamu/H5bhyvd68nf2q330zM6tKK2coFwLT62KLgX0j4iXAb4FPFsrujogp+fb+Qvw8YBbpd+YnF9Z5CnBNREwGrsnPAQ4r1J2Vlzczsy41YEKJiOtIv+lejP0wItblpzcCE5qtQ9IuwJiIuCEiArgIODIXHwHMzY/n1sUviuRGYGxej5mZdaEqxlDeA3y/8HySpF9J+omkA3NsV6CvUKcvxwB2jojlAPl+p8Iy9zdYph9JsyT1SOpZuXJle3tjZmZD0lZCkfTPwDrgkhxaDuweES8DPgp8U9IYQCWLx0Crb3WZiJgdEVMjYur48eNba7yZmVVq9FAXlDQTeDNwSO7GIiLWAmvz4yWS7gb2JJ1dFLvFJgAP5McPStolIpbnLq0VOd4H7NZgGTMz6zJDOkORNB34BPDWiHi8EB8vaVR+vAdpQH1Z7spaI2lant11HHB1XmwBMDM/nlkXPy7P9poGPFrrGjMzs+4z4BmKpHnAwcCOkvqAU0mzurYCFufZvzfmGV2vAT4naR3wFPD+iKgN6H+ANGNsG9KYS23c5QzgMkknAPcB78zxhcDhQC/wOHB8OztqZmbDa8CEEhFHl4QvaFD3CuCKBmU9wL4l8YeBQ0riAZw4UPvMzKw7+Ep5MzOrhBOKmZlVwgnFzMwq4YRiZmaVcEIxM7NKOKGYmVklnFDMzKwSTihmZlYJJxQzM6uEE4qZmVXCCcXMzCrhhGJmZpVwQjEzs0o4oZiZWSWcUMzMrBJOKGZmVomWEoqkOZJWSLqtENte0mJJS/P9uByXpHMk9Uq6RdJ+hWVm5vpL82/S1+L7S7o1L3NO/pnghtswM7Pu0+oZyoXA9LrYKcA1ETEZuCY/BziM9Fvyk4FZwHmQkgPp54NfDhwAnFpIEOflurXlpg+wDTMz6zItJZSIuA5YVRc+ApibH88FjizEL4rkRmCspF2AQ4HFEbEqIlYDi4HpuWxMRNyQf/b3orp1lW3DzMy6TDtjKDtHxHKAfL9Tju8K3F+o15djzeJ9JfFm2+hH0ixJPZJ6Vq5c2cYumZnZUA3HoLxKYjGEeMsiYnZETI2IqePHjx/MomZmVpF2EsqDubuKfL8ix/uA3Qr1JgAPDBCfUBJvtg0zM+sy7SSUBUBtptZM4OpC/Lg822sa8GjurloEvFHSuDwY/0ZgUS5bI2lant11XN26yrZhZmZdZnQrlSTNAw4GdpTUR5qtdQZwmaQTgPuAd+bqC4HDgV7gceB4gIhYJel04KZc73MRURvo/wBpJtk2wPfzjSbbMDOzLtNSQomIoxsUHVJSN4ATG6xnDjCnJN4D7FsSf7hsG2Zm1n18pbyZmVXCCcXMzCrhhGJmZpVwQjEzs0o4oZiZWSWcUMzMrBJOKGZmVgknFDMzq4QTipmZVcIJxczMKuGEYmZmlXBCMTOzSjihmJlZJZxQzMysEk4oZmZWCScUMzOrxJATiqQXSrq5cHtM0kcknSbp94X44YVlPimpV9Jdkg4txKfnWK+kUwrxSZJ+LmmppEslbTn0XTUzs+E05IQSEXdFxJSImALsT/q53ytz8ZdqZRGxEEDS3sAMYB9gOvBVSaMkjQLOBQ4D9gaOznUBvpjXNRlYDZww1PaamdnwqqrL6xDg7oj4XZM6RwDzI2JtRNxD+s35A/KtNyKWRcSTwHzgCEkCXgdcnpefCxxZUXvNzKxiVSWUGcC8wvOTJN0iaY6kcTm2K3B/oU5fjjWK7wA8EhHr6uIbkTRLUo+knpUrV7a/N2ZmNmhtJ5Q8rvFW4Fs5dB7wfGAKsBw4q1a1ZPEYQnzjYMTsiJgaEVPHjx8/iNabmVlVRlewjsOAX0bEgwC1ewBJXwO+m5/2AbsVlpsAPJAfl8UfAsZKGp3PUor1zcysy1TR5XU0he4uSbsUyo4CbsuPFwAzJG0laRIwGfgFcBMwOc/o2pLUfbYgIgK4FnhHXn4mcHUF7TUzs2HQ1hmKpGcCbwDeVwifKWkKqXvq3lpZRNwu6TLgDmAdcGJEPJXXcxKwCBgFzImI2/O6PgHMl/R54FfABe2018zMhk9bCSUiHicNnhdjxzap/wXgCyXxhcDCkvgy0iwwMzPrcr5S3szMKuGEYmZmlXBCMTOzSjihmJlZJZxQzMysEk4oZmZWCScUMzOrhBOKmZlVwgnFzMwq4YRiZmaVcEIxM7NKVPH19Wa2OTnt2Z1uwebltEc73YJNxmcoZmZWCScUMzOrhBOKmZlVwgnFzMwq0XZCkXSvpFsl3SypJ8e2l7RY0tJ8Py7HJekcSb2SbpG0X2E9M3P9pZJmFuL75/X35mXVbpvNzKx6VZ2hvDYipkTE1Pz8FOCaiJgMXJOfAxxG+i35ycAs4DxICQg4FXg56RcaT60loVxnVmG56RW12czMKjRcXV5HAHPz47nAkYX4RZHcCIyVtAtwKLA4IlZFxGpgMTA9l42JiBsiIoCLCusyM7MuUkVCCeCHkpZImpVjO0fEcoB8v1OO7wrcX1i2L8eaxftK4v1ImiWpR1LPypUrK9glMzMbrCoubHxVRDwgaSdgsaTfNKlbNv4RQ4j3D0TMBmYDTJ06daNyMzMbfm2foUTEA/l+BXAlaQzkwdxdRb5fkav3AbsVFp8APDBAfEJJ3MzMukxbCUXSsyRtV3sMvBG4DVgA1GZqzQSuzo8XAMfl2V7TgEdzl9gi4I2SxuXB+DcCi3LZGknT8uyu4wrrMjOzLtJul9fOwJV5Ju9o4JsR8QNJNwGXSToBuA94Z66/EDgc6AUeB44HiIhVkk4Hbsr1PhcRq/LjDwAXAtsA3883MzPrMm0llIhYBry0JP4wcEhJPIATG6xrDjCnJN4D7NtOO83MbPj5SnkzM6uEE4qZmVXCCcXMzCrhhGJmZpVwQjEzs0o4oZiZWSWcUMzMrBJOKGZmVgknFDMzq4QTipmZVcIJxczMKuGEYmZmlXBCMTOzSjihmJlZJZxQzMysEk4oZmZWiSEnFEm7SbpW0p2Sbpf04Rw/TdLvJd2cb4cXlvmkpF5Jd0k6tBCfnmO9kk4pxCdJ+rmkpZIulbTlUNtrZmbDq50zlHXAxyLiRcA04ERJe+eyL0XElHxbCJDLZgD7ANOBr0oaJWkUcC5wGLA3cHRhPV/M65oMrAZOaKO9ZmY2jIacUCJieUT8Mj9eA9wJ7NpkkSOA+RGxNiLuIf2u/AH51hsRyyLiSWA+cITSD9W/Drg8Lz8XOHKo7TUzs+FVyRiKpInAy4Cf59BJkm6RNEfSuBzbFbi/sFhfjjWK7wA8EhHr6uJsKGvGAAAI8klEQVRl258lqUdSz8qVKyvYIzMzG6y2E4qkbYErgI9ExGPAecDzgSnAcuCsWtWSxWMI8Y2DEbMjYmpETB0/fvwg98DMzKowup2FJT2DlEwuiYhvA0TEg4XyrwHfzU/7gN0Ki08AHsiPy+IPAWMljc5nKcX6ZmbWZdqZ5SXgAuDOiDi7EN+lUO0o4Lb8eAEwQ9JWkiYBk4FfADcBk/OMri1JA/cLIiKAa4F35OVnAlcPtb1mZja82jlDeRVwLHCrpJtz7FOkWVpTSN1T9wLvA4iI2yVdBtxBmiF2YkQ8BSDpJGARMAqYExG35/V9Apgv6fPAr0gJzMzMutCQE0pEXE/5OMfCJst8AfhCSXxh2XIRsYw0C8zMzLqcr5Q3M7NKOKGYmVklnFDMzKwSTihmZlYJJxQzM6uEE4qZmVXCCcXMzCrhhGJmZpVwQjEzs0o4oZiZWSWcUMzMrBJOKGZmVgknFDMzq4QTipmZVcIJxczMKuGEYmZmlej6hCJpuqS7JPVKOqXT7TEzs3JdnVAkjQLOBQ4D9ib9vPDenW2VmZmV6eqEQvr5396IWBYRTwLzgSM63CYzMysx5N+U30R2Be4vPO8DXl5fSdIsYFZ++kdJd22Ctv212BF4qNONGIi+2OkWWAeMiGOTz6rTLWjV89pdQbcnlLL/RGwUiJgNzB7+5vz1kdQTEVM73Q6zej42u0+3d3n1AbsVnk8AHuhQW8zMrIluTyg3AZMlTZK0JTADWNDhNpmZWYmu7vKKiHWSTgIWAaOAORFxe4eb9dfGXYnWrXxsdhlFbDQkYWZmNmjd3uVlZmYjhBOKmZlVwgnFzMwq0dWD8rbpSHpbs/KI+PamaotZkaRbKbn+rCYiXrIJm2NNOKFYzVvy/U7AK4Ef5eevBX4MOKFYp7w535+Y7y/O98cAj2/65lgjnuVl/Uj6LvDeiFien+8CnBsRTc9gzIabpJ9FxKsGilnneAzF6k2sJZPsQWDPTjXGrOBZkl5deyLplcCzOtgeq+MuL6v3Y0mLgHmkfusZwLWdbZIZACcAcyQ9Oz9/BHhPB9tjddzlZRvJA/QH5qfXRcSVnWyPWZGkMaT3rkc73RbrzwnFzLqapHdHxDckfbSsPCLO3tRtsnLu8jIAJF0fEa+WtIb+UzQFRESM6VDTzGrjJNt1tBU2IJ+hmJlZJXyGYqUk7QRsXXseEfd1sDlmSNqaNDC/D/2PTQ/MdwlPG7Z+JL1V0lLgHuAnwL3A9zvaKLPkYuA5wKGkY3MCsKajLbJ+nFCs3unANOC3ETEJOAT4WWebZAbACyLi08CfImIu8CbgxR1ukxU4oVi9v0TEw8AWkraIiGuBKZ1ulBnwl3z/iKR9gWcDEzvXHKvnMRSr94ikbYHrgEskrQDWdbhNZgCzJY0DPk36KfBt82PrEp7lZf1IehbwBOns9RjSp8BL8lmLmVlDTii2nqQjgRcAt0bEok63xwxA0stJvx//fOBW4ISIuKOzrbIyHkMxACR9FfhHYAfgdEnuSrBucS5wMunYPBv4UmebY434DMUAkHQb8NKIeErSM4GfRsT+nW6XmaRfRsR+jZ5b9/CgvNU8GRFPAUTE45LU6QaZZWPrflG033P/mmj38BmKASDpcaC39pTUX93Lhu/y8s+sWkdI+u8mxeEr5buHE4oBIOl5zcoj4nebqi1mNjI5oZiZWSU8y8vMzCrhhGJmZpVwQrF+JL1Zko8L6zqSeiSdmL9+xbqQ3zis3gxgqaQzJb2o040xK5gBPBe4SdJ8SYd6ent38aC8bUTSGOBo4HjSzwH/NzAvIvzbE9Zx+Qz6zcB5wNPAHOArEbGqow0zn6HYxiLiMeAKYD6wC3AU8EtJ/9DRhtlfPUkvAc4C/p10jL4DeAz4USfbZYnPUKwfSW8B3kO6sPFiYG5ErMhfx3JnRDS9XsVsuEhaAjwCXABcERFrC2Xfjoi3NVzYNgknFOtH0kXA1yPiupKyQyLimg40ywxJe0TEsk63wxpzQjGzribpo83KI+LsTdUWa85fDmkASFpDGoBfH8rPa9/lNaYjDTOD7TrdAGuNz1DMzKwSPkMxACRt36zcUzKtUySd06w8Ij60qdpizTmhWM0SNnRx1Qtgj03bHLP1lnS6AdYad3mZmVklfIZi/Uh6TVm8bBqx2aYk6Vr6TxwBICJe14HmWAknFKv38cLjrYEDSF0OftFap51ceLw18HZgXYfaYiXc5WVNSdoNODMiju50W8zqSfpJRBzU6XZY4jMUG0gfsG+nG2FWNxNxC2B/4Dkdao6VcEKxfiT9Jxv6qbcApgC/7lyLzNYrzkRcB9wDnNDRFlk/7vKyfiTNLDxdB9wbET/rVHvMbORwQjEAJO0eEfd1uh1m9ST9a0R8Kj9+Q0Qs7nSbrJx/D8Vqrqo9kHRFJxtiVmd64fEXO9YKG5ATitUUr5D3VfFmNmgelLeaaPDYrNN2yl9hr8Lj9fz19d3DYygGgKSngD+RXrTbAI/XivDX11sHSTq1WXlEfHZTtcWac0IxM7NKeAzFzMwq4YRiZmaVcEIxsxFB0qRWYtY5TihmNlKUXR91+SZvhTXkacNm1tUk7QXsAzxb0tsKRWNIX2NvXcIJxcy63QuBNwNjgbcU4muA93akRVbK04bNbESQ9IqIuKHT7bDGPIZiZiPF/ZKulLRC0oOSrpA0odONsg2cUMxspPhvYAHwXGBX4Ds5Zl3CXV5mNiJI+nVEvLQudnNETOlUm6w/n6GY2UixUtK7JY3Kt3cDD3e6UbaBz1DMbESQtDvwX8ArSN+I/b/AhyPidx1tmK3nhGJmZpXwdShm1tUkfaZJcUTE6ZusMdaUz1DMrKtJ+lhJ+FnACcAOEbHtJm6SNeCEYmYjhqTtgA+TksllwFkRsaKzrbIad3mZWdeTtD3wUeAYYC6wX0Ss7myrrJ4Tipl1NUn/DrwNmA28OCL+2OEmWQPu8jKzribpaWAtsI40XXh9EWlQfkxHGmYbcUIxM7NK+Ep5MzOrhBOKmZlVwgnFzMwq4YRiZmaVcEIxM7NKOKGYmVkl/g+moNZRUXGzyQAAAABJRU5ErkJggg=="/>
-          <p:cNvSpPr>
-            <a:spLocks noChangeAspect="1" noChangeArrowheads="1"/>
-          </p:cNvSpPr>
-          <p:nvPr/>
-        </p:nvSpPr>
-        <p:spPr bwMode="auto">
-          <a:xfrm>
-            <a:off x="155575" y="-144463"/>
-            <a:ext cx="304800" cy="304801"/>
-          </a:xfrm>
-          <a:prstGeom prst="rect">
-            <a:avLst/>
-          </a:prstGeom>
-          <a:noFill/>
-          <a:extLst>
-            <a:ext uri="{909E8E84-426E-40DD-AFC4-6F175D3DCCD1}">
-              <a14:hiddenFill xmlns:a14="http://schemas.microsoft.com/office/drawing/2010/main">
-                <a:solidFill>
-                  <a:srgbClr val="FFFFFF"/>
-                </a:solidFill>
-              </a14:hiddenFill>
-            </a:ext>
-          </a:extLst>
-        </p:spPr>
-        <p:txBody>
-          <a:bodyPr vert="horz" wrap="square" lIns="91440" tIns="45720" rIns="91440" bIns="45720" numCol="1" anchor="t" anchorCtr="0" compatLnSpc="1">
-            <a:prstTxWarp prst="textNoShape">
-              <a:avLst/>
-            </a:prstTxWarp>
-          </a:bodyPr>
-          <a:lstStyle/>
-          <a:p>
-            <a:endParaRPr lang="en-US" dirty="0"/>
+            <a:pPr lvl="1">
+              <a:spcBef>
+                <a:spcPts val="1200"/>
+              </a:spcBef>
+              <a:spcAft>
+                <a:spcPts val="600"/>
+              </a:spcAft>
+            </a:pPr>
+            <a:r>
+              <a:rPr lang="en-US" dirty="0" smtClean="0"/>
+              <a:t>Missing values:</a:t>
+            </a:r>
+          </a:p>
+          <a:p>
+            <a:pPr lvl="2">
+              <a:spcBef>
+                <a:spcPts val="1200"/>
+              </a:spcBef>
+              <a:spcAft>
+                <a:spcPts val="600"/>
+              </a:spcAft>
+            </a:pPr>
+            <a:r>
+              <a:rPr lang="en-US" sz="1800" dirty="0" smtClean="0"/>
+              <a:t>Eliminate variables with relatively high proportion of missing values</a:t>
+            </a:r>
+          </a:p>
+          <a:p>
+            <a:pPr lvl="2">
+              <a:spcBef>
+                <a:spcPts val="1200"/>
+              </a:spcBef>
+              <a:spcAft>
+                <a:spcPts val="600"/>
+              </a:spcAft>
+            </a:pPr>
+            <a:r>
+              <a:rPr lang="en-US" sz="1800" dirty="0" smtClean="0"/>
+              <a:t>Eliminate missing values (but keep rest of observations) for variables with small proportion of missing values</a:t>
+            </a:r>
+          </a:p>
+          <a:p>
+            <a:pPr lvl="1">
+              <a:spcBef>
+                <a:spcPts val="1200"/>
+              </a:spcBef>
+              <a:spcAft>
+                <a:spcPts val="600"/>
+              </a:spcAft>
+            </a:pPr>
+            <a:r>
+              <a:rPr lang="en-US" dirty="0" smtClean="0"/>
+              <a:t>Remove variables with little variation (e.g. clustering at 0)</a:t>
+            </a:r>
+          </a:p>
+          <a:p>
+            <a:pPr lvl="1">
+              <a:spcBef>
+                <a:spcPts val="1200"/>
+              </a:spcBef>
+              <a:spcAft>
+                <a:spcPts val="600"/>
+              </a:spcAft>
+            </a:pPr>
+            <a:r>
+              <a:rPr lang="en-US" dirty="0" smtClean="0"/>
+              <a:t>Normalize relevant loan variables (revol_bal and annual_inc) by funded amount</a:t>
+            </a:r>
+          </a:p>
+          <a:p>
+            <a:pPr lvl="1">
+              <a:spcBef>
+                <a:spcPts val="1200"/>
+              </a:spcBef>
+              <a:spcAft>
+                <a:spcPts val="600"/>
+              </a:spcAft>
+            </a:pPr>
+            <a:r>
+              <a:rPr lang="en-US" dirty="0" smtClean="0"/>
+              <a:t>Remove outlier values</a:t>
+            </a:r>
+          </a:p>
+          <a:p>
+            <a:pPr lvl="1">
+              <a:spcBef>
+                <a:spcPts val="1200"/>
+              </a:spcBef>
+              <a:spcAft>
+                <a:spcPts val="600"/>
+              </a:spcAft>
+            </a:pPr>
+            <a:r>
+              <a:rPr lang="en-US" dirty="0" smtClean="0"/>
+              <a:t>Remove variables with unexpected relationships with other variables</a:t>
+            </a:r>
+          </a:p>
+          <a:p>
+            <a:pPr lvl="1">
+              <a:spcBef>
+                <a:spcPts val="1200"/>
+              </a:spcBef>
+              <a:spcAft>
+                <a:spcPts val="600"/>
+              </a:spcAft>
+            </a:pPr>
+            <a:r>
+              <a:rPr lang="en-US" dirty="0" smtClean="0"/>
+              <a:t>Convert categorical variables to dummies</a:t>
+            </a:r>
+          </a:p>
+          <a:p>
+            <a:pPr lvl="1">
+              <a:spcBef>
+                <a:spcPts val="1200"/>
+              </a:spcBef>
+              <a:spcAft>
+                <a:spcPts val="600"/>
+              </a:spcAft>
+            </a:pPr>
+            <a:r>
+              <a:rPr lang="en-US" b="1" dirty="0" smtClean="0"/>
+              <a:t>End up with 159,431 observations and 82 variables</a:t>
+            </a:r>
           </a:p>
         </p:txBody>
       </p:sp>
     </p:spTree>
     <p:extLst>
       <p:ext uri="{BB962C8B-B14F-4D97-AF65-F5344CB8AC3E}">
-        <p14:creationId xmlns:p14="http://schemas.microsoft.com/office/powerpoint/2010/main" val="3033609931"/>
+        <p14:creationId xmlns:p14="http://schemas.microsoft.com/office/powerpoint/2010/main" val="363713684"/>
       </p:ext>
     </p:extLst>
   </p:cSld>
@@ -7470,94 +7143,793 @@
           <a:p>
             <a:r>
               <a:rPr lang="en-US" sz="2400" dirty="0" smtClean="0"/>
-              <a:t>Distribution of Fully Paid vs. Not Fully Paid Loans Across States [GRAPHIC]</a:t>
+              <a:t>Final Variable List</a:t>
             </a:r>
             <a:endParaRPr lang="en-US" sz="2400" dirty="0"/>
           </a:p>
         </p:txBody>
       </p:sp>
-      <p:sp>
-        <p:nvSpPr>
-          <p:cNvPr id="10" name="AutoShape 6" descr="data:image/png;base64,iVBORw0KGgoAAAANSUhEUgAAAbIAAAIICAYAAAALymuSAAAABHNCSVQICAgIfAhkiAAAAAlwSFlzAAALEgAACxIB0t1+/AAAADl0RVh0U29mdHdhcmUAbWF0cGxvdGxpYiB2ZXJzaW9uIDIuMi4yLCBodHRwOi8vbWF0cGxvdGxpYi5vcmcvhp/UCwAAIABJREFUeJzs3XfYHFXd//H3J6EKoYciAUOJIoK0CAg2QOkK+hMFfSQiRRAr6CP66IOK2EXBAiIgoEgR4QGRFmmCSgm9m4ARQg0QIIqUhO/vj3M292Qze5ck98wO+3ld133du2dm9pzdnZ3vzJlTFBGYmZk11Yi6C2BmZrYgHMjMzKzRHMjMzKzRHMjMzKzRHMjMzKzRHMjMzKzR5iuQSYoB/m5Z2AW17iPptZLOl/SkpJfzd79B3eUaKknfzGX/r258PTPr3yILuP3vgX+VpD+wgK9rXU7SSOAc4A3AX4H7gJeBGXWWy+ojaV1gMnBZRLxzIb3mIsBLwH0Rse7CeM0mkfRN4H+Aj0TEb+ouT7da0ED2+YiYujAKYo2zLimIXRER29ZdGDPrXb5HZvNr9fz//lpLYWYWEUP+AyL/jR3Euuvmdf8ELAv8CJhKqi74Qdu6OwMXAk8AL5AOkj8EVujw2isCPwceBv4D3Al8Clg05zmlbf1v5vT/6vB61+TlY0qWrZnzuh94HngS+AOwZcm678yvcwKwAnBsLuMLwD3AZ/v5vFYCvgXcAfwbeAa4DfgOsEpe57j8+gf08zq35XU2GOR3uijwaeDGnO+/gOuBg4CRJd9n2d8JQ8jrYOBa4FngOeDmnP/IkvU3Bb4HTAKm58/xn8CJwNoL8lm27xfAG4Hzgadyuf4G7DDE30fH/Szvsz8gVcE9n/O5GNi+w2u9A/hpLvdTeZvJwI+BlQf4vS2Z3+vU/Jn9AzgCWHSI7+fNwLn5M38BeBy4CTgKGN32nvvdL4byfoD9+nnNP+V1FqHkt172W2xLX4y0b19POt78J7+/S+jnd7WA+9kKpOPTxfk7aX3/lwHvLXndaf28/7eUfEdnA48CL+Ztj6fkWJbXX5r0m/pn4Tv4n/x5TgNmddhuF2Ai6RbC88C9+X0u19/vANgS+CPpuBnAhvT9xubZtvC7D2DSgN/BUL6wQgbzE8j+mr/cJ0n3Vs4BvlJY7/t5veeBq/OXMjmn/Z38g2k7INyTlz8MnJk/4JeAn5Tt3MxnIAO2Bp7Oy+7OZbs65/US8P4OP55zctkfAX6Xy/dCXvaVkvw3AB7Kyx/J259LCtAB7JrX2yg/v6GfA08Afxvk97kI6ccVpB/hucB5wMzC+xiR110ZOJn0g299Nyfnv30GkddSwFV52yfz65xPOji28lLbNv+XP+cb8+PW5xqkH9Tr5/ezbNsvjiH9sO4AziAd5AKYBbxjCL+P0v0MWIMUTIJ0ADkDuByYndM+V/Jat5AOsteT7kmfR7oH3XqN9oN/6/d2NfAX0sHiXNJBpPV9DuqEI7/eboXyXQecnl+r9dvbMq/3vly+1u/xZEr2i6G8H+BtwCl52bNtr/mFwr47P4GsVdaZpJPn04ErSfvkPUP4fIayn+2e06aSjgWnA3/O+1cAh7W99lHArXnZn9ve/7jCep8i3Z+eTTo5/B19J7KPAq9te90l6du3nyQdzy4g7ftn0yGQAV/N27xEOlE6g75gey+FoN32Ozgxb3M78Nv8XtYnnbwEcHCHz/YXefnHB/weBvuFtWUwP4Gs9eNatmSdvfLy24B1C+kjCh/Gb9q2+WVOvwBYspC+JelqYqEEMmC5vDPMAj7Utv4WpAD3DLBiyY8n8k61RGHZVnmHexZ4VSF9UfoOzj8CFmvLa0NgrcLza/O6G5e8j5PysgEDS17/i3n9W5n7QLJ6oUyfHMwBYhB5tXbOM4BlCunL0BdM9yvJq/1HIuDjef2L25YN9bMsXk0c2rbuYRSuAAb5HjsFsoty+qkUroqAt5MOIrPav0/SGfCybWmLFPI4brC/N2Bc3u9eBtYc5Htp/SbKrhg2aNtf5lwN9vN6Q30/AwWqIQeyQjnvp622J+87bx3kZzPU/WxdYIuS1xkHPEg62LefRA90zNqadDyZBmzatqz1+7imLf1r9J2YLFdIX5u+wDSrbZs35/3mWeBNhfQl6DspOLtD2QM4pKTs6+Vlt5QsWyrnNRMYNeB3MdgfZ1smMcDf2A4/rHkOunmdO/LyN5QsG0GK5C8By+e0UaSzulnFHaWwzQ/Kdu5B7BRlgezzOe17Hbb5Ql7+qZIfz1wBrrC8dcDeupD2odZOR9sVSYd8J+T1f9aWvgwpkD9NIVAO8FqtnXfbkmW75WWT29KHHMiAVfP3+E8KJx+F5a/Oy28cwmteR/ohL70An2Vrv7imZNli+Xt8npJqzwFe778KaeMK+0RZNcyP8vJfDuG9Pwo81pbW+r3NAl5Xsk2rWvrDg8zj3rz+0oNYd8BANh/vZzgCWavG4nfzU8753c8GeK2D8msdNNC+1Lb8grx85w7L/5iXb5ifi3TlONfxp7D+ga39py39tJz+jZJtViUdj18G1igp+839vO8r8jpvaktvVSsP6vcwXM3vy9IejIh5+pdJejWp9ds9EXFn+/KIeFnSX0hnf5uS6pPfRDoT+GtE/KMkr9OBQwf9Lvq3ff7/+w7Lr87/Ny9Zdn1EPFmSfi+wA+nA3dJqrnxq5G9yAGeSDn4flvSFiHgup3+YdDbz80JaR5LWJl15PRoRl5escj7p4LuupFUj4tFBlK2TbUkHngsj4j/tCyPiYUn3ARtJWiwiXiyUc0VgV9JZ7nL0tbgdTTrZWZt0RQ9D/yxbLiop04uSppLuna1Aukc3P96a/18YEU+XLD8V+GxhvTkkrU567+uRTlRG5kUjgNGSlomIZ9s2+0dE3FuSTyvt1SXLytwIvBY4VdKRwE1D/EznMZ/vZ2G6m3QFvJukzwGnz+d+PeT9LHdb2YZ0JbUasDgpuLS+j3GDzTx3TdiGdLy9tMNqV5PaHmxOuiBYmxR4HoqIv5Ssfybpnn671n55WvuCiHhU0qXAe0jv64y2Vf7Qz9s4jnTfdH/ghkL6/vn/8f1sO0eVze879S0bm/+vJ2mgnWGl/L/1pf+zw3qDLdNgjM3/r5XU33orlaQ92GHdmfn/4oW0NfL/vw+mUBHxvKRTSAe/PUj3EmCIOwB9n+XUDvlEPpBvRA54g3zdMmPz/wMlHTjAussDjwFI2ov0fpbuZ/1RhcdD+iwLhvJ9DVW/nzPp3hn0tQYFQNKhpIYEi/Xz2qNI1TBFC+u9fBF4PfDe/DdD0t9IVwKnRsS/B/k6wAK9n4UmIp6WtB9pnzoKOErSFNI9stM7nNCVGdJ+JmkN0onhxv2sNqqfZe1WBl6VH780yOPTavl/6fE4ImZImll43ZbV6LuPWaZ0/+0vr+wc0u98L0mHRMS/JL2RFHhviYgb+tl2jgUNZEPxfIf0VheAR+h8VtHS+kD6/cYWQFl3hFba70hncZ3MczVJutQeqqGc7R5HCmT7A6dIGg9sQroSvHUY8l2gM3H6Psub6bt66uRFAElrkW5uQ3qvFwLTWld0ks4iBfKyfWKo5Z2f72uoOpUp2pdL2ppUTf4M6X7HlcAjEfFCXn49qXai7L0vlPcSEQ/m/Wpb0pn924Gd8uMvS9o6IgY1AMICvp/5VdrFKCJOlzSRdBXxLtL72g/YT9KpETFhCHkMdj87iRTEfk9q3HYvMDMiZkvamVQNOJT33npvM0kBoT935f/DdexsKfssOh37iYiXJJ0EfAnYk9TS+4C8eLAn45UGsk6m5f+PRcRHB7nNw/n/azos75TeqqrqdGa/RknaNGAd4Mj5CA5D0TqDfi2pVd+AIuJeSVcA20han/nYAej7LNcqW6h0mtf6PB8ZwuuWaX3XV0XE5wa5za6ks/fvRsTRJcvLRnsY8mdZgX4/50L6w4W09+X/h0XEySXbrLMQyjWgiJhNamU3EebcDvgZqRXeEaT7tYOx0N9PRMyS9DJD+023tn2CFFxOApD0NtIJ696STo6IKwbIftD7maRlgO1I3+8HIqL9RGN+Ri15nHRMmzUfx841O5RzOdJV4ey2RY+QPsvX0Fc9XTS27fWH4njSlf/+kk4j3R75NyXVmJ3U3iE6V01OATaUNNgd+QZSM/bNJZUFrT07bNc6EL+ufYGkN1B+WTwx/3/vIMs2v/6U/+89xO2Oy/8/S3rfzzJvHXVHEXE/qfnwqpLKRujYlXRPakpELGggu5x0pfDuXL8/GMvn//NUleXvbMOSbeb3sxxOrXupu+SDRbuPtK0H/b/3HUj37CoXEQ+TAhike9ctrRPFTt/tkN9PRMwi7TP97S+PAitLWr5k2fYlaaUi4s+ke0Qw9/vqZCj72XKkq6GHS4IYwAc7bNfxM833kP8MLC/pHYMoA6SWmo8Cq0t6c8nyD3TYrrVffrh9gaSVSZ9zkLp8DEmOAZeQqhOPJH1WZw7lPmntgSw7gnTD9xxJG7UvlDRG0sGt5/kNnkb6cn8iaYnCupuTWgCVuTL/n5CrrFrbrErq61B22X0sqcPklyTtJ2muz0zS4pL2yAfVBXE2abzCt0j6vqRF2/LZsFjmgnNJdcz7k86kfjvU+xakDqoAP5I0upDnaqQqEICyq6EhyVVQp5DOvE/LP4C5SNpEUvHH1Dr7myBpqcJ6o0ln0mUHuPn9LIdNREwm/VhHAUcXyyTpLaR9djbpSqel9d73b1t/bVLn/GEn6dD8+2i3c/5fDEqPk97DurlRQ7v5fT+PAKtJ6nT/6ErSb/d/28q+D6nambb0zSS9V9JibelLk/quQed7jEVD2c8eIVUBbpSrWFvrSNJXSd1yyrSucOY5+c6OJAWQUyS9vX2hpJUkfVLS4pDueZO6wEC6N7hsYd2xpL5iZX6a8/lMrmpubbM4aZ9dEjgnIgbzuZVpnZC3amqGUqu0wM3vxw5i3UE1ySX1Dg/SD+FG0iX+haSm+bOBJ9rWX4m+DtPTSFchl5Kab7c+9Hma5JJah7WaQf8hb/MM6cdwHW3N7/M2W9PXI/2BXK7f5fWfyenFjo/9Nk2ncz+jN5LOloK0A59Nqvu+oz2Ptu1aO3MAm8zH91nsEP00fZ06n81p55I7RA/2PfaT11KklqdBam11DX0dg6fS1h+F1Cih1bn0UdL9hfNz2e7Kj4N5RzoY9GfZ6fsoLO844ssQv981Cu9xKql17Z/o6xB7SNv6K9HXVHoqcFb+np7P++u17eVigN8bfc2a5+mQ32H9f5F+fzfn/M8sfIb/Asa3rX9hXnY76aTlBGDC/L6fvN3Pc/p9wG/yax5SWP4G0v3rIPWF/F0u40ukkYHam9+/n75jwGWkk+LWaC5BuvpYZJCfz1D2s6/Q1zXiT/n7n5zL+YP2chb2mefzNheSTrhPYO7+tgcX9qHb6fuN3EK6ogvm7p5S7BD9RP68/kCqzjuHVEPzXMl7LXaIvpT0u30wp/2dzh2iS39XbeuOpK9j/K1DPoYNdYOc6UIPZHndd+QP9aH8BUzPX8YxlHRSJDW9Po7043iedGD7LB2GqMrbLEY68E/NeUwFvk1qzt/fEFWrkYZ0uZO+IZwmkw7ye7ftKPMVyPKyVfJOfW9+TzNIP85vt+8ohW22y69XOtLHIL/TRYHPkIYe+nf+uwH4BOXDRs1XICvstB8lBa8n8/fwEGn0l69SGLUgr7886eSkNTzYVNIV4nKkA9s8gWwon+VAP7j+9ov5+H5XIh1c7yNVj88gXal1GqJqdeDXpAPG86QDxjdIAb6s3+PCDmQTSAf6e0gH/n+Rmq//lJLhwUhNu39DOri3RgQ5YX7fT95mFOmsv9VpeJ73Rxqc4LJcvmfz47eU7aek3/L/kILJA7kcj5EC6ScoDGAwyM9o0L9ZUhXyjbmcT5KC01Zl5SxssxOpyq41MkvZidsmpBOH1jBiM0jB9IS8fftoOaNItS0P5PXvAw4nBbkXSd2lyt7rrvlzezpvNxn4LrmP72B/Bx1e+9d5/dKRPvr7U36BVxT12NQPkn5Bauixf0ScUHd5zKyZcjX31cAFEfHuCvN9FelkdjHg1RHxzFC275Z7ZDafcmOXj5CqRX5bc3HMrAHyvej2+/3r0tcZ+jcVF+lgUg3Lr4caxKA7mt/bfJD0RVLLqneRqgO+EoMYycPMjHR/bllJt5NOgtcAxpOuiM4l3b8cVrnB1rdJ1dE7kW5nfGt+XsuBrLneTapbfxj4Omm4KjOzwfgJqcn/RqR70P8hNeg5FfhFVHPPaVlgX9K9tptJI0UNqnN9u1fkPTIzM+sdvkdmZmaN9oqrWlxppZVi7NixdRfDzKxRbrzxxiciYvTAa3afV1wgGzt2LJMmTaq7GGZmjSKp08j2Xc9Vi2Zm1mgOZGZm1mgOZGZm1mgOZGZm1mgOZGZm1miDCmSSlpN0tqR7JN0t6c2SVpA0UdLk/H/5vK4kHSNpiqTbJG1aeJ0Jef3JkiYU0jeTdHve5pg8KzGd8jAzM2sZ7BXZ0cDFEbEeaUiTu4HDgMsiYhxpyoTD8ro7AePy3wHkQSglrUCaJmAL0kyghxcC07F53dZ2O+b0TnmYmZkBgwhkkpYhzZp6IqTptSPiaWA30vw35P+758e7AadGci2wXJ5peAdgYkQ8FREzgInAjnnZMhHxtzy+16ltr1WWh5mZGTC4DtFrkya4/JWkjUiTwn2GNGHcIwAR8Uhh2vrVmXua8Gk5rb/0aSXp9JPHfBt72B8X9CWY+p1dFvg1zMxs4RhM1eIiwKbAsRGxCWmo/f6q+FSSFvORPmiSDpA0SdKk6dOnD2VTMzNruMEEsmnAtIi4Lj8/mxTYHsvVguT/jxfWX6Ow/RjSVCP9pY8pSaefPOYSEcdHxPiIGD96dCOHCjMzs/k0YCCLiEeBByW9LidtB9wFnA+0Wh5OAM7Lj88H9s6tF7cEnsnVg5cA20taPjfy2B64JC+bKWnL3Fpx77bXKsvDzMwMGPygwZ8CTpO0GHA/sA8pCJ4laV/gAWCPvO6FwM7AFOC5vC4R8ZSkI4Ab8nrfiIin8uODgJNJMx1flP8AvtMhDzMzM2CQgSwibiFNg91uu5J1Azi4w+ucBJxUkj4J2KAk/cmyPMzMzFo8soeZmTWaA5mZmTWaA5mZmTWaA5mZmTWaA5mZmTWaA5mZmTWaA5mZmTWaA5mZmTWaA5mZmTWaA5mZmTWaA5mZmTWaA5mZmTWaA5mZmTWaA5mZmTWaA5mZmTWaA5mZmTWaA5mZmTWaA5mZmTWaA5mZmTWaA5mZmTWaA5mZmTWaA5mZmTWaA5mZmTWaA5mZmTWaA5mZmTWaA5mZmTXaoAKZpKmSbpd0i6RJOW0FSRMlTc7/l8/pknSMpCmSbpO0aeF1JuT1J0uaUEjfLL/+lLyt+svDzMysZShXZNtExMYRMT4/Pwy4LCLGAZfl5wA7AePy3wHAsZCCEnA4sAWwOXB4ITAdm9dtbbfjAHmYmZkBC1a1uBtwSn58CrB7If3USK4FlpO0GrADMDEinoqIGcBEYMe8bJmI+FtEBHBq22uV5WFmZgYMPpAFcKmkGyUdkNNWiYhHAPL/lXP66sCDhW2n5bT+0qeVpPeXh5mZGQCLDHK9rSPiYUkrAxMl3dPPuipJi/lIH7QcXA8AWHPNNYeyqZmZNdygrsgi4uH8/3HgXNI9rsdytSD5/+N59WnAGoXNxwAPD5A+piSdfvJoL9/xETE+IsaPHj16MG/JzMxeIQYMZJKWkjSq9RjYHrgDOB9otTycAJyXH58P7J1bL24JPJOrBS8Btpe0fG7ksT1wSV42U9KWubXi3m2vVZaHmZkZMLiqxVWAc3OL+EWA30bExZJuAM6StC/wALBHXv9CYGdgCvAcsA9ARDwl6QjghrzeNyLiqfz4IOBkYEngovwH8J0OeZiZmQGDCGQRcT+wUUn6k8B2JekBHNzhtU4CTipJnwRsMNg8zMzMWjyyh5mZNZoDmZmZNZoDmZmZNZoDmZmZNZoDmZmZNZoDmZmZNZoDmZmZNZoDmZmZNZoDmZmZNZoDmZmZNZoDmZmZNZoDmZmZNZoDmZmZNZoDmZmZNZoDmZmZNZoDmZmZNZoDmZmZNZoDmZmZNZoDmZmZNZoDmZmZNZoDmZmZNZoDmZmZNZoDmZmZNZoDmZmZNZoDmZmZNdqgA5mkkZJulnRBfr6WpOskTZZ0pqTFcvri+fmUvHxs4TW+lNPvlbRDIX3HnDZF0mGF9NI8zMzMWoZyRfYZ4O7C8+8CP4qIccAMYN+cvi8wIyLWBX6U10PS+sCewBuAHYGf5+A4EvgZsBOwPrBXXre/PMzMzIBBBjJJY4BdgBPycwHbAmfnVU4Bds+Pd8vPycu3y+vvBpwRES9ExD+AKcDm+W9KRNwfES8CZwC7DZCHmZkZMPgrsh8D/w28nJ+vCDwdEbPy82nA6vnx6sCDAHn5M3n9Oelt23RK7y8PMzMzYBCBTNKuwOMRcWMxuWTVGGDZwkovK+MBkiZJmjR9+vSyVczM7BVqMFdkWwPvkTSVVO23LekKbTlJi+R1xgAP58fTgDUA8vJlgaeK6W3bdEp/op885hIRx0fE+IgYP3r06EG8JTMze6UYMJBFxJciYkxEjCU11rg8Ij4MXAG8P682ATgvPz4/PycvvzwiIqfvmVs1rgWMA64HbgDG5RaKi+U8zs/bdMrDzMwMWLB+ZF8EDpE0hXQ/68ScfiKwYk4/BDgMICLuBM4C7gIuBg6OiNn5HtgngUtIrSLPyuv2l4eZmRkAiwy8Sp+IuBK4Mj++n9TisH2d54E9Omx/JHBkSfqFwIUl6aV5mJmZtXhkDzMzazQHMjMzazQHMjMzazQHMjMzazQHMjMzazQHMjMzazQHMjMzazQHMjMzazQHMjMzazQHMjMzazQHMjMzazQHMjMzazQHMjMzazQHMjMzazQHMjMzazQHMjMzazQHMjMzazQHMjMzazQHMjMzazQHMjMzazQHMjMzazQHMjMzazQHMjMzazQHMjMzazQHMjMza7QBA5mkJSRdL+lWSXdK+npOX0vSdZImSzpT0mI5ffH8fEpePrbwWl/K6fdK2qGQvmNOmyLpsEJ6aR5mZmYtg7kiewHYNiI2AjYGdpS0JfBd4EcRMQ6YAeyb198XmBER6wI/yushaX1gT+ANwI7AzyWNlDQS+BmwE7A+sFdel37yMDMzAwYRyCL5V366aP4LYFvg7Jx+CrB7frxbfk5evp0k5fQzIuKFiPgHMAXYPP9NiYj7I+JF4Axgt7xNpzzMzMyAQd4jy1dOtwCPAxOB+4CnI2JWXmUasHp+vDrwIEBe/gywYjG9bZtO6Sv2k4eZmRkwyEAWEbMjYmNgDOkK6vVlq+X/6rBsYaXPQ9IBkiZJmjR9+vSyVczM7BVqSK0WI+Jp4EpgS2A5SYvkRWOAh/PjacAaAHn5ssBTxfS2bTqlP9FPHu3lOj4ixkfE+NGjRw/lLZmZWcMNptXiaEnL5cdLAu8E7gauAN6fV5sAnJcfn5+fk5dfHhGR0/fMrRrXAsYB1wM3AONyC8XFSA1Czs/bdMrDzMwMgEUGXoXVgFNy68IRwFkRcYGku4AzJH0TuBk4Ma9/IvBrSVNIV2J7AkTEnZLOAu4CZgEHR8RsAEmfBC4BRgInRcSd+bW+2CEPMzMzYBCBLCJuAzYpSb+fdL+sPf15YI8Or3UkcGRJ+oXAhYPNw8zMrMUje5iZWaM5kJmZWaM5kJmZWaM5kJmZWaM5kJmZWaM5kJmZWaM5kJmZWaM5kJmZWaM5kJmZWaM5kJmZWaM5kJmZWaM5kJmZWaM5kJmZWaM5kJmZWaM5kJmZWaM5kJmZWaM5kJmZWaM5kJmZWaM5kJmZWaM5kJmZWaM5kJmZWaM5kJmZWaM5kJmZWaM5kJmZWaM5kJmZWaM5kJmZWaMNGMgkrSHpCkl3S7pT0mdy+gqSJkqanP8vn9Ml6RhJUyTdJmnTwmtNyOtPljShkL6ZpNvzNsdIUn95mJmZtSwyiHVmAYdGxE2SRgE3SpoIfBS4LCK+I+kw4DDgi8BOwLj8twVwLLCFpBWAw4HxQOTXOT8iZuR1DgCuBS4EdgQuyq9ZlkfzfW3ZBdz+mYVTDjOzhhvwiiwiHomIm/LjmcDdwOrAbsApebVTgN3z492AUyO5FlhO0mrADsDEiHgqB6+JwI552TIR8beICODUttcqy8PMzAwY4j0ySWOBTYDrgFUi4hFIwQ5YOa+2OvBgYbNpOa2/9Gkl6fSTh5mZGTCEQCZpaeD3wGcj4tn+Vi1Ji/lIHzRJB0iaJGnS9OnTh7KpmZk13KACmaRFSUHstIg4Jyc/lqsFyf8fz+nTgDUKm48BHh4gfUxJen95zCUijo+I8RExfvTo0YN5S2Zm9goxmFaLAk4E7o6IowqLzgdaLQ8nAOcV0vfOrRe3BJ7J1YKXANtLWj63PtweuCQvmylpy5zX3m2vVZaHmZkZMLhWi1sDHwFul3RLTvsy8B3gLEn7Ag8Ae+RlFwI7A1OA54B9ACLiKUlHADfk9b4REU/lxwcBJwNLklorXpTTO+VhZmYGDCKQRcQ1lN/HAtiuZP0ADu7wWicBJ5WkTwI2KEl/siwPMzOzFo/sYWZmjeZAZmZmjeZAZmZmjeZAZmZmjeZAZmZmjeZAZmZmjeZAZmZmjeZAZmZmjeZAZmZmjeZAZmZmjeZAZmZmjeZAZmZmjeZAZmZmjeZAZmZmjeZAZmZmjeZAZmZmjeZAZmZmjeZAZmZmjeZAZmZmjeZAZmZmjeZAZmZmjeZAZmZmjeZAZmZmjeZAZmZmjeZAZmZmjTZgIJN0kqTHJd1RSFtB0kRJk/P/5XO6JB0jaYqk2yRtWthmQl5/sqQJhfTNJN2etzlGkvrLw8zMrGgwV2QnAzu2pR0GXBYR44DL8nOAnYBx+e8A4FhIQQk4HNgC2Bw4vBCYjs3rtrbbcYA8zMzM5hgwkEXEn4Gn2pJ3A07Jj08Bdi+knxrJtcByklYDdgAmRsRTETEDmAjsmJctExF/i4gATm17rbI8zMzM5pjfe2SrRMQjAPn/yjl9deDBwnrTclrqWpOsAAAgAElEQVR/6dNK0vvLw8zMbI6F3dhDJWkxH+lDy1Q6QNIkSZOmT58+1M3NzKzB5jeQPZarBcn/H8/p04A1CuuNAR4eIH1MSXp/ecwjIo6PiPERMX706NHz+ZbMzKyJ5jeQnQ+0Wh5OAM4rpO+dWy9uCTyTqwUvAbaXtHxu5LE9cEleNlPSlrm14t5tr1WWh5mZ2RyLDLSCpNOBdwArSZpGan34HeAsSfsCDwB75NUvBHYGpgDPAfsARMRTko4AbsjrfSMiWg1IDiK1jFwSuCj/0U8eZmZmcwwYyCJirw6LtitZN4CDO7zOScBJJemTgA1K0p8sy8PMzKzII3uYmVmjOZCZmVmjOZCZmVmjOZCZmVmjOZCZmVmjOZCZmVmjOZCZmVmjOZCZmVmjOZCZmVmjOZCZmVmjOZCZmVmjOZCZmVmjOZCZmVmjOZCZmVmjDTiNi71ybXjKhgv8GrdPuH0hlMTMbP75iszMzBrNgczMzBrNgczMzBrNgczMzBrNgczMzBrNgczMzBrNgczMzBrNgczMzBrNgczMzBrNgczMzBrNgczMzBqt68dalLQjcDQwEjghIr5Tc5FsIbt7vdcv0Pavv+fuhVQSM2uirg5kkkYCPwPeBUwDbpB0fkTcVW/J7JXmZwdevsCvcfBx2y7wa/zwg7su0PaHnnnBApfBrGm6vWpxc2BKRNwfES8CZwC71VwmMzPrIl19RQasDjxYeD4N2KKmspj1hGmHXb3ArzHmO29d4Nf42te+Vuv2AJddvs4Cv8Z22963wK+x6hW3LND2j26z8QKXoZspIuouQ0eS9gB2iIj98vOPAJtHxKfa1jsAOCA/fR1w7wJmvRLwxAK+xoLqhjJAd5TDZejTDeXohjJAd5SjG8oAC6ccr4mI0QujMFXr9iuyacAahedjgIfbV4qI44HjF1amkiZFxPiF9XpNLUO3lMNl6K5ydEMZuqUc3VCGbipHXbr9HtkNwDhJa0laDNgTOL/mMpmZWRfp6iuyiJgl6ZPAJaTm9ydFxJ01F8vMzLpIVwcygIi4ELiw4mwXWjXlAuiGMkB3lMNl6NMN5eiGMkB3lKMbygDdU45adHVjDzMzs4F0+z0yMzOzfjmQGQCSvpv/71F3WcysnKT35f9r1l2WbuKqxZq1dsxOIuKcispxO7ApcF1EbFpFnh3KsQSwK/BW4NXAf4A7gD/2UkMfSX8AOv44I+I9FZZlBLARfd/HnRHxWIX5L9Pf8oh4tqqyAEj6TEQcPVDaMOV9U0Rs2vo/3Pk1hQMZ6WokIr44UNow5f2r/HBlYCugNejfNsCVEdFvoFuI5fg+qVP5UsBzxUVARES/B5OFVIavAe8GrgRuBB4HlgBeS/o8lgAOjYjbhrkctZ9cSHp7fvg+YFXgN/n5XsDUiPhyBWVYB/gi8E5gMjCdvu/jOeAXwCkR8fIwl+NBUlAXKZjOzI+XBh6KiEqvTsqCiKSbI2KTCvK+HJgNjAeuaF9e1fGi2ziQ0XHHvC0i3lhhGS4A9o+IR/Lz1YCfVRjIFo+IFySdFxG1jGcpaZeI+GM/y1cG1oyIScNcjq44uchl+XNEvG2gtGHK+3TgWODqaDtQ5O/iQ8CMiDhluMuS8/w5cHFEnJ+fvxt4W0R8oaL89yK957cAxXG8RgGzI+KdFZRhCVIQ+xVwYPvyiLhsuMvQjbq++f1wknQQ8AlgbUnFs/xRwF8qLs7YVhDLHiOd+Vblb6SqxUqraYrKgliu1lo6Ip6NiMdJV2nDXY59ct4XAOu3n1wMd/5tRktaOyLuz2VYC6hkGKGI2KufZY8DP66iHAWbR8QnCmX4g6TDK8z/r8AjpOGgflhInwkMay1BwXER8VFJp/Zq0CrT04EM+C1wEfBt4LBC+syIeKrislwp6RLgdFI1yp6UVB0Mo8UkTQC2Kqtaq+peHYCk35LONmeTqhiXlXRURHy/qjJkdZ9cAHyOtG/c3yoTfeOKViI3ALo4ImZK+grphOebEXFTleUAnpJ0GKmaNYD/AmZUlXlE/BP4J/DmqvIssbmk1YH3S/oxqYp1jqrvF3YLVy1mee6zVSgE94h4oOIyvI/UyAHgzxFxboV5vwX4MPAB5h0GLCLiYxWW5ZaI2FjSh4HNSPdpbqyyqjeX46fAOOY+uZjSPmh1BeVYHFgvP70nIl6oOP/bIuKNeR/5NvAD4MsRUelMFJJWAr4OtKpV/wwcHhGVDNoraSblDXCqvI98CHAQsCbz1k5E1fcLu4UDGZCHwfoa6Yy7deM6qj5wdgNJ+0bEiTWX4U5gY9IV808j4ipJt0bERjWU5b0UDpxVnlzk/BclHbhaZbgS+EVEvFRhGW6OiE0kfRu4PSJ+W1XjBisn6ZcRsX/d5egWvV612PJZ4HUR8WTVGUu6JiLeUnK2V9lZXqEsKwOvkXR2LstdpAYnw35fqs0vgKnArcCfJb2G+u7d3USqav6TpFdJGhURMyvM/1hgUeDn+flHctp+FZbhIUm/ILVe/G6+QqysD6qkH0bEoZLOpeSKqOqWep36cFVcg3OqpANJn8edEXFNhXl3HV+RAZKuAN4VEbPqLktdJG1NugI6mXRfSqR7IROAD0dEZY1fJI2MiNmF5wJGVv39SNqfdD9qhYhYR9I40s327SoswzxXolVfnUp6FbAj6Wpscm70smFEXFpR/ptHxPWSSj/3qhs95D6XLUsAawH3RsQbKsh7NeD3pABW/J2OAN7Xdk+3ZziQAZJOJE3I+Udgzv2HiDiqhrKsTPpxtMpQyVmepGuBgyLi5rb0jUlVWZXdD5H0D+B3wK8i4u6q8i0pxy3A5qRO4pvktNsjYsMKy3ATsEdE3Jefrw2cXWVnWEk/IH0XPdMhfSgkbQp8PCI+XkFe5wAXRsQJbekfA94TEbsPdxm6kasWkwfy32L5r3KS3kNq0vtq0k3c1wB3A8N+lpct0x7EACLiFkmjKipDyxtJDStOzM3vTwLOqKFF1gsR8WK6IARJi9DPaBvD5AvAFbnVokj7xT4Vl+Ee4Pj8/n8FnB4Rz1RchlYH7SOB9Zn7ZK/qlqRziYibJL2pouzeUFaVGhEn5RadPclXZAWSloqIf9eU963AtsCf8o31bYC9IqKSptaS7ga2iogZbekrAH+NiPXKtxz2cr2N1GpwOeBs4IiImFJR3t8Dngb2Bj5F6nN4V0T8TxX5F8qxOKnGQNTQarFQjteRguhepH6Wv4yIyrqISLoa+Cap1eTuuSwvR8T/VlWGXI5DCk9HkKr2VoyIHSrIe0pErFuSLmBy2bJe4EGDAUlvlnQX6QoISRvlUQSq9FJubDJC0oh8gNi4wvx/BFwq6e2SRuW/d5D62f2ownIgaaSk9+Sb+0eTrlTXBv5AtXPTHUYalul24OM5769UkbGkbfP/9wG7AOsC6wC7lPXzq6A8I0ldANYDniA1xDlE0hkVFuNVEXEJQETcFxFfIY22UrVRhb/FSbckqhoN50JJx0laspWQ72H+DLi4ojJ0HVctJj8GdiD3n4qIW/OVQJWelrQ0qW/MaZIeBypr3BARx0t6GDiCVJ3ZarX4zYj4Q1XlyCaTOoN/PyL+Wkg/u8rvJdIYgr/Mf1V7O2lorHeXLAugyg7qRwHvAS4DvhUR1+dF35V0b1XlAF7IVx735RZ7D5GGEatURHy96jwLPg98D3ggVzcH6STvt6T+lj3JVYuApOsiYoti35gaWoYtRRpZfASpY/KywGl1dAmom6SlI+JfXVCOf1De3HvtivIfAbw/Is6qIr9+yvEx0j3K50qWLVvV/TJJW5BOrpYn3StbBvhelS1qczlGA/9NOuEr3qvbtsIyLE3qrC/g793we6mTr8iSByVtBYSkxYBPk6sZqyBpd1LV0e256qSSQVi72CxJBzPvgaKy0UWy8YXHSwB7ACtUlXlEvJw769cayHJDguUlbcDc38efKwxiK5BaFCu35P1IFfl2cBpwJmm6oQNJXVSmV1mAHLjmaZzVq3yPLDkQOBhYHZhGujd1cBUZ53txnwNWBI6Q9NUq8u1yvyZNXbIDcBUwhjQwa6Ui4snC30MR8WNSg5wqTZT0eUlrSFqh9VdlASTtR6ryvoQ0RNQlpJFwqsp/H+BeUhXvZEm7VpV3Byvm0W9eioir8gnWljWXqaf1/BVZvon9kYj4cE1FeBuwUUTMzjdtrybdp+pl60bEHpJ2i4hTlAYRvqTqQuT+QS0jSFdoVXdFaF2FFk+sWvdFqvIZ4E3AtRGxjaT1SAGtKp8HNoiIxyStSzrRuaDC/Nu1hgd7RNIuwMOkky2rSc8HshxAdqPilnkFL7ZGsYiI59TqtFSxtibF86i4c3jrQPF0rs56lDTqe9WKU3XMIg2b9YEqCxARa1WZXwfPR8Tzklrz1t2Tm+JX5YXIM1JHxJRc/V+nb0paFjgU+AnpXt3nqshYUr/jv8YwTzrbrXo+kGV/URrp/ExgTj+yqGaaivXUNxeagHXy89ZYi1UNXNy60ngd6ey7NQL+u0nVSlU6XtLywFdzOZYGKu0rBBARdTTtnku+Sj+ENKHoAUrDZL0uIqq8IpkmaTng/0hVnTNIVyFVGZNbTrasUXweEf2ehC0s6ps1fsl8b/AZqm/+35oPb3FgE+BO0rHiDcAN1DvFTG3capE5Yy22iypaISkNiNtRpDmQKiPpUuD/RR4YN4/q8buI2LHKcnQDSZ8hjWQxk3R/ZlPgsKrGGMxlOJM0pt7eEbFB7j/0t4ioso9hsTxvJ7WovTgiXqwoz337Wx4VzdagNMbipqQhyyobIqxDWU4HvhsRt+TnGwGfqaFBVFfo+Suy3MT52LqaOFcdqAZhTaB4gHqRiqr1uqx6E+BjEXG0pB1I/ZX2IQW2ygIZsE5EfFDSXgAR8Z+qqp87NCppDZi7NFDJ5LNVBapBuJjUGXwpSc+Sa02g+pkqgNe3ghjM6ftaa3CtU88Hsm5p4txFfg1cr74pM94LnFpR3t1UvQl9s+/uTBo099Ya7mG+mK/CAuaMN1jVEFU30negXpM0G7NIw4U9QBr1vWdExBeAL0g6LyKqGsmjk79LOo65Z8v+e71Fqo+rFoHc5P0/zHuPrJIzzm6Tz+yKM1VX2l+lW6o3Jf2K1CVjLWAjYCRwZURsVmEZtgf+hzRQ7qXA1sBHI+LKCstwHHB+RFyYn+8EvDMiDq2qDN0m3xIYF2meuiWBRaLCeepynp9k7tmyfxoR/6mqDN3EgYw5Izi0i6pGcMhl2JU0PcPLA648/GV5C+lH+qs8isHSEVH2GQ1X/veQuiS8kJ8vDtxa9cDFudp5Y+D+iHg6V7WNqbplmKQVSf2URGoC/0TF+d/YHrwlTYqI8Z22GaZyLBcRT1eZZ4dy1D5PXS7HYqRGQJUMot3Ner5qEbqmifOewNGSfk+N83BJOpzUX+p1pPtBi5KqL7ausBhl1Zt1jHbyZuCWiPi3pP8i3eg/uoqMleal+zJ5xBfg21H9NDYtT0j6CnNXY9UxdNqNkq4n/T6qvE/Z7mDyPHUAkSYbrXTMx3zi+0PStFNrKc0beHhEvLfKcnQLX5EBkvYuS4+Iqu4NtcqxDGmKjH1IB4zW3E9VVlncQmrWe1Nh3MnbKuwG0CpHrdWbuQy3kaoU30gKrieSZuF9ewV5X0y6R/Vn0lBIoyLio8Odb4eyrAAcTqrGilymb1Rd9Z6vkHcgdRLfmDS9zymRJx2tsBxzjc2qNE/bTVX+RiTdCGwHXBE1TfraTXxFlhQnxVuCtIPcRHWNHACIiGfzFdmSwGdJVyJfkHRMRPykomK8GBEhqdW4YKmK8p1L7sNXRT++/szKn8VuwNERcaKkCRXlvWr0zXt2idJM0bXIAeszdeVfKMfLpGmFLlKaYug04HP5Ku1L0Tcq/3C7StKXgSUlvYs0T13VM0S8lKu7i2k9e1XiQAZExKeKz3Ov/V9XWQZJ7yadaa6T8948Ih7PHWLvJo0gUIWzJP0CWC7fC/gY9Uxj0g1mSvoSqSrtbUrDmS1aUd7KncJbR6qRxee92BApd8r+MGmi0xmk0TTOBTYjNdSq6hbBYcC+zD1P3QkV5d1yt6QPkOYvXIt0onFtxWXoGq5aLCFpUeC2iHh9hXmeCpwQEfM0M5e0XURcVmFZ3gVsTzpoXhIRE6vKu5tIWhX4EHBDRFwtaU3gHVVUOUuaCrxMXyArqrQhUreQNJk079ZJ7f0vJX05Ir5VYVlGA0REpaPeF/JfijTazZzfKfD1KJlqpxc4kAGS/kDfZfkIUlPnsyLisPpK1bskrUJq9h7Aw61x9qy3Kc2cXlur3tyH8HBSs3flv9nATyLiG3WVy3o8kCmNpL0Kc1exziL1F3qoipvIkmYyd912naMFlJUH0phyk4BDI+L+Ycx7Y+A40hBID+XkMcDTwCeimrEvO30GUNN3UpfciGFf0r3aV5NPLIDzgBMj4qV+Nl+Y5Wi1Xi0VEe+rqByfI3WOP6DVHUXS2sCxpCG7Kht4vMNn0vqd/rKq4cO6Ra8HsguAL7f3C5I0ntSUtWya+Vc0SV8nHax+Szpw70maG+xe4KCIeMcw5n0L8PGIuK4tfUvgF1HhjN02Zzy/p0ldH6bl5DGkiSRXiIgPVlSOfvtnVVXtLulm4F3t/fhyNeOlrdaDFZXlGNLv8vSc9EHSyd/SwBIRUVWjpK7Q64HsjojYoMOySpqydhjPbo4amjhfFxFbtKVdGxFbSrp1OIOJpMkRMa7DsikRse5w5W3zknRvRJRO1yLp7xHx2qrLVKcBjhcdlw1TWa4qdgPJ1Z5XRcTbJN0VEetXVZZu0OutFpfoZ9mSFZWhOJ5du6onUAR4ObeGOjs/f39beYbTRZL+SOr28GBOW4PUSu3iYc67a9U40soMSXsAv2/dm8p9ufYgtRqsRL4S6q9qsarBcvurrqu6Km8VSWMionWl/GpgdH5c1VicXaPXr8hOBy6PiF+2pe8LbF9V1Uk3yXX+R5NGtQhSk97PkaotNouIa4Y5/52A3UiNPUSq0pozzl+vKY60EhGvlfRq0riTwz7SiqSxwHeBbZl7wODLSdPZVDJsmdJAyR1V1SFa0mwKY7EWF5Gq86rqmoGk95DmJrsn5/9aUiOUy0i3AH5QVVm6Qa8HslVI/VBeJF0ZQTpoLAa8NyIerbAsbytLL2uOP4xlGAl8usqb1ta/LhppZUXS8aLScR5tXvmq+E3AbaQW1gLujB4dMBh6PJC1SNoGaNVv3xkRl9dQhuLIAEuQxnK7MSqY3LOtHFcOZ4OOAfIeCexHalBwUUT8tbDsKxHxzTrKVSdJ10fE5pJuiohNc/+hv1UVyCRtTmqpeYOk9YEdgbsj4qIq8m8rS7E16SKk1sUv9Eor0qLWfeu6y9EtHMi6lKQ1gO9FxF4V53skqfl7+5Q2w970XdIJwKuA64GPkG5eH5KX3VThvZCuIenzwDjgXcC3SSOt/LaKIctyteZOpKAxEdgCuBJ4J6mj/JHDXYZ+yjYCeB9ploSv1lWOukg6ApgUEefVXZZu4EDWpXIrpNuqHgRU0hUlyVHFlWGxyiz3Yfo5sBJpIOVrq2ze3E3qGmlF0u2kwXkXBx4lTWHzrNJcWNdVXb1ZplevTCTNIJ1wvkCaS7HVx7HfVtCvVL3earFrSPoJc48usjFwa9XliIhtqs6zYLFCOWYBB0j6X1LjgqVrK1WN8jh6V7eCl6QlJY2NiKkVZD8rImYDz0m6L/I0MhHxH0mVj7CRGzi0jCDdz656xu5usVLdBegmDmTdY1Lh8SzS9C1/qaMgknYB3kChe0JFQ/BMkrRjRMxpah8R35D0MGn0hF70O2CrwvPZOe1N5asvVC9KelUev2/OxJpKg2rXMVTUHoXHs4CppBauPSciZufvYR3m7kb01w6bvKK5arFmktaMiAfqLkeL0rT2rwK2IY3o/X7g+ojYt9aC9ShJt0TExm1pw9oxvZDP4pFn6W5LXwlYLSJuH+4yWLncRegQUjeV20knNtfW1VCrbiPqLoDxf60HSnOR1W2riNgbmBERXyf1J1uj5jK17hP1ounFKjWludEqaQLfIYgdEBFPVBnEJF1UePzfVeXb5T5LqlqdGhFvJV0xP1JvkerjQFa/Yh1/N0zN0eqL8lzufPsS1c3z1J8T6y5ATQ4EvizpAUkPAl8kzYFVZ3mqtmrh8Z415N+Nnm/1G5O0WETcCaxXc5lq43tk9YsOj+tygdIEht8nzdAcVDRpoKTzOy0CVqyiDN0mj1qxpaSlSbcCZtZcpDoaV3TD76LbPJJ/p38gzSD+FNCz0x35HlnNCsPeiDS+Y2tivNqnDJG0OGnonWcqym8GaTbmf7UvAs6MiFWqKEe3qbHxTVlZiuP7VZXn06SWqyLdu51rwIKoaBqXbpVnB1gW+GNZdXAv8BVZzSJiZN1laCdpK2Asef+QRFQwKzJpXMfnIuKqkjLdW0H+XadT45uK8t6CNIpHq+/YYcCmku4CvlXVCQ7w/wqPf1pRnl0v9zUdDdydk1YkTcHUc3xFZnOR9GtSk95bSE29IV0Zfrq+UvWuVifxwv+lgXMiYvsK8r6TNHLGLEnHk2oLzga2y+k9fSVUJ0mfAL4BPElfV4jotelbWnxFZu3GA+tHl5zhSNo1Ii6ouxw1ej7/bzW+eZLqGt+MyB3TAcYXhgi7Jg9mXLn2MTd7dQxOUtP710fE9LoL0g3catHa3cHcrcTqVsu9oC7yh7bGN1PpmxV4uN0haZ/8+FalmdOR9FpSa9Y63DHA814xDah00t1u5qpFA+aMvh/AKNLwWNdTmKAvIt7TYdPhLtfNPTzG4ghgy9YsADU0vlmWNDfdW0l91zYlTXj6IGm6n8qHUOt1klpV/G8kDSZ9AXP/To+po1x1c9WitXTrRHx19pmqVUS8LOmHpE7prQ7KlbVKywHzo5JGkfo4LgJMi4hamnlL+jZpBoDngD+STrg+FxG/raM8NWnNAv1I/uu5KWzK+IrMAJC0LrBK+/iOecLPh6qahbcTSe+qatT3biLp66QJFM/plvuWAJKWjoj2bhLDnectEbGxpN1JLRk/B1xWxXBd3ULSEsDS7ROc5mHDZvZq83vfI7OWHwNlnW2fy8vq1qsjexxCGiT4BUnPSpop6dm6CwXcVUOerRqknUmDaj9B73WW/jGpK0a7nYGjKi5L13DVorWMjYjb2hMjYpKksVUUwCN7zCsiRtWVt6RDOi2inml1LpJ0B6lbyMH5KqTXrkDeFhFlw4T9mjR8WU9yILOWJfpZtmRFZXgrnUf22LyiMnQFSSOBJVvVd5K2pG++tpsrGqrqW6TWkrNKllVemxMRX5D0feCp3LftedIs0b2kdIiwiIjcQbonOZBZyw2S9o+IXxYT83QRN1ZUBo/s0ee7wOPA9/Lz00lNzZcgNcOv4uz7JuD/ImKe71/SfhXk357nhwqPi4t6qbHHE5I2a/9OJG1KDzfHd2MPA0DSKsC5wIv0Ba7xpKuA90bEo3WVrRdJuhl4U6tDcqsbQj7rvjoi3lJBGV4HPNnesCAvW6Xq1ouSipOrLgFsC9zYSyOM5CvzM0jDlRV/px8DPhQRf6urbHVyILO5SNoG2CA/vTMiLu9v/QrKs0JE9NyZZvvkmZK2j4hL8+N5JtvsRZKWB06OiJ6aJVrSqsCnKPxOgZ9ERM/OR+ZAZl1D0takM82XSWeY3ySN+7go8IFeOtuUdDewefu9sNxJ+bqIGPa5p/L4ij8pm0RT0lLAB4EXIuK04S5LGUmLALdHxOvryN+6h++RWTf5EfABUou4PwK7R8Q1uf7/J8DWdRauYr8EzpR0YEQ8ACDpNcCxeVkVfg58VdKGpPtz00lVeuNIHXFPAioLYpLOpa+5/QjS1DbnVZV/t/G4k30cyKybLNo6+5c0PSKuAYiIm/I0Ij0jIo6S9BxpgN6lSAfwfwPfiYhj+996oZXhFuADecT98cBqpBnE746IOhrfFKdwmQX8MyKm1lCObuFxJzNXLVrXKN4XkrR7RPxfYdkdEbFB561fubpoduhaSfpWRHx5oDTrPR7Zw7rJVyW9CqAtiK0DVDGxZ1eKiH/1ehDLdixJ26XyUnQBSd+WtIykRSRdIumxYveEXuMrMjPrapI+DhwIvBYoVmmOIjW/37OWgtXI407OzffIrGt0eyu5XidpqYj4dw1ZnwVcRhr5/rBC+syIeLyG8nSDecadlNSzVyW+IrOuIWlj4MtAf63kjuu1Eb4lbQWMpXDiGRGVVbXm/E8gjbq+pqSNgI9HxCeqKkNbeVagMKRaRDxcRznqlIfq2ok07uR4YFngjxGxRa0Fq4kDmXWdLmolVztJvyb1pbuFdNCCNLTepztvtdDLcB3wfuD81iSndTS+kbQzafT3McCTwKuByVX0qetGklamb9zJpYFlI+KhustVB1ctWtfJA+VeWXc5usR4YP265yKLiAfbxjec3WndYfQtUl/CS/NwXe8i3R/qOR53cm4OZGbd7Q5gVdJswHV5MFcvhqTFgE8Dd9dQjlkRMV3SCEmKiImSjqyhHN3grYXHc8adxIHMzLrQSsBdkq6nMPdWRLynwjIcCBwNrA5MAy4F6rg/9kxu9HMNcKqkx0nDmfWciDio+Lw17mQ9pamf75FZ16qxlVzXkPT2svSyqW6GsQxbR8RfBkqroByjSDOWjwD2JjVwOLVsdP5e0+vjTjqQWdfptlZyvU7STRGx6UBpFZTDI3tkncadjIjP11eq+jiQWdfpllZydZI0k74D1VyLSK0Wl6mgDG8GtgI+SxrQuWUZ0hx1lXa+7RBQb626HN1A0naFpz0/7qTvkVlX6pJWcrWJiFF1l4E0qerSpONEsTzPkk40KlEc2UPSTYVFo4BJVZWjy2znq9M+viKzriPpbOAo0mjnW5JayY3vxaGIuoGk10TEP2vMf3lgRTyyxxy+Op2bA5l1HUkrkVrJvXrJlDEAABGPSURBVJNUlXYp8OlenCm6G0gaDfw36T5McUSNbSvKfwngpYiYnZ+vSxrV4p8RcX4VZegWHneynAOZdZ1uaSVniaRLgTOBz5MOohOA6RHxxYryvwrYPyL+nmdCuCGX5/XAX3upOs1Xp+UcyKzrdEsrOUsk3RgRm0m6LSLemNOuiojSrgHDkP/tEbFhfvwNYKWI+ISkxYFJrWW9yONOJm7sYV2j0EputKRDCouWAUbWUyoDXsr/H5G0C/AwabzDqhTPtrcFfggQES9I6skO0Z3GnQR6ctxJBzLrJl3RSs7m8U1JywKHAj8hnVh8tsL875T0HeAh0r2hSwFymdTfhq9gHneywFWL1nXqbiVnA5P02Yj4cUV5LUWaOHI14MSIuCmnbw2Mi4iTqyhHN5E0KSLGS7oV2DgiQtL1EbF53WWrgwOZdZ26W8nZwCQ9EBFr1l2OXiXpMuA9wPdIV8iPA1tHxJa1FqwmI+ougFmJ04B7gLWArwNTSS3VrHv0apVet9gdeJ5UxXslqdp11zoLVCcHMutGK0bEiaS+Q1dFxMdIHaOte7gqp15fiojZEfFSRJwYEUcBhwy41SuUA5l1o7layUnahGpbyRlpvEdJz5b8zSS1krP67FiStkvlpegSbrVo3ajuVnJG14z32C9JH4uIk+ouR1U87mQ5BzLrOhFxQX74DLANpFZy9ZXIutgSA6/yinIWcBke2WMubrVojeBWciZpZGu8xV7lcSfL+R6ZNYVbydkUSd+XtH7dBanRJcA6AHncyeuB9YFDJH2rzoLVyYHMmsJVB/ZG4O/ACZKulXSApGGfYLTLrBARf8+PJwBnRMRBwA7Au+srVr0cyKxruJWc9SciZkbELyNiK1KH+cNJLVtPyVVsvaB93MmJkMadBHpy3ElwYw/rIk1oJWf1kTSS1MR8H2AsafDg04C3AheSxmF8pfO4kyUcyMysKSYDVwDfj4i/FtLPlvS2mspUtf1I406uB+wYEf/O6RuQZlXvSW61aGaNIGnpiPhX3eWw7uN7ZGbWFD+TtFzriaTlJfVMZ2jrzIHMzJrijRHxdOtJRMwANqmxPNYlHMjMrClGSFq+9UTSCvg+v+GdwMya44fAXyWdnZ/vARxZY3m6Sq+NO1nkQGZmjRARp0qaROo/JeB9EXFXzcXqJr027uQcbrVoZl1N0jIR8WyuSpxHRDxVdZnq5nEn5+ZAZmZdTdIFEbGrpH8w98gWAiIi1q6paLXJn8XZwK98VepAZmbWOJJGAXuSRjkZAZxEGnfx2VoLVhMHMjPrapI27W95RNzU3/JXujyqyenAcqSrtCMiYkq9paqWA5mZdTVJV/SzOCJi28oK0yVKxp38NX3jTn4rInph3Mk5HMjMzBpG0v2kcSdPbBt3EknHRMSn6ylZPRzIzKwRJC0KHAS0Bgi+EvhFRLxUW6Fq4nEn5+aRPcysKY4FNgN+nv82y2m9yONOFrhDtJk1xZsiYqPC88sl3Vpbaeo1z7iTknp23ElfkZlZU8yWtE7riaS1gV7tFOxxJwt69o2bWeN8AbgiN3T4/+3da8xl5VnG8f/FAAXaoWWQ1gMyHMIhWKCAltJBpVT4IlYltRGcihWpKUSl2JoelSY1agxNmsaWVrClJdYU7IlEREs4NNSiHQYGLKc4gEnTD4CEjhiHQ28/7PV21p7ZBeKH99kP6/9Ldt53PWs+3JlM9j3Ps+597QDrmU3tTZG5kyMOe0jqRpKXAEcya2T3VtX2xiU1k+RoduRO3jDlhA8bmaQuJNkLuAA4hVlU1deBy6rqf5sWtorMnVzMRiapC0m+AGwDrhqWzgb2q6pfa1fV6jJ3cjEbmaQuJLlzp6nFhWuaHoc9JPVic5LXVdU3AZKcBNzauKZVZe7kYu7IJHUhyT3MBj3+c1g6CLgH+D6zY7VjW9W2WsydXMxGJqkLSdY/1/2qeni1atFysZFJUmfMnZxnI5OkziS5HNgDuHJYeivwbFX9Truq2rGRSVJnnOCcZ9aipC4k+YsXsjYR5k6OuCOT1IUkt1fVCTutbZnCtOLOkrwR+DQwlztZVc811fiiZSOTtNSSvINZNNWhwH+Mbq0Fbq2qjU0Ka8zcyR1sZJKWWpKXA/sBfwa8Z3Rr22SzBc2dnGMjk7TUDMrdlbmT82xkkpbagqDcjG5PMijXqcV5Zi1KWmpVdebw85DWtSyRyedOjrkjk7TUDMrdlbmT82xkkpbaKCh3L+CngTuZHS8eC9xWVae0qq0VcyfnebQoaalV1RsAkvwd8Paqumu4fjXwrpa1tTK1RvV8TPaQ1IujVpoYQFXdDbymYT1aEu7IJPXiniEs9ypm04sbmT0X0sS5I5PUi7cB/w78AXAR8O1hbXLMnZznsIekbiTZGzioqu5rXUtL5k7Oc0cmqQtJ3gTcAfzjcP2aJF9tW9XqSvKOJHcBRybZMno9CGxpXV8r7sgkdSHJJuA04KaqOn5Ym9QuxNzJxRz2kNSLZ6rqiSTP/ydfvKqqHkpy4c43kqybajOzkUnqxd1JzgHWJDkc+H3gG41rWm1/C5wJbGJB7iSzr7qZHI8WJXUhyT7A+4EzhqXrgQ9P9atLtIONTNLSS7IG+POqenfrWloyd3IxjxYlLb2qejbJia3rWAKXDj8X5k4y+6LNybGRSerF5mHc/mrgyZXFqvpiu5JWl7mTi9nIJPViHfAYsxH8FQVMppGN7JI7mWSyuZM+I5OkziT5PLNd6Th38mVVdXbTwhox2UNSF5JcmeQVo+v9kvxNy5oaMndyxB2ZpC4k2byS6PFca1Nh7uQO7sgk9WK3JPutXCRZx0Sf85s7OW+S/wgkdelS4BtJrmH2XOgtwJ+2LamZPwFeC9wEUFV3JDm4YT1N2cgkdaGqPpvkW8ymFgOcVVXfblxWK+ZOjtjIJHVjaFxTbV5j5k6O+IxMkvrze8BPAduZBQk/wWx6cZKcWpSkjpg7uSt3ZJK6kWR9kl8Yft87ydrWNa22qnoWMHdyxGdkkrqQ5Hzg7cyiqg4DDgQuA97Ysq5GJp87OWYjk9SLC5mNnN8GUFUPJHll25KaMXdyxEYmqRfbq+qplZHzJLsze/OenKqabBzVIj4jk9SLm5O8D9g7yenMjtWubVxTE+ZOznNqUVIXkuwGnAecwewD0dcDl9cE38TMnZxnI5OkziS5Ezi1qh4frtcBN1fVMW0ra8NnZJK6kGQDcAmwntl7V4CqqkNb1tWIuZMj7sgkdSHJvcA7gU3AsyvrVfVYs6IaSnI0O3Inb5hw7qSNTFIfktxWVSe1rkPLx0YmaaklOWH49S3AGmafldq+cr+qbm9Rl5aHjUzSUkty43Pcrqo67TnuawJsZJK6kOTQqtr6fGtTkWQ9cHhVfS3J3sDuVbWtdV0t+IFoSb24ZsHa1atexRIYcievAT45LB0IfLldRW05fi9pqSU5itl3b708yVmjW/sCe7WpqjlzJ0dsZJKW3ZHAmcArgF8arW8Dzm9SUXvmTo7YyCQttar6CvCVJCdX1b+0rmdJ7Jw7eQETzZ0Ehz0kqTvmTs6zkUmSuubUoqQuJDnkhaxNQZINSf45yf1JtiZ5MMkkP4YA7sgkdSLJ7VV1wk5rm6rqxFY1tWLu5DyHPSQtNcfvF3qiqq5rXcSysJFJWnaO3w9GuZM3JvlLzJ0EPFqU1AnH782d/GHckUnqxWNJbgBeVVWvTnIs8Kaq+nDrwlZLVb0BfnjuZJuq2nNqUVIv/hp4L/A0QFVtAX69aUXtmDs54o5MUi/2qap/XYllGjzTqpgWHHxZzEYmqRePJjmMIVMwyZuB77YtadU5+LKAwx6SujA8A/oU8HrgceBBYGNVPdSyrhYcfJlnI5PUlSQvBXab6pdIalcOe0jqQpJXJbkCuKaqtiU5Osl5retSezYySb34DLOU9x8fru8HLmpWTUPmTs6zkUnqxY9U1ReA7wNU1TOMcgYn5u8XrC0ayZ8EpxYl9eLJJPuzY2rxdcATbUtaXY7fL2Yjk9SLi4GvAocluRU4AHhz25JWneP3Czi1KKkbSXZn9mYe4L6qerpxSU04fj/PRiapC0nWAL8IHMzoNKmqPtKqplaSHAF8ggnnTo457CGpF9cCvwXsD6wdvabI3MkRn5FJ6sWBVXVs6yKWxORzJ8fckUnqxXVJzmhdxJIwd3LEHZmkXnwT+FKS3ZgdqYXZl0nu27asJi5kljt5VJLvMOROti2pHYc9JHUhyVbgV4C7yjcuwNzJFR4tSurFA8DdNjFzJ3fmjkxSF5J8BjgUuA7YvrI+0fH764BPA++vquOGz9dtrqpjGpfWhDsySb14ELgB2BPH782dHHHYQ1IXqupDrWtYIpPPnRyzkUlSf8ydHPEZmSR1yNzJHWxkkrqQZENV3fp8a1Ng7uQ8hz0k9eJjL3BtCsydHPEZmaSlluRk4PXAAUkuHt3aF1jTpqrmzJ0ccUcmadntCbyM2X+8x7uP7zHdAQdzJ0d8RiapC0nWV9XDSdYyy1j879Y1tZLkV4GrmG1Gpp476dGipG6sTbIZWAeQ5FHg3Kq6u21ZTVwKnIy5k4BHi5L68Sng4qpaX1XrgT8c1qbI3MkRd2SSevHSqrpx5aKqbhrS36fou8BNQ+bipHMnwUYmqR9bk3wQ+NxwvZFZ/uIUPTi89hxek+awh6QuJNkP+BBwCrPhhluAS6rq8aaFqTkbmSSpax4tSupCkiOAd7FrLNNprWrScnBHJqkLSe4ELgM2Mfrurara1KyoRsydnGcjk9SFJJuq6sTWdSyDJLdX1QnPtzYVHi1K6sW1SS4AvsT8yPl/tStpdZk7uZiNTFIvzh1+vnu0VsChDWppZefcyRVTzp30aFGSemPu5Dx3ZJLUH3MnR8xalKT+mDs5YiOTpP7skjsJTDV30kYmqQ9JNqyEBCfZmOQjSda3rquRrUk+mOTg4fUBpps7aSOT1I1PAP+T5Djgj4CHgc+2LamZ3wYOAL7I7OMIBwBva1pRQ04tSurCygd+k/wx8J2qumLKHwLWDk4tSurFtiTvBd4K/GySNcAejWtqwtzJee7IJHUhyY8C5wD/VlVfT3IQcGpVTe540dzJeTYySd0YhjsOr6qvJdkHWFNV21rXtdrMnZznsIekLiQ5H7gG+OSw9BPAl9tV1NS1SS5I8mNJ1q28WhfVijsySV1IcgfwWuC2qjp+WLurqo5pW9nqS7Jo1L6qakq5kz/gsIekXmyvqqeSAJBkd2ahwZNTVYe0rmGZeLQoqRc3J3kfsHeS04GrgWsb16Ql4NGipC4k2Q04DzgDCHA9cHn5JjZ5NjJJ3UiyJ3DEcHlfVT3dsh4tB48WJXUhyanAA8BfAR8H7k/yc02LasTcyXnuyCR1Ickm4Jyqum+4PgL4/BQ/T5VkC3AccCzwOeAK4Kyq+vmmhTXijkxSL/ZYaWIAVXU/E42oAp4Zng3+MvDRqvoosLZxTc04fi+pF99KcgWzHQjAbzCLaJoicydHPFqU1IUkLwEuBE5hNrV4C/DxqtretLAGzJ2cZyOT1I0kBwBU1SOta2nN3MkdfEYmaall5pIkjwL3AvcleWT4XrJJMndyno1M0rK7CNgA/ExV7V9V64CTgA1J3tm2tGYuZPZ38j2AqnoAeGXTihqykUladr8JnF1VPwjKraqtwMbh3hRtr6qnVi6mnDsJNjJJy2+Pqnp058XhOdlUJ/XMnRyxkUladk/9P++9mL0HeAS4C/hd4B+ADzStqCGnFiUttSTPAk8uugXsVVWT3JWZO7mDjUySOjPkTl4JPMSsof8kcG5V3dKwrGZsZJLUGXMn5/mMTJL6Y+7kiFmLktQfcydHPFqUpM6YOznPRiZJHTJ3cgefkUlSJ8ydXMxGJkn9MHdyAY8WJakTSTYDp+8c2TUcM/5TVR3fprK23JFJUj/MnVzARiZJ/TB3cgGPFiWpE+ZOLmYjkyR1zaNFSVLXbGSSpK7ZyCRJXbORSZK6ZiOTJHXNRiZJ6tr/AXlgQRnw4DsQAAAAAElFTkSuQmCC"/>
-          <p:cNvSpPr>
-            <a:spLocks noChangeAspect="1" noChangeArrowheads="1"/>
-          </p:cNvSpPr>
-          <p:nvPr/>
-        </p:nvSpPr>
-        <p:spPr bwMode="auto">
-          <a:xfrm>
-            <a:off x="155575" y="-6350"/>
-            <a:ext cx="304800" cy="304800"/>
-          </a:xfrm>
-          <a:prstGeom prst="rect">
-            <a:avLst/>
-          </a:prstGeom>
-          <a:noFill/>
-          <a:extLst>
-            <a:ext uri="{909E8E84-426E-40DD-AFC4-6F175D3DCCD1}">
-              <a14:hiddenFill xmlns:a14="http://schemas.microsoft.com/office/drawing/2010/main">
-                <a:solidFill>
-                  <a:srgbClr val="FFFFFF"/>
-                </a:solidFill>
-              </a14:hiddenFill>
-            </a:ext>
-          </a:extLst>
-        </p:spPr>
-        <p:txBody>
-          <a:bodyPr vert="horz" wrap="square" lIns="91440" tIns="45720" rIns="91440" bIns="45720" numCol="1" anchor="t" anchorCtr="0" compatLnSpc="1">
-            <a:prstTxWarp prst="textNoShape">
-              <a:avLst/>
-            </a:prstTxWarp>
-          </a:bodyPr>
-          <a:lstStyle/>
-          <a:p>
-            <a:endParaRPr lang="en-US" dirty="0"/>
-          </a:p>
-        </p:txBody>
-      </p:sp>
-      <p:sp>
-        <p:nvSpPr>
-          <p:cNvPr id="11" name="AutoShape 8" descr="data:image/png;base64,iVBORw0KGgoAAAANSUhEUgAAAbIAAAIICAYAAAALymuSAAAABHNCSVQICAgIfAhkiAAAAAlwSFlzAAALEgAACxIB0t1+/AAAADl0RVh0U29mdHdhcmUAbWF0cGxvdGxpYiB2ZXJzaW9uIDIuMi4yLCBodHRwOi8vbWF0cGxvdGxpYi5vcmcvhp/UCwAAIABJREFUeJzs3XfYHFXd//H3J6EKoYciAUOJIoK0CAg2QOkK+hMFfSQiRRAr6CP66IOK2EXBAiIgoEgR4QGRFmmCSgm9m4ARQg0QIIqUhO/vj3M292Qze5ck98wO+3ld133du2dm9pzdnZ3vzJlTFBGYmZk11Yi6C2BmZrYgHMjMzKzRHMjMzKzRHMjMzKzRHMjMzKzRHMjMzKzR5iuQSYoB/m5Z2AW17iPptZLOl/SkpJfzd79B3eUaKknfzGX/r258PTPr3yILuP3vgX+VpD+wgK9rXU7SSOAc4A3AX4H7gJeBGXWWy+ojaV1gMnBZRLxzIb3mIsBLwH0Rse7CeM0mkfRN4H+Aj0TEb+ouT7da0ED2+YiYujAKYo2zLimIXRER29ZdGDPrXb5HZvNr9fz//lpLYWYWEUP+AyL/jR3Euuvmdf8ELAv8CJhKqi74Qdu6OwMXAk8AL5AOkj8EVujw2isCPwceBv4D3Al8Clg05zmlbf1v5vT/6vB61+TlY0qWrZnzuh94HngS+AOwZcm678yvcwKwAnBsLuMLwD3AZ/v5vFYCvgXcAfwbeAa4DfgOsEpe57j8+gf08zq35XU2GOR3uijwaeDGnO+/gOuBg4CRJd9n2d8JQ8jrYOBa4FngOeDmnP/IkvU3Bb4HTAKm58/xn8CJwNoL8lm27xfAG4Hzgadyuf4G7DDE30fH/Szvsz8gVcE9n/O5GNi+w2u9A/hpLvdTeZvJwI+BlQf4vS2Z3+vU/Jn9AzgCWHSI7+fNwLn5M38BeBy4CTgKGN32nvvdL4byfoD9+nnNP+V1FqHkt172W2xLX4y0b19POt78J7+/S+jnd7WA+9kKpOPTxfk7aX3/lwHvLXndaf28/7eUfEdnA48CL+Ztj6fkWJbXX5r0m/pn4Tv4n/x5TgNmddhuF2Ai6RbC88C9+X0u19/vANgS+CPpuBnAhvT9xubZtvC7D2DSgN/BUL6wQgbzE8j+mr/cJ0n3Vs4BvlJY7/t5veeBq/OXMjmn/Z38g2k7INyTlz8MnJk/4JeAn5Tt3MxnIAO2Bp7Oy+7OZbs65/US8P4OP55zctkfAX6Xy/dCXvaVkvw3AB7Kyx/J259LCtAB7JrX2yg/v6GfA08Afxvk97kI6ccVpB/hucB5wMzC+xiR110ZOJn0g299Nyfnv30GkddSwFV52yfz65xPOji28lLbNv+XP+cb8+PW5xqkH9Tr5/ezbNsvjiH9sO4AziAd5AKYBbxjCL+P0v0MWIMUTIJ0ADkDuByYndM+V/Jat5AOsteT7kmfR7oH3XqN9oN/6/d2NfAX0sHiXNJBpPV9DuqEI7/eboXyXQecnl+r9dvbMq/3vly+1u/xZEr2i6G8H+BtwCl52bNtr/mFwr47P4GsVdaZpJPn04ErSfvkPUP4fIayn+2e06aSjgWnA3/O+1cAh7W99lHArXnZn9ve/7jCep8i3Z+eTTo5/B19J7KPAq9te90l6du3nyQdzy4g7ftn0yGQAV/N27xEOlE6g75gey+FoN32Ozgxb3M78Nv8XtYnnbwEcHCHz/YXefnHB/weBvuFtWUwP4Gs9eNatmSdvfLy24B1C+kjCh/Gb9q2+WVOvwBYspC+JelqYqEEMmC5vDPMAj7Utv4WpAD3DLBiyY8n8k61RGHZVnmHexZ4VSF9UfoOzj8CFmvLa0NgrcLza/O6G5e8j5PysgEDS17/i3n9W5n7QLJ6oUyfHMwBYhB5tXbOM4BlCunL0BdM9yvJq/1HIuDjef2L25YN9bMsXk0c2rbuYRSuAAb5HjsFsoty+qkUroqAt5MOIrPav0/SGfCybWmLFPI4brC/N2Bc3u9eBtYc5Htp/SbKrhg2aNtf5lwN9vN6Q30/AwWqIQeyQjnvp622J+87bx3kZzPU/WxdYIuS1xkHPEg62LefRA90zNqadDyZBmzatqz1+7imLf1r9J2YLFdIX5u+wDSrbZs35/3mWeBNhfQl6DspOLtD2QM4pKTs6+Vlt5QsWyrnNRMYNeB3MdgfZ1smMcDf2A4/rHkOunmdO/LyN5QsG0GK5C8By+e0UaSzulnFHaWwzQ/Kdu5B7BRlgezzOe17Hbb5Ql7+qZIfz1wBrrC8dcDeupD2odZOR9sVSYd8J+T1f9aWvgwpkD9NIVAO8FqtnXfbkmW75WWT29KHHMiAVfP3+E8KJx+F5a/Oy28cwmteR/ohL70An2Vrv7imZNli+Xt8npJqzwFe778KaeMK+0RZNcyP8vJfDuG9Pwo81pbW+r3NAl5Xsk2rWvrDg8zj3rz+0oNYd8BANh/vZzgCWavG4nfzU8753c8GeK2D8msdNNC+1Lb8grx85w7L/5iXb5ifi3TlONfxp7D+ga39py39tJz+jZJtViUdj18G1igp+839vO8r8jpvaktvVSsP6vcwXM3vy9IejIh5+pdJejWp9ds9EXFn+/KIeFnSX0hnf5uS6pPfRDoT+GtE/KMkr9OBQwf9Lvq3ff7/+w7Lr87/Ny9Zdn1EPFmSfi+wA+nA3dJqrnxq5G9yAGeSDn4flvSFiHgup3+YdDbz80JaR5LWJl15PRoRl5escj7p4LuupFUj4tFBlK2TbUkHngsj4j/tCyPiYUn3ARtJWiwiXiyUc0VgV9JZ7nL0tbgdTTrZWZt0RQ9D/yxbLiop04uSppLuna1Aukc3P96a/18YEU+XLD8V+GxhvTkkrU567+uRTlRG5kUjgNGSlomIZ9s2+0dE3FuSTyvt1SXLytwIvBY4VdKRwE1D/EznMZ/vZ2G6m3QFvJukzwGnz+d+PeT9LHdb2YZ0JbUasDgpuLS+j3GDzTx3TdiGdLy9tMNqV5PaHmxOuiBYmxR4HoqIv5Ssfybpnn671n55WvuCiHhU0qXAe0jv64y2Vf7Qz9s4jnTfdH/ghkL6/vn/8f1sO0eVze879S0bm/+vJ2mgnWGl/L/1pf+zw3qDLdNgjM3/r5XU33orlaQ92GHdmfn/4oW0NfL/vw+mUBHxvKRTSAe/PUj3EmCIOwB9n+XUDvlEPpBvRA54g3zdMmPz/wMlHTjAussDjwFI2ov0fpbuZ/1RhcdD+iwLhvJ9DVW/nzPp3hn0tQYFQNKhpIYEi/Xz2qNI1TBFC+u9fBF4PfDe/DdD0t9IVwKnRsS/B/k6wAK9n4UmIp6WtB9pnzoKOErSFNI9stM7nNCVGdJ+JmkN0onhxv2sNqqfZe1WBl6VH780yOPTavl/6fE4ImZImll43ZbV6LuPWaZ0/+0vr+wc0u98L0mHRMS/JL2RFHhviYgb+tl2jgUNZEPxfIf0VheAR+h8VtHS+kD6/cYWQFl3hFba70hncZ3MczVJutQeqqGc7R5HCmT7A6dIGg9sQroSvHUY8l2gM3H6Psub6bt66uRFAElrkW5uQ3qvFwLTWld0ks4iBfKyfWKo5Z2f72uoOpUp2pdL2ppUTf4M6X7HlcAjEfFCXn49qXai7L0vlPcSEQ/m/Wpb0pn924Gd8uMvS9o6IgY1AMICvp/5VdrFKCJOlzSRdBXxLtL72g/YT9KpETFhCHkMdj87iRTEfk9q3HYvMDMiZkvamVQNOJT33npvM0kBoT935f/DdexsKfssOh37iYiXJJ0EfAnYk9TS+4C8eLAn45UGsk6m5f+PRcRHB7nNw/n/azos75TeqqrqdGa/RknaNGAd4Mj5CA5D0TqDfi2pVd+AIuJeSVcA20han/nYAej7LNcqW6h0mtf6PB8ZwuuWaX3XV0XE5wa5za6ks/fvRsTRJcvLRnsY8mdZgX4/50L6w4W09+X/h0XEySXbrLMQyjWgiJhNamU3EebcDvgZqRXeEaT7tYOx0N9PRMyS9DJD+023tn2CFFxOApD0NtIJ696STo6IKwbIftD7maRlgO1I3+8HIqL9RGN+Ri15nHRMmzUfx841O5RzOdJV4ey2RY+QPsvX0Fc9XTS27fWH4njSlf/+kk4j3R75NyXVmJ3U3iE6V01OATaUNNgd+QZSM/bNJZUFrT07bNc6EL+ufYGkN1B+WTwx/3/vIMs2v/6U/+89xO2Oy/8/S3rfzzJvHXVHEXE/qfnwqpLKRujYlXRPakpELGggu5x0pfDuXL8/GMvn//NUleXvbMOSbeb3sxxOrXupu+SDRbuPtK0H/b/3HUj37CoXEQ+TAhike9ctrRPFTt/tkN9PRMwi7TP97S+PAitLWr5k2fYlaaUi4s+ke0Qw9/vqZCj72XKkq6GHS4IYwAc7bNfxM833kP8MLC/pHYMoA6SWmo8Cq0t6c8nyD3TYrrVffrh9gaSVSZ9zkLp8DEmOAZeQqhOPJH1WZw7lPmntgSw7gnTD9xxJG7UvlDRG0sGt5/kNnkb6cn8iaYnCupuTWgCVuTL/n5CrrFrbrErq61B22X0sqcPklyTtJ2muz0zS4pL2yAfVBXE2abzCt0j6vqRF2/LZsFjmgnNJdcz7k86kfjvU+xakDqoAP5I0upDnaqQqEICyq6EhyVVQp5DOvE/LP4C5SNpEUvHH1Dr7myBpqcJ6o0ln0mUHuPn9LIdNREwm/VhHAUcXyyTpLaR9djbpSqel9d73b1t/bVLn/GEn6dD8+2i3c/5fDEqPk97DurlRQ7v5fT+PAKtJ6nT/6ErSb/d/28q+D6nambb0zSS9V9JibelLk/quQed7jEVD2c8eIVUBbpSrWFvrSNJXSd1yyrSucOY5+c6OJAWQUyS9vX2hpJUkfVLS4pDueZO6wEC6N7hsYd2xpL5iZX6a8/lMrmpubbM4aZ9dEjgnIgbzuZVpnZC3amqGUqu0wM3vxw5i3UE1ySX1Dg/SD+FG0iX+haSm+bOBJ9rWX4m+DtPTSFchl5Kab7c+9Hma5JJah7WaQf8hb/MM6cdwHW3N7/M2W9PXI/2BXK7f5fWfyenFjo/9Nk2ncz+jN5LOloK0A59Nqvu+oz2Ptu1aO3MAm8zH91nsEP00fZ06n81p55I7RA/2PfaT11KklqdBam11DX0dg6fS1h+F1Cih1bn0UdL9hfNz2e7Kj4N5RzoY9GfZ6fsoLO844ssQv981Cu9xKql17Z/o6xB7SNv6K9HXVHoqcFb+np7P++u17eVigN8bfc2a5+mQ32H9f5F+fzfn/M8sfIb/Asa3rX9hXnY76aTlBGDC/L6fvN3Pc/p9wG/yax5SWP4G0v3rIPWF/F0u40ukkYHam9+/n75jwGWkk+LWaC5BuvpYZJCfz1D2s6/Q1zXiT/n7n5zL+YP2chb2mefzNheSTrhPYO7+tgcX9qHb6fuN3EK6ogvm7p5S7BD9RP68/kCqzjuHVEPzXMl7LXaIvpT0u30wp/2dzh2iS39XbeuOpK9j/K1DPoYNdYOc6UIPZHndd+QP9aH8BUzPX8YxlHRSJDW9Po7043iedGD7LB2GqMrbLEY68E/NeUwFvk1qzt/fEFWrkYZ0uZO+IZwmkw7ye7ftKPMVyPKyVfJOfW9+TzNIP85vt+8ohW22y69XOtLHIL/TRYHPkIYe+nf+uwH4BOXDRs1XICvstB8lBa8n8/fwEGn0l69SGLUgr7886eSkNTzYVNIV4nKkA9s8gWwon+VAP7j+9ov5+H5XIh1c7yNVj88gXal1GqJqdeDXpAPG86QDxjdIAb6s3+PCDmQTSAf6e0gH/n+Rmq//lJLhwUhNu39DOri3RgQ5YX7fT95mFOmsv9VpeJ73Rxqc4LJcvmfz47eU7aek3/L/kILJA7kcj5EC6ScoDGAwyM9o0L9ZUhXyjbmcT5KC01Zl5SxssxOpyq41MkvZidsmpBOH1jBiM0jB9IS8fftoOaNItS0P5PXvAw4nBbkXSd2lyt7rrvlzezpvNxn4LrmP72B/Bx1e+9d5/dKRPvr7U36BVxT12NQPkn5Bauixf0ScUHd5zKyZcjX31cAFEfHuCvN9FelkdjHg1RHxzFC275Z7ZDafcmOXj5CqRX5bc3HMrAHyvej2+/3r0tcZ+jcVF+lgUg3Lr4caxKA7mt/bfJD0RVLLqneRqgO+EoMYycPMjHR/bllJt5NOgtcAxpOuiM4l3b8cVrnB1rdJ1dE7kW5nfGt+XsuBrLneTapbfxj4Omm4KjOzwfgJqcn/RqR70P8hNeg5FfhFVHPPaVlgX9K9tptJI0UNqnN9u1fkPTIzM+sdvkdmZmaN9oqrWlxppZVi7NixdRfDzKxRbrzxxiciYvTAa3afV1wgGzt2LJMmTaq7GGZmjSKp08j2Xc9Vi2Zm1mgOZGZm1mgOZGZm1mgOZGZm1mgOZGZm1miDCmSSlpN0tqR7JN0t6c2SVpA0UdLk/H/5vK4kHSNpiqTbJG1aeJ0Jef3JkiYU0jeTdHve5pg8KzGd8jAzM2sZ7BXZ0cDFEbEeaUiTu4HDgMsiYhxpyoTD8ro7AePy3wHkQSglrUCaJmAL0kyghxcC07F53dZ2O+b0TnmYmZkBgwhkkpYhzZp6IqTptSPiaWA30vw35P+758e7AadGci2wXJ5peAdgYkQ8FREzgInAjnnZMhHxtzy+16ltr1WWh5mZGTC4DtFrkya4/JWkjUiTwn2GNGHcIwAR8Uhh2vrVmXua8Gk5rb/0aSXp9JPHfBt72B8X9CWY+p1dFvg1zMxs4RhM1eIiwKbAsRGxCWmo/f6q+FSSFvORPmiSDpA0SdKk6dOnD2VTMzNruMEEsmnAtIi4Lj8/mxTYHsvVguT/jxfWX6Ow/RjSVCP9pY8pSaefPOYSEcdHxPiIGD96dCOHCjMzs/k0YCCLiEeBByW9LidtB9wFnA+0Wh5OAM7Lj88H9s6tF7cEnsnVg5cA20taPjfy2B64JC+bKWnL3Fpx77bXKsvDzMwMGPygwZ8CTpO0GHA/sA8pCJ4laV/gAWCPvO6FwM7AFOC5vC4R8ZSkI4Ab8nrfiIin8uODgJNJMx1flP8AvtMhDzMzM2CQgSwibiFNg91uu5J1Azi4w+ucBJxUkj4J2KAk/cmyPMzMzFo8soeZmTWaA5mZmTWaA5mZmTWaA5mZmTWaA5mZmTWaA5mZmTWaA5mZmTWaA5mZmTWaA5mZmTWaA5mZmTWaA5mZmTWaA5mZmTWaA5mZmTWaA5mZmTWaA5mZmTWaA5mZmTWaA5mZmTWaA5mZmTWaA5mZmTWaA5mZmTWaA5mZmTWaA5mZmTWaA5mZmTWaA5mZmTWaA5mZmTWaA5mZmTXaoAKZpKmSbpd0i6RJOW0FSRMlTc7/l8/pknSMpCmSbpO0aeF1JuT1J0uaUEjfLL/+lLyt+svDzMysZShXZNtExMYRMT4/Pwy4LCLGAZfl5wA7AePy3wHAsZCCEnA4sAWwOXB4ITAdm9dtbbfjAHmYmZkBC1a1uBtwSn58CrB7If3USK4FlpO0GrADMDEinoqIGcBEYMe8bJmI+FtEBHBq22uV5WFmZgYMPpAFcKmkGyUdkNNWiYhHAPL/lXP66sCDhW2n5bT+0qeVpPeXh5mZGQCLDHK9rSPiYUkrAxMl3dPPuipJi/lIH7QcXA8AWHPNNYeyqZmZNdygrsgi4uH8/3HgXNI9rsdytSD5/+N59WnAGoXNxwAPD5A+piSdfvJoL9/xETE+IsaPHj16MG/JzMxeIQYMZJKWkjSq9RjYHrgDOB9otTycAJyXH58P7J1bL24JPJOrBS8Btpe0fG7ksT1wSV42U9KWubXi3m2vVZaHmZkZMLiqxVWAc3OL+EWA30bExZJuAM6StC/wALBHXv9CYGdgCvAcsA9ARDwl6QjghrzeNyLiqfz4IOBkYEngovwH8J0OeZiZmQGDCGQRcT+wUUn6k8B2JekBHNzhtU4CTipJnwRsMNg8zMzMWjyyh5mZNZoDmZmZNZoDmZmZNZoDmZmZNZoDmZmZNZoDmZmZNZoDmZmZNZoDmZmZNZoDmZmZNZoDmZmZNZoDmZmZNZoDmZmZNZoDmZmZNZoDmZmZNZoDmZmZNZoDmZmZNZoDmZmZNZoDmZmZNZoDmZmZNZoDmZmZNZoDmZmZNZoDmZmZNZoDmZmZNZoDmZmZNZoDmZmZNdqgA5mkkZJulnRBfr6WpOskTZZ0pqTFcvri+fmUvHxs4TW+lNPvlbRDIX3HnDZF0mGF9NI8zMzMWoZyRfYZ4O7C8+8CP4qIccAMYN+cvi8wIyLWBX6U10PS+sCewBuAHYGf5+A4EvgZsBOwPrBXXre/PMzMzIBBBjJJY4BdgBPycwHbAmfnVU4Bds+Pd8vPycu3y+vvBpwRES9ExD+AKcDm+W9KRNwfES8CZwC7DZCHmZkZMPgrsh8D/w28nJ+vCDwdEbPy82nA6vnx6sCDAHn5M3n9Oelt23RK7y8PMzMzYBCBTNKuwOMRcWMxuWTVGGDZwkovK+MBkiZJmjR9+vSyVczM7BVqMFdkWwPvkTSVVO23LekKbTlJi+R1xgAP58fTgDUA8vJlgaeK6W3bdEp/op885hIRx0fE+IgYP3r06EG8JTMze6UYMJBFxJciYkxEjCU11rg8Ij4MXAG8P682ATgvPz4/PycvvzwiIqfvmVs1rgWMA64HbgDG5RaKi+U8zs/bdMrDzMwMWLB+ZF8EDpE0hXQ/68ScfiKwYk4/BDgMICLuBM4C7gIuBg6OiNn5HtgngUtIrSLPyuv2l4eZmRkAiwy8Sp+IuBK4Mj++n9TisH2d54E9Omx/JHBkSfqFwIUl6aV5mJmZtXhkDzMzazQHMjMzazQHMjMzazQHMjMzazQHMjMzazQHMjMzazQHMjMzazQHMjMzazQHMjMzazQHMjMzazQHMjMzazQHMjMzazQHMjMzazQHMjMzazQHMjMzazQHMjMzazQHMjMzazQHMjMzazQHMjMzazQHMjMzazQHMjMzazQHMjMzazQHMjMzazQHMjMzazQHMjMza7QBA5mkJSRdL+lWSXdK+npOX0vSdZImSzpT0mI5ffH8fEpePrbwWl/K6fdK2qGQvmNOmyLpsEJ6aR5mZmYtg7kiewHYNiI2AjYGdpS0JfBd4EcRMQ6YAeyb198XmBER6wI/yushaX1gT+ANwI7AzyWNlDQS+BmwE7A+sFdel37yMDMzAwYRyCL5V366aP4LYFvg7Jx+CrB7frxbfk5evp0k5fQzIuKFiPgHMAXYPP9NiYj7I+JF4Axgt7xNpzzMzMyAQd4jy1dOtwCPAxOB+4CnI2JWXmUasHp+vDrwIEBe/gywYjG9bZtO6Sv2k4eZmRkwyEAWEbMjYmNgDOkK6vVlq+X/6rBsYaXPQ9IBkiZJmjR9+vSyVczM7BVqSK0WI+Jp4EpgS2A5SYvkRWOAh/PjacAaAHn5ssBTxfS2bTqlP9FPHu3lOj4ixkfE+NGjRw/lLZmZWcMNptXiaEnL5cdLAu8E7gauAN6fV5sAnJcfn5+fk5dfHhGR0/fMrRrXAsYB1wM3AONyC8XFSA1Czs/bdMrDzMwMgEUGXoXVgFNy68IRwFkRcYGku4AzJH0TuBk4Ma9/IvBrSVNIV2J7AkTEnZLOAu4CZgEHR8RsAEmfBC4BRgInRcSd+bW+2CEPMzMzYBCBLCJuAzYpSb+fdL+sPf15YI8Or3UkcGRJ+oXAhYPNw8zMrMUje5iZWaM5kJmZWaM5kJmZWaM5kJmZWaM5kJmZWaM5kJmZWaM5kJmZWaM5kJmZWaM5kJmZWaM5kJmZWaM5kJmZWaM5kJmZWaM5kJmZWaM5kJmZWaM5kJmZWaM5kJmZWaM5kJmZWaM5kJmZWaM5kJmZWaM5kJmZWaM5kJmZWaM5kJmZWaM5kJmZWaM5kJmZWaM5kJmZWaM5kJmZWaMNGMgkrSHpCkl3S7pT0mdy+gqSJkqanP8vn9Ml6RhJUyTdJmnTwmtNyOtPljShkL6ZpNvzNsdIUn95mJmZtSwyiHVmAYdGxE2SRgE3SpoIfBS4LCK+I+kw4DDgi8BOwLj8twVwLLCFpBWAw4HxQOTXOT8iZuR1DgCuBS4EdgQuyq9ZlkfzfW3ZBdz+mYVTDjOzhhvwiiwiHomIm/LjmcDdwOrAbsApebVTgN3z492AUyO5FlhO0mrADsDEiHgqB6+JwI552TIR8beICODUttcqy8PMzAwY4j0ySWOBTYDrgFUi4hFIwQ5YOa+2OvBgYbNpOa2/9Gkl6fSTh5mZGTCEQCZpaeD3wGcj4tn+Vi1Ji/lIHzRJB0iaJGnS9OnTh7KpmZk13KACmaRFSUHstIg4Jyc/lqsFyf8fz+nTgDUKm48BHh4gfUxJen95zCUijo+I8RExfvTo0YN5S2Zm9goxmFaLAk4E7o6IowqLzgdaLQ8nAOcV0vfOrRe3BJ7J1YKXANtLWj63PtweuCQvmylpy5zX3m2vVZaHmZkZMLhWi1sDHwFul3RLTvsy8B3gLEn7Ag8Ae+RlFwI7A1OA54B9ACLiKUlHADfk9b4REU/lxwcBJwNLklorXpTTO+VhZmYGDCKQRcQ1lN/HAtiuZP0ADu7wWicBJ5WkTwI2KEl/siwPMzOzFo/sYWZmjeZAZmZmjeZAZmZmjeZAZmZmjeZAZmZmjeZAZmZmjeZAZmZmjeZAZmZmjeZAZmZmjeZAZmZmjeZAZmZmjeZAZmZmjeZAZmZmjeZAZmZmjeZAZmZmjeZAZmZmjeZAZmZmjeZAZmZmjeZAZmZmjeZAZmZmjeZAZmZmjeZAZmZmjeZAZmZmjeZAZmZmjeZAZmZmjTZgIJN0kqTHJd1RSFtB0kRJk/P/5XO6JB0jaYqk2yRtWthmQl5/sqQJhfTNJN2etzlGkvrLw8zMrGgwV2QnAzu2pR0GXBYR44DL8nOAnYBx+e8A4FhIQQk4HNgC2Bw4vBCYjs3rtrbbcYA8zMzM5hgwkEXEn4Gn2pJ3A07Jj08Bdi+knxrJtcByklYDdgAmRsRTETEDmAjsmJctExF/i4gATm17rbI8zMzM5pjfe2SrRMQjAPn/yjl9deDBwnrTclrqWpOsAAAgAElEQVR/6dNK0vvLw8zMbI6F3dhDJWkxH+lDy1Q6QNIkSZOmT58+1M3NzKzB5jeQPZarBcn/H8/p04A1CuuNAR4eIH1MSXp/ecwjIo6PiPERMX706NHz+ZbMzKyJ5jeQnQ+0Wh5OAM4rpO+dWy9uCTyTqwUvAbaXtHxu5LE9cEleNlPSlrm14t5tr1WWh5mZ2RyLDLSCpNOBdwArSZpGan34HeAsSfsCDwB75NUvBHYGpgDPAfsARMRTko4AbsjrfSMiWg1IDiK1jFwSuCj/0U8eZmZmcwwYyCJirw6LtitZN4CDO7zOScBJJemTgA1K0p8sy8PMzKzII3uYmVmjOZCZmVmjOZCZmVmjOZCZmVmjOZCZmVmjOZCZmVmjOZCZmVmjOZCZmVmjOZCZmVmjOZCZmVmjOZCZmVmjOZCZmVmjOZCZmVmjOZCZmVmjDTiNi71ybXjKhgv8GrdPuH0hlMTMbP75iszMzBrNgczMzBrNgczMzBrNgczMzBrNgczMzBrNgczMzBrNgczMzBrNgczMzBrNgczMzBrNgczMzBrNgczMzBqt68dalLQjcDQwEjghIr5Tc5FsIbt7vdcv0Pavv+fuhVQSM2uirg5kkkYCPwPeBUwDbpB0fkTcVW/J7JXmZwdevsCvcfBx2y7wa/zwg7su0PaHnnnBApfBrGm6vWpxc2BKRNwfES8CZwC71VwmMzPrIl19RQasDjxYeD4N2KKmspj1hGmHXb3ArzHmO29d4Nf42te+Vuv2AJddvs4Cv8Z22963wK+x6hW3LND2j26z8QKXoZspIuouQ0eS9gB2iIj98vOPAJtHxKfa1jsAOCA/fR1w7wJmvRLwxAK+xoLqhjJAd5TDZejTDeXohjJAd5SjG8oAC6ccr4mI0QujMFXr9iuyacAahedjgIfbV4qI44HjF1amkiZFxPiF9XpNLUO3lMNl6K5ydEMZuqUc3VCGbipHXbr9HtkNwDhJa0laDNgTOL/mMpmZWRfp6iuyiJgl6ZPAJaTm9ydFxJ01F8vMzLpIVwcygIi4ELiw4mwXWjXlAuiGMkB3lMNl6NMN5eiGMkB3lKMbygDdU45adHVjDzMzs4F0+z0yMzOzfjmQGQCSvpv/71F3WcysnKT35f9r1l2WbuKqxZq1dsxOIuKcispxO7ApcF1EbFpFnh3KsQSwK/BW4NXAf4A7gD/2UkMfSX8AOv44I+I9FZZlBLARfd/HnRHxWIX5L9Pf8oh4tqqyAEj6TEQcPVDaMOV9U0Rs2vo/3Pk1hQMZ6WokIr44UNow5f2r/HBlYCugNejfNsCVEdFvoFuI5fg+qVP5UsBzxUVARES/B5OFVIavAe8GrgRuBB4HlgBeS/o8lgAOjYjbhrkctZ9cSHp7fvg+YFXgN/n5XsDUiPhyBWVYB/gi8E5gMjCdvu/jOeAXwCkR8fIwl+NBUlAXKZjOzI+XBh6KiEqvTsqCiKSbI2KTCvK+HJgNjAeuaF9e1fGi2ziQ0XHHvC0i3lhhGS4A9o+IR/Lz1YCfVRjIFo+IFySdFxG1jGcpaZeI+GM/y1cG1oyIScNcjq44uchl+XNEvG2gtGHK+3TgWODqaDtQ5O/iQ8CMiDhluMuS8/w5cHFEnJ+fvxt4W0R8oaL89yK957cAxXG8RgGzI+KdFZRhCVIQ+xVwYPvyiLhsuMvQjbq++f1wknQQ8AlgbUnFs/xRwF8qLs7YVhDLHiOd+Vblb6SqxUqraYrKgliu1lo6Ip6NiMdJV2nDXY59ct4XAOu3n1wMd/5tRktaOyLuz2VYC6hkGKGI2KufZY8DP66iHAWbR8QnCmX4g6TDK8z/r8AjpOGgflhInwkMay1BwXER8VFJp/Zq0CrT04EM+C1wEfBt4LBC+syIeKrislwp6RLgdFI1yp6UVB0Mo8UkTQC2Kqtaq+peHYCk35LONmeTqhiXlXRURHy/qjJkdZ9cAHyOtG/c3yoTfeOKViI3ALo4ImZK+grphOebEXFTleUAnpJ0GKmaNYD/AmZUlXlE/BP4J/DmqvIssbmk1YH3S/oxqYp1jqrvF3YLVy1mee6zVSgE94h4oOIyvI/UyAHgzxFxboV5vwX4MPAB5h0GLCLiYxWW5ZaI2FjSh4HNSPdpbqyyqjeX46fAOOY+uZjSPmh1BeVYHFgvP70nIl6oOP/bIuKNeR/5NvAD4MsRUelMFJJWAr4OtKpV/wwcHhGVDNoraSblDXCqvI98CHAQsCbz1k5E1fcLu4UDGZCHwfoa6Yy7deM6qj5wdgNJ+0bEiTWX4U5gY9IV808j4ipJt0bERjWU5b0UDpxVnlzk/BclHbhaZbgS+EVEvFRhGW6OiE0kfRu4PSJ+W1XjBisn6ZcRsX/d5egWvV612PJZ4HUR8WTVGUu6JiLeUnK2V9lZXqEsKwOvkXR2LstdpAYnw35fqs0vgKnArcCfJb2G+u7d3USqav6TpFdJGhURMyvM/1hgUeDn+flHctp+FZbhIUm/ILVe/G6+QqysD6qkH0bEoZLOpeSKqOqWep36cFVcg3OqpANJn8edEXFNhXl3HV+RAZKuAN4VEbPqLktdJG1NugI6mXRfSqR7IROAD0dEZY1fJI2MiNmF5wJGVv39SNqfdD9qhYhYR9I40s327SoswzxXolVfnUp6FbAj6Wpscm70smFEXFpR/ptHxPWSSj/3qhs95D6XLUsAawH3RsQbKsh7NeD3pABW/J2OAN7Xdk+3ZziQAZJOJE3I+Udgzv2HiDiqhrKsTPpxtMpQyVmepGuBgyLi5rb0jUlVWZXdD5H0D+B3wK8i4u6q8i0pxy3A5qRO4pvktNsjYsMKy3ATsEdE3Jefrw2cXWVnWEk/IH0XPdMhfSgkbQp8PCI+XkFe5wAXRsQJbekfA94TEbsPdxm6kasWkwfy32L5r3KS3kNq0vtq0k3c1wB3A8N+lpct0x7EACLiFkmjKipDyxtJDStOzM3vTwLOqKFF1gsR8WK6IARJi9DPaBvD5AvAFbnVokj7xT4Vl+Ee4Pj8/n8FnB4Rz1RchlYH7SOB9Zn7ZK/qlqRziYibJL2pouzeUFaVGhEn5RadPclXZAWSloqIf9eU963AtsCf8o31bYC9IqKSptaS7ga2iogZbekrAH+NiPXKtxz2cr2N1GpwOeBs4IiImFJR3t8Dngb2Bj5F6nN4V0T8TxX5F8qxOKnGQNTQarFQjteRguhepH6Wv4yIyrqISLoa+Cap1eTuuSwvR8T/VlWGXI5DCk9HkKr2VoyIHSrIe0pErFuSLmBy2bJe4EGDAUlvlnQX6QoISRvlUQSq9FJubDJC0oh8gNi4wvx/BFwq6e2SRuW/d5D62f2ownIgaaSk9+Sb+0eTrlTXBv5AtXPTHUYalul24OM5769UkbGkbfP/9wG7AOsC6wC7lPXzq6A8I0ldANYDniA1xDlE0hkVFuNVEXEJQETcFxFfIY22UrVRhb/FSbckqhoN50JJx0laspWQ72H+DLi4ojJ0HVctJj8GdiD3n4qIW/OVQJWelrQ0qW/MaZIeBypr3BARx0t6GDiCVJ3ZarX4zYj4Q1XlyCaTOoN/PyL+Wkg/u8rvJdIYgr/Mf1V7O2lorHeXLAugyg7qRwHvAS4DvhUR1+dF35V0b1XlAF7IVx735RZ7D5GGEatURHy96jwLPg98D3ggVzcH6STvt6T+lj3JVYuApOsiYoti35gaWoYtRRpZfASpY/KywGl1dAmom6SlI+JfXVCOf1De3HvtivIfAbw/Is6qIr9+yvEx0j3K50qWLVvV/TJJW5BOrpYn3StbBvhelS1qczlGA/9NOuEr3qvbtsIyLE3qrC/g793we6mTr8iSByVtBYSkxYBPk6sZqyBpd1LV0e256qSSQVi72CxJBzPvgaKy0UWy8YXHSwB7ACtUlXlEvJw769cayHJDguUlbcDc38efKwxiK5BaFCu35P1IFfl2cBpwJmm6oQNJXVSmV1mAHLjmaZzVq3yPLDkQOBhYHZhGujd1cBUZ53txnwNWBI6Q9NUq8u1yvyZNXbIDcBUwhjQwa6Ui4snC30MR8WNSg5wqTZT0eUlrSFqh9VdlASTtR6ryvoQ0RNQlpJFwqsp/H+BeUhXvZEm7VpV3Byvm0W9eioir8gnWljWXqaf1/BVZvon9kYj4cE1FeBuwUUTMzjdtrybdp+pl60bEHpJ2i4hTlAYRvqTqQuT+QS0jSFdoVXdFaF2FFk+sWvdFqvIZ4E3AtRGxjaT1SAGtKp8HNoiIxyStSzrRuaDC/Nu1hgd7RNIuwMOkky2rSc8HshxAdqPilnkFL7ZGsYiI59TqtFSxtibF86i4c3jrQPF0rs56lDTqe9WKU3XMIg2b9YEqCxARa1WZXwfPR8Tzklrz1t2Tm+JX5YXIM1JHxJRc/V+nb0paFjgU+AnpXt3nqshYUr/jv8YwTzrbrXo+kGV/URrp/ExgTj+yqGaaivXUNxeagHXy89ZYi1UNXNy60ngd6ey7NQL+u0nVSlU6XtLywFdzOZYGKu0rBBARdTTtnku+Sj+ENKHoAUrDZL0uIqq8IpkmaTng/0hVnTNIVyFVGZNbTrasUXweEf2ehC0s6ps1fsl8b/AZqm/+35oPb3FgE+BO0rHiDcAN1DvFTG3capE5Yy22iypaISkNiNtRpDmQKiPpUuD/RR4YN4/q8buI2LHKcnQDSZ8hjWQxk3R/ZlPgsKrGGMxlOJM0pt7eEbFB7j/0t4ioso9hsTxvJ7WovTgiXqwoz337Wx4VzdagNMbipqQhyyobIqxDWU4HvhsRt+TnGwGfqaFBVFfo+Suy3MT52LqaOFcdqAZhTaB4gHqRiqr1uqx6E+BjEXG0pB1I/ZX2IQW2ygIZsE5EfFDSXgAR8Z+qqp87NCppDZi7NFDJ5LNVBapBuJjUGXwpSc+Sa02g+pkqgNe3ghjM6ftaa3CtU88Hsm5p4txFfg1cr74pM94LnFpR3t1UvQl9s+/uTBo099Ya7mG+mK/CAuaMN1jVEFU30negXpM0G7NIw4U9QBr1vWdExBeAL0g6LyKqGsmjk79LOo65Z8v+e71Fqo+rFoHc5P0/zHuPrJIzzm6Tz+yKM1VX2l+lW6o3Jf2K1CVjLWAjYCRwZURsVmEZtgf+hzRQ7qXA1sBHI+LKCstwHHB+RFyYn+8EvDMiDq2qDN0m3xIYF2meuiWBRaLCeepynp9k7tmyfxoR/6mqDN3EgYw5Izi0i6pGcMhl2JU0PcPLA648/GV5C+lH+qs8isHSEVH2GQ1X/veQuiS8kJ8vDtxa9cDFudp5Y+D+iHg6V7WNqbplmKQVSf2URGoC/0TF+d/YHrwlTYqI8Z22GaZyLBcRT1eZZ4dy1D5PXS7HYqRGQJUMot3Ner5qEbqmifOewNGSfk+N83BJOpzUX+p1pPtBi5KqL7ausBhl1Zt1jHbyZuCWiPi3pP8i3eg/uoqMleal+zJ5xBfg21H9NDYtT0j6CnNXY9UxdNqNkq4n/T6qvE/Z7mDyPHUAkSYbrXTMx3zi+0PStFNrKc0beHhEvLfKcnQLX5EBkvYuS4+Iqu4NtcqxDGmKjH1IB4zW3E9VVlncQmrWe1Nh3MnbKuwG0CpHrdWbuQy3kaoU30gKrieSZuF9ewV5X0y6R/Vn0lBIoyLio8Odb4eyrAAcTqrGilymb1Rd9Z6vkHcgdRLfmDS9zymRJx2tsBxzjc2qNE/bTVX+RiTdCGwHXBE1TfraTXxFlhQnxVuCtIPcRHWNHACIiGfzFdmSwGdJVyJfkHRMRPykomK8GBEhqdW4YKmK8p1L7sNXRT++/szKn8VuwNERcaKkCRXlvWr0zXt2idJM0bXIAeszdeVfKMfLpGmFLlKaYug04HP5Ku1L0Tcq/3C7StKXgSUlvYs0T13VM0S8lKu7i2k9e1XiQAZExKeKz3Ov/V9XWQZJ7yadaa6T8948Ih7PHWLvJo0gUIWzJP0CWC7fC/gY9Uxj0g1mSvoSqSrtbUrDmS1aUd7KncJbR6qRxee92BApd8r+MGmi0xmk0TTOBTYjNdSq6hbBYcC+zD1P3QkV5d1yt6QPkOYvXIt0onFtxWXoGq5aLCFpUeC2iHh9hXmeCpwQEfM0M5e0XURcVmFZ3gVsTzpoXhIRE6vKu5tIWhX4EHBDRFwtaU3gHVVUOUuaCrxMXyArqrQhUreQNJk079ZJ7f0vJX05Ir5VYVlGA0REpaPeF/JfijTazZzfKfD1KJlqpxc4kAGS/kDfZfkIUlPnsyLisPpK1bskrUJq9h7Aw61x9qy3Kc2cXlur3tyH8HBSs3flv9nATyLiG3WVy3o8kCmNpL0Kc1exziL1F3qoipvIkmYyd912naMFlJUH0phyk4BDI+L+Ycx7Y+A40hBID+XkMcDTwCeimrEvO30GUNN3UpfciGFf0r3aV5NPLIDzgBMj4qV+Nl+Y5Wi1Xi0VEe+rqByfI3WOP6DVHUXS2sCxpCG7Kht4vMNn0vqd/rKq4cO6Ra8HsguAL7f3C5I0ntSUtWya+Vc0SV8nHax+Szpw70maG+xe4KCIeMcw5n0L8PGIuK4tfUvgF1HhjN02Zzy/p0ldH6bl5DGkiSRXiIgPVlSOfvtnVVXtLulm4F3t/fhyNeOlrdaDFZXlGNLv8vSc9EHSyd/SwBIRUVWjpK7Q64HsjojYoMOySpqydhjPbo4amjhfFxFbtKVdGxFbSrp1OIOJpMkRMa7DsikRse5w5W3zknRvRJRO1yLp7xHx2qrLVKcBjhcdlw1TWa4qdgPJ1Z5XRcTbJN0VEetXVZZu0OutFpfoZ9mSFZWhOJ5du6onUAR4ObeGOjs/f39beYbTRZL+SOr28GBOW4PUSu3iYc67a9U40soMSXsAv2/dm8p9ufYgtRqsRL4S6q9qsarBcvurrqu6Km8VSWMionWl/GpgdH5c1VicXaPXr8hOBy6PiF+2pe8LbF9V1Uk3yXX+R5NGtQhSk97PkaotNouIa4Y5/52A3UiNPUSq0pozzl+vKY60EhGvlfRq0riTwz7SiqSxwHeBbZl7wODLSdPZVDJsmdJAyR1V1SFa0mwKY7EWF5Gq86rqmoGk95DmJrsn5/9aUiOUy0i3AH5QVVm6Qa8HslVI/VBeJF0ZQTpoLAa8NyIerbAsbytLL2uOP4xlGAl8usqb1ta/LhppZUXS8aLScR5tXvmq+E3AbaQW1gLujB4dMBh6PJC1SNoGaNVv3xkRl9dQhuLIAEuQxnK7MSqY3LOtHFcOZ4OOAfIeCexHalBwUUT8tbDsKxHxzTrKVSdJ10fE5pJuiohNc/+hv1UVyCRtTmqpeYOk9YEdgbsj4qIq8m8rS7E16SKk1sUv9Eor0qLWfeu6y9EtHMi6lKQ1gO9FxF4V53skqfl7+5Q2w970XdIJwKuA64GPkG5eH5KX3VThvZCuIenzwDjgXcC3SSOt/LaKIctyteZOpKAxEdgCuBJ4J6mj/JHDXYZ+yjYCeB9ploSv1lWOukg6ApgUEefVXZZu4EDWpXIrpNuqHgRU0hUlyVHFlWGxyiz3Yfo5sBJpIOVrq2ze3E3qGmlF0u2kwXkXBx4lTWHzrNJcWNdVXb1ZplevTCTNIJ1wvkCaS7HVx7HfVtCvVL3earFrSPoJc48usjFwa9XliIhtqs6zYLFCOWYBB0j6X1LjgqVrK1WN8jh6V7eCl6QlJY2NiKkVZD8rImYDz0m6L/I0MhHxH0mVj7CRGzi0jCDdz656xu5usVLdBegmDmTdY1Lh8SzS9C1/qaMgknYB3kChe0JFQ/BMkrRjRMxpah8R35D0MGn0hF70O2CrwvPZOe1N5asvVC9KelUev2/OxJpKg2rXMVTUHoXHs4CppBauPSciZufvYR3m7kb01w6bvKK5arFmktaMiAfqLkeL0rT2rwK2IY3o/X7g+ojYt9aC9ShJt0TExm1pw9oxvZDP4pFn6W5LXwlYLSJuH+4yWLncRegQUjeV20knNtfW1VCrbiPqLoDxf60HSnOR1W2riNgbmBERXyf1J1uj5jK17hP1ounFKjWludEqaQLfIYgdEBFPVBnEJF1UePzfVeXb5T5LqlqdGhFvJV0xP1JvkerjQFa/Yh1/N0zN0eqL8lzufPsS1c3z1J8T6y5ATQ4EvizpAUkPAl8kzYFVZ3mqtmrh8Z415N+Nnm/1G5O0WETcCaxXc5lq43tk9YsOj+tygdIEht8nzdAcVDRpoKTzOy0CVqyiDN0mj1qxpaSlSbcCZtZcpDoaV3TD76LbPJJ/p38gzSD+FNCz0x35HlnNCsPeiDS+Y2tivNqnDJG0OGnonWcqym8GaTbmf7UvAs6MiFWqKEe3qbHxTVlZiuP7VZXn06SWqyLdu51rwIKoaBqXbpVnB1gW+GNZdXAv8BVZzSJiZN1laCdpK2Asef+QRFQwKzJpXMfnIuKqkjLdW0H+XadT45uK8t6CNIpHq+/YYcCmku4CvlXVCQ7w/wqPf1pRnl0v9zUdDdydk1YkTcHUc3xFZnOR9GtSk95bSE29IV0Zfrq+UvWuVifxwv+lgXMiYvsK8r6TNHLGLEnHk2oLzga2y+k9fSVUJ0mfAL4BPElfV4jotelbWnxFZu3GA+tHl5zhSNo1Ii6ouxw1ej7/bzW+eZLqGt+MyB3TAcYXhgi7Jg9mXLn2MTd7dQxOUtP710fE9LoL0g3catHa3cHcrcTqVsu9oC7yh7bGN1PpmxV4uN0haZ/8+FalmdOR9FpSa9Y63DHA814xDah00t1u5qpFA+aMvh/AKNLwWNdTmKAvIt7TYdPhLtfNPTzG4ghgy9YsADU0vlmWNDfdW0l91zYlTXj6IGm6n8qHUOt1klpV/G8kDSZ9AXP/To+po1x1c9WitXTrRHx19pmqVUS8LOmHpE7prQ7KlbVKywHzo5JGkfo4LgJMi4hamnlL+jZpBoDngD+STrg+FxG/raM8NWnNAv1I/uu5KWzK+IrMAJC0LrBK+/iOecLPh6qahbcTSe+qatT3biLp66QJFM/plvuWAJKWjoj2bhLDnectEbGxpN1JLRk/B1xWxXBd3ULSEsDS7ROc5mHDZvZq83vfI7OWHwNlnW2fy8vq1qsjexxCGiT4BUnPSpop6dm6CwXcVUOerRqknUmDaj9B73WW/jGpK0a7nYGjKi5L13DVorWMjYjb2hMjYpKksVUUwCN7zCsiRtWVt6RDOi2inml1LpJ0B6lbyMH5KqTXrkDeFhFlw4T9mjR8WU9yILOWJfpZtmRFZXgrnUf22LyiMnQFSSOBJVvVd5K2pG++tpsrGqrqW6TWkrNKllVemxMRX5D0feCp3LftedIs0b2kdIiwiIjcQbonOZBZyw2S9o+IXxYT83QRN1ZUBo/s0ee7wOPA9/Lz00lNzZcgNcOv4uz7JuD/ImKe71/SfhXk357nhwqPi4t6qbHHE5I2a/9OJG1KDzfHd2MPA0DSKsC5wIv0Ba7xpKuA90bEo3WVrRdJuhl4U6tDcqsbQj7rvjoi3lJBGV4HPNnesCAvW6Xq1ouSipOrLgFsC9zYSyOM5CvzM0jDlRV/px8DPhQRf6urbHVyILO5SNoG2CA/vTMiLu9v/QrKs0JE9NyZZvvkmZK2j4hL8+N5JtvsRZKWB06OiJ6aJVrSqsCnKPxOgZ9ERM/OR+ZAZl1D0takM82XSWeY3ySN+7go8IFeOtuUdDewefu9sNxJ+bqIGPa5p/L4ij8pm0RT0lLAB4EXIuK04S5LGUmLALdHxOvryN+6h++RWTf5EfABUou4PwK7R8Q1uf7/J8DWdRauYr8EzpR0YEQ8ACDpNcCxeVkVfg58VdKGpPtz00lVeuNIHXFPAioLYpLOpa+5/QjS1DbnVZV/t/G4k30cyKybLNo6+5c0PSKuAYiIm/I0Ij0jIo6S9BxpgN6lSAfwfwPfiYhj+996oZXhFuADecT98cBqpBnE746IOhrfFKdwmQX8MyKm1lCObuFxJzNXLVrXKN4XkrR7RPxfYdkdEbFB561fubpoduhaSfpWRHx5oDTrPR7Zw7rJVyW9CqAtiK0DVDGxZ1eKiH/1ehDLdixJ26XyUnQBSd+WtIykRSRdIumxYveEXuMrMjPrapI+DhwIvBYoVmmOIjW/37OWgtXI407OzffIrGt0eyu5XidpqYj4dw1ZnwVcRhr5/rBC+syIeLyG8nSDecadlNSzVyW+IrOuIWlj4MtAf63kjuu1Eb4lbQWMpXDiGRGVVbXm/E8gjbq+pqSNgI9HxCeqKkNbeVagMKRaRDxcRznqlIfq2ok07uR4YFngjxGxRa0Fq4kDmXWdLmolVztJvyb1pbuFdNCCNLTepztvtdDLcB3wfuD81iSndTS+kbQzafT3McCTwKuByVX0qetGklamb9zJpYFlI+KhustVB1ctWtfJA+VeWXc5usR4YP265yKLiAfbxjec3WndYfQtUl/CS/NwXe8i3R/qOR53cm4OZGbd7Q5gVdJswHV5MFcvhqTFgE8Dd9dQjlkRMV3SCEmKiImSjqyhHN3grYXHc8adxIHMzLrQSsBdkq6nMPdWRLynwjIcCBwNrA5MAy4F6rg/9kxu9HMNcKqkx0nDmfWciDio+Lw17mQ9pamf75FZ16qxlVzXkPT2svSyqW6GsQxbR8RfBkqroByjSDOWjwD2JjVwOLVsdP5e0+vjTjqQWdfptlZyvU7STRGx6UBpFZTDI3tkncadjIjP11eq+jiQWdfpllZydZI0k74D1VyLSK0Wl6mgDG8GtgI+SxrQuWUZ0hx1lXa+7RBQb626HN1A0naFpz0/7qTvkVlX6pJWcrWJiFF1l4E0qerSpONEsTzPkk40KlEc2UPSTYVFo4BJVZWjy2znq9M+viKzriPpbOAo0mjnW5JayY3vxaGIuoGk10TEP2vMf3lgRTyyxxy+Op2bA5l1HUkrkVrJvXrJlDEAABGPSURBVJNUlXYp8OlenCm6G0gaDfw36T5McUSNbSvKfwngpYiYnZ+vSxrV4p8RcX4VZegWHneynAOZdZ1uaSVniaRLgTOBz5MOohOA6RHxxYryvwrYPyL+nmdCuCGX5/XAX3upOs1Xp+UcyKzrdEsrOUsk3RgRm0m6LSLemNOuiojSrgHDkP/tEbFhfvwNYKWI+ISkxYFJrWW9yONOJm7sYV2j0EputKRDCouWAUbWUyoDXsr/H5G0C/AwabzDqhTPtrcFfggQES9I6skO0Z3GnQR6ctxJBzLrJl3RSs7m8U1JywKHAj8hnVh8tsL875T0HeAh0r2hSwFymdTfhq9gHneywFWL1nXqbiVnA5P02Yj4cUV5LUWaOHI14MSIuCmnbw2Mi4iTqyhHN5E0KSLGS7oV2DgiQtL1EbF53WWrgwOZdZ26W8nZwCQ9EBFr1l2OXiXpMuA9wPdIV8iPA1tHxJa1FqwmI+ougFmJ04B7gLWArwNTSS3VrHv0apVet9gdeJ5UxXslqdp11zoLVCcHMutGK0bEiaS+Q1dFxMdIHaOte7gqp15fiojZEfFSRJwYEUcBhwy41SuUA5l1o7layUnahGpbyRlpvEdJz5b8zSS1krP67FiStkvlpegSbrVo3ajuVnJG14z32C9JH4uIk+ouR1U87mQ5BzLrOhFxQX74DLANpFZy9ZXIutgSA6/yinIWcBke2WMubrVojeBWciZpZGu8xV7lcSfL+R6ZNYVbydkUSd+XtH7dBanRJcA6AHncyeuB9YFDJH2rzoLVyYHMmsJVB/ZG4O/ACZKulXSApGGfYLTLrBARf8+PJwBnRMRBwA7Au+srVr0cyKxruJWc9SciZkbELyNiK1KH+cNJLVtPyVVsvaB93MmJkMadBHpy3ElwYw/rIk1oJWf1kTSS1MR8H2AsafDg04C3AheSxmF8pfO4kyUcyMysKSYDVwDfj4i/FtLPlvS2mspUtf1I406uB+wYEf/O6RuQZlXvSW61aGaNIGnpiPhX3eWw7uN7ZGbWFD+TtFzriaTlJfVMZ2jrzIHMzJrijRHxdOtJRMwANqmxPNYlHMjMrClGSFq+9UTSCvg+v+GdwMya44fAXyWdnZ/vARxZY3m6Sq+NO1nkQGZmjRARp0qaROo/JeB9EXFXzcXqJr027uQcbrVoZl1N0jIR8WyuSpxHRDxVdZnq5nEn5+ZAZmZdTdIFEbGrpH8w98gWAiIi1q6paLXJn8XZwK98VepAZmbWOJJGAXuSRjkZAZxEGnfx2VoLVhMHMjPrapI27W95RNzU3/JXujyqyenAcqSrtCMiYkq9paqWA5mZdTVJV/SzOCJi28oK0yVKxp38NX3jTn4rInph3Mk5HMjMzBpG0v2kcSdPbBt3EknHRMSn6ylZPRzIzKwRJC0KHAS0Bgi+EvhFRLxUW6Fq4nEn5+aRPcysKY4FNgN+nv82y2m9yONOFrhDtJk1xZsiYqPC88sl3Vpbaeo1z7iTknp23ElfkZlZU8yWtE7riaS1gV7tFOxxJwt69o2bWeN8AbgiN3T4/+3da8xl5VnG8f/FAAXaoWWQ1gMyHMIhWKCAltJBpVT4IlYltRGcihWpKUSl2JoelSY1agxNmsaWVrClJdYU7IlEREs4NNSiHQYGLKc4gEnTD4CEjhiHQ28/7PV21p7ZBeKH99kP6/9Ldt53PWs+3JlM9j3Ps+597QDrmU3tTZG5kyMOe0jqRpKXAEcya2T3VtX2xiU1k+RoduRO3jDlhA8bmaQuJNkLuAA4hVlU1deBy6rqf5sWtorMnVzMRiapC0m+AGwDrhqWzgb2q6pfa1fV6jJ3cjEbmaQuJLlzp6nFhWuaHoc9JPVic5LXVdU3AZKcBNzauKZVZe7kYu7IJHUhyT3MBj3+c1g6CLgH+D6zY7VjW9W2WsydXMxGJqkLSdY/1/2qeni1atFysZFJUmfMnZxnI5OkziS5HNgDuHJYeivwbFX9Truq2rGRSVJnnOCcZ9aipC4k+YsXsjYR5k6OuCOT1IUkt1fVCTutbZnCtOLOkrwR+DQwlztZVc811fiiZSOTtNSSvINZNNWhwH+Mbq0Fbq2qjU0Ka8zcyR1sZJKWWpKXA/sBfwa8Z3Rr22SzBc2dnGMjk7TUDMrdlbmT82xkkpbagqDcjG5PMijXqcV5Zi1KWmpVdebw85DWtSyRyedOjrkjk7TUDMrdlbmT82xkkpbaKCh3L+CngTuZHS8eC9xWVae0qq0VcyfnebQoaalV1RsAkvwd8Paqumu4fjXwrpa1tTK1RvV8TPaQ1IujVpoYQFXdDbymYT1aEu7IJPXiniEs9ypm04sbmT0X0sS5I5PUi7cB/w78AXAR8O1hbXLMnZznsIekbiTZGzioqu5rXUtL5k7Oc0cmqQtJ3gTcAfzjcP2aJF9tW9XqSvKOJHcBRybZMno9CGxpXV8r7sgkdSHJJuA04KaqOn5Ym9QuxNzJxRz2kNSLZ6rqiSTP/ydfvKqqHkpy4c43kqybajOzkUnqxd1JzgHWJDkc+H3gG41rWm1/C5wJbGJB7iSzr7qZHI8WJXUhyT7A+4EzhqXrgQ9P9atLtIONTNLSS7IG+POqenfrWloyd3IxjxYlLb2qejbJia3rWAKXDj8X5k4y+6LNybGRSerF5mHc/mrgyZXFqvpiu5JWl7mTi9nIJPViHfAYsxH8FQVMppGN7JI7mWSyuZM+I5OkziT5PLNd6Th38mVVdXbTwhox2UNSF5JcmeQVo+v9kvxNy5oaMndyxB2ZpC4k2byS6PFca1Nh7uQO7sgk9WK3JPutXCRZx0Sf85s7OW+S/wgkdelS4BtJrmH2XOgtwJ+2LamZPwFeC9wEUFV3JDm4YT1N2cgkdaGqPpvkW8ymFgOcVVXfblxWK+ZOjtjIJHVjaFxTbV5j5k6O+IxMkvrze8BPAduZBQk/wWx6cZKcWpSkjpg7uSt3ZJK6kWR9kl8Yft87ydrWNa22qnoWMHdyxGdkkrqQ5Hzg7cyiqg4DDgQuA97Ysq5GJp87OWYjk9SLC5mNnN8GUFUPJHll25KaMXdyxEYmqRfbq+qplZHzJLsze/OenKqabBzVIj4jk9SLm5O8D9g7yenMjtWubVxTE+ZOznNqUVIXkuwGnAecwewD0dcDl9cE38TMnZxnI5OkziS5Ezi1qh4frtcBN1fVMW0ra8NnZJK6kGQDcAmwntl7V4CqqkNb1tWIuZMj7sgkdSHJvcA7gU3AsyvrVfVYs6IaSnI0O3Inb5hw7qSNTFIfktxWVSe1rkPLx0YmaaklOWH49S3AGmafldq+cr+qbm9Rl5aHjUzSUkty43Pcrqo67TnuawJsZJK6kOTQqtr6fGtTkWQ9cHhVfS3J3sDuVbWtdV0t+IFoSb24ZsHa1atexRIYcievAT45LB0IfLldRW05fi9pqSU5itl3b708yVmjW/sCe7WpqjlzJ0dsZJKW3ZHAmcArgF8arW8Dzm9SUXvmTo7YyCQttar6CvCVJCdX1b+0rmdJ7Jw7eQETzZ0Ehz0kqTvmTs6zkUmSuubUoqQuJDnkhaxNQZINSf45yf1JtiZ5MMkkP4YA7sgkdSLJ7VV1wk5rm6rqxFY1tWLu5DyHPSQtNcfvF3qiqq5rXcSysJFJWnaO3w9GuZM3JvlLzJ0EPFqU1AnH782d/GHckUnqxWNJbgBeVVWvTnIs8Kaq+nDrwlZLVb0BfnjuZJuq2nNqUVIv/hp4L/A0QFVtAX69aUXtmDs54o5MUi/2qap/XYllGjzTqpgWHHxZzEYmqRePJjmMIVMwyZuB77YtadU5+LKAwx6SujA8A/oU8HrgceBBYGNVPdSyrhYcfJlnI5PUlSQvBXab6pdIalcOe0jqQpJXJbkCuKaqtiU5Osl5retSezYySb34DLOU9x8fru8HLmpWTUPmTs6zkUnqxY9U1ReA7wNU1TOMcgYn5u8XrC0ayZ8EpxYl9eLJJPuzY2rxdcATbUtaXY7fL2Yjk9SLi4GvAocluRU4AHhz25JWneP3Czi1KKkbSXZn9mYe4L6qerpxSU04fj/PRiapC0nWAL8IHMzoNKmqPtKqplaSHAF8ggnnTo457CGpF9cCvwXsD6wdvabI3MkRn5FJ6sWBVXVs6yKWxORzJ8fckUnqxXVJzmhdxJIwd3LEHZmkXnwT+FKS3ZgdqYXZl0nu27asJi5kljt5VJLvMOROti2pHYc9JHUhyVbgV4C7yjcuwNzJFR4tSurFA8DdNjFzJ3fmjkxSF5J8BjgUuA7YvrI+0fH764BPA++vquOGz9dtrqpjGpfWhDsySb14ELgB2BPH782dHHHYQ1IXqupDrWtYIpPPnRyzkUlSf8ydHPEZmSR1yNzJHWxkkrqQZENV3fp8a1Ng7uQ8hz0k9eJjL3BtCsydHPEZmaSlluRk4PXAAUkuHt3aF1jTpqrmzJ0ccUcmadntCbyM2X+8x7uP7zHdAQdzJ0d8RiapC0nWV9XDSdYyy1j879Y1tZLkV4GrmG1Gpp476dGipG6sTbIZWAeQ5FHg3Kq6u21ZTVwKnIy5k4BHi5L68Sng4qpaX1XrgT8c1qbI3MkRd2SSevHSqrpx5aKqbhrS36fou8BNQ+bipHMnwUYmqR9bk3wQ+NxwvZFZ/uIUPTi89hxek+awh6QuJNkP+BBwCrPhhluAS6rq8aaFqTkbmSSpax4tSupCkiOAd7FrLNNprWrScnBHJqkLSe4ELgM2Mfrurara1KyoRsydnGcjk9SFJJuq6sTWdSyDJLdX1QnPtzYVHi1K6sW1SS4AvsT8yPl/tStpdZk7uZiNTFIvzh1+vnu0VsChDWppZefcyRVTzp30aFGSemPu5Dx3ZJLUH3MnR8xalKT+mDs5YiOTpP7skjsJTDV30kYmqQ9JNqyEBCfZmOQjSda3rquRrUk+mOTg4fUBpps7aSOT1I1PAP+T5Djgj4CHgc+2LamZ3wYOAL7I7OMIBwBva1pRQ04tSurCygd+k/wx8J2qumLKHwLWDk4tSurFtiTvBd4K/GySNcAejWtqwtzJee7IJHUhyY8C5wD/VlVfT3IQcGpVTe540dzJeTYySd0YhjsOr6qvJdkHWFNV21rXtdrMnZznsIekLiQ5H7gG+OSw9BPAl9tV1NS1SS5I8mNJ1q28WhfVijsySV1IcgfwWuC2qjp+WLurqo5pW9nqS7Jo1L6qakq5kz/gsIekXmyvqqeSAJBkd2ahwZNTVYe0rmGZeLQoqRc3J3kfsHeS04GrgWsb16Ql4NGipC4k2Q04DzgDCHA9cHn5JjZ5NjJJ3UiyJ3DEcHlfVT3dsh4tB48WJXUhyanAA8BfAR8H7k/yc02LasTcyXnuyCR1Ickm4Jyqum+4PgL4/BQ/T5VkC3AccCzwOeAK4Kyq+vmmhTXijkxSL/ZYaWIAVXU/E42oAp4Zng3+MvDRqvoosLZxTc04fi+pF99KcgWzHQjAbzCLaJoicydHPFqU1IUkLwEuBE5hNrV4C/DxqtretLAGzJ2cZyOT1I0kBwBU1SOta2nN3MkdfEYmaall5pIkjwL3AvcleWT4XrJJMndyno1M0rK7CNgA/ExV7V9V64CTgA1J3tm2tGYuZPZ38j2AqnoAeGXTihqykUladr8JnF1VPwjKraqtwMbh3hRtr6qnVi6mnDsJNjJJy2+Pqnp058XhOdlUJ/XMnRyxkUladk/9P++9mL0HeAS4C/hd4B+ADzStqCGnFiUttSTPAk8uugXsVVWT3JWZO7mDjUySOjPkTl4JPMSsof8kcG5V3dKwrGZsZJLUGXMn5/mMTJL6Y+7kiFmLktQfcydHPFqUpM6YOznPRiZJHTJ3cgefkUlSJ8ydXMxGJkn9MHdyAY8WJakTSTYDp+8c2TUcM/5TVR3fprK23JFJUj/MnVzARiZJ/TB3cgGPFiWpE+ZOLmYjkyR1zaNFSVLXbGSSpK7ZyCRJXbORSZK6ZiOTJHXNRiZJ6tr/AXlgQRnw4DsQAAAAAElFTkSuQmCC"/>
-          <p:cNvSpPr>
-            <a:spLocks noChangeAspect="1" noChangeArrowheads="1"/>
-          </p:cNvSpPr>
-          <p:nvPr/>
-        </p:nvSpPr>
-        <p:spPr bwMode="auto">
-          <a:xfrm>
-            <a:off x="155574" y="-144463"/>
-            <a:ext cx="5643029" cy="5643048"/>
-          </a:xfrm>
-          <a:prstGeom prst="rect">
-            <a:avLst/>
-          </a:prstGeom>
-          <a:noFill/>
-          <a:extLst>
-            <a:ext uri="{909E8E84-426E-40DD-AFC4-6F175D3DCCD1}">
-              <a14:hiddenFill xmlns:a14="http://schemas.microsoft.com/office/drawing/2010/main">
-                <a:solidFill>
-                  <a:srgbClr val="FFFFFF"/>
-                </a:solidFill>
-              </a14:hiddenFill>
-            </a:ext>
-          </a:extLst>
-        </p:spPr>
-        <p:txBody>
-          <a:bodyPr vert="horz" wrap="square" lIns="91440" tIns="45720" rIns="91440" bIns="45720" numCol="1" anchor="t" anchorCtr="0" compatLnSpc="1">
-            <a:prstTxWarp prst="textNoShape">
-              <a:avLst/>
-            </a:prstTxWarp>
-          </a:bodyPr>
-          <a:lstStyle/>
-          <a:p>
-            <a:endParaRPr lang="en-US" dirty="0"/>
-          </a:p>
-        </p:txBody>
-      </p:sp>
+      <p:graphicFrame>
+        <p:nvGraphicFramePr>
+          <p:cNvPr id="3" name="Table 2"/>
+          <p:cNvGraphicFramePr>
+            <a:graphicFrameLocks noGrp="1"/>
+          </p:cNvGraphicFramePr>
+          <p:nvPr>
+            <p:extLst>
+              <p:ext uri="{D42A27DB-BD31-4B8C-83A1-F6EECF244321}">
+                <p14:modId xmlns:p14="http://schemas.microsoft.com/office/powerpoint/2010/main" val="1316278416"/>
+              </p:ext>
+            </p:extLst>
+          </p:nvPr>
+        </p:nvGraphicFramePr>
+        <p:xfrm>
+          <a:off x="1551709" y="1258454"/>
+          <a:ext cx="5883564" cy="5334000"/>
+        </p:xfrm>
+        <a:graphic>
+          <a:graphicData uri="http://schemas.openxmlformats.org/drawingml/2006/table">
+            <a:tbl>
+              <a:tblPr firstRow="1" bandRow="1">
+                <a:tableStyleId>{5C22544A-7EE6-4342-B048-85BDC9FD1C3A}</a:tableStyleId>
+              </a:tblPr>
+              <a:tblGrid>
+                <a:gridCol w="2941782">
+                  <a:extLst>
+                    <a:ext uri="{9D8B030D-6E8A-4147-A177-3AD203B41FA5}">
+                      <a16:colId xmlns:a16="http://schemas.microsoft.com/office/drawing/2014/main" val="2523324861"/>
+                    </a:ext>
+                  </a:extLst>
+                </a:gridCol>
+                <a:gridCol w="2941782">
+                  <a:extLst>
+                    <a:ext uri="{9D8B030D-6E8A-4147-A177-3AD203B41FA5}">
+                      <a16:colId xmlns:a16="http://schemas.microsoft.com/office/drawing/2014/main" val="825263479"/>
+                    </a:ext>
+                  </a:extLst>
+                </a:gridCol>
+              </a:tblGrid>
+              <a:tr h="528830">
+                <a:tc>
+                  <a:txBody>
+                    <a:bodyPr/>
+                    <a:lstStyle/>
+                    <a:p>
+                      <a:r>
+                        <a:rPr lang="en-US" dirty="0" smtClean="0"/>
+                        <a:t>Explanatory Variables to Predict Loan Status</a:t>
+                      </a:r>
+                      <a:endParaRPr lang="en-US" dirty="0"/>
+                    </a:p>
+                  </a:txBody>
+                  <a:tcPr/>
+                </a:tc>
+                <a:tc>
+                  <a:txBody>
+                    <a:bodyPr/>
+                    <a:lstStyle/>
+                    <a:p>
+                      <a:r>
+                        <a:rPr lang="en-US" dirty="0" smtClean="0"/>
+                        <a:t>Type</a:t>
+                      </a:r>
+                      <a:endParaRPr lang="en-US" dirty="0"/>
+                    </a:p>
+                  </a:txBody>
+                  <a:tcPr/>
+                </a:tc>
+                <a:extLst>
+                  <a:ext uri="{0D108BD9-81ED-4DB2-BD59-A6C34878D82A}">
+                    <a16:rowId xmlns:a16="http://schemas.microsoft.com/office/drawing/2014/main" val="1665234554"/>
+                  </a:ext>
+                </a:extLst>
+              </a:tr>
+              <a:tr h="277006">
+                <a:tc>
+                  <a:txBody>
+                    <a:bodyPr/>
+                    <a:lstStyle/>
+                    <a:p>
+                      <a:r>
+                        <a:rPr lang="en-US" sz="1400" dirty="0" smtClean="0"/>
+                        <a:t>Interest Rate</a:t>
+                      </a:r>
+                      <a:endParaRPr lang="en-US" sz="1400" dirty="0"/>
+                    </a:p>
+                  </a:txBody>
+                  <a:tcPr/>
+                </a:tc>
+                <a:tc>
+                  <a:txBody>
+                    <a:bodyPr/>
+                    <a:lstStyle/>
+                    <a:p>
+                      <a:r>
+                        <a:rPr lang="en-US" sz="1400" dirty="0" smtClean="0"/>
+                        <a:t>Numeric </a:t>
+                      </a:r>
+                      <a:endParaRPr lang="en-US" sz="1400" dirty="0"/>
+                    </a:p>
+                  </a:txBody>
+                  <a:tcPr/>
+                </a:tc>
+                <a:extLst>
+                  <a:ext uri="{0D108BD9-81ED-4DB2-BD59-A6C34878D82A}">
+                    <a16:rowId xmlns:a16="http://schemas.microsoft.com/office/drawing/2014/main" val="626473973"/>
+                  </a:ext>
+                </a:extLst>
+              </a:tr>
+              <a:tr h="277006">
+                <a:tc>
+                  <a:txBody>
+                    <a:bodyPr/>
+                    <a:lstStyle/>
+                    <a:p>
+                      <a:r>
+                        <a:rPr lang="en-US" sz="1400" dirty="0" smtClean="0"/>
+                        <a:t>DTI</a:t>
+                      </a:r>
+                      <a:endParaRPr lang="en-US" sz="1400" dirty="0"/>
+                    </a:p>
+                  </a:txBody>
+                  <a:tcPr/>
+                </a:tc>
+                <a:tc>
+                  <a:txBody>
+                    <a:bodyPr/>
+                    <a:lstStyle/>
+                    <a:p>
+                      <a:pPr marL="0" marR="0" indent="0" algn="l" defTabSz="457200" rtl="0" eaLnBrk="1" fontAlgn="auto" latinLnBrk="0" hangingPunct="1">
+                        <a:lnSpc>
+                          <a:spcPct val="100000"/>
+                        </a:lnSpc>
+                        <a:spcBef>
+                          <a:spcPts val="0"/>
+                        </a:spcBef>
+                        <a:spcAft>
+                          <a:spcPts val="0"/>
+                        </a:spcAft>
+                        <a:buClrTx/>
+                        <a:buSzTx/>
+                        <a:buFontTx/>
+                        <a:buNone/>
+                        <a:tabLst/>
+                        <a:defRPr/>
+                      </a:pPr>
+                      <a:r>
+                        <a:rPr lang="en-US" sz="1400" dirty="0" smtClean="0"/>
+                        <a:t>Numeric </a:t>
+                      </a:r>
+                      <a:endParaRPr lang="en-US" sz="1400" dirty="0"/>
+                    </a:p>
+                  </a:txBody>
+                  <a:tcPr/>
+                </a:tc>
+                <a:extLst>
+                  <a:ext uri="{0D108BD9-81ED-4DB2-BD59-A6C34878D82A}">
+                    <a16:rowId xmlns:a16="http://schemas.microsoft.com/office/drawing/2014/main" val="2478854165"/>
+                  </a:ext>
+                </a:extLst>
+              </a:tr>
+              <a:tr h="478465">
+                <a:tc>
+                  <a:txBody>
+                    <a:bodyPr/>
+                    <a:lstStyle/>
+                    <a:p>
+                      <a:r>
+                        <a:rPr lang="en-US" sz="1400" dirty="0" smtClean="0"/>
+                        <a:t>Delinquency Incidences over past 2 years</a:t>
+                      </a:r>
+                      <a:endParaRPr lang="en-US" sz="1400" dirty="0"/>
+                    </a:p>
+                  </a:txBody>
+                  <a:tcPr/>
+                </a:tc>
+                <a:tc>
+                  <a:txBody>
+                    <a:bodyPr/>
+                    <a:lstStyle/>
+                    <a:p>
+                      <a:pPr marL="0" marR="0" indent="0" algn="l" defTabSz="457200" rtl="0" eaLnBrk="1" fontAlgn="auto" latinLnBrk="0" hangingPunct="1">
+                        <a:lnSpc>
+                          <a:spcPct val="100000"/>
+                        </a:lnSpc>
+                        <a:spcBef>
+                          <a:spcPts val="0"/>
+                        </a:spcBef>
+                        <a:spcAft>
+                          <a:spcPts val="0"/>
+                        </a:spcAft>
+                        <a:buClrTx/>
+                        <a:buSzTx/>
+                        <a:buFontTx/>
+                        <a:buNone/>
+                        <a:tabLst/>
+                        <a:defRPr/>
+                      </a:pPr>
+                      <a:r>
+                        <a:rPr lang="en-US" sz="1400" dirty="0" smtClean="0"/>
+                        <a:t>Numeric </a:t>
+                      </a:r>
+                    </a:p>
+                    <a:p>
+                      <a:endParaRPr lang="en-US" sz="1400" dirty="0"/>
+                    </a:p>
+                  </a:txBody>
+                  <a:tcPr/>
+                </a:tc>
+                <a:extLst>
+                  <a:ext uri="{0D108BD9-81ED-4DB2-BD59-A6C34878D82A}">
+                    <a16:rowId xmlns:a16="http://schemas.microsoft.com/office/drawing/2014/main" val="601966731"/>
+                  </a:ext>
+                </a:extLst>
+              </a:tr>
+              <a:tr h="478465">
+                <a:tc>
+                  <a:txBody>
+                    <a:bodyPr/>
+                    <a:lstStyle/>
+                    <a:p>
+                      <a:r>
+                        <a:rPr lang="en-US" sz="1400" dirty="0" smtClean="0"/>
+                        <a:t>Inquiries in last 6 months</a:t>
+                      </a:r>
+                      <a:endParaRPr lang="en-US" sz="1400" dirty="0"/>
+                    </a:p>
+                  </a:txBody>
+                  <a:tcPr/>
+                </a:tc>
+                <a:tc>
+                  <a:txBody>
+                    <a:bodyPr/>
+                    <a:lstStyle/>
+                    <a:p>
+                      <a:pPr marL="0" marR="0" indent="0" algn="l" defTabSz="457200" rtl="0" eaLnBrk="1" fontAlgn="auto" latinLnBrk="0" hangingPunct="1">
+                        <a:lnSpc>
+                          <a:spcPct val="100000"/>
+                        </a:lnSpc>
+                        <a:spcBef>
+                          <a:spcPts val="0"/>
+                        </a:spcBef>
+                        <a:spcAft>
+                          <a:spcPts val="0"/>
+                        </a:spcAft>
+                        <a:buClrTx/>
+                        <a:buSzTx/>
+                        <a:buFontTx/>
+                        <a:buNone/>
+                        <a:tabLst/>
+                        <a:defRPr/>
+                      </a:pPr>
+                      <a:r>
+                        <a:rPr lang="en-US" sz="1400" dirty="0" smtClean="0"/>
+                        <a:t>Numeric </a:t>
+                      </a:r>
+                    </a:p>
+                    <a:p>
+                      <a:endParaRPr lang="en-US" sz="1400" dirty="0"/>
+                    </a:p>
+                  </a:txBody>
+                  <a:tcPr/>
+                </a:tc>
+                <a:extLst>
+                  <a:ext uri="{0D108BD9-81ED-4DB2-BD59-A6C34878D82A}">
+                    <a16:rowId xmlns:a16="http://schemas.microsoft.com/office/drawing/2014/main" val="1525281608"/>
+                  </a:ext>
+                </a:extLst>
+              </a:tr>
+              <a:tr h="277006">
+                <a:tc>
+                  <a:txBody>
+                    <a:bodyPr/>
+                    <a:lstStyle/>
+                    <a:p>
+                      <a:r>
+                        <a:rPr lang="en-US" sz="1400" dirty="0" smtClean="0"/>
+                        <a:t>Revolving credit utilization rate</a:t>
+                      </a:r>
+                      <a:endParaRPr lang="en-US" sz="1400" dirty="0"/>
+                    </a:p>
+                  </a:txBody>
+                  <a:tcPr/>
+                </a:tc>
+                <a:tc>
+                  <a:txBody>
+                    <a:bodyPr/>
+                    <a:lstStyle/>
+                    <a:p>
+                      <a:pPr marL="0" marR="0" indent="0" algn="l" defTabSz="457200" rtl="0" eaLnBrk="1" fontAlgn="auto" latinLnBrk="0" hangingPunct="1">
+                        <a:lnSpc>
+                          <a:spcPct val="100000"/>
+                        </a:lnSpc>
+                        <a:spcBef>
+                          <a:spcPts val="0"/>
+                        </a:spcBef>
+                        <a:spcAft>
+                          <a:spcPts val="0"/>
+                        </a:spcAft>
+                        <a:buClrTx/>
+                        <a:buSzTx/>
+                        <a:buFontTx/>
+                        <a:buNone/>
+                        <a:tabLst/>
+                        <a:defRPr/>
+                      </a:pPr>
+                      <a:r>
+                        <a:rPr lang="en-US" sz="1400" dirty="0" smtClean="0"/>
+                        <a:t>Numeric </a:t>
+                      </a:r>
+                      <a:endParaRPr lang="en-US" sz="1400" dirty="0"/>
+                    </a:p>
+                  </a:txBody>
+                  <a:tcPr/>
+                </a:tc>
+                <a:extLst>
+                  <a:ext uri="{0D108BD9-81ED-4DB2-BD59-A6C34878D82A}">
+                    <a16:rowId xmlns:a16="http://schemas.microsoft.com/office/drawing/2014/main" val="1133952704"/>
+                  </a:ext>
+                </a:extLst>
+              </a:tr>
+              <a:tr h="277006">
+                <a:tc>
+                  <a:txBody>
+                    <a:bodyPr/>
+                    <a:lstStyle/>
+                    <a:p>
+                      <a:r>
+                        <a:rPr lang="en-US" sz="1400" dirty="0" smtClean="0"/>
+                        <a:t>No. of open credit lines</a:t>
+                      </a:r>
+                      <a:endParaRPr lang="en-US" sz="1400" dirty="0"/>
+                    </a:p>
+                  </a:txBody>
+                  <a:tcPr/>
+                </a:tc>
+                <a:tc>
+                  <a:txBody>
+                    <a:bodyPr/>
+                    <a:lstStyle/>
+                    <a:p>
+                      <a:pPr marL="0" marR="0" indent="0" algn="l" defTabSz="457200" rtl="0" eaLnBrk="1" fontAlgn="auto" latinLnBrk="0" hangingPunct="1">
+                        <a:lnSpc>
+                          <a:spcPct val="100000"/>
+                        </a:lnSpc>
+                        <a:spcBef>
+                          <a:spcPts val="0"/>
+                        </a:spcBef>
+                        <a:spcAft>
+                          <a:spcPts val="0"/>
+                        </a:spcAft>
+                        <a:buClrTx/>
+                        <a:buSzTx/>
+                        <a:buFontTx/>
+                        <a:buNone/>
+                        <a:tabLst/>
+                        <a:defRPr/>
+                      </a:pPr>
+                      <a:r>
+                        <a:rPr lang="en-US" sz="1400" dirty="0" smtClean="0"/>
+                        <a:t>Numeric </a:t>
+                      </a:r>
+                      <a:endParaRPr lang="en-US" sz="1400" dirty="0"/>
+                    </a:p>
+                  </a:txBody>
+                  <a:tcPr/>
+                </a:tc>
+                <a:extLst>
+                  <a:ext uri="{0D108BD9-81ED-4DB2-BD59-A6C34878D82A}">
+                    <a16:rowId xmlns:a16="http://schemas.microsoft.com/office/drawing/2014/main" val="3702698494"/>
+                  </a:ext>
+                </a:extLst>
+              </a:tr>
+              <a:tr h="277006">
+                <a:tc>
+                  <a:txBody>
+                    <a:bodyPr/>
+                    <a:lstStyle/>
+                    <a:p>
+                      <a:r>
+                        <a:rPr lang="en-US" sz="1400" dirty="0" smtClean="0"/>
+                        <a:t>Annual Income</a:t>
+                      </a:r>
+                      <a:endParaRPr lang="en-US" sz="1400" dirty="0"/>
+                    </a:p>
+                  </a:txBody>
+                  <a:tcPr/>
+                </a:tc>
+                <a:tc>
+                  <a:txBody>
+                    <a:bodyPr/>
+                    <a:lstStyle/>
+                    <a:p>
+                      <a:pPr marL="0" marR="0" indent="0" algn="l" defTabSz="457200" rtl="0" eaLnBrk="1" fontAlgn="auto" latinLnBrk="0" hangingPunct="1">
+                        <a:lnSpc>
+                          <a:spcPct val="100000"/>
+                        </a:lnSpc>
+                        <a:spcBef>
+                          <a:spcPts val="0"/>
+                        </a:spcBef>
+                        <a:spcAft>
+                          <a:spcPts val="0"/>
+                        </a:spcAft>
+                        <a:buClrTx/>
+                        <a:buSzTx/>
+                        <a:buFontTx/>
+                        <a:buNone/>
+                        <a:tabLst/>
+                        <a:defRPr/>
+                      </a:pPr>
+                      <a:r>
+                        <a:rPr lang="en-US" sz="1400" dirty="0" smtClean="0"/>
+                        <a:t>Numeric </a:t>
+                      </a:r>
+                      <a:endParaRPr lang="en-US" sz="1400" dirty="0"/>
+                    </a:p>
+                  </a:txBody>
+                  <a:tcPr/>
+                </a:tc>
+                <a:extLst>
+                  <a:ext uri="{0D108BD9-81ED-4DB2-BD59-A6C34878D82A}">
+                    <a16:rowId xmlns:a16="http://schemas.microsoft.com/office/drawing/2014/main" val="137535134"/>
+                  </a:ext>
+                </a:extLst>
+              </a:tr>
+              <a:tr h="277006">
+                <a:tc>
+                  <a:txBody>
+                    <a:bodyPr/>
+                    <a:lstStyle/>
+                    <a:p>
+                      <a:r>
+                        <a:rPr lang="en-US" sz="1400" dirty="0" smtClean="0"/>
+                        <a:t>State</a:t>
+                      </a:r>
+                      <a:endParaRPr lang="en-US" sz="1400" dirty="0"/>
+                    </a:p>
+                  </a:txBody>
+                  <a:tcPr/>
+                </a:tc>
+                <a:tc>
+                  <a:txBody>
+                    <a:bodyPr/>
+                    <a:lstStyle/>
+                    <a:p>
+                      <a:r>
+                        <a:rPr lang="en-US" sz="1400" dirty="0" smtClean="0"/>
+                        <a:t>Categorical</a:t>
+                      </a:r>
+                      <a:endParaRPr lang="en-US" sz="1400" dirty="0"/>
+                    </a:p>
+                  </a:txBody>
+                  <a:tcPr/>
+                </a:tc>
+                <a:extLst>
+                  <a:ext uri="{0D108BD9-81ED-4DB2-BD59-A6C34878D82A}">
+                    <a16:rowId xmlns:a16="http://schemas.microsoft.com/office/drawing/2014/main" val="1341152662"/>
+                  </a:ext>
+                </a:extLst>
+              </a:tr>
+              <a:tr h="277006">
+                <a:tc>
+                  <a:txBody>
+                    <a:bodyPr/>
+                    <a:lstStyle/>
+                    <a:p>
+                      <a:r>
+                        <a:rPr lang="en-US" sz="1400" dirty="0" smtClean="0"/>
+                        <a:t>Home ownership status</a:t>
+                      </a:r>
+                      <a:endParaRPr lang="en-US" sz="1400" dirty="0"/>
+                    </a:p>
+                  </a:txBody>
+                  <a:tcPr/>
+                </a:tc>
+                <a:tc>
+                  <a:txBody>
+                    <a:bodyPr/>
+                    <a:lstStyle/>
+                    <a:p>
+                      <a:pPr marL="0" marR="0" indent="0" algn="l" defTabSz="457200" rtl="0" eaLnBrk="1" fontAlgn="auto" latinLnBrk="0" hangingPunct="1">
+                        <a:lnSpc>
+                          <a:spcPct val="100000"/>
+                        </a:lnSpc>
+                        <a:spcBef>
+                          <a:spcPts val="0"/>
+                        </a:spcBef>
+                        <a:spcAft>
+                          <a:spcPts val="0"/>
+                        </a:spcAft>
+                        <a:buClrTx/>
+                        <a:buSzTx/>
+                        <a:buFontTx/>
+                        <a:buNone/>
+                        <a:tabLst/>
+                        <a:defRPr/>
+                      </a:pPr>
+                      <a:r>
+                        <a:rPr lang="en-US" sz="1400" dirty="0" smtClean="0"/>
+                        <a:t>Categorical</a:t>
+                      </a:r>
+                      <a:endParaRPr lang="en-US" sz="1400" dirty="0"/>
+                    </a:p>
+                  </a:txBody>
+                  <a:tcPr/>
+                </a:tc>
+                <a:extLst>
+                  <a:ext uri="{0D108BD9-81ED-4DB2-BD59-A6C34878D82A}">
+                    <a16:rowId xmlns:a16="http://schemas.microsoft.com/office/drawing/2014/main" val="3603422781"/>
+                  </a:ext>
+                </a:extLst>
+              </a:tr>
+              <a:tr h="277006">
+                <a:tc>
+                  <a:txBody>
+                    <a:bodyPr/>
+                    <a:lstStyle/>
+                    <a:p>
+                      <a:r>
+                        <a:rPr lang="en-US" sz="1400" dirty="0" smtClean="0"/>
+                        <a:t>Purpose</a:t>
+                      </a:r>
+                      <a:endParaRPr lang="en-US" sz="1400" dirty="0"/>
+                    </a:p>
+                  </a:txBody>
+                  <a:tcPr/>
+                </a:tc>
+                <a:tc>
+                  <a:txBody>
+                    <a:bodyPr/>
+                    <a:lstStyle/>
+                    <a:p>
+                      <a:pPr marL="0" marR="0" indent="0" algn="l" defTabSz="457200" rtl="0" eaLnBrk="1" fontAlgn="auto" latinLnBrk="0" hangingPunct="1">
+                        <a:lnSpc>
+                          <a:spcPct val="100000"/>
+                        </a:lnSpc>
+                        <a:spcBef>
+                          <a:spcPts val="0"/>
+                        </a:spcBef>
+                        <a:spcAft>
+                          <a:spcPts val="0"/>
+                        </a:spcAft>
+                        <a:buClrTx/>
+                        <a:buSzTx/>
+                        <a:buFontTx/>
+                        <a:buNone/>
+                        <a:tabLst/>
+                        <a:defRPr/>
+                      </a:pPr>
+                      <a:r>
+                        <a:rPr lang="en-US" sz="1400" dirty="0" smtClean="0"/>
+                        <a:t>Categorical</a:t>
+                      </a:r>
+                      <a:endParaRPr lang="en-US" sz="1400" dirty="0"/>
+                    </a:p>
+                  </a:txBody>
+                  <a:tcPr/>
+                </a:tc>
+                <a:extLst>
+                  <a:ext uri="{0D108BD9-81ED-4DB2-BD59-A6C34878D82A}">
+                    <a16:rowId xmlns:a16="http://schemas.microsoft.com/office/drawing/2014/main" val="790295009"/>
+                  </a:ext>
+                </a:extLst>
+              </a:tr>
+              <a:tr h="277006">
+                <a:tc>
+                  <a:txBody>
+                    <a:bodyPr/>
+                    <a:lstStyle/>
+                    <a:p>
+                      <a:r>
+                        <a:rPr lang="en-US" sz="1400" dirty="0" smtClean="0"/>
+                        <a:t>Employment length</a:t>
+                      </a:r>
+                      <a:endParaRPr lang="en-US" sz="1400" dirty="0"/>
+                    </a:p>
+                  </a:txBody>
+                  <a:tcPr/>
+                </a:tc>
+                <a:tc>
+                  <a:txBody>
+                    <a:bodyPr/>
+                    <a:lstStyle/>
+                    <a:p>
+                      <a:pPr marL="0" marR="0" indent="0" algn="l" defTabSz="457200" rtl="0" eaLnBrk="1" fontAlgn="auto" latinLnBrk="0" hangingPunct="1">
+                        <a:lnSpc>
+                          <a:spcPct val="100000"/>
+                        </a:lnSpc>
+                        <a:spcBef>
+                          <a:spcPts val="0"/>
+                        </a:spcBef>
+                        <a:spcAft>
+                          <a:spcPts val="0"/>
+                        </a:spcAft>
+                        <a:buClrTx/>
+                        <a:buSzTx/>
+                        <a:buFontTx/>
+                        <a:buNone/>
+                        <a:tabLst/>
+                        <a:defRPr/>
+                      </a:pPr>
+                      <a:r>
+                        <a:rPr lang="en-US" sz="1400" dirty="0" smtClean="0"/>
+                        <a:t>Categorical</a:t>
+                      </a:r>
+                      <a:endParaRPr lang="en-US" sz="1400" dirty="0"/>
+                    </a:p>
+                  </a:txBody>
+                  <a:tcPr/>
+                </a:tc>
+                <a:extLst>
+                  <a:ext uri="{0D108BD9-81ED-4DB2-BD59-A6C34878D82A}">
+                    <a16:rowId xmlns:a16="http://schemas.microsoft.com/office/drawing/2014/main" val="1587733160"/>
+                  </a:ext>
+                </a:extLst>
+              </a:tr>
+              <a:tr h="277006">
+                <a:tc>
+                  <a:txBody>
+                    <a:bodyPr/>
+                    <a:lstStyle/>
+                    <a:p>
+                      <a:r>
+                        <a:rPr lang="en-US" sz="1400" dirty="0" smtClean="0"/>
+                        <a:t>Income verification status</a:t>
+                      </a:r>
+                      <a:endParaRPr lang="en-US" sz="1400" dirty="0"/>
+                    </a:p>
+                  </a:txBody>
+                  <a:tcPr/>
+                </a:tc>
+                <a:tc>
+                  <a:txBody>
+                    <a:bodyPr/>
+                    <a:lstStyle/>
+                    <a:p>
+                      <a:pPr marL="0" marR="0" indent="0" algn="l" defTabSz="457200" rtl="0" eaLnBrk="1" fontAlgn="auto" latinLnBrk="0" hangingPunct="1">
+                        <a:lnSpc>
+                          <a:spcPct val="100000"/>
+                        </a:lnSpc>
+                        <a:spcBef>
+                          <a:spcPts val="0"/>
+                        </a:spcBef>
+                        <a:spcAft>
+                          <a:spcPts val="0"/>
+                        </a:spcAft>
+                        <a:buClrTx/>
+                        <a:buSzTx/>
+                        <a:buFontTx/>
+                        <a:buNone/>
+                        <a:tabLst/>
+                        <a:defRPr/>
+                      </a:pPr>
+                      <a:r>
+                        <a:rPr lang="en-US" sz="1400" dirty="0" smtClean="0"/>
+                        <a:t>Categorical</a:t>
+                      </a:r>
+                      <a:endParaRPr lang="en-US" sz="1400" dirty="0"/>
+                    </a:p>
+                  </a:txBody>
+                  <a:tcPr/>
+                </a:tc>
+                <a:extLst>
+                  <a:ext uri="{0D108BD9-81ED-4DB2-BD59-A6C34878D82A}">
+                    <a16:rowId xmlns:a16="http://schemas.microsoft.com/office/drawing/2014/main" val="2376079612"/>
+                  </a:ext>
+                </a:extLst>
+              </a:tr>
+              <a:tr h="277006">
+                <a:tc>
+                  <a:txBody>
+                    <a:bodyPr/>
+                    <a:lstStyle/>
+                    <a:p>
+                      <a:r>
+                        <a:rPr lang="en-US" sz="1400" dirty="0" smtClean="0"/>
+                        <a:t>Loan sub-grade</a:t>
+                      </a:r>
+                      <a:endParaRPr lang="en-US" sz="1400" dirty="0"/>
+                    </a:p>
+                  </a:txBody>
+                  <a:tcPr/>
+                </a:tc>
+                <a:tc>
+                  <a:txBody>
+                    <a:bodyPr/>
+                    <a:lstStyle/>
+                    <a:p>
+                      <a:pPr marL="0" marR="0" indent="0" algn="l" defTabSz="457200" rtl="0" eaLnBrk="1" fontAlgn="auto" latinLnBrk="0" hangingPunct="1">
+                        <a:lnSpc>
+                          <a:spcPct val="100000"/>
+                        </a:lnSpc>
+                        <a:spcBef>
+                          <a:spcPts val="0"/>
+                        </a:spcBef>
+                        <a:spcAft>
+                          <a:spcPts val="0"/>
+                        </a:spcAft>
+                        <a:buClrTx/>
+                        <a:buSzTx/>
+                        <a:buFontTx/>
+                        <a:buNone/>
+                        <a:tabLst/>
+                        <a:defRPr/>
+                      </a:pPr>
+                      <a:r>
+                        <a:rPr lang="en-US" sz="1400" dirty="0" smtClean="0"/>
+                        <a:t>Categorical</a:t>
+                      </a:r>
+                      <a:endParaRPr lang="en-US" sz="1400" dirty="0"/>
+                    </a:p>
+                  </a:txBody>
+                  <a:tcPr/>
+                </a:tc>
+                <a:extLst>
+                  <a:ext uri="{0D108BD9-81ED-4DB2-BD59-A6C34878D82A}">
+                    <a16:rowId xmlns:a16="http://schemas.microsoft.com/office/drawing/2014/main" val="1247668953"/>
+                  </a:ext>
+                </a:extLst>
+              </a:tr>
+              <a:tr h="277006">
+                <a:tc>
+                  <a:txBody>
+                    <a:bodyPr/>
+                    <a:lstStyle/>
+                    <a:p>
+                      <a:r>
+                        <a:rPr lang="en-US" sz="1400" dirty="0" smtClean="0"/>
+                        <a:t>Loan term</a:t>
+                      </a:r>
+                      <a:endParaRPr lang="en-US" sz="1400" dirty="0"/>
+                    </a:p>
+                  </a:txBody>
+                  <a:tcPr/>
+                </a:tc>
+                <a:tc>
+                  <a:txBody>
+                    <a:bodyPr/>
+                    <a:lstStyle/>
+                    <a:p>
+                      <a:pPr marL="0" marR="0" indent="0" algn="l" defTabSz="457200" rtl="0" eaLnBrk="1" fontAlgn="auto" latinLnBrk="0" hangingPunct="1">
+                        <a:lnSpc>
+                          <a:spcPct val="100000"/>
+                        </a:lnSpc>
+                        <a:spcBef>
+                          <a:spcPts val="0"/>
+                        </a:spcBef>
+                        <a:spcAft>
+                          <a:spcPts val="0"/>
+                        </a:spcAft>
+                        <a:buClrTx/>
+                        <a:buSzTx/>
+                        <a:buFontTx/>
+                        <a:buNone/>
+                        <a:tabLst/>
+                        <a:defRPr/>
+                      </a:pPr>
+                      <a:r>
+                        <a:rPr lang="en-US" sz="1400" dirty="0" smtClean="0"/>
+                        <a:t>Categorical</a:t>
+                      </a:r>
+                      <a:endParaRPr lang="en-US" sz="1400" dirty="0"/>
+                    </a:p>
+                  </a:txBody>
+                  <a:tcPr/>
+                </a:tc>
+                <a:extLst>
+                  <a:ext uri="{0D108BD9-81ED-4DB2-BD59-A6C34878D82A}">
+                    <a16:rowId xmlns:a16="http://schemas.microsoft.com/office/drawing/2014/main" val="3232777738"/>
+                  </a:ext>
+                </a:extLst>
+              </a:tr>
+            </a:tbl>
+          </a:graphicData>
+        </a:graphic>
+      </p:graphicFrame>
     </p:spTree>
     <p:extLst>
       <p:ext uri="{BB962C8B-B14F-4D97-AF65-F5344CB8AC3E}">
-        <p14:creationId xmlns:p14="http://schemas.microsoft.com/office/powerpoint/2010/main" val="2769999316"/>
+        <p14:creationId xmlns:p14="http://schemas.microsoft.com/office/powerpoint/2010/main" val="2250961283"/>
       </p:ext>
     </p:extLst>
   </p:cSld>
@@ -7593,31 +7965,91 @@
       </p:grpSpPr>
       <p:sp>
         <p:nvSpPr>
-          <p:cNvPr id="2" name="Title 1"/>
-          <p:cNvSpPr>
-            <a:spLocks noGrp="1"/>
-          </p:cNvSpPr>
-          <p:nvPr>
-            <p:ph type="title"/>
-          </p:nvPr>
-        </p:nvSpPr>
-        <p:spPr/>
-        <p:txBody>
-          <a:bodyPr/>
+          <p:cNvPr id="5" name="TextBox 4"/>
+          <p:cNvSpPr txBox="1"/>
+          <p:nvPr/>
+        </p:nvSpPr>
+        <p:spPr>
+          <a:xfrm>
+            <a:off x="885825" y="2113002"/>
+            <a:ext cx="7381875" cy="1384995"/>
+          </a:xfrm>
+          <a:prstGeom prst="rect">
+            <a:avLst/>
+          </a:prstGeom>
+          <a:noFill/>
+        </p:spPr>
+        <p:txBody>
+          <a:bodyPr wrap="square" rtlCol="0">
+            <a:spAutoFit/>
+          </a:bodyPr>
           <a:lstStyle/>
           <a:p>
-            <a:r>
-              <a:rPr lang="en-US" sz="2400" dirty="0" smtClean="0"/>
-              <a:t>Correlation Heatmap [GRAPHIC]</a:t>
-            </a:r>
-            <a:endParaRPr lang="en-US" sz="2400" dirty="0"/>
+            <a:pPr algn="ctr" defTabSz="457200" fontAlgn="base">
+              <a:spcBef>
+                <a:spcPct val="0"/>
+              </a:spcBef>
+              <a:spcAft>
+                <a:spcPct val="0"/>
+              </a:spcAft>
+            </a:pPr>
+            <a:r>
+              <a:rPr lang="en-US" sz="2800" b="1" dirty="0" smtClean="0">
+                <a:solidFill>
+                  <a:srgbClr val="00467F"/>
+                </a:solidFill>
+                <a:latin typeface="Century Gothic" pitchFamily="34" charset="0"/>
+                <a:ea typeface="+mj-ea"/>
+                <a:cs typeface="+mj-cs"/>
+              </a:rPr>
+              <a:t>Model Performance Evaluation: </a:t>
+            </a:r>
+          </a:p>
+          <a:p>
+            <a:pPr algn="ctr" defTabSz="457200" fontAlgn="base">
+              <a:spcBef>
+                <a:spcPct val="0"/>
+              </a:spcBef>
+              <a:spcAft>
+                <a:spcPct val="0"/>
+              </a:spcAft>
+            </a:pPr>
+            <a:r>
+              <a:rPr lang="en-US" sz="2800" b="1" dirty="0" smtClean="0">
+                <a:solidFill>
+                  <a:srgbClr val="00467F"/>
+                </a:solidFill>
+                <a:latin typeface="Century Gothic" pitchFamily="34" charset="0"/>
+                <a:ea typeface="+mj-ea"/>
+                <a:cs typeface="+mj-cs"/>
+              </a:rPr>
+              <a:t>Logistic Model</a:t>
+            </a:r>
+          </a:p>
+          <a:p>
+            <a:pPr algn="ctr" defTabSz="457200" fontAlgn="base">
+              <a:spcBef>
+                <a:spcPct val="0"/>
+              </a:spcBef>
+              <a:spcAft>
+                <a:spcPct val="0"/>
+              </a:spcAft>
+            </a:pPr>
+            <a:endParaRPr lang="en-US" sz="2800" b="1" dirty="0" smtClean="0">
+              <a:solidFill>
+                <a:srgbClr val="00467F"/>
+              </a:solidFill>
+              <a:latin typeface="Century Gothic" pitchFamily="34" charset="0"/>
+              <a:ea typeface="+mj-ea"/>
+              <a:cs typeface="+mj-cs"/>
+            </a:endParaRPr>
           </a:p>
         </p:txBody>
       </p:sp>
     </p:spTree>
     <p:extLst>
       <p:ext uri="{BB962C8B-B14F-4D97-AF65-F5344CB8AC3E}">
-        <p14:creationId xmlns:p14="http://schemas.microsoft.com/office/powerpoint/2010/main" val="2628230308"/>
+        <p14:creationId xmlns:p14="http://schemas.microsoft.com/office/powerpoint/2010/main" val="4146025096"/>
       </p:ext>
     </p:extLst>
   </p:cSld>
@@ -7668,7 +8100,7 @@
           <a:p>
             <a:r>
               <a:rPr lang="en-US" sz="2400" dirty="0" smtClean="0"/>
-              <a:t>Multicollinearity Check</a:t>
+              <a:t>Success Metrics </a:t>
             </a:r>
             <a:endParaRPr lang="en-US" sz="2400" dirty="0"/>
           </a:p>
@@ -7686,7 +8118,7 @@
         </p:nvSpPr>
         <p:spPr>
           <a:xfrm>
-            <a:off x="370115" y="1390650"/>
+            <a:off x="323933" y="1233632"/>
             <a:ext cx="8370412" cy="5225810"/>
           </a:xfrm>
         </p:spPr>
@@ -7703,12 +8135,16 @@
               </a:spcAft>
             </a:pPr>
             <a:r>
-              <a:rPr lang="en-US" sz="1800" b="1" dirty="0" smtClean="0"/>
-              <a:t>Filtered dataset down to 26 relevant variables (18 numeric), with ~ 160,000 observations</a:t>
-            </a:r>
-          </a:p>
-          <a:p>
-            <a:pPr lvl="1">
+              <a:rPr lang="en-US" b="1" dirty="0" smtClean="0"/>
+              <a:t>Given imbalanced sample (20% non-fully paid vs. 80% fully paid loans) </a:t>
+            </a:r>
+            <a:r>
+              <a:rPr lang="en-US" dirty="0" smtClean="0"/>
+              <a:t>focus on:</a:t>
+            </a:r>
+          </a:p>
+          <a:p>
+            <a:pPr lvl="2">
               <a:spcBef>
                 <a:spcPts val="1200"/>
               </a:spcBef>
@@ -7717,9 +8153,42 @@
               </a:spcAft>
             </a:pPr>
             <a:r>
+              <a:rPr lang="en-US" sz="1800" b="1" dirty="0" smtClean="0"/>
+              <a:t>Sensitivity or true positive rate </a:t>
+            </a:r>
+            <a:r>
               <a:rPr lang="en-US" sz="1800" dirty="0" smtClean="0"/>
-              <a:t>Correlation heatmap shows that several sets of variables are highly positively correlated (&gt; ~0.4):</a:t>
-            </a:r>
+              <a:t>(i.e</a:t>
+            </a:r>
+            <a:r>
+              <a:rPr lang="en-US" sz="1800" dirty="0"/>
+              <a:t>. the fraction of loans that </a:t>
+            </a:r>
+            <a:r>
+              <a:rPr lang="en-US" sz="1800" dirty="0" smtClean="0"/>
+              <a:t>were </a:t>
+            </a:r>
+            <a:r>
+              <a:rPr lang="en-US" sz="1800" dirty="0"/>
+              <a:t>actually </a:t>
+            </a:r>
+            <a:r>
+              <a:rPr lang="en-US" sz="1800" dirty="0" smtClean="0"/>
+              <a:t>fully paid off that </a:t>
+            </a:r>
+            <a:r>
+              <a:rPr lang="en-US" sz="1800" dirty="0"/>
+              <a:t>were predicted as </a:t>
+            </a:r>
+            <a:r>
+              <a:rPr lang="en-US" sz="1800" dirty="0" smtClean="0"/>
+              <a:t>such, i.e. a target value of 1); </a:t>
+            </a:r>
+            <a:r>
+              <a:rPr lang="en-US" sz="1800" dirty="0"/>
+              <a:t>and </a:t>
+            </a:r>
+            <a:endParaRPr lang="en-US" sz="1800" dirty="0" smtClean="0"/>
           </a:p>
           <a:p>
             <a:pPr lvl="2">
@@ -7731,9 +8200,10 @@
               </a:spcAft>
             </a:pPr>
             <a:r>
-              <a:rPr lang="en-US" sz="1800" dirty="0" smtClean="0"/>
-              <a:t>Loan amount and funded amount (0.998)</a:t>
-            </a:r>
+              <a:rPr lang="en-US" sz="1800" b="1" dirty="0" smtClean="0"/>
+              <a:t>Specificity or true negative rate </a:t>
+            </a:r>
+            <a:endParaRPr lang="en-US" sz="1800" dirty="0" smtClean="0"/>
           </a:p>
           <a:p>
             <a:pPr lvl="2">
@@ -7745,12 +8215,12 @@
               </a:spcAft>
             </a:pPr>
             <a:r>
-              <a:rPr lang="en-US" sz="1800" dirty="0" smtClean="0"/>
-              <a:t>Revol_bal (total revolving credit balance) and total_rev_hi_lim (total revolving credit limit) (0.83)</a:t>
-            </a:r>
-          </a:p>
-          <a:p>
-            <a:pPr lvl="2">
+              <a:rPr lang="en-US" sz="1800" b="1" dirty="0" smtClean="0"/>
+              <a:t>Also examine ROC curve and AUC (area under curve):</a:t>
+            </a:r>
+          </a:p>
+          <a:p>
+            <a:pPr lvl="3">
               <a:spcBef>
                 <a:spcPts val="1200"/>
               </a:spcBef>
@@ -7759,12 +8229,16 @@
               </a:spcAft>
             </a:pPr>
             <a:r>
+              <a:rPr lang="en-US" sz="1800" b="1" dirty="0" smtClean="0"/>
+              <a:t>ROC curve </a:t>
+            </a:r>
+            <a:r>
               <a:rPr lang="en-US" sz="1800" dirty="0" smtClean="0"/>
-              <a:t>Open_acc (open credit lines) and total_acc (total no. of credit lines) (0.68)</a:t>
-            </a:r>
-          </a:p>
-          <a:p>
-            <a:pPr lvl="2">
+              <a:t>plots true positive against false positive rate across all classification thresholds </a:t>
+            </a:r>
+          </a:p>
+          <a:p>
+            <a:pPr lvl="3">
               <a:spcBef>
                 <a:spcPts val="1200"/>
               </a:spcBef>
@@ -7773,17 +8247,16 @@
               </a:spcAft>
             </a:pPr>
             <a:r>
-              <a:rPr lang="en-US" sz="1800" dirty="0"/>
-              <a:t>Revol_bal and </a:t>
+              <a:rPr lang="en-US" sz="1800" b="1" dirty="0" smtClean="0"/>
+              <a:t>AUC </a:t>
             </a:r>
             <a:r>
               <a:rPr lang="en-US" sz="1800" dirty="0" smtClean="0"/>
-              <a:t>tot_cur_bal (total current balance across accounts) (0.43)</a:t>
-            </a:r>
-            <a:endParaRPr lang="en-US" sz="1800" dirty="0"/>
-          </a:p>
-          <a:p>
-            <a:pPr lvl="2">
+              <a:t>measures area under ROC curve (i.e. likelihood that model assigns a higher probability of being fully paid off to a randomly chosen fully paid loan than to a randomly chosen non-fully paid loan)</a:t>
+            </a:r>
+          </a:p>
+          <a:p>
+            <a:pPr lvl="3">
               <a:spcBef>
                 <a:spcPts val="1200"/>
               </a:spcBef>
@@ -7792,43 +8265,16 @@
               </a:spcAft>
             </a:pPr>
             <a:r>
-              <a:rPr lang="en-US" sz="1800" dirty="0" smtClean="0"/>
-              <a:t>Tot_cur_bal and annual_inc (0.42)</a:t>
-            </a:r>
-          </a:p>
-          <a:p>
-            <a:pPr lvl="1">
-              <a:spcBef>
-                <a:spcPts val="1200"/>
-              </a:spcBef>
-              <a:spcAft>
-                <a:spcPts val="600"/>
-              </a:spcAft>
-            </a:pPr>
-            <a:r>
               <a:rPr lang="en-US" sz="1800" b="1" dirty="0" smtClean="0"/>
-              <a:t>Eliminate loan amount, total_rev_hi_lim, total_acc and total_cur_bal</a:t>
-            </a:r>
-            <a:endParaRPr lang="en-US" sz="1800" b="1" dirty="0"/>
-          </a:p>
-          <a:p>
-            <a:pPr marL="681037" lvl="2" indent="0">
-              <a:spcBef>
-                <a:spcPts val="1200"/>
-              </a:spcBef>
-              <a:spcAft>
-                <a:spcPts val="600"/>
-              </a:spcAft>
-              <a:buNone/>
-            </a:pPr>
-            <a:endParaRPr lang="en-US" sz="1800" dirty="0" smtClean="0"/>
+              <a:t>AUC score of 0.5 indicates model is non-discriminatory, while value closer to 1 indicates more informative classifier</a:t>
+            </a:r>
           </a:p>
         </p:txBody>
       </p:sp>
     </p:spTree>
     <p:extLst>
       <p:ext uri="{BB962C8B-B14F-4D97-AF65-F5344CB8AC3E}">
-        <p14:creationId xmlns:p14="http://schemas.microsoft.com/office/powerpoint/2010/main" val="521232572"/>
+        <p14:creationId xmlns:p14="http://schemas.microsoft.com/office/powerpoint/2010/main" val="821509069"/>
       </p:ext>
     </p:extLst>
   </p:cSld>
@@ -7879,7 +8325,7 @@
           <a:p>
             <a:r>
               <a:rPr lang="en-US" sz="2400" dirty="0" smtClean="0"/>
-              <a:t>Other filters</a:t>
+              <a:t>Logistic Model (0.5 Classification Threshold)</a:t>
             </a:r>
             <a:endParaRPr lang="en-US" sz="2400" dirty="0"/>
           </a:p>
@@ -7897,7 +8343,7 @@
         </p:nvSpPr>
         <p:spPr>
           <a:xfrm>
-            <a:off x="333169" y="1252104"/>
+            <a:off x="370115" y="1390650"/>
             <a:ext cx="8370412" cy="5225810"/>
           </a:xfrm>
         </p:spPr>
@@ -7914,8 +8360,12 @@
               </a:spcAft>
             </a:pPr>
             <a:r>
+              <a:rPr lang="en-US" b="1" dirty="0" smtClean="0"/>
+              <a:t>Accuracy (5-fold cross-validation): 80% </a:t>
+            </a:r>
+            <a:r>
               <a:rPr lang="en-US" dirty="0" smtClean="0"/>
-              <a:t>Missing values:</a:t>
+              <a:t>vs. 20% null model accuracy</a:t>
             </a:r>
           </a:p>
           <a:p>
@@ -7928,12 +8378,12 @@
               </a:spcAft>
             </a:pPr>
             <a:r>
-              <a:rPr lang="en-US" sz="1800" dirty="0" smtClean="0"/>
-              <a:t>Eliminate variables with relatively high proportion of missing values</a:t>
-            </a:r>
-          </a:p>
-          <a:p>
-            <a:pPr lvl="2">
+              <a:rPr lang="en-US" dirty="0" smtClean="0"/>
+              <a:t>Indicates relatively low bias</a:t>
+            </a:r>
+          </a:p>
+          <a:p>
+            <a:pPr lvl="1">
               <a:spcBef>
                 <a:spcPts val="1200"/>
               </a:spcBef>
@@ -7942,12 +8392,12 @@
               </a:spcAft>
             </a:pPr>
             <a:r>
-              <a:rPr lang="en-US" sz="1800" dirty="0" smtClean="0"/>
-              <a:t>Eliminate missing values (but keep rest of observations) for variables with small proportion of missing values</a:t>
-            </a:r>
-          </a:p>
-          <a:p>
-            <a:pPr lvl="1">
+              <a:rPr lang="en-US" b="1" dirty="0" smtClean="0"/>
+              <a:t>Training set accuracy of 78.7% vs. test set accuracy of 78.4%</a:t>
+            </a:r>
+          </a:p>
+          <a:p>
+            <a:pPr lvl="2">
               <a:spcBef>
                 <a:spcPts val="1200"/>
               </a:spcBef>
@@ -7957,7 +8407,7 @@
             </a:pPr>
             <a:r>
               <a:rPr lang="en-US" dirty="0" smtClean="0"/>
-              <a:t>Remove variables with little variation (e.g. clustering at 0)</a:t>
+              <a:t>Indicates low variance</a:t>
             </a:r>
           </a:p>
           <a:p>
@@ -7970,8 +8420,8 @@
               </a:spcAft>
             </a:pPr>
             <a:r>
-              <a:rPr lang="en-US" dirty="0" smtClean="0"/>
-              <a:t>Normalize relevant loan variables (revol_bal and annual_inc) by funded amount</a:t>
+              <a:rPr lang="en-US" b="1" dirty="0" smtClean="0"/>
+              <a:t>True positive rate (sensitivity): 98.4%</a:t>
             </a:r>
           </a:p>
           <a:p>
@@ -7984,8 +8434,8 @@
               </a:spcAft>
             </a:pPr>
             <a:r>
-              <a:rPr lang="en-US" dirty="0" smtClean="0"/>
-              <a:t>Remove outlier values</a:t>
+              <a:rPr lang="en-US" b="1" dirty="0" smtClean="0"/>
+              <a:t>True negative rate (specificity): 6.8% and false positive rate (1-specificity): 93.2%</a:t>
             </a:r>
           </a:p>
           <a:p>
@@ -7999,7 +8449,11 @@
             </a:pPr>
             <a:r>
               <a:rPr lang="en-US" dirty="0" smtClean="0"/>
-              <a:t>Remove variables with unexpected relationships with other variables</a:t>
+              <a:t>Overall, model does very good job of predicting fully paid off loans (high sensitivity) but </a:t>
+            </a:r>
+            <a:r>
+              <a:rPr lang="en-US" b="1" dirty="0" smtClean="0"/>
+              <a:t>very poor job of predicting non-fully paid off loans</a:t>
             </a:r>
           </a:p>
           <a:p>
@@ -8012,22 +8466,8 @@
               </a:spcAft>
             </a:pPr>
             <a:r>
-              <a:rPr lang="en-US" dirty="0" smtClean="0"/>
-              <a:t>Convert categorical variables to dummies</a:t>
-            </a:r>
-          </a:p>
-          <a:p>
-            <a:pPr lvl="1">
-              <a:spcBef>
-                <a:spcPts val="1200"/>
-              </a:spcBef>
-              <a:spcAft>
-                <a:spcPts val="600"/>
-              </a:spcAft>
-            </a:pPr>
-            <a:r>
               <a:rPr lang="en-US" b="1" dirty="0" smtClean="0"/>
-              <a:t>End up with 159,431 observations and 82 variables</a:t>
+              <a:t>Expected result given highly imbalanced sample – try increasing classification threshold to decrease false positive rate</a:t>
             </a:r>
           </a:p>
         </p:txBody>
@@ -8035,7 +8475,7 @@
     </p:spTree>
     <p:extLst>
       <p:ext uri="{BB962C8B-B14F-4D97-AF65-F5344CB8AC3E}">
-        <p14:creationId xmlns:p14="http://schemas.microsoft.com/office/powerpoint/2010/main" val="363713684"/>
+        <p14:creationId xmlns:p14="http://schemas.microsoft.com/office/powerpoint/2010/main" val="731084785"/>
       </p:ext>
     </p:extLst>
   </p:cSld>
@@ -8086,16 +8526,212 @@
           <a:p>
             <a:r>
               <a:rPr lang="en-US" sz="2400" dirty="0" smtClean="0"/>
-              <a:t>Pairwise Plot [GRAPHIC]</a:t>
+              <a:t>Logistic Model (0.8 Classification Threshold)</a:t>
             </a:r>
             <a:endParaRPr lang="en-US" sz="2400" dirty="0"/>
+          </a:p>
+        </p:txBody>
+      </p:sp>
+      <p:sp>
+        <p:nvSpPr>
+          <p:cNvPr id="3" name="Text Placeholder 2"/>
+          <p:cNvSpPr>
+            <a:spLocks noGrp="1"/>
+          </p:cNvSpPr>
+          <p:nvPr>
+            <p:ph type="body" sz="quarter" idx="10"/>
+          </p:nvPr>
+        </p:nvSpPr>
+        <p:spPr>
+          <a:xfrm>
+            <a:off x="370115" y="1390650"/>
+            <a:ext cx="8370412" cy="5225810"/>
+          </a:xfrm>
+        </p:spPr>
+        <p:txBody>
+          <a:bodyPr/>
+          <a:lstStyle/>
+          <a:p>
+            <a:pPr lvl="1">
+              <a:spcBef>
+                <a:spcPts val="1200"/>
+              </a:spcBef>
+              <a:spcAft>
+                <a:spcPts val="600"/>
+              </a:spcAft>
+            </a:pPr>
+            <a:r>
+              <a:rPr lang="en-US" b="1" dirty="0" smtClean="0"/>
+              <a:t>Overall accuracy rate: 60.9% </a:t>
+            </a:r>
+            <a:r>
+              <a:rPr lang="en-US" b="1" dirty="0" smtClean="0">
+                <a:solidFill>
+                  <a:srgbClr val="FF0000"/>
+                </a:solidFill>
+              </a:rPr>
+              <a:t>(down from ~ 80%)</a:t>
+            </a:r>
+          </a:p>
+          <a:p>
+            <a:pPr lvl="1">
+              <a:spcBef>
+                <a:spcPts val="1200"/>
+              </a:spcBef>
+              <a:spcAft>
+                <a:spcPts val="600"/>
+              </a:spcAft>
+            </a:pPr>
+            <a:r>
+              <a:rPr lang="en-US" b="1" dirty="0" smtClean="0"/>
+              <a:t>True </a:t>
+            </a:r>
+            <a:r>
+              <a:rPr lang="en-US" b="1" dirty="0"/>
+              <a:t>positive rate (sensitivity): </a:t>
+            </a:r>
+            <a:r>
+              <a:rPr lang="en-US" b="1" dirty="0" smtClean="0"/>
+              <a:t>58% </a:t>
+            </a:r>
+            <a:r>
+              <a:rPr lang="en-US" b="1" dirty="0" smtClean="0">
+                <a:solidFill>
+                  <a:srgbClr val="FF0000"/>
+                </a:solidFill>
+              </a:rPr>
+              <a:t>(down from 98%)</a:t>
+            </a:r>
+            <a:endParaRPr lang="en-US" b="1" dirty="0">
+              <a:solidFill>
+                <a:srgbClr val="FF0000"/>
+              </a:solidFill>
+            </a:endParaRPr>
+          </a:p>
+          <a:p>
+            <a:pPr lvl="1">
+              <a:spcBef>
+                <a:spcPts val="1200"/>
+              </a:spcBef>
+              <a:spcAft>
+                <a:spcPts val="600"/>
+              </a:spcAft>
+            </a:pPr>
+            <a:r>
+              <a:rPr lang="en-US" b="1" dirty="0"/>
+              <a:t>True negative rate (specificity): </a:t>
+            </a:r>
+            <a:r>
+              <a:rPr lang="en-US" b="1" dirty="0" smtClean="0"/>
+              <a:t>71% </a:t>
+            </a:r>
+            <a:r>
+              <a:rPr lang="en-US" b="1" dirty="0" smtClean="0">
+                <a:solidFill>
+                  <a:srgbClr val="00B050"/>
+                </a:solidFill>
+              </a:rPr>
+              <a:t>(up from 7%) </a:t>
+            </a:r>
+            <a:r>
+              <a:rPr lang="en-US" b="1" dirty="0"/>
+              <a:t>and false positive rate (1-specificity): </a:t>
+            </a:r>
+            <a:r>
+              <a:rPr lang="en-US" b="1" dirty="0" smtClean="0"/>
+              <a:t>29% </a:t>
+            </a:r>
+            <a:r>
+              <a:rPr lang="en-US" b="1" dirty="0" smtClean="0">
+                <a:solidFill>
+                  <a:srgbClr val="00B050"/>
+                </a:solidFill>
+              </a:rPr>
+              <a:t>(down from 93%)</a:t>
+            </a:r>
+            <a:endParaRPr lang="en-US" b="1" dirty="0">
+              <a:solidFill>
+                <a:srgbClr val="00B050"/>
+              </a:solidFill>
+            </a:endParaRPr>
+          </a:p>
+          <a:p>
+            <a:pPr lvl="1">
+              <a:spcBef>
+                <a:spcPts val="1200"/>
+              </a:spcBef>
+              <a:spcAft>
+                <a:spcPts val="600"/>
+              </a:spcAft>
+            </a:pPr>
+            <a:r>
+              <a:rPr lang="en-US" b="1" dirty="0" smtClean="0"/>
+              <a:t>Overall</a:t>
+            </a:r>
+            <a:r>
+              <a:rPr lang="en-US" dirty="0" smtClean="0"/>
+              <a:t>: </a:t>
+            </a:r>
+          </a:p>
+          <a:p>
+            <a:pPr lvl="2">
+              <a:spcBef>
+                <a:spcPts val="1200"/>
+              </a:spcBef>
+              <a:spcAft>
+                <a:spcPts val="600"/>
+              </a:spcAft>
+            </a:pPr>
+            <a:r>
+              <a:rPr lang="en-US" b="1" dirty="0" smtClean="0"/>
+              <a:t>Stricter classification thresholds yield superior ability to predict non-fully paid loan status</a:t>
+            </a:r>
+          </a:p>
+          <a:p>
+            <a:pPr lvl="2">
+              <a:spcBef>
+                <a:spcPts val="1200"/>
+              </a:spcBef>
+              <a:spcAft>
+                <a:spcPts val="600"/>
+              </a:spcAft>
+            </a:pPr>
+            <a:r>
+              <a:rPr lang="en-US" dirty="0" smtClean="0"/>
+              <a:t>Varying classification threshold from 0.5 to 1 (in 0.1 increments) yields maximum AUC (of ~ 65%) at classification threshold of 0.8</a:t>
+            </a:r>
+          </a:p>
+          <a:p>
+            <a:pPr lvl="2">
+              <a:spcBef>
+                <a:spcPts val="1200"/>
+              </a:spcBef>
+              <a:spcAft>
+                <a:spcPts val="600"/>
+              </a:spcAft>
+            </a:pPr>
+            <a:r>
+              <a:rPr lang="en-US" b="1" dirty="0" smtClean="0"/>
+              <a:t>0.8 classification threshold thus generates most informative model</a:t>
+            </a:r>
+          </a:p>
+          <a:p>
+            <a:pPr lvl="1">
+              <a:spcBef>
+                <a:spcPts val="1200"/>
+              </a:spcBef>
+              <a:spcAft>
+                <a:spcPts val="600"/>
+              </a:spcAft>
+            </a:pPr>
+            <a:endParaRPr lang="en-US" b="1" dirty="0" smtClean="0"/>
           </a:p>
         </p:txBody>
       </p:sp>
     </p:spTree>
     <p:extLst>
       <p:ext uri="{BB962C8B-B14F-4D97-AF65-F5344CB8AC3E}">
-        <p14:creationId xmlns:p14="http://schemas.microsoft.com/office/powerpoint/2010/main" val="4082047420"/>
+        <p14:creationId xmlns:p14="http://schemas.microsoft.com/office/powerpoint/2010/main" val="139769176"/>
       </p:ext>
     </p:extLst>
   </p:cSld>
@@ -8288,7 +8924,7 @@
                 <a:ea typeface="+mj-ea"/>
                 <a:cs typeface="+mj-cs"/>
               </a:rPr>
-              <a:t>Logistic Model</a:t>
+              <a:t>Random Forest</a:t>
             </a:r>
           </a:p>
           <a:p>
@@ -8314,7 +8950,7 @@
     </p:spTree>
     <p:extLst>
       <p:ext uri="{BB962C8B-B14F-4D97-AF65-F5344CB8AC3E}">
-        <p14:creationId xmlns:p14="http://schemas.microsoft.com/office/powerpoint/2010/main" val="4146025096"/>
+        <p14:creationId xmlns:p14="http://schemas.microsoft.com/office/powerpoint/2010/main" val="1737559854"/>
       </p:ext>
     </p:extLst>
   </p:cSld>
@@ -8365,868 +9001,6 @@
           <a:p>
             <a:r>
               <a:rPr lang="en-US" sz="2400" dirty="0" smtClean="0"/>
-              <a:t>Success Metrics </a:t>
-            </a:r>
-            <a:endParaRPr lang="en-US" sz="2400" dirty="0"/>
-          </a:p>
-        </p:txBody>
-      </p:sp>
-      <p:sp>
-        <p:nvSpPr>
-          <p:cNvPr id="3" name="Text Placeholder 2"/>
-          <p:cNvSpPr>
-            <a:spLocks noGrp="1"/>
-          </p:cNvSpPr>
-          <p:nvPr>
-            <p:ph type="body" sz="quarter" idx="10"/>
-          </p:nvPr>
-        </p:nvSpPr>
-        <p:spPr>
-          <a:xfrm>
-            <a:off x="323933" y="1233632"/>
-            <a:ext cx="8370412" cy="5225810"/>
-          </a:xfrm>
-        </p:spPr>
-        <p:txBody>
-          <a:bodyPr/>
-          <a:lstStyle/>
-          <a:p>
-            <a:pPr lvl="1">
-              <a:spcBef>
-                <a:spcPts val="1200"/>
-              </a:spcBef>
-              <a:spcAft>
-                <a:spcPts val="600"/>
-              </a:spcAft>
-            </a:pPr>
-            <a:r>
-              <a:rPr lang="en-US" b="1" dirty="0" smtClean="0"/>
-              <a:t>Given imbalanced sample (20% non-fully paid vs. 80% fully paid loans) </a:t>
-            </a:r>
-            <a:r>
-              <a:rPr lang="en-US" dirty="0" smtClean="0"/>
-              <a:t>focus on:</a:t>
-            </a:r>
-          </a:p>
-          <a:p>
-            <a:pPr lvl="2">
-              <a:spcBef>
-                <a:spcPts val="1200"/>
-              </a:spcBef>
-              <a:spcAft>
-                <a:spcPts val="600"/>
-              </a:spcAft>
-            </a:pPr>
-            <a:r>
-              <a:rPr lang="en-US" sz="1800" b="1" dirty="0" smtClean="0"/>
-              <a:t>Sensitivity or true positive rate </a:t>
-            </a:r>
-            <a:r>
-              <a:rPr lang="en-US" sz="1800" dirty="0" smtClean="0"/>
-              <a:t>(i.e</a:t>
-            </a:r>
-            <a:r>
-              <a:rPr lang="en-US" sz="1800" dirty="0"/>
-              <a:t>. the fraction of loans that </a:t>
-            </a:r>
-            <a:r>
-              <a:rPr lang="en-US" sz="1800" dirty="0" smtClean="0"/>
-              <a:t>were </a:t>
-            </a:r>
-            <a:r>
-              <a:rPr lang="en-US" sz="1800" dirty="0"/>
-              <a:t>actually </a:t>
-            </a:r>
-            <a:r>
-              <a:rPr lang="en-US" sz="1800" dirty="0" smtClean="0"/>
-              <a:t>fully paid off that </a:t>
-            </a:r>
-            <a:r>
-              <a:rPr lang="en-US" sz="1800" dirty="0"/>
-              <a:t>were predicted as </a:t>
-            </a:r>
-            <a:r>
-              <a:rPr lang="en-US" sz="1800" dirty="0" smtClean="0"/>
-              <a:t>such, i.e. a target value of 1); </a:t>
-            </a:r>
-            <a:r>
-              <a:rPr lang="en-US" sz="1800" dirty="0"/>
-              <a:t>and </a:t>
-            </a:r>
-            <a:endParaRPr lang="en-US" sz="1800" dirty="0" smtClean="0"/>
-          </a:p>
-          <a:p>
-            <a:pPr lvl="2">
-              <a:spcBef>
-                <a:spcPts val="1200"/>
-              </a:spcBef>
-              <a:spcAft>
-                <a:spcPts val="600"/>
-              </a:spcAft>
-            </a:pPr>
-            <a:r>
-              <a:rPr lang="en-US" sz="1800" b="1" dirty="0" smtClean="0"/>
-              <a:t>Specificity or true negative rate </a:t>
-            </a:r>
-            <a:endParaRPr lang="en-US" sz="1800" dirty="0" smtClean="0"/>
-          </a:p>
-          <a:p>
-            <a:pPr lvl="2">
-              <a:spcBef>
-                <a:spcPts val="1200"/>
-              </a:spcBef>
-              <a:spcAft>
-                <a:spcPts val="600"/>
-              </a:spcAft>
-            </a:pPr>
-            <a:r>
-              <a:rPr lang="en-US" sz="1800" b="1" dirty="0" smtClean="0"/>
-              <a:t>Also examine ROC curve and AUC (area under curve):</a:t>
-            </a:r>
-          </a:p>
-          <a:p>
-            <a:pPr lvl="3">
-              <a:spcBef>
-                <a:spcPts val="1200"/>
-              </a:spcBef>
-              <a:spcAft>
-                <a:spcPts val="600"/>
-              </a:spcAft>
-            </a:pPr>
-            <a:r>
-              <a:rPr lang="en-US" sz="1800" b="1" dirty="0" smtClean="0"/>
-              <a:t>ROC curve </a:t>
-            </a:r>
-            <a:r>
-              <a:rPr lang="en-US" sz="1800" dirty="0" smtClean="0"/>
-              <a:t>plots true positive against false positive rate across all classification thresholds </a:t>
-            </a:r>
-          </a:p>
-          <a:p>
-            <a:pPr lvl="3">
-              <a:spcBef>
-                <a:spcPts val="1200"/>
-              </a:spcBef>
-              <a:spcAft>
-                <a:spcPts val="600"/>
-              </a:spcAft>
-            </a:pPr>
-            <a:r>
-              <a:rPr lang="en-US" sz="1800" b="1" dirty="0" smtClean="0"/>
-              <a:t>AUC </a:t>
-            </a:r>
-            <a:r>
-              <a:rPr lang="en-US" sz="1800" dirty="0" smtClean="0"/>
-              <a:t>measures area under ROC curve (i.e. likelihood that model assigns a higher probability of being fully paid off to a randomly chosen fully paid loan than to a randomly chosen non-fully paid loan)</a:t>
-            </a:r>
-          </a:p>
-          <a:p>
-            <a:pPr lvl="3">
-              <a:spcBef>
-                <a:spcPts val="1200"/>
-              </a:spcBef>
-              <a:spcAft>
-                <a:spcPts val="600"/>
-              </a:spcAft>
-            </a:pPr>
-            <a:r>
-              <a:rPr lang="en-US" sz="1800" b="1" dirty="0" smtClean="0"/>
-              <a:t>AUC score of 0.5 indicates model is non-discriminatory, while value closer to 1 indicates more informative classifier</a:t>
-            </a:r>
-          </a:p>
-        </p:txBody>
-      </p:sp>
-    </p:spTree>
-    <p:extLst>
-      <p:ext uri="{BB962C8B-B14F-4D97-AF65-F5344CB8AC3E}">
-        <p14:creationId xmlns:p14="http://schemas.microsoft.com/office/powerpoint/2010/main" val="821509069"/>
-      </p:ext>
-    </p:extLst>
-  </p:cSld>
-  <p:clrMapOvr>
-    <a:masterClrMapping/>
-  </p:clrMapOvr>
-  <p:timing>
-    <p:tnLst>
-      <p:par>
-        <p:cTn id="1" dur="indefinite" restart="never" nodeType="tmRoot"/>
-      </p:par>
-    </p:tnLst>
-  </p:timing>
-</p:sld>
-</file>
-
-<file path=ppt/slides/slide22.xml><?xml version="1.0" encoding="utf-8"?>
-<p:sld xmlns:a="http://schemas.openxmlformats.org/drawingml/2006/main" xmlns:r="http://schemas.openxmlformats.org/officeDocument/2006/relationships" xmlns:p="http://schemas.openxmlformats.org/presentationml/2006/main">
-  <p:cSld>
-    <p:spTree>
-      <p:nvGrpSpPr>
-        <p:cNvPr id="1" name=""/>
-        <p:cNvGrpSpPr/>
-        <p:nvPr/>
-      </p:nvGrpSpPr>
-      <p:grpSpPr>
-        <a:xfrm>
-          <a:off x="0" y="0"/>
-          <a:ext cx="0" cy="0"/>
-          <a:chOff x="0" y="0"/>
-          <a:chExt cx="0" cy="0"/>
-        </a:xfrm>
-      </p:grpSpPr>
-      <p:sp>
-        <p:nvSpPr>
-          <p:cNvPr id="2" name="Title 1"/>
-          <p:cNvSpPr>
-            <a:spLocks noGrp="1"/>
-          </p:cNvSpPr>
-          <p:nvPr>
-            <p:ph type="title"/>
-          </p:nvPr>
-        </p:nvSpPr>
-        <p:spPr/>
-        <p:txBody>
-          <a:bodyPr/>
-          <a:lstStyle/>
-          <a:p>
-            <a:r>
-              <a:rPr lang="en-US" sz="2400" dirty="0" smtClean="0"/>
-              <a:t>Logistic Model (0.5 Classification Threshold)</a:t>
-            </a:r>
-            <a:endParaRPr lang="en-US" sz="2400" dirty="0"/>
-          </a:p>
-        </p:txBody>
-      </p:sp>
-      <p:sp>
-        <p:nvSpPr>
-          <p:cNvPr id="3" name="Text Placeholder 2"/>
-          <p:cNvSpPr>
-            <a:spLocks noGrp="1"/>
-          </p:cNvSpPr>
-          <p:nvPr>
-            <p:ph type="body" sz="quarter" idx="10"/>
-          </p:nvPr>
-        </p:nvSpPr>
-        <p:spPr>
-          <a:xfrm>
-            <a:off x="370115" y="1390650"/>
-            <a:ext cx="8370412" cy="5225810"/>
-          </a:xfrm>
-        </p:spPr>
-        <p:txBody>
-          <a:bodyPr/>
-          <a:lstStyle/>
-          <a:p>
-            <a:pPr lvl="1">
-              <a:spcBef>
-                <a:spcPts val="1200"/>
-              </a:spcBef>
-              <a:spcAft>
-                <a:spcPts val="600"/>
-              </a:spcAft>
-            </a:pPr>
-            <a:r>
-              <a:rPr lang="en-US" b="1" dirty="0" smtClean="0"/>
-              <a:t>Accuracy (5-fold cross-validation): 80% </a:t>
-            </a:r>
-            <a:r>
-              <a:rPr lang="en-US" dirty="0" smtClean="0"/>
-              <a:t>vs. 20% null model accuracy</a:t>
-            </a:r>
-          </a:p>
-          <a:p>
-            <a:pPr lvl="2">
-              <a:spcBef>
-                <a:spcPts val="1200"/>
-              </a:spcBef>
-              <a:spcAft>
-                <a:spcPts val="600"/>
-              </a:spcAft>
-            </a:pPr>
-            <a:r>
-              <a:rPr lang="en-US" dirty="0" smtClean="0"/>
-              <a:t>Indicates relatively low bias</a:t>
-            </a:r>
-          </a:p>
-          <a:p>
-            <a:pPr lvl="1">
-              <a:spcBef>
-                <a:spcPts val="1200"/>
-              </a:spcBef>
-              <a:spcAft>
-                <a:spcPts val="600"/>
-              </a:spcAft>
-            </a:pPr>
-            <a:r>
-              <a:rPr lang="en-US" b="1" dirty="0" smtClean="0"/>
-              <a:t>Training set accuracy of 78.7% vs. test set accuracy of 78.4%</a:t>
-            </a:r>
-          </a:p>
-          <a:p>
-            <a:pPr lvl="2">
-              <a:spcBef>
-                <a:spcPts val="1200"/>
-              </a:spcBef>
-              <a:spcAft>
-                <a:spcPts val="600"/>
-              </a:spcAft>
-            </a:pPr>
-            <a:r>
-              <a:rPr lang="en-US" dirty="0" smtClean="0"/>
-              <a:t>Indicates low variance</a:t>
-            </a:r>
-          </a:p>
-          <a:p>
-            <a:pPr lvl="1">
-              <a:spcBef>
-                <a:spcPts val="1200"/>
-              </a:spcBef>
-              <a:spcAft>
-                <a:spcPts val="600"/>
-              </a:spcAft>
-            </a:pPr>
-            <a:r>
-              <a:rPr lang="en-US" b="1" dirty="0" smtClean="0"/>
-              <a:t>True positive rate (sensitivity): 98.4%</a:t>
-            </a:r>
-          </a:p>
-          <a:p>
-            <a:pPr lvl="1">
-              <a:spcBef>
-                <a:spcPts val="1200"/>
-              </a:spcBef>
-              <a:spcAft>
-                <a:spcPts val="600"/>
-              </a:spcAft>
-            </a:pPr>
-            <a:r>
-              <a:rPr lang="en-US" b="1" dirty="0" smtClean="0"/>
-              <a:t>True negative rate (specificity): 6.8% and false positive rate (1-specificity): 93.2%</a:t>
-            </a:r>
-          </a:p>
-          <a:p>
-            <a:pPr lvl="1">
-              <a:spcBef>
-                <a:spcPts val="1200"/>
-              </a:spcBef>
-              <a:spcAft>
-                <a:spcPts val="600"/>
-              </a:spcAft>
-            </a:pPr>
-            <a:r>
-              <a:rPr lang="en-US" dirty="0" smtClean="0"/>
-              <a:t>Overall, model does very good job of predicting fully paid off loans (high sensitivity) but </a:t>
-            </a:r>
-            <a:r>
-              <a:rPr lang="en-US" b="1" dirty="0" smtClean="0"/>
-              <a:t>very poor job of predicting non-fully paid off loans</a:t>
-            </a:r>
-          </a:p>
-          <a:p>
-            <a:pPr lvl="1">
-              <a:spcBef>
-                <a:spcPts val="1200"/>
-              </a:spcBef>
-              <a:spcAft>
-                <a:spcPts val="600"/>
-              </a:spcAft>
-            </a:pPr>
-            <a:r>
-              <a:rPr lang="en-US" b="1" dirty="0" smtClean="0"/>
-              <a:t>Expected result given highly imbalanced sample – try increasing classification threshold to decrease false positive rate</a:t>
-            </a:r>
-          </a:p>
-        </p:txBody>
-      </p:sp>
-    </p:spTree>
-    <p:extLst>
-      <p:ext uri="{BB962C8B-B14F-4D97-AF65-F5344CB8AC3E}">
-        <p14:creationId xmlns:p14="http://schemas.microsoft.com/office/powerpoint/2010/main" val="731084785"/>
-      </p:ext>
-    </p:extLst>
-  </p:cSld>
-  <p:clrMapOvr>
-    <a:masterClrMapping/>
-  </p:clrMapOvr>
-  <p:timing>
-    <p:tnLst>
-      <p:par>
-        <p:cTn id="1" dur="indefinite" restart="never" nodeType="tmRoot"/>
-      </p:par>
-    </p:tnLst>
-  </p:timing>
-</p:sld>
-</file>
-
-<file path=ppt/slides/slide23.xml><?xml version="1.0" encoding="utf-8"?>
-<p:sld xmlns:a="http://schemas.openxmlformats.org/drawingml/2006/main" xmlns:r="http://schemas.openxmlformats.org/officeDocument/2006/relationships" xmlns:p="http://schemas.openxmlformats.org/presentationml/2006/main">
-  <p:cSld>
-    <p:spTree>
-      <p:nvGrpSpPr>
-        <p:cNvPr id="1" name=""/>
-        <p:cNvGrpSpPr/>
-        <p:nvPr/>
-      </p:nvGrpSpPr>
-      <p:grpSpPr>
-        <a:xfrm>
-          <a:off x="0" y="0"/>
-          <a:ext cx="0" cy="0"/>
-          <a:chOff x="0" y="0"/>
-          <a:chExt cx="0" cy="0"/>
-        </a:xfrm>
-      </p:grpSpPr>
-      <p:sp>
-        <p:nvSpPr>
-          <p:cNvPr id="2" name="Title 1"/>
-          <p:cNvSpPr>
-            <a:spLocks noGrp="1"/>
-          </p:cNvSpPr>
-          <p:nvPr>
-            <p:ph type="title"/>
-          </p:nvPr>
-        </p:nvSpPr>
-        <p:spPr/>
-        <p:txBody>
-          <a:bodyPr/>
-          <a:lstStyle/>
-          <a:p>
-            <a:r>
-              <a:rPr lang="en-US" sz="2400" dirty="0" smtClean="0"/>
-              <a:t>Logistic Model: ROC Curve and AUC [GRAPHIC]</a:t>
-            </a:r>
-            <a:endParaRPr lang="en-US" sz="2400" dirty="0"/>
-          </a:p>
-        </p:txBody>
-      </p:sp>
-    </p:spTree>
-    <p:extLst>
-      <p:ext uri="{BB962C8B-B14F-4D97-AF65-F5344CB8AC3E}">
-        <p14:creationId xmlns:p14="http://schemas.microsoft.com/office/powerpoint/2010/main" val="399804551"/>
-      </p:ext>
-    </p:extLst>
-  </p:cSld>
-  <p:clrMapOvr>
-    <a:masterClrMapping/>
-  </p:clrMapOvr>
-  <p:timing>
-    <p:tnLst>
-      <p:par>
-        <p:cTn id="1" dur="indefinite" restart="never" nodeType="tmRoot"/>
-      </p:par>
-    </p:tnLst>
-  </p:timing>
-</p:sld>
-</file>
-
-<file path=ppt/slides/slide24.xml><?xml version="1.0" encoding="utf-8"?>
-<p:sld xmlns:a="http://schemas.openxmlformats.org/drawingml/2006/main" xmlns:r="http://schemas.openxmlformats.org/officeDocument/2006/relationships" xmlns:p="http://schemas.openxmlformats.org/presentationml/2006/main">
-  <p:cSld>
-    <p:spTree>
-      <p:nvGrpSpPr>
-        <p:cNvPr id="1" name=""/>
-        <p:cNvGrpSpPr/>
-        <p:nvPr/>
-      </p:nvGrpSpPr>
-      <p:grpSpPr>
-        <a:xfrm>
-          <a:off x="0" y="0"/>
-          <a:ext cx="0" cy="0"/>
-          <a:chOff x="0" y="0"/>
-          <a:chExt cx="0" cy="0"/>
-        </a:xfrm>
-      </p:grpSpPr>
-      <p:sp>
-        <p:nvSpPr>
-          <p:cNvPr id="2" name="Title 1"/>
-          <p:cNvSpPr>
-            <a:spLocks noGrp="1"/>
-          </p:cNvSpPr>
-          <p:nvPr>
-            <p:ph type="title"/>
-          </p:nvPr>
-        </p:nvSpPr>
-        <p:spPr/>
-        <p:txBody>
-          <a:bodyPr/>
-          <a:lstStyle/>
-          <a:p>
-            <a:r>
-              <a:rPr lang="en-US" sz="2400" dirty="0" smtClean="0"/>
-              <a:t>Logistic Model (0.8 Classification Threshold)</a:t>
-            </a:r>
-            <a:endParaRPr lang="en-US" sz="2400" dirty="0"/>
-          </a:p>
-        </p:txBody>
-      </p:sp>
-      <p:sp>
-        <p:nvSpPr>
-          <p:cNvPr id="3" name="Text Placeholder 2"/>
-          <p:cNvSpPr>
-            <a:spLocks noGrp="1"/>
-          </p:cNvSpPr>
-          <p:nvPr>
-            <p:ph type="body" sz="quarter" idx="10"/>
-          </p:nvPr>
-        </p:nvSpPr>
-        <p:spPr>
-          <a:xfrm>
-            <a:off x="370115" y="1390650"/>
-            <a:ext cx="8370412" cy="5225810"/>
-          </a:xfrm>
-        </p:spPr>
-        <p:txBody>
-          <a:bodyPr/>
-          <a:lstStyle/>
-          <a:p>
-            <a:pPr lvl="1">
-              <a:spcBef>
-                <a:spcPts val="1200"/>
-              </a:spcBef>
-              <a:spcAft>
-                <a:spcPts val="600"/>
-              </a:spcAft>
-            </a:pPr>
-            <a:r>
-              <a:rPr lang="en-US" b="1" dirty="0" smtClean="0"/>
-              <a:t>Overall accuracy rate: 60.9% </a:t>
-            </a:r>
-            <a:r>
-              <a:rPr lang="en-US" b="1" dirty="0" smtClean="0">
-                <a:solidFill>
-                  <a:srgbClr val="FF0000"/>
-                </a:solidFill>
-              </a:rPr>
-              <a:t>(down from ~ 80%)</a:t>
-            </a:r>
-          </a:p>
-          <a:p>
-            <a:pPr lvl="1">
-              <a:spcBef>
-                <a:spcPts val="1200"/>
-              </a:spcBef>
-              <a:spcAft>
-                <a:spcPts val="600"/>
-              </a:spcAft>
-            </a:pPr>
-            <a:r>
-              <a:rPr lang="en-US" b="1" dirty="0" smtClean="0"/>
-              <a:t>True </a:t>
-            </a:r>
-            <a:r>
-              <a:rPr lang="en-US" b="1" dirty="0"/>
-              <a:t>positive rate (sensitivity): </a:t>
-            </a:r>
-            <a:r>
-              <a:rPr lang="en-US" b="1" dirty="0" smtClean="0"/>
-              <a:t>58% </a:t>
-            </a:r>
-            <a:r>
-              <a:rPr lang="en-US" b="1" dirty="0" smtClean="0">
-                <a:solidFill>
-                  <a:srgbClr val="FF0000"/>
-                </a:solidFill>
-              </a:rPr>
-              <a:t>(down from 98%)</a:t>
-            </a:r>
-            <a:endParaRPr lang="en-US" b="1" dirty="0">
-              <a:solidFill>
-                <a:srgbClr val="FF0000"/>
-              </a:solidFill>
-            </a:endParaRPr>
-          </a:p>
-          <a:p>
-            <a:pPr lvl="1">
-              <a:spcBef>
-                <a:spcPts val="1200"/>
-              </a:spcBef>
-              <a:spcAft>
-                <a:spcPts val="600"/>
-              </a:spcAft>
-            </a:pPr>
-            <a:r>
-              <a:rPr lang="en-US" b="1" dirty="0"/>
-              <a:t>True negative rate (specificity): </a:t>
-            </a:r>
-            <a:r>
-              <a:rPr lang="en-US" b="1" dirty="0" smtClean="0"/>
-              <a:t>71% </a:t>
-            </a:r>
-            <a:r>
-              <a:rPr lang="en-US" b="1" dirty="0" smtClean="0">
-                <a:solidFill>
-                  <a:srgbClr val="00B050"/>
-                </a:solidFill>
-              </a:rPr>
-              <a:t>(up from 7%) </a:t>
-            </a:r>
-            <a:r>
-              <a:rPr lang="en-US" b="1" dirty="0"/>
-              <a:t>and false positive rate (1-specificity): </a:t>
-            </a:r>
-            <a:r>
-              <a:rPr lang="en-US" b="1" dirty="0" smtClean="0"/>
-              <a:t>29% </a:t>
-            </a:r>
-            <a:r>
-              <a:rPr lang="en-US" b="1" dirty="0" smtClean="0">
-                <a:solidFill>
-                  <a:srgbClr val="00B050"/>
-                </a:solidFill>
-              </a:rPr>
-              <a:t>(down from 93%)</a:t>
-            </a:r>
-            <a:endParaRPr lang="en-US" b="1" dirty="0">
-              <a:solidFill>
-                <a:srgbClr val="00B050"/>
-              </a:solidFill>
-            </a:endParaRPr>
-          </a:p>
-          <a:p>
-            <a:pPr lvl="1">
-              <a:spcBef>
-                <a:spcPts val="1200"/>
-              </a:spcBef>
-              <a:spcAft>
-                <a:spcPts val="600"/>
-              </a:spcAft>
-            </a:pPr>
-            <a:r>
-              <a:rPr lang="en-US" b="1" dirty="0" smtClean="0"/>
-              <a:t>Overall</a:t>
-            </a:r>
-            <a:r>
-              <a:rPr lang="en-US" dirty="0" smtClean="0"/>
-              <a:t>: </a:t>
-            </a:r>
-          </a:p>
-          <a:p>
-            <a:pPr lvl="2">
-              <a:spcBef>
-                <a:spcPts val="1200"/>
-              </a:spcBef>
-              <a:spcAft>
-                <a:spcPts val="600"/>
-              </a:spcAft>
-            </a:pPr>
-            <a:r>
-              <a:rPr lang="en-US" b="1" dirty="0" smtClean="0"/>
-              <a:t>Stricter classification thresholds yield superior ability to predict non-fully paid loan status</a:t>
-            </a:r>
-          </a:p>
-          <a:p>
-            <a:pPr lvl="2">
-              <a:spcBef>
-                <a:spcPts val="1200"/>
-              </a:spcBef>
-              <a:spcAft>
-                <a:spcPts val="600"/>
-              </a:spcAft>
-            </a:pPr>
-            <a:r>
-              <a:rPr lang="en-US" dirty="0" smtClean="0"/>
-              <a:t>Varying classification threshold from 0.5 to 1 (in 0.1 increments) yields maximum AUC (of ~ 65%) at classification threshold of 0.8</a:t>
-            </a:r>
-          </a:p>
-          <a:p>
-            <a:pPr lvl="2">
-              <a:spcBef>
-                <a:spcPts val="1200"/>
-              </a:spcBef>
-              <a:spcAft>
-                <a:spcPts val="600"/>
-              </a:spcAft>
-            </a:pPr>
-            <a:r>
-              <a:rPr lang="en-US" b="1" dirty="0" smtClean="0"/>
-              <a:t>0.8 classification threshold thus generates most informative model</a:t>
-            </a:r>
-          </a:p>
-          <a:p>
-            <a:pPr lvl="1">
-              <a:spcBef>
-                <a:spcPts val="1200"/>
-              </a:spcBef>
-              <a:spcAft>
-                <a:spcPts val="600"/>
-              </a:spcAft>
-            </a:pPr>
-            <a:endParaRPr lang="en-US" b="1" dirty="0" smtClean="0"/>
-          </a:p>
-        </p:txBody>
-      </p:sp>
-    </p:spTree>
-    <p:extLst>
-      <p:ext uri="{BB962C8B-B14F-4D97-AF65-F5344CB8AC3E}">
-        <p14:creationId xmlns:p14="http://schemas.microsoft.com/office/powerpoint/2010/main" val="139769176"/>
-      </p:ext>
-    </p:extLst>
-  </p:cSld>
-  <p:clrMapOvr>
-    <a:masterClrMapping/>
-  </p:clrMapOvr>
-  <p:timing>
-    <p:tnLst>
-      <p:par>
-        <p:cTn id="1" dur="indefinite" restart="never" nodeType="tmRoot"/>
-      </p:par>
-    </p:tnLst>
-  </p:timing>
-</p:sld>
-</file>
-
-<file path=ppt/slides/slide25.xml><?xml version="1.0" encoding="utf-8"?>
-<p:sld xmlns:a="http://schemas.openxmlformats.org/drawingml/2006/main" xmlns:r="http://schemas.openxmlformats.org/officeDocument/2006/relationships" xmlns:p="http://schemas.openxmlformats.org/presentationml/2006/main">
-  <p:cSld>
-    <p:spTree>
-      <p:nvGrpSpPr>
-        <p:cNvPr id="1" name=""/>
-        <p:cNvGrpSpPr/>
-        <p:nvPr/>
-      </p:nvGrpSpPr>
-      <p:grpSpPr>
-        <a:xfrm>
-          <a:off x="0" y="0"/>
-          <a:ext cx="0" cy="0"/>
-          <a:chOff x="0" y="0"/>
-          <a:chExt cx="0" cy="0"/>
-        </a:xfrm>
-      </p:grpSpPr>
-      <p:sp>
-        <p:nvSpPr>
-          <p:cNvPr id="5" name="TextBox 4"/>
-          <p:cNvSpPr txBox="1"/>
-          <p:nvPr/>
-        </p:nvSpPr>
-        <p:spPr>
-          <a:xfrm>
-            <a:off x="885825" y="2113002"/>
-            <a:ext cx="7381875" cy="1384995"/>
-          </a:xfrm>
-          <a:prstGeom prst="rect">
-            <a:avLst/>
-          </a:prstGeom>
-          <a:noFill/>
-        </p:spPr>
-        <p:txBody>
-          <a:bodyPr wrap="square" rtlCol="0">
-            <a:spAutoFit/>
-          </a:bodyPr>
-          <a:lstStyle/>
-          <a:p>
-            <a:pPr algn="ctr" defTabSz="457200" fontAlgn="base">
-              <a:spcBef>
-                <a:spcPct val="0"/>
-              </a:spcBef>
-              <a:spcAft>
-                <a:spcPct val="0"/>
-              </a:spcAft>
-            </a:pPr>
-            <a:r>
-              <a:rPr lang="en-US" sz="2800" b="1" dirty="0" smtClean="0">
-                <a:solidFill>
-                  <a:srgbClr val="00467F"/>
-                </a:solidFill>
-                <a:latin typeface="Century Gothic" pitchFamily="34" charset="0"/>
-                <a:ea typeface="+mj-ea"/>
-                <a:cs typeface="+mj-cs"/>
-              </a:rPr>
-              <a:t>Model Performance Evaluation: </a:t>
-            </a:r>
-          </a:p>
-          <a:p>
-            <a:pPr algn="ctr" defTabSz="457200" fontAlgn="base">
-              <a:spcBef>
-                <a:spcPct val="0"/>
-              </a:spcBef>
-              <a:spcAft>
-                <a:spcPct val="0"/>
-              </a:spcAft>
-            </a:pPr>
-            <a:r>
-              <a:rPr lang="en-US" sz="2800" b="1" dirty="0" smtClean="0">
-                <a:solidFill>
-                  <a:srgbClr val="00467F"/>
-                </a:solidFill>
-                <a:latin typeface="Century Gothic" pitchFamily="34" charset="0"/>
-                <a:ea typeface="+mj-ea"/>
-                <a:cs typeface="+mj-cs"/>
-              </a:rPr>
-              <a:t>Random Forest</a:t>
-            </a:r>
-          </a:p>
-          <a:p>
-            <a:pPr algn="ctr" defTabSz="457200" fontAlgn="base">
-              <a:spcBef>
-                <a:spcPct val="0"/>
-              </a:spcBef>
-              <a:spcAft>
-                <a:spcPct val="0"/>
-              </a:spcAft>
-            </a:pPr>
-            <a:endParaRPr lang="en-US" sz="2800" b="1" dirty="0" smtClean="0">
-              <a:solidFill>
-                <a:srgbClr val="00467F"/>
-              </a:solidFill>
-              <a:latin typeface="Century Gothic" pitchFamily="34" charset="0"/>
-              <a:ea typeface="+mj-ea"/>
-              <a:cs typeface="+mj-cs"/>
-            </a:endParaRPr>
-          </a:p>
-        </p:txBody>
-      </p:sp>
-    </p:spTree>
-    <p:extLst>
-      <p:ext uri="{BB962C8B-B14F-4D97-AF65-F5344CB8AC3E}">
-        <p14:creationId xmlns:p14="http://schemas.microsoft.com/office/powerpoint/2010/main" val="1737559854"/>
-      </p:ext>
-    </p:extLst>
-  </p:cSld>
-  <p:clrMapOvr>
-    <a:masterClrMapping/>
-  </p:clrMapOvr>
-  <p:timing>
-    <p:tnLst>
-      <p:par>
-        <p:cTn id="1" dur="indefinite" restart="never" nodeType="tmRoot"/>
-      </p:par>
-    </p:tnLst>
-  </p:timing>
-</p:sld>
-</file>
-
-<file path=ppt/slides/slide26.xml><?xml version="1.0" encoding="utf-8"?>
-<p:sld xmlns:a="http://schemas.openxmlformats.org/drawingml/2006/main" xmlns:r="http://schemas.openxmlformats.org/officeDocument/2006/relationships" xmlns:p="http://schemas.openxmlformats.org/presentationml/2006/main">
-  <p:cSld>
-    <p:spTree>
-      <p:nvGrpSpPr>
-        <p:cNvPr id="1" name=""/>
-        <p:cNvGrpSpPr/>
-        <p:nvPr/>
-      </p:nvGrpSpPr>
-      <p:grpSpPr>
-        <a:xfrm>
-          <a:off x="0" y="0"/>
-          <a:ext cx="0" cy="0"/>
-          <a:chOff x="0" y="0"/>
-          <a:chExt cx="0" cy="0"/>
-        </a:xfrm>
-      </p:grpSpPr>
-      <p:sp>
-        <p:nvSpPr>
-          <p:cNvPr id="2" name="Title 1"/>
-          <p:cNvSpPr>
-            <a:spLocks noGrp="1"/>
-          </p:cNvSpPr>
-          <p:nvPr>
-            <p:ph type="title"/>
-          </p:nvPr>
-        </p:nvSpPr>
-        <p:spPr/>
-        <p:txBody>
-          <a:bodyPr/>
-          <a:lstStyle/>
-          <a:p>
-            <a:r>
-              <a:rPr lang="en-US" sz="2400" dirty="0" smtClean="0"/>
               <a:t>Random Forest Model Results</a:t>
             </a:r>
             <a:endParaRPr lang="en-US" sz="2400" dirty="0"/>
@@ -9340,7 +9114,7 @@
 </p:sld>
 </file>
 
-<file path=ppt/slides/slide27.xml><?xml version="1.0" encoding="utf-8"?>
+<file path=ppt/slides/slide22.xml><?xml version="1.0" encoding="utf-8"?>
 <p:sld xmlns:a="http://schemas.openxmlformats.org/drawingml/2006/main" xmlns:r="http://schemas.openxmlformats.org/officeDocument/2006/relationships" xmlns:p="http://schemas.openxmlformats.org/presentationml/2006/main">
   <p:cSld>
     <p:spTree>
@@ -9662,8 +9436,37 @@
             </a:pPr>
             <a:r>
               <a:rPr lang="en-US" sz="1800" b="1" dirty="0" smtClean="0"/>
-              <a:t>Classification models: Logistic Regression and Random Forest</a:t>
-            </a:r>
+              <a:t>Classification models: </a:t>
+            </a:r>
+            <a:endParaRPr lang="en-US" sz="1800" b="1" dirty="0" smtClean="0"/>
+          </a:p>
+          <a:p>
+            <a:pPr lvl="3">
+              <a:spcBef>
+                <a:spcPts val="1200"/>
+              </a:spcBef>
+            </a:pPr>
+            <a:r>
+              <a:rPr lang="en-US" sz="1800" b="1" dirty="0" smtClean="0"/>
+              <a:t>Logistic Regression (simple first pass) </a:t>
+            </a:r>
+            <a:r>
+              <a:rPr lang="en-US" sz="1800" b="1" dirty="0" smtClean="0"/>
+              <a:t>and </a:t>
+            </a:r>
+            <a:endParaRPr lang="en-US" sz="1800" b="1" dirty="0" smtClean="0"/>
+          </a:p>
+          <a:p>
+            <a:pPr lvl="3">
+              <a:spcBef>
+                <a:spcPts val="1200"/>
+              </a:spcBef>
+            </a:pPr>
+            <a:r>
+              <a:rPr lang="en-US" sz="1800" b="1" dirty="0" smtClean="0"/>
+              <a:t>Random Forest (optimized performance)</a:t>
+            </a:r>
+            <a:endParaRPr lang="en-US" sz="1800" b="1" dirty="0" smtClean="0"/>
           </a:p>
           <a:p>
             <a:pPr lvl="1">
@@ -9685,7 +9488,15 @@
             </a:r>
             <a:r>
               <a:rPr lang="en-US" b="1" dirty="0" smtClean="0"/>
-              <a:t>Predict defaults and inform superior loan picking strategy for investors</a:t>
+              <a:t>Predict </a:t>
+            </a:r>
+            <a:r>
+              <a:rPr lang="en-US" b="1" dirty="0" smtClean="0"/>
+              <a:t>negative loan status </a:t>
+            </a:r>
+            <a:r>
+              <a:rPr lang="en-US" b="1" dirty="0" smtClean="0"/>
+              <a:t>and inform superior loan picking strategy for investors</a:t>
             </a:r>
             <a:endParaRPr lang="en-US" b="1" dirty="0"/>
           </a:p>
@@ -9771,14 +9582,14 @@
           <p:nvPr>
             <p:extLst>
               <p:ext uri="{D42A27DB-BD31-4B8C-83A1-F6EECF244321}">
-                <p14:modId xmlns:p14="http://schemas.microsoft.com/office/powerpoint/2010/main" val="4059052505"/>
+                <p14:modId xmlns:p14="http://schemas.microsoft.com/office/powerpoint/2010/main" val="3721584773"/>
               </p:ext>
             </p:extLst>
           </p:nvPr>
         </p:nvGraphicFramePr>
         <p:xfrm>
           <a:off x="1524000" y="1397000"/>
-          <a:ext cx="6096000" cy="4758575"/>
+          <a:ext cx="6096000" cy="3977640"/>
         </p:xfrm>
         <a:graphic>
           <a:graphicData uri="http://schemas.openxmlformats.org/drawingml/2006/table">
@@ -9824,7 +9635,7 @@
                     <a:p>
                       <a:r>
                         <a:rPr lang="en-US" dirty="0" smtClean="0"/>
-                        <a:t>Probability of Loan Default</a:t>
+                        <a:t>Prob. Loan Not Fully Paid Off</a:t>
                       </a:r>
                       <a:endParaRPr lang="en-US" dirty="0"/>
                     </a:p>
@@ -9894,7 +9705,11 @@
                     <a:p>
                       <a:r>
                         <a:rPr lang="en-US" dirty="0" smtClean="0"/>
-                        <a:t>                Higher</a:t>
+                        <a:t>                </a:t>
+                      </a:r>
+                      <a:r>
+                        <a:rPr lang="en-US" dirty="0" smtClean="0"/>
+                        <a:t>Lower</a:t>
                       </a:r>
                       <a:endParaRPr lang="en-US" dirty="0"/>
                     </a:p>
@@ -10074,49 +9889,6 @@
                   </a:ext>
                 </a:extLst>
               </a:tr>
-              <a:tr h="780935">
-                <a:tc>
-                  <a:txBody>
-                    <a:bodyPr/>
-                    <a:lstStyle/>
-                    <a:p>
-                      <a:r>
-                        <a:rPr lang="en-US" b="0" i="1" dirty="0" smtClean="0"/>
-                        <a:t>Loan</a:t>
-                      </a:r>
-                      <a:r>
-                        <a:rPr lang="en-US" b="0" i="1" baseline="0" dirty="0" smtClean="0"/>
-                        <a:t> Amount</a:t>
-                      </a:r>
-                      <a:endParaRPr lang="en-US" b="0" i="1" dirty="0"/>
-                    </a:p>
-                  </a:txBody>
-                  <a:tcPr/>
-                </a:tc>
-                <a:tc>
-                  <a:txBody>
-                    <a:bodyPr/>
-                    <a:lstStyle/>
-                    <a:p>
-                      <a:r>
-                        <a:rPr lang="en-US" dirty="0" smtClean="0"/>
-                        <a:t>                 Higher</a:t>
-                      </a:r>
-                      <a:r>
-                        <a:rPr lang="en-US" baseline="0" dirty="0" smtClean="0"/>
-                        <a:t> (correlated    with income)</a:t>
-                      </a:r>
-                      <a:endParaRPr lang="en-US" dirty="0"/>
-                    </a:p>
-                  </a:txBody>
-                  <a:tcPr/>
-                </a:tc>
-                <a:extLst>
-                  <a:ext uri="{0D108BD9-81ED-4DB2-BD59-A6C34878D82A}">
-                    <a16:rowId xmlns:a16="http://schemas.microsoft.com/office/drawing/2014/main" val="3838165317"/>
-                  </a:ext>
-                </a:extLst>
-              </a:tr>
               <a:tr h="370840">
                 <a:tc>
                   <a:txBody>
@@ -10365,13 +10137,13 @@
       </p:sp>
       <p:sp>
         <p:nvSpPr>
-          <p:cNvPr id="10" name="Up Arrow 9"/>
+          <p:cNvPr id="11" name="Up Arrow 10"/>
           <p:cNvSpPr/>
           <p:nvPr/>
         </p:nvSpPr>
         <p:spPr>
           <a:xfrm>
-            <a:off x="4895272" y="4415282"/>
+            <a:off x="4895272" y="4415702"/>
             <a:ext cx="489527" cy="304800"/>
           </a:xfrm>
           <a:prstGeom prst="upArrow">
@@ -10406,13 +10178,13 @@
       </p:sp>
       <p:sp>
         <p:nvSpPr>
-          <p:cNvPr id="11" name="Up Arrow 10"/>
+          <p:cNvPr id="12" name="Up Arrow 11"/>
           <p:cNvSpPr/>
           <p:nvPr/>
         </p:nvSpPr>
         <p:spPr>
           <a:xfrm>
-            <a:off x="4899888" y="5150808"/>
+            <a:off x="4895272" y="4800426"/>
             <a:ext cx="489527" cy="304800"/>
           </a:xfrm>
           <a:prstGeom prst="upArrow">
@@ -10447,42 +10219,31 @@
       </p:sp>
       <p:sp>
         <p:nvSpPr>
-          <p:cNvPr id="12" name="Up Arrow 11"/>
-          <p:cNvSpPr/>
+          <p:cNvPr id="3" name="TextBox 2"/>
+          <p:cNvSpPr txBox="1"/>
           <p:nvPr/>
         </p:nvSpPr>
         <p:spPr>
           <a:xfrm>
-            <a:off x="4895272" y="5533961"/>
-            <a:ext cx="489527" cy="304800"/>
+            <a:off x="1115568" y="5687568"/>
+            <a:ext cx="7132320" cy="461665"/>
           </a:xfrm>
-          <a:prstGeom prst="upArrow">
+          <a:prstGeom prst="rect">
             <a:avLst/>
           </a:prstGeom>
-          <a:solidFill>
-            <a:srgbClr val="FF0000"/>
-          </a:solidFill>
+          <a:noFill/>
         </p:spPr>
-        <p:style>
-          <a:lnRef idx="1">
-            <a:schemeClr val="accent1"/>
-          </a:lnRef>
-          <a:fillRef idx="3">
-            <a:schemeClr val="accent1"/>
-          </a:fillRef>
-          <a:effectRef idx="2">
-            <a:schemeClr val="accent1"/>
-          </a:effectRef>
-          <a:fontRef idx="minor">
-            <a:schemeClr val="lt1"/>
-          </a:fontRef>
-        </p:style>
-        <p:txBody>
-          <a:bodyPr rtlCol="0" anchor="ctr"/>
+        <p:txBody>
+          <a:bodyPr wrap="square" rtlCol="0">
+            <a:spAutoFit/>
+          </a:bodyPr>
           <a:lstStyle/>
           <a:p>
-            <a:pPr algn="ctr"/>
-            <a:endParaRPr lang="en-US"/>
+            <a:r>
+              <a:rPr lang="en-US" sz="2400" b="1" dirty="0" smtClean="0"/>
+              <a:t>Hypotheses are confirmed by logit model coefficients</a:t>
+            </a:r>
+            <a:endParaRPr lang="en-US" sz="2400" b="1" dirty="0"/>
           </a:p>
         </p:txBody>
       </p:sp>
@@ -11182,11 +10943,7 @@
             </a:pPr>
             <a:r>
               <a:rPr lang="en-US" b="1" dirty="0" smtClean="0"/>
-              <a:t>Random </a:t>
-            </a:r>
-            <a:r>
-              <a:rPr lang="en-US" b="1" dirty="0" smtClean="0"/>
-              <a:t>Forest : 150 trees, max_features = 8 minimizes RMSE</a:t>
+              <a:t>Random Forest : 150 trees, max_features = 8 minimizes RMSE</a:t>
             </a:r>
           </a:p>
           <a:p>

</xml_diff>